<commit_message>
Updated README.md to reflect new objective and questions. Upload Working_Presentation.pptx
</commit_message>
<xml_diff>
--- a/Working_Presentation.pptx
+++ b/Working_Presentation.pptx
@@ -8,11 +8,15 @@
     <p:sldId id="256" r:id="rId2"/>
     <p:sldId id="257" r:id="rId3"/>
     <p:sldId id="262" r:id="rId4"/>
-    <p:sldId id="259" r:id="rId5"/>
-    <p:sldId id="261" r:id="rId6"/>
-    <p:sldId id="260" r:id="rId7"/>
-    <p:sldId id="258" r:id="rId8"/>
-    <p:sldId id="263" r:id="rId9"/>
+    <p:sldId id="264" r:id="rId5"/>
+    <p:sldId id="259" r:id="rId6"/>
+    <p:sldId id="261" r:id="rId7"/>
+    <p:sldId id="260" r:id="rId8"/>
+    <p:sldId id="258" r:id="rId9"/>
+    <p:sldId id="263" r:id="rId10"/>
+    <p:sldId id="265" r:id="rId11"/>
+    <p:sldId id="266" r:id="rId12"/>
+    <p:sldId id="267" r:id="rId13"/>
   </p:sldIdLst>
   <p:sldSz cx="12192000" cy="6858000"/>
   <p:notesSz cx="6858000" cy="9144000"/>
@@ -111,6 +115,11 @@
       </a:defRPr>
     </a:lvl9pPr>
   </p:defaultTextStyle>
+  <p:extLst>
+    <p:ext uri="{EFAFB233-063F-42B5-8137-9DF3F51BA10A}">
+      <p15:sldGuideLst xmlns:p15="http://schemas.microsoft.com/office/powerpoint/2012/main"/>
+    </p:ext>
+  </p:extLst>
 </p:presentation>
 </file>
 
@@ -446,7 +455,7 @@
             <a:fld id="{B61BEF0D-F0BB-DE4B-95CE-6DB70DBA9567}" type="datetimeFigureOut">
               <a:rPr lang="en-US" dirty="0"/>
               <a:pPr/>
-              <a:t>7/1/2019</a:t>
+              <a:t>7/2/2019</a:t>
             </a:fld>
             <a:endParaRPr lang="en-US" dirty="0"/>
           </a:p>
@@ -767,7 +776,7 @@
             <a:fld id="{B61BEF0D-F0BB-DE4B-95CE-6DB70DBA9567}" type="datetimeFigureOut">
               <a:rPr lang="en-US" dirty="0"/>
               <a:pPr/>
-              <a:t>7/1/2019</a:t>
+              <a:t>7/2/2019</a:t>
             </a:fld>
             <a:endParaRPr lang="en-US" dirty="0"/>
           </a:p>
@@ -1012,7 +1021,7 @@
             <a:fld id="{B61BEF0D-F0BB-DE4B-95CE-6DB70DBA9567}" type="datetimeFigureOut">
               <a:rPr lang="en-US" dirty="0"/>
               <a:pPr/>
-              <a:t>7/1/2019</a:t>
+              <a:t>7/2/2019</a:t>
             </a:fld>
             <a:endParaRPr lang="en-US" dirty="0"/>
           </a:p>
@@ -1348,7 +1357,7 @@
             <a:fld id="{B61BEF0D-F0BB-DE4B-95CE-6DB70DBA9567}" type="datetimeFigureOut">
               <a:rPr lang="en-US" dirty="0"/>
               <a:pPr/>
-              <a:t>7/1/2019</a:t>
+              <a:t>7/2/2019</a:t>
             </a:fld>
             <a:endParaRPr lang="en-US" dirty="0"/>
           </a:p>
@@ -1692,7 +1701,7 @@
             <a:fld id="{B61BEF0D-F0BB-DE4B-95CE-6DB70DBA9567}" type="datetimeFigureOut">
               <a:rPr lang="en-US" dirty="0"/>
               <a:pPr/>
-              <a:t>7/1/2019</a:t>
+              <a:t>7/2/2019</a:t>
             </a:fld>
             <a:endParaRPr lang="en-US" dirty="0"/>
           </a:p>
@@ -2063,7 +2072,7 @@
             <a:fld id="{B61BEF0D-F0BB-DE4B-95CE-6DB70DBA9567}" type="datetimeFigureOut">
               <a:rPr lang="en-US" dirty="0"/>
               <a:pPr/>
-              <a:t>7/1/2019</a:t>
+              <a:t>7/2/2019</a:t>
             </a:fld>
             <a:endParaRPr lang="en-US" dirty="0"/>
           </a:p>
@@ -2530,7 +2539,7 @@
             <a:fld id="{B61BEF0D-F0BB-DE4B-95CE-6DB70DBA9567}" type="datetimeFigureOut">
               <a:rPr lang="en-US" dirty="0"/>
               <a:pPr/>
-              <a:t>7/1/2019</a:t>
+              <a:t>7/2/2019</a:t>
             </a:fld>
             <a:endParaRPr lang="en-US" dirty="0"/>
           </a:p>
@@ -2732,7 +2741,7 @@
             <a:fld id="{B61BEF0D-F0BB-DE4B-95CE-6DB70DBA9567}" type="datetimeFigureOut">
               <a:rPr lang="en-US" dirty="0"/>
               <a:pPr/>
-              <a:t>7/1/2019</a:t>
+              <a:t>7/2/2019</a:t>
             </a:fld>
             <a:endParaRPr lang="en-US" dirty="0"/>
           </a:p>
@@ -2940,7 +2949,7 @@
             <a:fld id="{B61BEF0D-F0BB-DE4B-95CE-6DB70DBA9567}" type="datetimeFigureOut">
               <a:rPr lang="en-US" dirty="0"/>
               <a:pPr/>
-              <a:t>7/1/2019</a:t>
+              <a:t>7/2/2019</a:t>
             </a:fld>
             <a:endParaRPr lang="en-US" dirty="0"/>
           </a:p>
@@ -3168,7 +3177,7 @@
           <a:p>
             <a:fld id="{52647F38-B617-4D2F-AE0A-013F0C4D2C57}" type="datetimeFigureOut">
               <a:rPr lang="en-US" dirty="0"/>
-              <a:t>7/1/2019</a:t>
+              <a:t>7/2/2019</a:t>
             </a:fld>
             <a:endParaRPr lang="en-US" dirty="0"/>
           </a:p>
@@ -3412,7 +3421,7 @@
             <a:fld id="{B61BEF0D-F0BB-DE4B-95CE-6DB70DBA9567}" type="datetimeFigureOut">
               <a:rPr lang="en-US" dirty="0"/>
               <a:pPr/>
-              <a:t>7/1/2019</a:t>
+              <a:t>7/2/2019</a:t>
             </a:fld>
             <a:endParaRPr lang="en-US" dirty="0"/>
           </a:p>
@@ -3706,7 +3715,7 @@
           <a:p>
             <a:fld id="{05BFA754-D5C3-4E66-96A6-867B257F58DC}" type="datetimeFigureOut">
               <a:rPr lang="en-US" dirty="0"/>
-              <a:t>7/1/2019</a:t>
+              <a:t>7/2/2019</a:t>
             </a:fld>
             <a:endParaRPr lang="en-US" dirty="0"/>
           </a:p>
@@ -4096,7 +4105,7 @@
             <a:fld id="{B61BEF0D-F0BB-DE4B-95CE-6DB70DBA9567}" type="datetimeFigureOut">
               <a:rPr lang="en-US" dirty="0"/>
               <a:pPr/>
-              <a:t>7/1/2019</a:t>
+              <a:t>7/2/2019</a:t>
             </a:fld>
             <a:endParaRPr lang="en-US" dirty="0"/>
           </a:p>
@@ -4242,7 +4251,7 @@
             <a:fld id="{B61BEF0D-F0BB-DE4B-95CE-6DB70DBA9567}" type="datetimeFigureOut">
               <a:rPr lang="en-US" dirty="0"/>
               <a:pPr/>
-              <a:t>7/1/2019</a:t>
+              <a:t>7/2/2019</a:t>
             </a:fld>
             <a:endParaRPr lang="en-US" dirty="0"/>
           </a:p>
@@ -4365,7 +4374,7 @@
             <a:fld id="{B61BEF0D-F0BB-DE4B-95CE-6DB70DBA9567}" type="datetimeFigureOut">
               <a:rPr lang="en-US" dirty="0"/>
               <a:pPr/>
-              <a:t>7/1/2019</a:t>
+              <a:t>7/2/2019</a:t>
             </a:fld>
             <a:endParaRPr lang="en-US" dirty="0"/>
           </a:p>
@@ -4617,7 +4626,7 @@
             <a:fld id="{B61BEF0D-F0BB-DE4B-95CE-6DB70DBA9567}" type="datetimeFigureOut">
               <a:rPr lang="en-US" dirty="0"/>
               <a:pPr/>
-              <a:t>7/1/2019</a:t>
+              <a:t>7/2/2019</a:t>
             </a:fld>
             <a:endParaRPr lang="en-US" dirty="0"/>
           </a:p>
@@ -4929,7 +4938,7 @@
             <a:fld id="{B61BEF0D-F0BB-DE4B-95CE-6DB70DBA9567}" type="datetimeFigureOut">
               <a:rPr lang="en-US" dirty="0"/>
               <a:pPr/>
-              <a:t>7/1/2019</a:t>
+              <a:t>7/2/2019</a:t>
             </a:fld>
             <a:endParaRPr lang="en-US" dirty="0"/>
           </a:p>
@@ -5277,7 +5286,7 @@
             <a:fld id="{B61BEF0D-F0BB-DE4B-95CE-6DB70DBA9567}" type="datetimeFigureOut">
               <a:rPr lang="en-US" dirty="0"/>
               <a:pPr/>
-              <a:t>7/1/2019</a:t>
+              <a:t>7/2/2019</a:t>
             </a:fld>
             <a:endParaRPr lang="en-US" dirty="0"/>
           </a:p>
@@ -5839,7 +5848,7 @@
           <a:p>
             <a:r>
               <a:rPr lang="en-US" dirty="0"/>
-              <a:t>The IQ’s 2018 Best State Choice</a:t>
+              <a:t>The IQ’s 2018 Best State for Employee</a:t>
             </a:r>
           </a:p>
         </p:txBody>
@@ -5884,6 +5893,330 @@
     <p:extLst>
       <p:ext uri="{BB962C8B-B14F-4D97-AF65-F5344CB8AC3E}">
         <p14:creationId xmlns:p14="http://schemas.microsoft.com/office/powerpoint/2010/main" val="3896973568"/>
+      </p:ext>
+    </p:extLst>
+  </p:cSld>
+  <p:clrMapOvr>
+    <a:masterClrMapping/>
+  </p:clrMapOvr>
+</p:sld>
+</file>
+
+<file path=ppt/slides/slide10.xml><?xml version="1.0" encoding="utf-8"?>
+<p:sld xmlns:a="http://schemas.openxmlformats.org/drawingml/2006/main" xmlns:r="http://schemas.openxmlformats.org/officeDocument/2006/relationships" xmlns:p="http://schemas.openxmlformats.org/presentationml/2006/main">
+  <p:cSld>
+    <p:spTree>
+      <p:nvGrpSpPr>
+        <p:cNvPr id="1" name=""/>
+        <p:cNvGrpSpPr/>
+        <p:nvPr/>
+      </p:nvGrpSpPr>
+      <p:grpSpPr>
+        <a:xfrm>
+          <a:off x="0" y="0"/>
+          <a:ext cx="0" cy="0"/>
+          <a:chOff x="0" y="0"/>
+          <a:chExt cx="0" cy="0"/>
+        </a:xfrm>
+      </p:grpSpPr>
+      <p:sp>
+        <p:nvSpPr>
+          <p:cNvPr id="2" name="Title 1">
+            <a:extLst>
+              <a:ext uri="{FF2B5EF4-FFF2-40B4-BE49-F238E27FC236}">
+                <a16:creationId xmlns:a16="http://schemas.microsoft.com/office/drawing/2014/main" id="{1917A588-6B43-4326-8CEE-B31FA8CC4FDB}"/>
+              </a:ext>
+            </a:extLst>
+          </p:cNvPr>
+          <p:cNvSpPr>
+            <a:spLocks noGrp="1"/>
+          </p:cNvSpPr>
+          <p:nvPr>
+            <p:ph type="title"/>
+          </p:nvPr>
+        </p:nvSpPr>
+        <p:spPr/>
+        <p:txBody>
+          <a:bodyPr/>
+          <a:lstStyle/>
+          <a:p>
+            <a:r>
+              <a:rPr lang="en-US" dirty="0"/>
+              <a:t>Unemployment &amp; Crime Rate - Catherine</a:t>
+            </a:r>
+          </a:p>
+        </p:txBody>
+      </p:sp>
+      <p:sp>
+        <p:nvSpPr>
+          <p:cNvPr id="3" name="Content Placeholder 2">
+            <a:extLst>
+              <a:ext uri="{FF2B5EF4-FFF2-40B4-BE49-F238E27FC236}">
+                <a16:creationId xmlns:a16="http://schemas.microsoft.com/office/drawing/2014/main" id="{F5BE9D4D-949C-4037-9F87-16CDE0EE0466}"/>
+              </a:ext>
+            </a:extLst>
+          </p:cNvPr>
+          <p:cNvSpPr>
+            <a:spLocks noGrp="1"/>
+          </p:cNvSpPr>
+          <p:nvPr>
+            <p:ph idx="1"/>
+          </p:nvPr>
+        </p:nvSpPr>
+        <p:spPr/>
+        <p:txBody>
+          <a:bodyPr/>
+          <a:lstStyle/>
+          <a:p>
+            <a:r>
+              <a:rPr lang="en-US" dirty="0"/>
+              <a:t>Lower </a:t>
+            </a:r>
+            <a:r>
+              <a:rPr lang="en-US" dirty="0">
+                <a:solidFill>
+                  <a:srgbClr val="FF0000"/>
+                </a:solidFill>
+              </a:rPr>
+              <a:t>unemployment</a:t>
+            </a:r>
+            <a:r>
+              <a:rPr lang="en-US" dirty="0"/>
+              <a:t> correlated to </a:t>
+            </a:r>
+            <a:r>
+              <a:rPr lang="en-US" dirty="0">
+                <a:solidFill>
+                  <a:srgbClr val="FF0000"/>
+                </a:solidFill>
+              </a:rPr>
+              <a:t>crime rate</a:t>
+            </a:r>
+            <a:r>
+              <a:rPr lang="en-US" dirty="0"/>
+              <a:t>?</a:t>
+            </a:r>
+          </a:p>
+          <a:p>
+            <a:r>
+              <a:rPr lang="en-US" i="1" dirty="0"/>
+              <a:t>Write description/ observation and supporting plots (minimum 2) here</a:t>
+            </a:r>
+          </a:p>
+        </p:txBody>
+      </p:sp>
+    </p:spTree>
+    <p:extLst>
+      <p:ext uri="{BB962C8B-B14F-4D97-AF65-F5344CB8AC3E}">
+        <p14:creationId xmlns:p14="http://schemas.microsoft.com/office/powerpoint/2010/main" val="4121259519"/>
+      </p:ext>
+    </p:extLst>
+  </p:cSld>
+  <p:clrMapOvr>
+    <a:masterClrMapping/>
+  </p:clrMapOvr>
+</p:sld>
+</file>
+
+<file path=ppt/slides/slide11.xml><?xml version="1.0" encoding="utf-8"?>
+<p:sld xmlns:a="http://schemas.openxmlformats.org/drawingml/2006/main" xmlns:r="http://schemas.openxmlformats.org/officeDocument/2006/relationships" xmlns:p="http://schemas.openxmlformats.org/presentationml/2006/main">
+  <p:cSld>
+    <p:spTree>
+      <p:nvGrpSpPr>
+        <p:cNvPr id="1" name=""/>
+        <p:cNvGrpSpPr/>
+        <p:nvPr/>
+      </p:nvGrpSpPr>
+      <p:grpSpPr>
+        <a:xfrm>
+          <a:off x="0" y="0"/>
+          <a:ext cx="0" cy="0"/>
+          <a:chOff x="0" y="0"/>
+          <a:chExt cx="0" cy="0"/>
+        </a:xfrm>
+      </p:grpSpPr>
+      <p:sp>
+        <p:nvSpPr>
+          <p:cNvPr id="2" name="Title 1">
+            <a:extLst>
+              <a:ext uri="{FF2B5EF4-FFF2-40B4-BE49-F238E27FC236}">
+                <a16:creationId xmlns:a16="http://schemas.microsoft.com/office/drawing/2014/main" id="{1917A588-6B43-4326-8CEE-B31FA8CC4FDB}"/>
+              </a:ext>
+            </a:extLst>
+          </p:cNvPr>
+          <p:cNvSpPr>
+            <a:spLocks noGrp="1"/>
+          </p:cNvSpPr>
+          <p:nvPr>
+            <p:ph type="title"/>
+          </p:nvPr>
+        </p:nvSpPr>
+        <p:spPr/>
+        <p:txBody>
+          <a:bodyPr/>
+          <a:lstStyle/>
+          <a:p>
+            <a:r>
+              <a:rPr lang="en-US" dirty="0"/>
+              <a:t>Salary - Molly</a:t>
+            </a:r>
+          </a:p>
+        </p:txBody>
+      </p:sp>
+      <p:sp>
+        <p:nvSpPr>
+          <p:cNvPr id="3" name="Content Placeholder 2">
+            <a:extLst>
+              <a:ext uri="{FF2B5EF4-FFF2-40B4-BE49-F238E27FC236}">
+                <a16:creationId xmlns:a16="http://schemas.microsoft.com/office/drawing/2014/main" id="{F5BE9D4D-949C-4037-9F87-16CDE0EE0466}"/>
+              </a:ext>
+            </a:extLst>
+          </p:cNvPr>
+          <p:cNvSpPr>
+            <a:spLocks noGrp="1"/>
+          </p:cNvSpPr>
+          <p:nvPr>
+            <p:ph idx="1"/>
+          </p:nvPr>
+        </p:nvSpPr>
+        <p:spPr/>
+        <p:txBody>
+          <a:bodyPr/>
+          <a:lstStyle/>
+          <a:p>
+            <a:r>
+              <a:rPr lang="en-US" dirty="0"/>
+              <a:t>Higher </a:t>
+            </a:r>
+            <a:r>
+              <a:rPr lang="en-US" dirty="0">
+                <a:solidFill>
+                  <a:srgbClr val="FF0000"/>
+                </a:solidFill>
+              </a:rPr>
+              <a:t>salary</a:t>
+            </a:r>
+            <a:r>
+              <a:rPr lang="en-US" dirty="0"/>
+              <a:t> states are the preferred ones?</a:t>
+            </a:r>
+          </a:p>
+          <a:p>
+            <a:r>
+              <a:rPr lang="en-US" i="1" dirty="0"/>
+              <a:t>Write description/ observation and supporting plots (minimum 2) here</a:t>
+            </a:r>
+          </a:p>
+        </p:txBody>
+      </p:sp>
+    </p:spTree>
+    <p:extLst>
+      <p:ext uri="{BB962C8B-B14F-4D97-AF65-F5344CB8AC3E}">
+        <p14:creationId xmlns:p14="http://schemas.microsoft.com/office/powerpoint/2010/main" val="1530488418"/>
+      </p:ext>
+    </p:extLst>
+  </p:cSld>
+  <p:clrMapOvr>
+    <a:masterClrMapping/>
+  </p:clrMapOvr>
+</p:sld>
+</file>
+
+<file path=ppt/slides/slide12.xml><?xml version="1.0" encoding="utf-8"?>
+<p:sld xmlns:a="http://schemas.openxmlformats.org/drawingml/2006/main" xmlns:r="http://schemas.openxmlformats.org/officeDocument/2006/relationships" xmlns:p="http://schemas.openxmlformats.org/presentationml/2006/main">
+  <p:cSld>
+    <p:spTree>
+      <p:nvGrpSpPr>
+        <p:cNvPr id="1" name=""/>
+        <p:cNvGrpSpPr/>
+        <p:nvPr/>
+      </p:nvGrpSpPr>
+      <p:grpSpPr>
+        <a:xfrm>
+          <a:off x="0" y="0"/>
+          <a:ext cx="0" cy="0"/>
+          <a:chOff x="0" y="0"/>
+          <a:chExt cx="0" cy="0"/>
+        </a:xfrm>
+      </p:grpSpPr>
+      <p:sp>
+        <p:nvSpPr>
+          <p:cNvPr id="2" name="Title 1">
+            <a:extLst>
+              <a:ext uri="{FF2B5EF4-FFF2-40B4-BE49-F238E27FC236}">
+                <a16:creationId xmlns:a16="http://schemas.microsoft.com/office/drawing/2014/main" id="{1917A588-6B43-4326-8CEE-B31FA8CC4FDB}"/>
+              </a:ext>
+            </a:extLst>
+          </p:cNvPr>
+          <p:cNvSpPr>
+            <a:spLocks noGrp="1"/>
+          </p:cNvSpPr>
+          <p:nvPr>
+            <p:ph type="title"/>
+          </p:nvPr>
+        </p:nvSpPr>
+        <p:spPr/>
+        <p:txBody>
+          <a:bodyPr/>
+          <a:lstStyle/>
+          <a:p>
+            <a:r>
+              <a:rPr lang="en-US" dirty="0"/>
+              <a:t>Climate - Prakash</a:t>
+            </a:r>
+          </a:p>
+        </p:txBody>
+      </p:sp>
+      <p:sp>
+        <p:nvSpPr>
+          <p:cNvPr id="3" name="Content Placeholder 2">
+            <a:extLst>
+              <a:ext uri="{FF2B5EF4-FFF2-40B4-BE49-F238E27FC236}">
+                <a16:creationId xmlns:a16="http://schemas.microsoft.com/office/drawing/2014/main" id="{F5BE9D4D-949C-4037-9F87-16CDE0EE0466}"/>
+              </a:ext>
+            </a:extLst>
+          </p:cNvPr>
+          <p:cNvSpPr>
+            <a:spLocks noGrp="1"/>
+          </p:cNvSpPr>
+          <p:nvPr>
+            <p:ph idx="1"/>
+          </p:nvPr>
+        </p:nvSpPr>
+        <p:spPr/>
+        <p:txBody>
+          <a:bodyPr/>
+          <a:lstStyle/>
+          <a:p>
+            <a:r>
+              <a:rPr lang="en-US" dirty="0"/>
+              <a:t>Warmer </a:t>
+            </a:r>
+            <a:r>
+              <a:rPr lang="en-US" dirty="0">
+                <a:solidFill>
+                  <a:srgbClr val="FF0000"/>
+                </a:solidFill>
+              </a:rPr>
+              <a:t>climate</a:t>
+            </a:r>
+            <a:r>
+              <a:rPr lang="en-US" dirty="0"/>
+              <a:t> preferred state to live in, correlate to home price?</a:t>
+            </a:r>
+          </a:p>
+          <a:p>
+            <a:r>
+              <a:rPr lang="en-US" i="1" dirty="0"/>
+              <a:t>Write description/ observation and supporting plots (minimum 2) here</a:t>
+            </a:r>
+          </a:p>
+        </p:txBody>
+      </p:sp>
+    </p:spTree>
+    <p:extLst>
+      <p:ext uri="{BB962C8B-B14F-4D97-AF65-F5344CB8AC3E}">
+        <p14:creationId xmlns:p14="http://schemas.microsoft.com/office/powerpoint/2010/main" val="4136999629"/>
       </p:ext>
     </p:extLst>
   </p:cSld>
@@ -5957,37 +6290,70 @@
         <p:spPr/>
         <p:txBody>
           <a:bodyPr>
-            <a:normAutofit fontScale="92500"/>
+            <a:normAutofit fontScale="92500" lnSpcReduction="10000"/>
           </a:bodyPr>
           <a:lstStyle/>
           <a:p>
             <a:r>
               <a:rPr lang="en-US" dirty="0"/>
-              <a:t>Our opinion on Best State to live in 2018</a:t>
-            </a:r>
-          </a:p>
-          <a:p>
-            <a:r>
-              <a:rPr lang="en-US" dirty="0"/>
-              <a:t>We're trying figure out the best state to live in by the questions we have, plotting correlation, geo maps at city level. </a:t>
-            </a:r>
-          </a:p>
-          <a:p>
-            <a:r>
-              <a:rPr lang="en-US" dirty="0"/>
-              <a:t>We will rank the cities and go the most state that has the highest ranks. </a:t>
-            </a:r>
-          </a:p>
-          <a:p>
-            <a:r>
-              <a:rPr lang="en-US" dirty="0"/>
-              <a:t>Assumptions are low crime rate and unemployment rate may be preferred place. </a:t>
-            </a:r>
-          </a:p>
-          <a:p>
-            <a:r>
-              <a:rPr lang="en-US" dirty="0"/>
-              <a:t>Higher salary also another reason people get drawn to a particular state. Due to higher salary may cause higher home prices.</a:t>
+              <a:t>Our opinion on Best State to live in 2018 for </a:t>
+            </a:r>
+            <a:r>
+              <a:rPr lang="en-US" dirty="0">
+                <a:solidFill>
+                  <a:srgbClr val="FF0000"/>
+                </a:solidFill>
+              </a:rPr>
+              <a:t>“employee” </a:t>
+            </a:r>
+            <a:r>
+              <a:rPr lang="en-US" dirty="0">
+                <a:solidFill>
+                  <a:schemeClr val="tx1"/>
+                </a:solidFill>
+              </a:rPr>
+              <a:t>from 5 criteria below, </a:t>
+            </a:r>
+          </a:p>
+          <a:p>
+            <a:pPr lvl="1"/>
+            <a:r>
+              <a:rPr lang="en-US" dirty="0"/>
+              <a:t>State Tax</a:t>
+            </a:r>
+          </a:p>
+          <a:p>
+            <a:pPr lvl="1"/>
+            <a:r>
+              <a:rPr lang="en-US" dirty="0"/>
+              <a:t>Climate</a:t>
+            </a:r>
+          </a:p>
+          <a:p>
+            <a:pPr lvl="1"/>
+            <a:r>
+              <a:rPr lang="en-US" dirty="0"/>
+              <a:t>Unemployment rate</a:t>
+            </a:r>
+          </a:p>
+          <a:p>
+            <a:pPr lvl="1"/>
+            <a:r>
+              <a:rPr lang="en-US" dirty="0"/>
+              <a:t>Crime rate</a:t>
+            </a:r>
+          </a:p>
+          <a:p>
+            <a:pPr lvl="1"/>
+            <a:r>
+              <a:rPr lang="en-US" dirty="0"/>
+              <a:t>Salary </a:t>
+            </a:r>
+          </a:p>
+          <a:p>
+            <a:r>
+              <a:rPr lang="en-US" dirty="0"/>
+              <a:t>Through observations, plots and correlations, we’re to determine the best state for employee to work in.</a:t>
             </a:r>
           </a:p>
         </p:txBody>
@@ -6045,7 +6411,7 @@
           <a:p>
             <a:r>
               <a:rPr lang="en-US" dirty="0"/>
-              <a:t>Datasets Mapping</a:t>
+              <a:t>Supporting Datasets</a:t>
             </a:r>
           </a:p>
         </p:txBody>
@@ -6064,7 +6430,7 @@
         </p:nvSpPr>
         <p:spPr>
           <a:xfrm>
-            <a:off x="5292969" y="3596054"/>
+            <a:off x="5291503" y="2874670"/>
             <a:ext cx="1608993" cy="1222131"/>
           </a:xfrm>
           <a:prstGeom prst="rect">
@@ -6113,7 +6479,7 @@
         </p:nvSpPr>
         <p:spPr>
           <a:xfrm>
-            <a:off x="7036780" y="2488223"/>
+            <a:off x="7657393" y="2517544"/>
             <a:ext cx="2262549" cy="1222131"/>
           </a:xfrm>
           <a:prstGeom prst="ellipse">
@@ -6162,7 +6528,7 @@
         </p:nvSpPr>
         <p:spPr>
           <a:xfrm>
-            <a:off x="2892670" y="4792135"/>
+            <a:off x="2211253" y="4272246"/>
             <a:ext cx="2262552" cy="1303866"/>
           </a:xfrm>
           <a:prstGeom prst="ellipse">
@@ -6211,7 +6577,7 @@
         </p:nvSpPr>
         <p:spPr>
           <a:xfrm>
-            <a:off x="2892671" y="2488223"/>
+            <a:off x="2211253" y="2522853"/>
             <a:ext cx="2262552" cy="1222131"/>
           </a:xfrm>
           <a:prstGeom prst="ellipse">
@@ -6260,7 +6626,7 @@
         </p:nvSpPr>
         <p:spPr>
           <a:xfrm>
-            <a:off x="7036779" y="4873870"/>
+            <a:off x="7657392" y="4272246"/>
             <a:ext cx="2262549" cy="1222131"/>
           </a:xfrm>
           <a:prstGeom prst="ellipse">
@@ -6308,8 +6674,8 @@
           <p:nvPr/>
         </p:nvSpPr>
         <p:spPr>
-          <a:xfrm rot="3511498">
-            <a:off x="4655526" y="3665662"/>
+          <a:xfrm rot="2105362">
+            <a:off x="4556521" y="3227476"/>
             <a:ext cx="653560" cy="430822"/>
           </a:xfrm>
           <a:prstGeom prst="rightArrow">
@@ -6355,7 +6721,7 @@
         </p:nvSpPr>
         <p:spPr>
           <a:xfrm rot="12595974">
-            <a:off x="6964126" y="4422849"/>
+            <a:off x="6979992" y="4171008"/>
             <a:ext cx="653560" cy="430823"/>
           </a:xfrm>
           <a:prstGeom prst="rightArrow">
@@ -6401,7 +6767,7 @@
         </p:nvSpPr>
         <p:spPr>
           <a:xfrm rot="18872579">
-            <a:off x="4619737" y="4366181"/>
+            <a:off x="4593516" y="4272601"/>
             <a:ext cx="653560" cy="430823"/>
           </a:xfrm>
           <a:prstGeom prst="rightArrow">
@@ -6446,9 +6812,104 @@
           <p:nvPr/>
         </p:nvSpPr>
         <p:spPr>
-          <a:xfrm rot="6873628">
-            <a:off x="6895489" y="3670084"/>
+          <a:xfrm rot="8985750">
+            <a:off x="6945456" y="3173597"/>
             <a:ext cx="653560" cy="430823"/>
+          </a:xfrm>
+          <a:prstGeom prst="rightArrow">
+            <a:avLst/>
+          </a:prstGeom>
+        </p:spPr>
+        <p:style>
+          <a:lnRef idx="2">
+            <a:schemeClr val="accent1">
+              <a:shade val="50000"/>
+            </a:schemeClr>
+          </a:lnRef>
+          <a:fillRef idx="1">
+            <a:schemeClr val="accent1"/>
+          </a:fillRef>
+          <a:effectRef idx="0">
+            <a:schemeClr val="accent1"/>
+          </a:effectRef>
+          <a:fontRef idx="minor">
+            <a:schemeClr val="lt1"/>
+          </a:fontRef>
+        </p:style>
+        <p:txBody>
+          <a:bodyPr rtlCol="0" anchor="ctr"/>
+          <a:lstStyle/>
+          <a:p>
+            <a:pPr algn="ctr"/>
+            <a:endParaRPr lang="en-US"/>
+          </a:p>
+        </p:txBody>
+      </p:sp>
+      <p:sp>
+        <p:nvSpPr>
+          <p:cNvPr id="13" name="Oval 12">
+            <a:extLst>
+              <a:ext uri="{FF2B5EF4-FFF2-40B4-BE49-F238E27FC236}">
+                <a16:creationId xmlns:a16="http://schemas.microsoft.com/office/drawing/2014/main" id="{78A88E94-BBCA-4491-97F9-BD1AFC4AAED7}"/>
+              </a:ext>
+            </a:extLst>
+          </p:cNvPr>
+          <p:cNvSpPr/>
+          <p:nvPr/>
+        </p:nvSpPr>
+        <p:spPr>
+          <a:xfrm>
+            <a:off x="5044220" y="5007535"/>
+            <a:ext cx="2262552" cy="1222131"/>
+          </a:xfrm>
+          <a:prstGeom prst="ellipse">
+            <a:avLst/>
+          </a:prstGeom>
+        </p:spPr>
+        <p:style>
+          <a:lnRef idx="2">
+            <a:schemeClr val="accent1">
+              <a:shade val="50000"/>
+            </a:schemeClr>
+          </a:lnRef>
+          <a:fillRef idx="1">
+            <a:schemeClr val="accent1"/>
+          </a:fillRef>
+          <a:effectRef idx="0">
+            <a:schemeClr val="accent1"/>
+          </a:effectRef>
+          <a:fontRef idx="minor">
+            <a:schemeClr val="lt1"/>
+          </a:fontRef>
+        </p:style>
+        <p:txBody>
+          <a:bodyPr rtlCol="0" anchor="ctr"/>
+          <a:lstStyle/>
+          <a:p>
+            <a:pPr algn="ctr"/>
+            <a:r>
+              <a:rPr lang="en-US" dirty="0"/>
+              <a:t>State Tax</a:t>
+            </a:r>
+          </a:p>
+        </p:txBody>
+      </p:sp>
+      <p:sp>
+        <p:nvSpPr>
+          <p:cNvPr id="14" name="Arrow: Right 13">
+            <a:extLst>
+              <a:ext uri="{FF2B5EF4-FFF2-40B4-BE49-F238E27FC236}">
+                <a16:creationId xmlns:a16="http://schemas.microsoft.com/office/drawing/2014/main" id="{710BA0AC-1A55-4E4B-BAA9-F5E99A8A14DC}"/>
+              </a:ext>
+            </a:extLst>
+          </p:cNvPr>
+          <p:cNvSpPr/>
+          <p:nvPr/>
+        </p:nvSpPr>
+        <p:spPr>
+          <a:xfrm rot="16200000">
+            <a:off x="5832850" y="4343690"/>
+            <a:ext cx="653560" cy="430822"/>
           </a:xfrm>
           <a:prstGeom prst="rightArrow">
             <a:avLst/>
@@ -6509,6 +6970,36 @@
           <a:chExt cx="0" cy="0"/>
         </a:xfrm>
       </p:grpSpPr>
+      <p:pic>
+        <p:nvPicPr>
+          <p:cNvPr id="3" name="Picture 2">
+            <a:extLst>
+              <a:ext uri="{FF2B5EF4-FFF2-40B4-BE49-F238E27FC236}">
+                <a16:creationId xmlns:a16="http://schemas.microsoft.com/office/drawing/2014/main" id="{ECCBDFFA-2E8B-4AA2-9BC5-6ACE03B5F881}"/>
+              </a:ext>
+            </a:extLst>
+          </p:cNvPr>
+          <p:cNvPicPr>
+            <a:picLocks noChangeAspect="1"/>
+          </p:cNvPicPr>
+          <p:nvPr/>
+        </p:nvPicPr>
+        <p:blipFill>
+          <a:blip r:embed="rId2"/>
+          <a:stretch>
+            <a:fillRect/>
+          </a:stretch>
+        </p:blipFill>
+        <p:spPr>
+          <a:xfrm>
+            <a:off x="2874522" y="4715861"/>
+            <a:ext cx="3898685" cy="1398479"/>
+          </a:xfrm>
+          <a:prstGeom prst="rect">
+            <a:avLst/>
+          </a:prstGeom>
+        </p:spPr>
+      </p:pic>
       <p:sp>
         <p:nvSpPr>
           <p:cNvPr id="2" name="Title 1">
@@ -6525,6 +7016,2116 @@
             <p:ph type="title"/>
           </p:nvPr>
         </p:nvSpPr>
+        <p:spPr>
+          <a:xfrm>
+            <a:off x="1295402" y="683517"/>
+            <a:ext cx="9601196" cy="1303867"/>
+          </a:xfrm>
+        </p:spPr>
+        <p:txBody>
+          <a:bodyPr/>
+          <a:lstStyle/>
+          <a:p>
+            <a:r>
+              <a:rPr lang="en-US" dirty="0"/>
+              <a:t>Work Flow</a:t>
+            </a:r>
+          </a:p>
+        </p:txBody>
+      </p:sp>
+      <p:sp>
+        <p:nvSpPr>
+          <p:cNvPr id="4" name="Rectangle 3">
+            <a:extLst>
+              <a:ext uri="{FF2B5EF4-FFF2-40B4-BE49-F238E27FC236}">
+                <a16:creationId xmlns:a16="http://schemas.microsoft.com/office/drawing/2014/main" id="{982B98E6-7640-4E5E-AE9A-932FDB07F887}"/>
+              </a:ext>
+            </a:extLst>
+          </p:cNvPr>
+          <p:cNvSpPr/>
+          <p:nvPr/>
+        </p:nvSpPr>
+        <p:spPr>
+          <a:xfrm>
+            <a:off x="9604801" y="1822550"/>
+            <a:ext cx="1608993" cy="1222131"/>
+          </a:xfrm>
+          <a:prstGeom prst="rect">
+            <a:avLst/>
+          </a:prstGeom>
+        </p:spPr>
+        <p:style>
+          <a:lnRef idx="2">
+            <a:schemeClr val="accent1">
+              <a:shade val="50000"/>
+            </a:schemeClr>
+          </a:lnRef>
+          <a:fillRef idx="1">
+            <a:schemeClr val="accent1"/>
+          </a:fillRef>
+          <a:effectRef idx="0">
+            <a:schemeClr val="accent1"/>
+          </a:effectRef>
+          <a:fontRef idx="minor">
+            <a:schemeClr val="lt1"/>
+          </a:fontRef>
+        </p:style>
+        <p:txBody>
+          <a:bodyPr rtlCol="0" anchor="ctr"/>
+          <a:lstStyle/>
+          <a:p>
+            <a:pPr algn="ctr"/>
+            <a:r>
+              <a:rPr lang="en-US" dirty="0"/>
+              <a:t>2018 Best State Choice  </a:t>
+            </a:r>
+          </a:p>
+        </p:txBody>
+      </p:sp>
+      <p:sp>
+        <p:nvSpPr>
+          <p:cNvPr id="5" name="Oval 4">
+            <a:extLst>
+              <a:ext uri="{FF2B5EF4-FFF2-40B4-BE49-F238E27FC236}">
+                <a16:creationId xmlns:a16="http://schemas.microsoft.com/office/drawing/2014/main" id="{FA0737F6-BE34-4171-AED3-2654FE6F5793}"/>
+              </a:ext>
+            </a:extLst>
+          </p:cNvPr>
+          <p:cNvSpPr/>
+          <p:nvPr/>
+        </p:nvSpPr>
+        <p:spPr>
+          <a:xfrm>
+            <a:off x="978206" y="743284"/>
+            <a:ext cx="2450611" cy="1673608"/>
+          </a:xfrm>
+          <a:prstGeom prst="ellipse">
+            <a:avLst/>
+          </a:prstGeom>
+        </p:spPr>
+        <p:style>
+          <a:lnRef idx="2">
+            <a:schemeClr val="accent1">
+              <a:shade val="50000"/>
+            </a:schemeClr>
+          </a:lnRef>
+          <a:fillRef idx="1">
+            <a:schemeClr val="accent1"/>
+          </a:fillRef>
+          <a:effectRef idx="0">
+            <a:schemeClr val="accent1"/>
+          </a:effectRef>
+          <a:fontRef idx="minor">
+            <a:schemeClr val="lt1"/>
+          </a:fontRef>
+        </p:style>
+        <p:txBody>
+          <a:bodyPr rtlCol="0" anchor="ctr"/>
+          <a:lstStyle/>
+          <a:p>
+            <a:pPr algn="ctr"/>
+            <a:r>
+              <a:rPr lang="en-US" dirty="0"/>
+              <a:t> (1)</a:t>
+            </a:r>
+          </a:p>
+          <a:p>
+            <a:pPr algn="ctr"/>
+            <a:r>
+              <a:rPr lang="en-US" dirty="0"/>
+              <a:t>Get median home prices, salary, tax rate, climate per state</a:t>
+            </a:r>
+          </a:p>
+        </p:txBody>
+      </p:sp>
+      <p:sp>
+        <p:nvSpPr>
+          <p:cNvPr id="6" name="Oval 5">
+            <a:extLst>
+              <a:ext uri="{FF2B5EF4-FFF2-40B4-BE49-F238E27FC236}">
+                <a16:creationId xmlns:a16="http://schemas.microsoft.com/office/drawing/2014/main" id="{30930C6A-0445-40E8-A2E1-0CB8F9F25F79}"/>
+              </a:ext>
+            </a:extLst>
+          </p:cNvPr>
+          <p:cNvSpPr/>
+          <p:nvPr/>
+        </p:nvSpPr>
+        <p:spPr>
+          <a:xfrm>
+            <a:off x="1166238" y="3241442"/>
+            <a:ext cx="2233390" cy="1547981"/>
+          </a:xfrm>
+          <a:prstGeom prst="ellipse">
+            <a:avLst/>
+          </a:prstGeom>
+        </p:spPr>
+        <p:style>
+          <a:lnRef idx="2">
+            <a:schemeClr val="accent1">
+              <a:shade val="50000"/>
+            </a:schemeClr>
+          </a:lnRef>
+          <a:fillRef idx="1">
+            <a:schemeClr val="accent1"/>
+          </a:fillRef>
+          <a:effectRef idx="0">
+            <a:schemeClr val="accent1"/>
+          </a:effectRef>
+          <a:fontRef idx="minor">
+            <a:schemeClr val="lt1"/>
+          </a:fontRef>
+        </p:style>
+        <p:txBody>
+          <a:bodyPr rtlCol="0" anchor="ctr"/>
+          <a:lstStyle/>
+          <a:p>
+            <a:pPr algn="ctr"/>
+            <a:r>
+              <a:rPr lang="en-US" dirty="0"/>
+              <a:t>(2)</a:t>
+            </a:r>
+          </a:p>
+          <a:p>
+            <a:pPr algn="ctr"/>
+            <a:r>
+              <a:rPr lang="en-US" dirty="0"/>
+              <a:t>Get Unemployment vs Crime Rate correlation</a:t>
+            </a:r>
+          </a:p>
+        </p:txBody>
+      </p:sp>
+      <p:sp>
+        <p:nvSpPr>
+          <p:cNvPr id="7" name="Oval 6">
+            <a:extLst>
+              <a:ext uri="{FF2B5EF4-FFF2-40B4-BE49-F238E27FC236}">
+                <a16:creationId xmlns:a16="http://schemas.microsoft.com/office/drawing/2014/main" id="{43A8C126-D91E-4B2C-9ACB-9C7498D62767}"/>
+              </a:ext>
+            </a:extLst>
+          </p:cNvPr>
+          <p:cNvSpPr/>
+          <p:nvPr/>
+        </p:nvSpPr>
+        <p:spPr>
+          <a:xfrm>
+            <a:off x="4710549" y="3460447"/>
+            <a:ext cx="2262552" cy="1222131"/>
+          </a:xfrm>
+          <a:prstGeom prst="ellipse">
+            <a:avLst/>
+          </a:prstGeom>
+        </p:spPr>
+        <p:style>
+          <a:lnRef idx="2">
+            <a:schemeClr val="accent1">
+              <a:shade val="50000"/>
+            </a:schemeClr>
+          </a:lnRef>
+          <a:fillRef idx="1">
+            <a:schemeClr val="accent1"/>
+          </a:fillRef>
+          <a:effectRef idx="0">
+            <a:schemeClr val="accent1"/>
+          </a:effectRef>
+          <a:fontRef idx="minor">
+            <a:schemeClr val="lt1"/>
+          </a:fontRef>
+        </p:style>
+        <p:txBody>
+          <a:bodyPr rtlCol="0" anchor="ctr"/>
+          <a:lstStyle/>
+          <a:p>
+            <a:pPr algn="ctr"/>
+            <a:r>
+              <a:rPr lang="en-US" dirty="0"/>
+              <a:t>(4)</a:t>
+            </a:r>
+          </a:p>
+          <a:p>
+            <a:pPr algn="ctr"/>
+            <a:r>
+              <a:rPr lang="en-US" dirty="0"/>
+              <a:t>Get climate correlation to home price</a:t>
+            </a:r>
+          </a:p>
+        </p:txBody>
+      </p:sp>
+      <p:sp>
+        <p:nvSpPr>
+          <p:cNvPr id="8" name="Oval 7">
+            <a:extLst>
+              <a:ext uri="{FF2B5EF4-FFF2-40B4-BE49-F238E27FC236}">
+                <a16:creationId xmlns:a16="http://schemas.microsoft.com/office/drawing/2014/main" id="{93E43BBF-BD00-4285-8CFA-BC114AC1E2F7}"/>
+              </a:ext>
+            </a:extLst>
+          </p:cNvPr>
+          <p:cNvSpPr/>
+          <p:nvPr/>
+        </p:nvSpPr>
+        <p:spPr>
+          <a:xfrm>
+            <a:off x="6500636" y="1891321"/>
+            <a:ext cx="2262549" cy="1222131"/>
+          </a:xfrm>
+          <a:prstGeom prst="ellipse">
+            <a:avLst/>
+          </a:prstGeom>
+        </p:spPr>
+        <p:style>
+          <a:lnRef idx="2">
+            <a:schemeClr val="accent1">
+              <a:shade val="50000"/>
+            </a:schemeClr>
+          </a:lnRef>
+          <a:fillRef idx="1">
+            <a:schemeClr val="accent1"/>
+          </a:fillRef>
+          <a:effectRef idx="0">
+            <a:schemeClr val="accent1"/>
+          </a:effectRef>
+          <a:fontRef idx="minor">
+            <a:schemeClr val="lt1"/>
+          </a:fontRef>
+        </p:style>
+        <p:txBody>
+          <a:bodyPr rtlCol="0" anchor="ctr"/>
+          <a:lstStyle/>
+          <a:p>
+            <a:pPr algn="ctr"/>
+            <a:r>
+              <a:rPr lang="en-US" dirty="0"/>
+              <a:t>Analyze plots </a:t>
+            </a:r>
+          </a:p>
+        </p:txBody>
+      </p:sp>
+      <p:sp>
+        <p:nvSpPr>
+          <p:cNvPr id="9" name="Arrow: Right 8">
+            <a:extLst>
+              <a:ext uri="{FF2B5EF4-FFF2-40B4-BE49-F238E27FC236}">
+                <a16:creationId xmlns:a16="http://schemas.microsoft.com/office/drawing/2014/main" id="{B669EA5E-408C-4E0E-8F0B-0E3A3E4AF818}"/>
+              </a:ext>
+            </a:extLst>
+          </p:cNvPr>
+          <p:cNvSpPr/>
+          <p:nvPr/>
+        </p:nvSpPr>
+        <p:spPr>
+          <a:xfrm rot="5400000">
+            <a:off x="1876730" y="2613756"/>
+            <a:ext cx="653560" cy="430822"/>
+          </a:xfrm>
+          <a:prstGeom prst="rightArrow">
+            <a:avLst/>
+          </a:prstGeom>
+        </p:spPr>
+        <p:style>
+          <a:lnRef idx="2">
+            <a:schemeClr val="accent1">
+              <a:shade val="50000"/>
+            </a:schemeClr>
+          </a:lnRef>
+          <a:fillRef idx="1">
+            <a:schemeClr val="accent1"/>
+          </a:fillRef>
+          <a:effectRef idx="0">
+            <a:schemeClr val="accent1"/>
+          </a:effectRef>
+          <a:fontRef idx="minor">
+            <a:schemeClr val="lt1"/>
+          </a:fontRef>
+        </p:style>
+        <p:txBody>
+          <a:bodyPr rtlCol="0" anchor="ctr"/>
+          <a:lstStyle/>
+          <a:p>
+            <a:pPr algn="ctr"/>
+            <a:endParaRPr lang="en-US"/>
+          </a:p>
+        </p:txBody>
+      </p:sp>
+      <p:sp>
+        <p:nvSpPr>
+          <p:cNvPr id="10" name="Arrow: Right 9">
+            <a:extLst>
+              <a:ext uri="{FF2B5EF4-FFF2-40B4-BE49-F238E27FC236}">
+                <a16:creationId xmlns:a16="http://schemas.microsoft.com/office/drawing/2014/main" id="{3268ED5A-38FA-4167-88E1-99E13B3B5A68}"/>
+              </a:ext>
+            </a:extLst>
+          </p:cNvPr>
+          <p:cNvSpPr/>
+          <p:nvPr/>
+        </p:nvSpPr>
+        <p:spPr>
+          <a:xfrm rot="3247684">
+            <a:off x="4576953" y="3072325"/>
+            <a:ext cx="653560" cy="430823"/>
+          </a:xfrm>
+          <a:prstGeom prst="rightArrow">
+            <a:avLst/>
+          </a:prstGeom>
+        </p:spPr>
+        <p:style>
+          <a:lnRef idx="2">
+            <a:schemeClr val="accent1">
+              <a:shade val="50000"/>
+            </a:schemeClr>
+          </a:lnRef>
+          <a:fillRef idx="1">
+            <a:schemeClr val="accent1"/>
+          </a:fillRef>
+          <a:effectRef idx="0">
+            <a:schemeClr val="accent1"/>
+          </a:effectRef>
+          <a:fontRef idx="minor">
+            <a:schemeClr val="lt1"/>
+          </a:fontRef>
+        </p:style>
+        <p:txBody>
+          <a:bodyPr rtlCol="0" anchor="ctr"/>
+          <a:lstStyle/>
+          <a:p>
+            <a:pPr algn="ctr"/>
+            <a:endParaRPr lang="en-US"/>
+          </a:p>
+        </p:txBody>
+      </p:sp>
+      <p:sp>
+        <p:nvSpPr>
+          <p:cNvPr id="11" name="Arrow: Right 10">
+            <a:extLst>
+              <a:ext uri="{FF2B5EF4-FFF2-40B4-BE49-F238E27FC236}">
+                <a16:creationId xmlns:a16="http://schemas.microsoft.com/office/drawing/2014/main" id="{863EC0E5-6E5A-4F45-9B1C-BD342541E908}"/>
+              </a:ext>
+            </a:extLst>
+          </p:cNvPr>
+          <p:cNvSpPr/>
+          <p:nvPr/>
+        </p:nvSpPr>
+        <p:spPr>
+          <a:xfrm rot="18872579">
+            <a:off x="6301635" y="3003361"/>
+            <a:ext cx="653560" cy="430823"/>
+          </a:xfrm>
+          <a:prstGeom prst="rightArrow">
+            <a:avLst/>
+          </a:prstGeom>
+        </p:spPr>
+        <p:style>
+          <a:lnRef idx="2">
+            <a:schemeClr val="accent1">
+              <a:shade val="50000"/>
+            </a:schemeClr>
+          </a:lnRef>
+          <a:fillRef idx="1">
+            <a:schemeClr val="accent1"/>
+          </a:fillRef>
+          <a:effectRef idx="0">
+            <a:schemeClr val="accent1"/>
+          </a:effectRef>
+          <a:fontRef idx="minor">
+            <a:schemeClr val="lt1"/>
+          </a:fontRef>
+        </p:style>
+        <p:txBody>
+          <a:bodyPr rtlCol="0" anchor="ctr"/>
+          <a:lstStyle/>
+          <a:p>
+            <a:pPr algn="ctr"/>
+            <a:endParaRPr lang="en-US"/>
+          </a:p>
+        </p:txBody>
+      </p:sp>
+      <p:sp>
+        <p:nvSpPr>
+          <p:cNvPr id="12" name="Arrow: Right 11">
+            <a:extLst>
+              <a:ext uri="{FF2B5EF4-FFF2-40B4-BE49-F238E27FC236}">
+                <a16:creationId xmlns:a16="http://schemas.microsoft.com/office/drawing/2014/main" id="{E608765A-C816-4FE0-9D92-2BD97FB8C902}"/>
+              </a:ext>
+            </a:extLst>
+          </p:cNvPr>
+          <p:cNvSpPr/>
+          <p:nvPr/>
+        </p:nvSpPr>
+        <p:spPr>
+          <a:xfrm rot="18793874">
+            <a:off x="3056667" y="2940536"/>
+            <a:ext cx="653560" cy="430823"/>
+          </a:xfrm>
+          <a:prstGeom prst="rightArrow">
+            <a:avLst/>
+          </a:prstGeom>
+        </p:spPr>
+        <p:style>
+          <a:lnRef idx="2">
+            <a:schemeClr val="accent1">
+              <a:shade val="50000"/>
+            </a:schemeClr>
+          </a:lnRef>
+          <a:fillRef idx="1">
+            <a:schemeClr val="accent1"/>
+          </a:fillRef>
+          <a:effectRef idx="0">
+            <a:schemeClr val="accent1"/>
+          </a:effectRef>
+          <a:fontRef idx="minor">
+            <a:schemeClr val="lt1"/>
+          </a:fontRef>
+        </p:style>
+        <p:txBody>
+          <a:bodyPr rtlCol="0" anchor="ctr"/>
+          <a:lstStyle/>
+          <a:p>
+            <a:pPr algn="ctr"/>
+            <a:endParaRPr lang="en-US"/>
+          </a:p>
+        </p:txBody>
+      </p:sp>
+      <p:sp>
+        <p:nvSpPr>
+          <p:cNvPr id="13" name="Oval 12">
+            <a:extLst>
+              <a:ext uri="{FF2B5EF4-FFF2-40B4-BE49-F238E27FC236}">
+                <a16:creationId xmlns:a16="http://schemas.microsoft.com/office/drawing/2014/main" id="{78A88E94-BBCA-4491-97F9-BD1AFC4AAED7}"/>
+              </a:ext>
+            </a:extLst>
+          </p:cNvPr>
+          <p:cNvSpPr/>
+          <p:nvPr/>
+        </p:nvSpPr>
+        <p:spPr>
+          <a:xfrm>
+            <a:off x="3228361" y="1762500"/>
+            <a:ext cx="2262552" cy="1222131"/>
+          </a:xfrm>
+          <a:prstGeom prst="ellipse">
+            <a:avLst/>
+          </a:prstGeom>
+        </p:spPr>
+        <p:style>
+          <a:lnRef idx="2">
+            <a:schemeClr val="accent1">
+              <a:shade val="50000"/>
+            </a:schemeClr>
+          </a:lnRef>
+          <a:fillRef idx="1">
+            <a:schemeClr val="accent1"/>
+          </a:fillRef>
+          <a:effectRef idx="0">
+            <a:schemeClr val="accent1"/>
+          </a:effectRef>
+          <a:fontRef idx="minor">
+            <a:schemeClr val="lt1"/>
+          </a:fontRef>
+        </p:style>
+        <p:txBody>
+          <a:bodyPr rtlCol="0" anchor="ctr"/>
+          <a:lstStyle/>
+          <a:p>
+            <a:pPr algn="ctr"/>
+            <a:r>
+              <a:rPr lang="en-US" dirty="0"/>
+              <a:t>(3)</a:t>
+            </a:r>
+          </a:p>
+          <a:p>
+            <a:pPr algn="ctr"/>
+            <a:r>
+              <a:rPr lang="en-US" dirty="0"/>
+              <a:t>Get state tax rate and home price trend</a:t>
+            </a:r>
+          </a:p>
+        </p:txBody>
+      </p:sp>
+      <p:sp>
+        <p:nvSpPr>
+          <p:cNvPr id="14" name="Arrow: Right 13">
+            <a:extLst>
+              <a:ext uri="{FF2B5EF4-FFF2-40B4-BE49-F238E27FC236}">
+                <a16:creationId xmlns:a16="http://schemas.microsoft.com/office/drawing/2014/main" id="{710BA0AC-1A55-4E4B-BAA9-F5E99A8A14DC}"/>
+              </a:ext>
+            </a:extLst>
+          </p:cNvPr>
+          <p:cNvSpPr/>
+          <p:nvPr/>
+        </p:nvSpPr>
+        <p:spPr>
+          <a:xfrm>
+            <a:off x="8846857" y="2218205"/>
+            <a:ext cx="653560" cy="430822"/>
+          </a:xfrm>
+          <a:prstGeom prst="rightArrow">
+            <a:avLst/>
+          </a:prstGeom>
+        </p:spPr>
+        <p:style>
+          <a:lnRef idx="2">
+            <a:schemeClr val="accent1">
+              <a:shade val="50000"/>
+            </a:schemeClr>
+          </a:lnRef>
+          <a:fillRef idx="1">
+            <a:schemeClr val="accent1"/>
+          </a:fillRef>
+          <a:effectRef idx="0">
+            <a:schemeClr val="accent1"/>
+          </a:effectRef>
+          <a:fontRef idx="minor">
+            <a:schemeClr val="lt1"/>
+          </a:fontRef>
+        </p:style>
+        <p:txBody>
+          <a:bodyPr rtlCol="0" anchor="ctr"/>
+          <a:lstStyle/>
+          <a:p>
+            <a:pPr algn="ctr"/>
+            <a:endParaRPr lang="en-US"/>
+          </a:p>
+        </p:txBody>
+      </p:sp>
+      <p:graphicFrame>
+        <p:nvGraphicFramePr>
+          <p:cNvPr id="15" name="Table 14">
+            <a:extLst>
+              <a:ext uri="{FF2B5EF4-FFF2-40B4-BE49-F238E27FC236}">
+                <a16:creationId xmlns:a16="http://schemas.microsoft.com/office/drawing/2014/main" id="{38AE4A53-878B-4327-B5F8-4CE5A55CD9FE}"/>
+              </a:ext>
+            </a:extLst>
+          </p:cNvPr>
+          <p:cNvGraphicFramePr>
+            <a:graphicFrameLocks noGrp="1"/>
+          </p:cNvGraphicFramePr>
+          <p:nvPr>
+            <p:extLst>
+              <p:ext uri="{D42A27DB-BD31-4B8C-83A1-F6EECF244321}">
+                <p14:modId xmlns:p14="http://schemas.microsoft.com/office/powerpoint/2010/main" val="719422650"/>
+              </p:ext>
+            </p:extLst>
+          </p:nvPr>
+        </p:nvGraphicFramePr>
+        <p:xfrm>
+          <a:off x="7215438" y="3541583"/>
+          <a:ext cx="4100262" cy="2417456"/>
+        </p:xfrm>
+        <a:graphic>
+          <a:graphicData uri="http://schemas.openxmlformats.org/drawingml/2006/table">
+            <a:tbl>
+              <a:tblPr/>
+              <a:tblGrid>
+                <a:gridCol w="314397">
+                  <a:extLst>
+                    <a:ext uri="{9D8B030D-6E8A-4147-A177-3AD203B41FA5}">
+                      <a16:colId xmlns:a16="http://schemas.microsoft.com/office/drawing/2014/main" val="627972978"/>
+                    </a:ext>
+                  </a:extLst>
+                </a:gridCol>
+                <a:gridCol w="2764074">
+                  <a:extLst>
+                    <a:ext uri="{9D8B030D-6E8A-4147-A177-3AD203B41FA5}">
+                      <a16:colId xmlns:a16="http://schemas.microsoft.com/office/drawing/2014/main" val="1331289709"/>
+                    </a:ext>
+                  </a:extLst>
+                </a:gridCol>
+                <a:gridCol w="1021791">
+                  <a:extLst>
+                    <a:ext uri="{9D8B030D-6E8A-4147-A177-3AD203B41FA5}">
+                      <a16:colId xmlns:a16="http://schemas.microsoft.com/office/drawing/2014/main" val="394571513"/>
+                    </a:ext>
+                  </a:extLst>
+                </a:gridCol>
+              </a:tblGrid>
+              <a:tr h="302182">
+                <a:tc>
+                  <a:txBody>
+                    <a:bodyPr/>
+                    <a:lstStyle/>
+                    <a:p>
+                      <a:pPr algn="ctr" fontAlgn="ctr"/>
+                      <a:r>
+                        <a:rPr lang="en-US" sz="1100" b="1" i="0" u="sng" strike="noStrike">
+                          <a:solidFill>
+                            <a:srgbClr val="000000"/>
+                          </a:solidFill>
+                          <a:effectLst/>
+                          <a:latin typeface="Calibri" panose="020F0502020204030204" pitchFamily="34" charset="0"/>
+                        </a:rPr>
+                        <a:t>No. </a:t>
+                      </a:r>
+                    </a:p>
+                  </a:txBody>
+                  <a:tcPr marL="7620" marR="7620" marT="7620" marB="0" anchor="ctr">
+                    <a:lnL w="6350" cap="flat" cmpd="sng" algn="ctr">
+                      <a:solidFill>
+                        <a:srgbClr val="000000"/>
+                      </a:solidFill>
+                      <a:prstDash val="solid"/>
+                      <a:round/>
+                      <a:headEnd type="none" w="med" len="med"/>
+                      <a:tailEnd type="none" w="med" len="med"/>
+                    </a:lnL>
+                    <a:lnR w="6350" cap="flat" cmpd="sng" algn="ctr">
+                      <a:solidFill>
+                        <a:srgbClr val="000000"/>
+                      </a:solidFill>
+                      <a:prstDash val="solid"/>
+                      <a:round/>
+                      <a:headEnd type="none" w="med" len="med"/>
+                      <a:tailEnd type="none" w="med" len="med"/>
+                    </a:lnR>
+                    <a:lnT w="6350" cap="flat" cmpd="sng" algn="ctr">
+                      <a:solidFill>
+                        <a:srgbClr val="000000"/>
+                      </a:solidFill>
+                      <a:prstDash val="solid"/>
+                      <a:round/>
+                      <a:headEnd type="none" w="med" len="med"/>
+                      <a:tailEnd type="none" w="med" len="med"/>
+                    </a:lnT>
+                    <a:lnB w="6350" cap="flat" cmpd="sng" algn="ctr">
+                      <a:solidFill>
+                        <a:srgbClr val="000000"/>
+                      </a:solidFill>
+                      <a:prstDash val="solid"/>
+                      <a:round/>
+                      <a:headEnd type="none" w="med" len="med"/>
+                      <a:tailEnd type="none" w="med" len="med"/>
+                    </a:lnB>
+                    <a:solidFill>
+                      <a:srgbClr val="D9D9D9"/>
+                    </a:solidFill>
+                  </a:tcPr>
+                </a:tc>
+                <a:tc>
+                  <a:txBody>
+                    <a:bodyPr/>
+                    <a:lstStyle/>
+                    <a:p>
+                      <a:pPr algn="ctr" fontAlgn="ctr"/>
+                      <a:r>
+                        <a:rPr lang="en-US" sz="1100" b="1" i="0" u="sng" strike="noStrike">
+                          <a:solidFill>
+                            <a:srgbClr val="000000"/>
+                          </a:solidFill>
+                          <a:effectLst/>
+                          <a:latin typeface="Calibri" panose="020F0502020204030204" pitchFamily="34" charset="0"/>
+                        </a:rPr>
+                        <a:t>Tasks</a:t>
+                      </a:r>
+                    </a:p>
+                  </a:txBody>
+                  <a:tcPr marL="7620" marR="7620" marT="7620" marB="0" anchor="ctr">
+                    <a:lnL w="6350" cap="flat" cmpd="sng" algn="ctr">
+                      <a:solidFill>
+                        <a:srgbClr val="000000"/>
+                      </a:solidFill>
+                      <a:prstDash val="solid"/>
+                      <a:round/>
+                      <a:headEnd type="none" w="med" len="med"/>
+                      <a:tailEnd type="none" w="med" len="med"/>
+                    </a:lnL>
+                    <a:lnR w="6350" cap="flat" cmpd="sng" algn="ctr">
+                      <a:solidFill>
+                        <a:srgbClr val="000000"/>
+                      </a:solidFill>
+                      <a:prstDash val="solid"/>
+                      <a:round/>
+                      <a:headEnd type="none" w="med" len="med"/>
+                      <a:tailEnd type="none" w="med" len="med"/>
+                    </a:lnR>
+                    <a:lnT w="6350" cap="flat" cmpd="sng" algn="ctr">
+                      <a:solidFill>
+                        <a:srgbClr val="000000"/>
+                      </a:solidFill>
+                      <a:prstDash val="solid"/>
+                      <a:round/>
+                      <a:headEnd type="none" w="med" len="med"/>
+                      <a:tailEnd type="none" w="med" len="med"/>
+                    </a:lnT>
+                    <a:lnB w="6350" cap="flat" cmpd="sng" algn="ctr">
+                      <a:solidFill>
+                        <a:srgbClr val="000000"/>
+                      </a:solidFill>
+                      <a:prstDash val="solid"/>
+                      <a:round/>
+                      <a:headEnd type="none" w="med" len="med"/>
+                      <a:tailEnd type="none" w="med" len="med"/>
+                    </a:lnB>
+                    <a:solidFill>
+                      <a:srgbClr val="D9D9D9"/>
+                    </a:solidFill>
+                  </a:tcPr>
+                </a:tc>
+                <a:tc>
+                  <a:txBody>
+                    <a:bodyPr/>
+                    <a:lstStyle/>
+                    <a:p>
+                      <a:pPr algn="ctr" fontAlgn="ctr"/>
+                      <a:r>
+                        <a:rPr lang="en-US" sz="1100" b="1" i="0" u="sng" strike="noStrike">
+                          <a:solidFill>
+                            <a:srgbClr val="000000"/>
+                          </a:solidFill>
+                          <a:effectLst/>
+                          <a:latin typeface="Calibri" panose="020F0502020204030204" pitchFamily="34" charset="0"/>
+                        </a:rPr>
+                        <a:t>Person in charge</a:t>
+                      </a:r>
+                    </a:p>
+                  </a:txBody>
+                  <a:tcPr marL="7620" marR="7620" marT="7620" marB="0" anchor="ctr">
+                    <a:lnL w="6350" cap="flat" cmpd="sng" algn="ctr">
+                      <a:solidFill>
+                        <a:srgbClr val="000000"/>
+                      </a:solidFill>
+                      <a:prstDash val="solid"/>
+                      <a:round/>
+                      <a:headEnd type="none" w="med" len="med"/>
+                      <a:tailEnd type="none" w="med" len="med"/>
+                    </a:lnL>
+                    <a:lnR w="6350" cap="flat" cmpd="sng" algn="ctr">
+                      <a:solidFill>
+                        <a:srgbClr val="000000"/>
+                      </a:solidFill>
+                      <a:prstDash val="solid"/>
+                      <a:round/>
+                      <a:headEnd type="none" w="med" len="med"/>
+                      <a:tailEnd type="none" w="med" len="med"/>
+                    </a:lnR>
+                    <a:lnT w="6350" cap="flat" cmpd="sng" algn="ctr">
+                      <a:solidFill>
+                        <a:srgbClr val="000000"/>
+                      </a:solidFill>
+                      <a:prstDash val="solid"/>
+                      <a:round/>
+                      <a:headEnd type="none" w="med" len="med"/>
+                      <a:tailEnd type="none" w="med" len="med"/>
+                    </a:lnT>
+                    <a:lnB w="6350" cap="flat" cmpd="sng" algn="ctr">
+                      <a:solidFill>
+                        <a:srgbClr val="000000"/>
+                      </a:solidFill>
+                      <a:prstDash val="solid"/>
+                      <a:round/>
+                      <a:headEnd type="none" w="med" len="med"/>
+                      <a:tailEnd type="none" w="med" len="med"/>
+                    </a:lnB>
+                    <a:solidFill>
+                      <a:srgbClr val="D9D9D9"/>
+                    </a:solidFill>
+                  </a:tcPr>
+                </a:tc>
+                <a:extLst>
+                  <a:ext uri="{0D108BD9-81ED-4DB2-BD59-A6C34878D82A}">
+                    <a16:rowId xmlns:a16="http://schemas.microsoft.com/office/drawing/2014/main" val="681482602"/>
+                  </a:ext>
+                </a:extLst>
+              </a:tr>
+              <a:tr h="302182">
+                <a:tc>
+                  <a:txBody>
+                    <a:bodyPr/>
+                    <a:lstStyle/>
+                    <a:p>
+                      <a:pPr algn="ctr" fontAlgn="ctr"/>
+                      <a:r>
+                        <a:rPr lang="en-US" sz="1100" b="0" i="0" u="none" strike="noStrike">
+                          <a:solidFill>
+                            <a:srgbClr val="000000"/>
+                          </a:solidFill>
+                          <a:effectLst/>
+                          <a:latin typeface="Calibri" panose="020F0502020204030204" pitchFamily="34" charset="0"/>
+                        </a:rPr>
+                        <a:t>1</a:t>
+                      </a:r>
+                    </a:p>
+                  </a:txBody>
+                  <a:tcPr marL="7620" marR="7620" marT="7620" marB="0" anchor="ctr">
+                    <a:lnL w="6350" cap="flat" cmpd="sng" algn="ctr">
+                      <a:solidFill>
+                        <a:srgbClr val="000000"/>
+                      </a:solidFill>
+                      <a:prstDash val="solid"/>
+                      <a:round/>
+                      <a:headEnd type="none" w="med" len="med"/>
+                      <a:tailEnd type="none" w="med" len="med"/>
+                    </a:lnL>
+                    <a:lnR w="6350" cap="flat" cmpd="sng" algn="ctr">
+                      <a:solidFill>
+                        <a:srgbClr val="000000"/>
+                      </a:solidFill>
+                      <a:prstDash val="solid"/>
+                      <a:round/>
+                      <a:headEnd type="none" w="med" len="med"/>
+                      <a:tailEnd type="none" w="med" len="med"/>
+                    </a:lnR>
+                    <a:lnT w="6350" cap="flat" cmpd="sng" algn="ctr">
+                      <a:solidFill>
+                        <a:srgbClr val="000000"/>
+                      </a:solidFill>
+                      <a:prstDash val="solid"/>
+                      <a:round/>
+                      <a:headEnd type="none" w="med" len="med"/>
+                      <a:tailEnd type="none" w="med" len="med"/>
+                    </a:lnT>
+                    <a:lnB w="6350" cap="flat" cmpd="sng" algn="ctr">
+                      <a:solidFill>
+                        <a:srgbClr val="000000"/>
+                      </a:solidFill>
+                      <a:prstDash val="solid"/>
+                      <a:round/>
+                      <a:headEnd type="none" w="med" len="med"/>
+                      <a:tailEnd type="none" w="med" len="med"/>
+                    </a:lnB>
+                  </a:tcPr>
+                </a:tc>
+                <a:tc>
+                  <a:txBody>
+                    <a:bodyPr/>
+                    <a:lstStyle/>
+                    <a:p>
+                      <a:pPr algn="ctr" fontAlgn="ctr"/>
+                      <a:r>
+                        <a:rPr lang="en-US" sz="1100" b="0" i="0" u="none" strike="noStrike">
+                          <a:solidFill>
+                            <a:srgbClr val="000000"/>
+                          </a:solidFill>
+                          <a:effectLst/>
+                          <a:latin typeface="Calibri" panose="020F0502020204030204" pitchFamily="34" charset="0"/>
+                        </a:rPr>
+                        <a:t>Get median home prices </a:t>
+                      </a:r>
+                    </a:p>
+                  </a:txBody>
+                  <a:tcPr marL="7620" marR="7620" marT="7620" marB="0" anchor="ctr">
+                    <a:lnL w="6350" cap="flat" cmpd="sng" algn="ctr">
+                      <a:solidFill>
+                        <a:srgbClr val="000000"/>
+                      </a:solidFill>
+                      <a:prstDash val="solid"/>
+                      <a:round/>
+                      <a:headEnd type="none" w="med" len="med"/>
+                      <a:tailEnd type="none" w="med" len="med"/>
+                    </a:lnL>
+                    <a:lnR w="6350" cap="flat" cmpd="sng" algn="ctr">
+                      <a:solidFill>
+                        <a:srgbClr val="000000"/>
+                      </a:solidFill>
+                      <a:prstDash val="solid"/>
+                      <a:round/>
+                      <a:headEnd type="none" w="med" len="med"/>
+                      <a:tailEnd type="none" w="med" len="med"/>
+                    </a:lnR>
+                    <a:lnT w="6350" cap="flat" cmpd="sng" algn="ctr">
+                      <a:solidFill>
+                        <a:srgbClr val="000000"/>
+                      </a:solidFill>
+                      <a:prstDash val="solid"/>
+                      <a:round/>
+                      <a:headEnd type="none" w="med" len="med"/>
+                      <a:tailEnd type="none" w="med" len="med"/>
+                    </a:lnT>
+                    <a:lnB w="6350" cap="flat" cmpd="sng" algn="ctr">
+                      <a:solidFill>
+                        <a:srgbClr val="000000"/>
+                      </a:solidFill>
+                      <a:prstDash val="solid"/>
+                      <a:round/>
+                      <a:headEnd type="none" w="med" len="med"/>
+                      <a:tailEnd type="none" w="med" len="med"/>
+                    </a:lnB>
+                  </a:tcPr>
+                </a:tc>
+                <a:tc>
+                  <a:txBody>
+                    <a:bodyPr/>
+                    <a:lstStyle/>
+                    <a:p>
+                      <a:pPr algn="ctr" fontAlgn="ctr"/>
+                      <a:r>
+                        <a:rPr lang="en-US" sz="1100" b="0" i="0" u="none" strike="noStrike">
+                          <a:solidFill>
+                            <a:srgbClr val="000000"/>
+                          </a:solidFill>
+                          <a:effectLst/>
+                          <a:latin typeface="Calibri" panose="020F0502020204030204" pitchFamily="34" charset="0"/>
+                        </a:rPr>
+                        <a:t>Bahar</a:t>
+                      </a:r>
+                    </a:p>
+                  </a:txBody>
+                  <a:tcPr marL="7620" marR="7620" marT="7620" marB="0" anchor="ctr">
+                    <a:lnL w="6350" cap="flat" cmpd="sng" algn="ctr">
+                      <a:solidFill>
+                        <a:srgbClr val="000000"/>
+                      </a:solidFill>
+                      <a:prstDash val="solid"/>
+                      <a:round/>
+                      <a:headEnd type="none" w="med" len="med"/>
+                      <a:tailEnd type="none" w="med" len="med"/>
+                    </a:lnL>
+                    <a:lnR w="6350" cap="flat" cmpd="sng" algn="ctr">
+                      <a:solidFill>
+                        <a:srgbClr val="000000"/>
+                      </a:solidFill>
+                      <a:prstDash val="solid"/>
+                      <a:round/>
+                      <a:headEnd type="none" w="med" len="med"/>
+                      <a:tailEnd type="none" w="med" len="med"/>
+                    </a:lnR>
+                    <a:lnT w="6350" cap="flat" cmpd="sng" algn="ctr">
+                      <a:solidFill>
+                        <a:srgbClr val="000000"/>
+                      </a:solidFill>
+                      <a:prstDash val="solid"/>
+                      <a:round/>
+                      <a:headEnd type="none" w="med" len="med"/>
+                      <a:tailEnd type="none" w="med" len="med"/>
+                    </a:lnT>
+                    <a:lnB w="6350" cap="flat" cmpd="sng" algn="ctr">
+                      <a:solidFill>
+                        <a:srgbClr val="000000"/>
+                      </a:solidFill>
+                      <a:prstDash val="solid"/>
+                      <a:round/>
+                      <a:headEnd type="none" w="med" len="med"/>
+                      <a:tailEnd type="none" w="med" len="med"/>
+                    </a:lnB>
+                  </a:tcPr>
+                </a:tc>
+                <a:extLst>
+                  <a:ext uri="{0D108BD9-81ED-4DB2-BD59-A6C34878D82A}">
+                    <a16:rowId xmlns:a16="http://schemas.microsoft.com/office/drawing/2014/main" val="597122820"/>
+                  </a:ext>
+                </a:extLst>
+              </a:tr>
+              <a:tr h="302182">
+                <a:tc>
+                  <a:txBody>
+                    <a:bodyPr/>
+                    <a:lstStyle/>
+                    <a:p>
+                      <a:pPr algn="ctr" fontAlgn="ctr"/>
+                      <a:r>
+                        <a:rPr lang="en-US" sz="1100" b="0" i="0" u="none" strike="noStrike">
+                          <a:solidFill>
+                            <a:srgbClr val="000000"/>
+                          </a:solidFill>
+                          <a:effectLst/>
+                          <a:latin typeface="Calibri" panose="020F0502020204030204" pitchFamily="34" charset="0"/>
+                        </a:rPr>
+                        <a:t>2</a:t>
+                      </a:r>
+                    </a:p>
+                  </a:txBody>
+                  <a:tcPr marL="7620" marR="7620" marT="7620" marB="0" anchor="ctr">
+                    <a:lnL w="6350" cap="flat" cmpd="sng" algn="ctr">
+                      <a:solidFill>
+                        <a:srgbClr val="000000"/>
+                      </a:solidFill>
+                      <a:prstDash val="solid"/>
+                      <a:round/>
+                      <a:headEnd type="none" w="med" len="med"/>
+                      <a:tailEnd type="none" w="med" len="med"/>
+                    </a:lnL>
+                    <a:lnR w="6350" cap="flat" cmpd="sng" algn="ctr">
+                      <a:solidFill>
+                        <a:srgbClr val="000000"/>
+                      </a:solidFill>
+                      <a:prstDash val="solid"/>
+                      <a:round/>
+                      <a:headEnd type="none" w="med" len="med"/>
+                      <a:tailEnd type="none" w="med" len="med"/>
+                    </a:lnR>
+                    <a:lnT w="6350" cap="flat" cmpd="sng" algn="ctr">
+                      <a:solidFill>
+                        <a:srgbClr val="000000"/>
+                      </a:solidFill>
+                      <a:prstDash val="solid"/>
+                      <a:round/>
+                      <a:headEnd type="none" w="med" len="med"/>
+                      <a:tailEnd type="none" w="med" len="med"/>
+                    </a:lnT>
+                    <a:lnB w="6350" cap="flat" cmpd="sng" algn="ctr">
+                      <a:solidFill>
+                        <a:srgbClr val="000000"/>
+                      </a:solidFill>
+                      <a:prstDash val="solid"/>
+                      <a:round/>
+                      <a:headEnd type="none" w="med" len="med"/>
+                      <a:tailEnd type="none" w="med" len="med"/>
+                    </a:lnB>
+                  </a:tcPr>
+                </a:tc>
+                <a:tc>
+                  <a:txBody>
+                    <a:bodyPr/>
+                    <a:lstStyle/>
+                    <a:p>
+                      <a:pPr algn="ctr" fontAlgn="ctr"/>
+                      <a:r>
+                        <a:rPr lang="en-US" sz="1100" b="0" i="0" u="none" strike="noStrike">
+                          <a:solidFill>
+                            <a:srgbClr val="000000"/>
+                          </a:solidFill>
+                          <a:effectLst/>
+                          <a:latin typeface="Calibri" panose="020F0502020204030204" pitchFamily="34" charset="0"/>
+                        </a:rPr>
+                        <a:t>Get median salary</a:t>
+                      </a:r>
+                    </a:p>
+                  </a:txBody>
+                  <a:tcPr marL="7620" marR="7620" marT="7620" marB="0" anchor="ctr">
+                    <a:lnL w="6350" cap="flat" cmpd="sng" algn="ctr">
+                      <a:solidFill>
+                        <a:srgbClr val="000000"/>
+                      </a:solidFill>
+                      <a:prstDash val="solid"/>
+                      <a:round/>
+                      <a:headEnd type="none" w="med" len="med"/>
+                      <a:tailEnd type="none" w="med" len="med"/>
+                    </a:lnL>
+                    <a:lnR w="6350" cap="flat" cmpd="sng" algn="ctr">
+                      <a:solidFill>
+                        <a:srgbClr val="000000"/>
+                      </a:solidFill>
+                      <a:prstDash val="solid"/>
+                      <a:round/>
+                      <a:headEnd type="none" w="med" len="med"/>
+                      <a:tailEnd type="none" w="med" len="med"/>
+                    </a:lnR>
+                    <a:lnT w="6350" cap="flat" cmpd="sng" algn="ctr">
+                      <a:solidFill>
+                        <a:srgbClr val="000000"/>
+                      </a:solidFill>
+                      <a:prstDash val="solid"/>
+                      <a:round/>
+                      <a:headEnd type="none" w="med" len="med"/>
+                      <a:tailEnd type="none" w="med" len="med"/>
+                    </a:lnT>
+                    <a:lnB w="6350" cap="flat" cmpd="sng" algn="ctr">
+                      <a:solidFill>
+                        <a:srgbClr val="000000"/>
+                      </a:solidFill>
+                      <a:prstDash val="solid"/>
+                      <a:round/>
+                      <a:headEnd type="none" w="med" len="med"/>
+                      <a:tailEnd type="none" w="med" len="med"/>
+                    </a:lnB>
+                  </a:tcPr>
+                </a:tc>
+                <a:tc>
+                  <a:txBody>
+                    <a:bodyPr/>
+                    <a:lstStyle/>
+                    <a:p>
+                      <a:pPr algn="ctr" fontAlgn="ctr"/>
+                      <a:r>
+                        <a:rPr lang="en-US" sz="1100" b="0" i="0" u="none" strike="noStrike" dirty="0">
+                          <a:solidFill>
+                            <a:srgbClr val="000000"/>
+                          </a:solidFill>
+                          <a:effectLst/>
+                          <a:latin typeface="Calibri" panose="020F0502020204030204" pitchFamily="34" charset="0"/>
+                        </a:rPr>
+                        <a:t>Molly</a:t>
+                      </a:r>
+                    </a:p>
+                  </a:txBody>
+                  <a:tcPr marL="7620" marR="7620" marT="7620" marB="0" anchor="ctr">
+                    <a:lnL w="6350" cap="flat" cmpd="sng" algn="ctr">
+                      <a:solidFill>
+                        <a:srgbClr val="000000"/>
+                      </a:solidFill>
+                      <a:prstDash val="solid"/>
+                      <a:round/>
+                      <a:headEnd type="none" w="med" len="med"/>
+                      <a:tailEnd type="none" w="med" len="med"/>
+                    </a:lnL>
+                    <a:lnR w="6350" cap="flat" cmpd="sng" algn="ctr">
+                      <a:solidFill>
+                        <a:srgbClr val="000000"/>
+                      </a:solidFill>
+                      <a:prstDash val="solid"/>
+                      <a:round/>
+                      <a:headEnd type="none" w="med" len="med"/>
+                      <a:tailEnd type="none" w="med" len="med"/>
+                    </a:lnR>
+                    <a:lnT w="6350" cap="flat" cmpd="sng" algn="ctr">
+                      <a:solidFill>
+                        <a:srgbClr val="000000"/>
+                      </a:solidFill>
+                      <a:prstDash val="solid"/>
+                      <a:round/>
+                      <a:headEnd type="none" w="med" len="med"/>
+                      <a:tailEnd type="none" w="med" len="med"/>
+                    </a:lnT>
+                    <a:lnB w="6350" cap="flat" cmpd="sng" algn="ctr">
+                      <a:solidFill>
+                        <a:srgbClr val="000000"/>
+                      </a:solidFill>
+                      <a:prstDash val="solid"/>
+                      <a:round/>
+                      <a:headEnd type="none" w="med" len="med"/>
+                      <a:tailEnd type="none" w="med" len="med"/>
+                    </a:lnB>
+                  </a:tcPr>
+                </a:tc>
+                <a:extLst>
+                  <a:ext uri="{0D108BD9-81ED-4DB2-BD59-A6C34878D82A}">
+                    <a16:rowId xmlns:a16="http://schemas.microsoft.com/office/drawing/2014/main" val="2566262265"/>
+                  </a:ext>
+                </a:extLst>
+              </a:tr>
+              <a:tr h="302182">
+                <a:tc>
+                  <a:txBody>
+                    <a:bodyPr/>
+                    <a:lstStyle/>
+                    <a:p>
+                      <a:pPr algn="ctr" fontAlgn="ctr"/>
+                      <a:r>
+                        <a:rPr lang="en-US" sz="1100" b="0" i="0" u="none" strike="noStrike">
+                          <a:solidFill>
+                            <a:srgbClr val="000000"/>
+                          </a:solidFill>
+                          <a:effectLst/>
+                          <a:latin typeface="Calibri" panose="020F0502020204030204" pitchFamily="34" charset="0"/>
+                        </a:rPr>
+                        <a:t>3</a:t>
+                      </a:r>
+                    </a:p>
+                  </a:txBody>
+                  <a:tcPr marL="7620" marR="7620" marT="7620" marB="0" anchor="ctr">
+                    <a:lnL w="6350" cap="flat" cmpd="sng" algn="ctr">
+                      <a:solidFill>
+                        <a:srgbClr val="000000"/>
+                      </a:solidFill>
+                      <a:prstDash val="solid"/>
+                      <a:round/>
+                      <a:headEnd type="none" w="med" len="med"/>
+                      <a:tailEnd type="none" w="med" len="med"/>
+                    </a:lnL>
+                    <a:lnR w="6350" cap="flat" cmpd="sng" algn="ctr">
+                      <a:solidFill>
+                        <a:srgbClr val="000000"/>
+                      </a:solidFill>
+                      <a:prstDash val="solid"/>
+                      <a:round/>
+                      <a:headEnd type="none" w="med" len="med"/>
+                      <a:tailEnd type="none" w="med" len="med"/>
+                    </a:lnR>
+                    <a:lnT w="6350" cap="flat" cmpd="sng" algn="ctr">
+                      <a:solidFill>
+                        <a:srgbClr val="000000"/>
+                      </a:solidFill>
+                      <a:prstDash val="solid"/>
+                      <a:round/>
+                      <a:headEnd type="none" w="med" len="med"/>
+                      <a:tailEnd type="none" w="med" len="med"/>
+                    </a:lnT>
+                    <a:lnB w="6350" cap="flat" cmpd="sng" algn="ctr">
+                      <a:solidFill>
+                        <a:srgbClr val="000000"/>
+                      </a:solidFill>
+                      <a:prstDash val="solid"/>
+                      <a:round/>
+                      <a:headEnd type="none" w="med" len="med"/>
+                      <a:tailEnd type="none" w="med" len="med"/>
+                    </a:lnB>
+                  </a:tcPr>
+                </a:tc>
+                <a:tc>
+                  <a:txBody>
+                    <a:bodyPr/>
+                    <a:lstStyle/>
+                    <a:p>
+                      <a:pPr algn="ctr" fontAlgn="ctr"/>
+                      <a:r>
+                        <a:rPr lang="en-US" sz="1100" b="0" i="0" u="none" strike="noStrike" dirty="0">
+                          <a:solidFill>
+                            <a:srgbClr val="000000"/>
+                          </a:solidFill>
+                          <a:effectLst/>
+                          <a:latin typeface="Calibri" panose="020F0502020204030204" pitchFamily="34" charset="0"/>
+                        </a:rPr>
+                        <a:t>Get unemployment and crime rate correlation</a:t>
+                      </a:r>
+                    </a:p>
+                  </a:txBody>
+                  <a:tcPr marL="7620" marR="7620" marT="7620" marB="0" anchor="ctr">
+                    <a:lnL w="6350" cap="flat" cmpd="sng" algn="ctr">
+                      <a:solidFill>
+                        <a:srgbClr val="000000"/>
+                      </a:solidFill>
+                      <a:prstDash val="solid"/>
+                      <a:round/>
+                      <a:headEnd type="none" w="med" len="med"/>
+                      <a:tailEnd type="none" w="med" len="med"/>
+                    </a:lnL>
+                    <a:lnR w="6350" cap="flat" cmpd="sng" algn="ctr">
+                      <a:solidFill>
+                        <a:srgbClr val="000000"/>
+                      </a:solidFill>
+                      <a:prstDash val="solid"/>
+                      <a:round/>
+                      <a:headEnd type="none" w="med" len="med"/>
+                      <a:tailEnd type="none" w="med" len="med"/>
+                    </a:lnR>
+                    <a:lnT w="6350" cap="flat" cmpd="sng" algn="ctr">
+                      <a:solidFill>
+                        <a:srgbClr val="000000"/>
+                      </a:solidFill>
+                      <a:prstDash val="solid"/>
+                      <a:round/>
+                      <a:headEnd type="none" w="med" len="med"/>
+                      <a:tailEnd type="none" w="med" len="med"/>
+                    </a:lnT>
+                    <a:lnB w="6350" cap="flat" cmpd="sng" algn="ctr">
+                      <a:solidFill>
+                        <a:srgbClr val="000000"/>
+                      </a:solidFill>
+                      <a:prstDash val="solid"/>
+                      <a:round/>
+                      <a:headEnd type="none" w="med" len="med"/>
+                      <a:tailEnd type="none" w="med" len="med"/>
+                    </a:lnB>
+                  </a:tcPr>
+                </a:tc>
+                <a:tc>
+                  <a:txBody>
+                    <a:bodyPr/>
+                    <a:lstStyle/>
+                    <a:p>
+                      <a:pPr algn="ctr" fontAlgn="ctr"/>
+                      <a:r>
+                        <a:rPr lang="en-US" sz="1100" b="0" i="0" u="none" strike="noStrike">
+                          <a:solidFill>
+                            <a:srgbClr val="000000"/>
+                          </a:solidFill>
+                          <a:effectLst/>
+                          <a:latin typeface="Calibri" panose="020F0502020204030204" pitchFamily="34" charset="0"/>
+                        </a:rPr>
+                        <a:t>Catherine</a:t>
+                      </a:r>
+                    </a:p>
+                  </a:txBody>
+                  <a:tcPr marL="7620" marR="7620" marT="7620" marB="0" anchor="ctr">
+                    <a:lnL w="6350" cap="flat" cmpd="sng" algn="ctr">
+                      <a:solidFill>
+                        <a:srgbClr val="000000"/>
+                      </a:solidFill>
+                      <a:prstDash val="solid"/>
+                      <a:round/>
+                      <a:headEnd type="none" w="med" len="med"/>
+                      <a:tailEnd type="none" w="med" len="med"/>
+                    </a:lnL>
+                    <a:lnR w="6350" cap="flat" cmpd="sng" algn="ctr">
+                      <a:solidFill>
+                        <a:srgbClr val="000000"/>
+                      </a:solidFill>
+                      <a:prstDash val="solid"/>
+                      <a:round/>
+                      <a:headEnd type="none" w="med" len="med"/>
+                      <a:tailEnd type="none" w="med" len="med"/>
+                    </a:lnR>
+                    <a:lnT w="6350" cap="flat" cmpd="sng" algn="ctr">
+                      <a:solidFill>
+                        <a:srgbClr val="000000"/>
+                      </a:solidFill>
+                      <a:prstDash val="solid"/>
+                      <a:round/>
+                      <a:headEnd type="none" w="med" len="med"/>
+                      <a:tailEnd type="none" w="med" len="med"/>
+                    </a:lnT>
+                    <a:lnB w="6350" cap="flat" cmpd="sng" algn="ctr">
+                      <a:solidFill>
+                        <a:srgbClr val="000000"/>
+                      </a:solidFill>
+                      <a:prstDash val="solid"/>
+                      <a:round/>
+                      <a:headEnd type="none" w="med" len="med"/>
+                      <a:tailEnd type="none" w="med" len="med"/>
+                    </a:lnB>
+                  </a:tcPr>
+                </a:tc>
+                <a:extLst>
+                  <a:ext uri="{0D108BD9-81ED-4DB2-BD59-A6C34878D82A}">
+                    <a16:rowId xmlns:a16="http://schemas.microsoft.com/office/drawing/2014/main" val="1082596135"/>
+                  </a:ext>
+                </a:extLst>
+              </a:tr>
+              <a:tr h="302182">
+                <a:tc>
+                  <a:txBody>
+                    <a:bodyPr/>
+                    <a:lstStyle/>
+                    <a:p>
+                      <a:pPr algn="ctr" fontAlgn="ctr"/>
+                      <a:r>
+                        <a:rPr lang="en-US" sz="1100" b="0" i="0" u="none" strike="noStrike">
+                          <a:solidFill>
+                            <a:srgbClr val="000000"/>
+                          </a:solidFill>
+                          <a:effectLst/>
+                          <a:latin typeface="Calibri" panose="020F0502020204030204" pitchFamily="34" charset="0"/>
+                        </a:rPr>
+                        <a:t>4</a:t>
+                      </a:r>
+                    </a:p>
+                  </a:txBody>
+                  <a:tcPr marL="7620" marR="7620" marT="7620" marB="0" anchor="ctr">
+                    <a:lnL w="6350" cap="flat" cmpd="sng" algn="ctr">
+                      <a:solidFill>
+                        <a:srgbClr val="000000"/>
+                      </a:solidFill>
+                      <a:prstDash val="solid"/>
+                      <a:round/>
+                      <a:headEnd type="none" w="med" len="med"/>
+                      <a:tailEnd type="none" w="med" len="med"/>
+                    </a:lnL>
+                    <a:lnR w="6350" cap="flat" cmpd="sng" algn="ctr">
+                      <a:solidFill>
+                        <a:srgbClr val="000000"/>
+                      </a:solidFill>
+                      <a:prstDash val="solid"/>
+                      <a:round/>
+                      <a:headEnd type="none" w="med" len="med"/>
+                      <a:tailEnd type="none" w="med" len="med"/>
+                    </a:lnR>
+                    <a:lnT w="6350" cap="flat" cmpd="sng" algn="ctr">
+                      <a:solidFill>
+                        <a:srgbClr val="000000"/>
+                      </a:solidFill>
+                      <a:prstDash val="solid"/>
+                      <a:round/>
+                      <a:headEnd type="none" w="med" len="med"/>
+                      <a:tailEnd type="none" w="med" len="med"/>
+                    </a:lnT>
+                    <a:lnB w="6350" cap="flat" cmpd="sng" algn="ctr">
+                      <a:solidFill>
+                        <a:srgbClr val="000000"/>
+                      </a:solidFill>
+                      <a:prstDash val="solid"/>
+                      <a:round/>
+                      <a:headEnd type="none" w="med" len="med"/>
+                      <a:tailEnd type="none" w="med" len="med"/>
+                    </a:lnB>
+                  </a:tcPr>
+                </a:tc>
+                <a:tc>
+                  <a:txBody>
+                    <a:bodyPr/>
+                    <a:lstStyle/>
+                    <a:p>
+                      <a:pPr algn="ctr" fontAlgn="ctr"/>
+                      <a:r>
+                        <a:rPr lang="en-US" sz="1100" b="0" i="0" u="none" strike="noStrike">
+                          <a:solidFill>
+                            <a:srgbClr val="000000"/>
+                          </a:solidFill>
+                          <a:effectLst/>
+                          <a:latin typeface="Calibri" panose="020F0502020204030204" pitchFamily="34" charset="0"/>
+                        </a:rPr>
+                        <a:t>Get state tax and climate datasets</a:t>
+                      </a:r>
+                    </a:p>
+                  </a:txBody>
+                  <a:tcPr marL="7620" marR="7620" marT="7620" marB="0" anchor="ctr">
+                    <a:lnL w="6350" cap="flat" cmpd="sng" algn="ctr">
+                      <a:solidFill>
+                        <a:srgbClr val="000000"/>
+                      </a:solidFill>
+                      <a:prstDash val="solid"/>
+                      <a:round/>
+                      <a:headEnd type="none" w="med" len="med"/>
+                      <a:tailEnd type="none" w="med" len="med"/>
+                    </a:lnL>
+                    <a:lnR w="6350" cap="flat" cmpd="sng" algn="ctr">
+                      <a:solidFill>
+                        <a:srgbClr val="000000"/>
+                      </a:solidFill>
+                      <a:prstDash val="solid"/>
+                      <a:round/>
+                      <a:headEnd type="none" w="med" len="med"/>
+                      <a:tailEnd type="none" w="med" len="med"/>
+                    </a:lnR>
+                    <a:lnT w="6350" cap="flat" cmpd="sng" algn="ctr">
+                      <a:solidFill>
+                        <a:srgbClr val="000000"/>
+                      </a:solidFill>
+                      <a:prstDash val="solid"/>
+                      <a:round/>
+                      <a:headEnd type="none" w="med" len="med"/>
+                      <a:tailEnd type="none" w="med" len="med"/>
+                    </a:lnT>
+                    <a:lnB w="6350" cap="flat" cmpd="sng" algn="ctr">
+                      <a:solidFill>
+                        <a:srgbClr val="000000"/>
+                      </a:solidFill>
+                      <a:prstDash val="solid"/>
+                      <a:round/>
+                      <a:headEnd type="none" w="med" len="med"/>
+                      <a:tailEnd type="none" w="med" len="med"/>
+                    </a:lnB>
+                  </a:tcPr>
+                </a:tc>
+                <a:tc>
+                  <a:txBody>
+                    <a:bodyPr/>
+                    <a:lstStyle/>
+                    <a:p>
+                      <a:pPr algn="ctr" fontAlgn="ctr"/>
+                      <a:r>
+                        <a:rPr lang="en-US" sz="1100" b="0" i="0" u="none" strike="noStrike" dirty="0">
+                          <a:solidFill>
+                            <a:srgbClr val="000000"/>
+                          </a:solidFill>
+                          <a:effectLst/>
+                          <a:latin typeface="Calibri" panose="020F0502020204030204" pitchFamily="34" charset="0"/>
+                        </a:rPr>
+                        <a:t>Prakash</a:t>
+                      </a:r>
+                    </a:p>
+                  </a:txBody>
+                  <a:tcPr marL="7620" marR="7620" marT="7620" marB="0" anchor="ctr">
+                    <a:lnL w="6350" cap="flat" cmpd="sng" algn="ctr">
+                      <a:solidFill>
+                        <a:srgbClr val="000000"/>
+                      </a:solidFill>
+                      <a:prstDash val="solid"/>
+                      <a:round/>
+                      <a:headEnd type="none" w="med" len="med"/>
+                      <a:tailEnd type="none" w="med" len="med"/>
+                    </a:lnL>
+                    <a:lnR w="6350" cap="flat" cmpd="sng" algn="ctr">
+                      <a:solidFill>
+                        <a:srgbClr val="000000"/>
+                      </a:solidFill>
+                      <a:prstDash val="solid"/>
+                      <a:round/>
+                      <a:headEnd type="none" w="med" len="med"/>
+                      <a:tailEnd type="none" w="med" len="med"/>
+                    </a:lnR>
+                    <a:lnT w="6350" cap="flat" cmpd="sng" algn="ctr">
+                      <a:solidFill>
+                        <a:srgbClr val="000000"/>
+                      </a:solidFill>
+                      <a:prstDash val="solid"/>
+                      <a:round/>
+                      <a:headEnd type="none" w="med" len="med"/>
+                      <a:tailEnd type="none" w="med" len="med"/>
+                    </a:lnT>
+                    <a:lnB w="6350" cap="flat" cmpd="sng" algn="ctr">
+                      <a:solidFill>
+                        <a:srgbClr val="000000"/>
+                      </a:solidFill>
+                      <a:prstDash val="solid"/>
+                      <a:round/>
+                      <a:headEnd type="none" w="med" len="med"/>
+                      <a:tailEnd type="none" w="med" len="med"/>
+                    </a:lnB>
+                  </a:tcPr>
+                </a:tc>
+                <a:extLst>
+                  <a:ext uri="{0D108BD9-81ED-4DB2-BD59-A6C34878D82A}">
+                    <a16:rowId xmlns:a16="http://schemas.microsoft.com/office/drawing/2014/main" val="3777229127"/>
+                  </a:ext>
+                </a:extLst>
+              </a:tr>
+              <a:tr h="302182">
+                <a:tc>
+                  <a:txBody>
+                    <a:bodyPr/>
+                    <a:lstStyle/>
+                    <a:p>
+                      <a:pPr algn="ctr" fontAlgn="ctr"/>
+                      <a:r>
+                        <a:rPr lang="en-US" sz="1100" b="0" i="0" u="none" strike="noStrike">
+                          <a:solidFill>
+                            <a:srgbClr val="000000"/>
+                          </a:solidFill>
+                          <a:effectLst/>
+                          <a:latin typeface="Calibri" panose="020F0502020204030204" pitchFamily="34" charset="0"/>
+                        </a:rPr>
+                        <a:t>5</a:t>
+                      </a:r>
+                    </a:p>
+                  </a:txBody>
+                  <a:tcPr marL="7620" marR="7620" marT="7620" marB="0" anchor="ctr">
+                    <a:lnL w="6350" cap="flat" cmpd="sng" algn="ctr">
+                      <a:solidFill>
+                        <a:srgbClr val="000000"/>
+                      </a:solidFill>
+                      <a:prstDash val="solid"/>
+                      <a:round/>
+                      <a:headEnd type="none" w="med" len="med"/>
+                      <a:tailEnd type="none" w="med" len="med"/>
+                    </a:lnL>
+                    <a:lnR w="6350" cap="flat" cmpd="sng" algn="ctr">
+                      <a:solidFill>
+                        <a:srgbClr val="000000"/>
+                      </a:solidFill>
+                      <a:prstDash val="solid"/>
+                      <a:round/>
+                      <a:headEnd type="none" w="med" len="med"/>
+                      <a:tailEnd type="none" w="med" len="med"/>
+                    </a:lnR>
+                    <a:lnT w="6350" cap="flat" cmpd="sng" algn="ctr">
+                      <a:solidFill>
+                        <a:srgbClr val="000000"/>
+                      </a:solidFill>
+                      <a:prstDash val="solid"/>
+                      <a:round/>
+                      <a:headEnd type="none" w="med" len="med"/>
+                      <a:tailEnd type="none" w="med" len="med"/>
+                    </a:lnT>
+                    <a:lnB w="6350" cap="flat" cmpd="sng" algn="ctr">
+                      <a:solidFill>
+                        <a:srgbClr val="000000"/>
+                      </a:solidFill>
+                      <a:prstDash val="solid"/>
+                      <a:round/>
+                      <a:headEnd type="none" w="med" len="med"/>
+                      <a:tailEnd type="none" w="med" len="med"/>
+                    </a:lnB>
+                  </a:tcPr>
+                </a:tc>
+                <a:tc>
+                  <a:txBody>
+                    <a:bodyPr/>
+                    <a:lstStyle/>
+                    <a:p>
+                      <a:pPr algn="ctr" fontAlgn="ctr"/>
+                      <a:r>
+                        <a:rPr lang="en-US" sz="1100" b="0" i="0" u="none" strike="noStrike">
+                          <a:solidFill>
+                            <a:srgbClr val="000000"/>
+                          </a:solidFill>
+                          <a:effectLst/>
+                          <a:latin typeface="Calibri" panose="020F0502020204030204" pitchFamily="34" charset="0"/>
+                        </a:rPr>
+                        <a:t>Get state tax rate and home price trend</a:t>
+                      </a:r>
+                    </a:p>
+                  </a:txBody>
+                  <a:tcPr marL="7620" marR="7620" marT="7620" marB="0" anchor="ctr">
+                    <a:lnL w="6350" cap="flat" cmpd="sng" algn="ctr">
+                      <a:solidFill>
+                        <a:srgbClr val="000000"/>
+                      </a:solidFill>
+                      <a:prstDash val="solid"/>
+                      <a:round/>
+                      <a:headEnd type="none" w="med" len="med"/>
+                      <a:tailEnd type="none" w="med" len="med"/>
+                    </a:lnL>
+                    <a:lnR w="6350" cap="flat" cmpd="sng" algn="ctr">
+                      <a:solidFill>
+                        <a:srgbClr val="000000"/>
+                      </a:solidFill>
+                      <a:prstDash val="solid"/>
+                      <a:round/>
+                      <a:headEnd type="none" w="med" len="med"/>
+                      <a:tailEnd type="none" w="med" len="med"/>
+                    </a:lnR>
+                    <a:lnT w="6350" cap="flat" cmpd="sng" algn="ctr">
+                      <a:solidFill>
+                        <a:srgbClr val="000000"/>
+                      </a:solidFill>
+                      <a:prstDash val="solid"/>
+                      <a:round/>
+                      <a:headEnd type="none" w="med" len="med"/>
+                      <a:tailEnd type="none" w="med" len="med"/>
+                    </a:lnT>
+                    <a:lnB w="6350" cap="flat" cmpd="sng" algn="ctr">
+                      <a:solidFill>
+                        <a:srgbClr val="000000"/>
+                      </a:solidFill>
+                      <a:prstDash val="solid"/>
+                      <a:round/>
+                      <a:headEnd type="none" w="med" len="med"/>
+                      <a:tailEnd type="none" w="med" len="med"/>
+                    </a:lnB>
+                  </a:tcPr>
+                </a:tc>
+                <a:tc>
+                  <a:txBody>
+                    <a:bodyPr/>
+                    <a:lstStyle/>
+                    <a:p>
+                      <a:pPr algn="ctr" fontAlgn="ctr"/>
+                      <a:r>
+                        <a:rPr lang="en-US" sz="1100" b="0" i="0" u="none" strike="noStrike" dirty="0" err="1">
+                          <a:solidFill>
+                            <a:srgbClr val="000000"/>
+                          </a:solidFill>
+                          <a:effectLst/>
+                          <a:latin typeface="Calibri" panose="020F0502020204030204" pitchFamily="34" charset="0"/>
+                        </a:rPr>
+                        <a:t>Bahar</a:t>
+                      </a:r>
+                      <a:endParaRPr lang="en-US" sz="1100" b="0" i="0" u="none" strike="noStrike" dirty="0">
+                        <a:solidFill>
+                          <a:srgbClr val="000000"/>
+                        </a:solidFill>
+                        <a:effectLst/>
+                        <a:latin typeface="Calibri" panose="020F0502020204030204" pitchFamily="34" charset="0"/>
+                      </a:endParaRPr>
+                    </a:p>
+                  </a:txBody>
+                  <a:tcPr marL="7620" marR="7620" marT="7620" marB="0" anchor="ctr">
+                    <a:lnL w="6350" cap="flat" cmpd="sng" algn="ctr">
+                      <a:solidFill>
+                        <a:srgbClr val="000000"/>
+                      </a:solidFill>
+                      <a:prstDash val="solid"/>
+                      <a:round/>
+                      <a:headEnd type="none" w="med" len="med"/>
+                      <a:tailEnd type="none" w="med" len="med"/>
+                    </a:lnL>
+                    <a:lnR w="6350" cap="flat" cmpd="sng" algn="ctr">
+                      <a:solidFill>
+                        <a:srgbClr val="000000"/>
+                      </a:solidFill>
+                      <a:prstDash val="solid"/>
+                      <a:round/>
+                      <a:headEnd type="none" w="med" len="med"/>
+                      <a:tailEnd type="none" w="med" len="med"/>
+                    </a:lnR>
+                    <a:lnT w="6350" cap="flat" cmpd="sng" algn="ctr">
+                      <a:solidFill>
+                        <a:srgbClr val="000000"/>
+                      </a:solidFill>
+                      <a:prstDash val="solid"/>
+                      <a:round/>
+                      <a:headEnd type="none" w="med" len="med"/>
+                      <a:tailEnd type="none" w="med" len="med"/>
+                    </a:lnT>
+                    <a:lnB w="6350" cap="flat" cmpd="sng" algn="ctr">
+                      <a:solidFill>
+                        <a:srgbClr val="000000"/>
+                      </a:solidFill>
+                      <a:prstDash val="solid"/>
+                      <a:round/>
+                      <a:headEnd type="none" w="med" len="med"/>
+                      <a:tailEnd type="none" w="med" len="med"/>
+                    </a:lnB>
+                  </a:tcPr>
+                </a:tc>
+                <a:extLst>
+                  <a:ext uri="{0D108BD9-81ED-4DB2-BD59-A6C34878D82A}">
+                    <a16:rowId xmlns:a16="http://schemas.microsoft.com/office/drawing/2014/main" val="247023052"/>
+                  </a:ext>
+                </a:extLst>
+              </a:tr>
+              <a:tr h="302182">
+                <a:tc>
+                  <a:txBody>
+                    <a:bodyPr/>
+                    <a:lstStyle/>
+                    <a:p>
+                      <a:pPr algn="ctr" fontAlgn="ctr"/>
+                      <a:r>
+                        <a:rPr lang="en-US" sz="1100" b="0" i="0" u="none" strike="noStrike">
+                          <a:solidFill>
+                            <a:srgbClr val="000000"/>
+                          </a:solidFill>
+                          <a:effectLst/>
+                          <a:latin typeface="Calibri" panose="020F0502020204030204" pitchFamily="34" charset="0"/>
+                        </a:rPr>
+                        <a:t>6</a:t>
+                      </a:r>
+                    </a:p>
+                  </a:txBody>
+                  <a:tcPr marL="7620" marR="7620" marT="7620" marB="0" anchor="ctr">
+                    <a:lnL w="6350" cap="flat" cmpd="sng" algn="ctr">
+                      <a:solidFill>
+                        <a:srgbClr val="000000"/>
+                      </a:solidFill>
+                      <a:prstDash val="solid"/>
+                      <a:round/>
+                      <a:headEnd type="none" w="med" len="med"/>
+                      <a:tailEnd type="none" w="med" len="med"/>
+                    </a:lnL>
+                    <a:lnR w="6350" cap="flat" cmpd="sng" algn="ctr">
+                      <a:solidFill>
+                        <a:srgbClr val="000000"/>
+                      </a:solidFill>
+                      <a:prstDash val="solid"/>
+                      <a:round/>
+                      <a:headEnd type="none" w="med" len="med"/>
+                      <a:tailEnd type="none" w="med" len="med"/>
+                    </a:lnR>
+                    <a:lnT w="6350" cap="flat" cmpd="sng" algn="ctr">
+                      <a:solidFill>
+                        <a:srgbClr val="000000"/>
+                      </a:solidFill>
+                      <a:prstDash val="solid"/>
+                      <a:round/>
+                      <a:headEnd type="none" w="med" len="med"/>
+                      <a:tailEnd type="none" w="med" len="med"/>
+                    </a:lnT>
+                    <a:lnB w="6350" cap="flat" cmpd="sng" algn="ctr">
+                      <a:solidFill>
+                        <a:srgbClr val="000000"/>
+                      </a:solidFill>
+                      <a:prstDash val="solid"/>
+                      <a:round/>
+                      <a:headEnd type="none" w="med" len="med"/>
+                      <a:tailEnd type="none" w="med" len="med"/>
+                    </a:lnB>
+                  </a:tcPr>
+                </a:tc>
+                <a:tc>
+                  <a:txBody>
+                    <a:bodyPr/>
+                    <a:lstStyle/>
+                    <a:p>
+                      <a:pPr algn="ctr" fontAlgn="ctr"/>
+                      <a:r>
+                        <a:rPr lang="en-US" sz="1100" b="0" i="0" u="none" strike="noStrike">
+                          <a:solidFill>
+                            <a:srgbClr val="000000"/>
+                          </a:solidFill>
+                          <a:effectLst/>
+                          <a:latin typeface="Calibri" panose="020F0502020204030204" pitchFamily="34" charset="0"/>
+                        </a:rPr>
+                        <a:t>Get climate correlation to home price</a:t>
+                      </a:r>
+                    </a:p>
+                  </a:txBody>
+                  <a:tcPr marL="7620" marR="7620" marT="7620" marB="0" anchor="ctr">
+                    <a:lnL w="6350" cap="flat" cmpd="sng" algn="ctr">
+                      <a:solidFill>
+                        <a:srgbClr val="000000"/>
+                      </a:solidFill>
+                      <a:prstDash val="solid"/>
+                      <a:round/>
+                      <a:headEnd type="none" w="med" len="med"/>
+                      <a:tailEnd type="none" w="med" len="med"/>
+                    </a:lnL>
+                    <a:lnR w="6350" cap="flat" cmpd="sng" algn="ctr">
+                      <a:solidFill>
+                        <a:srgbClr val="000000"/>
+                      </a:solidFill>
+                      <a:prstDash val="solid"/>
+                      <a:round/>
+                      <a:headEnd type="none" w="med" len="med"/>
+                      <a:tailEnd type="none" w="med" len="med"/>
+                    </a:lnR>
+                    <a:lnT w="6350" cap="flat" cmpd="sng" algn="ctr">
+                      <a:solidFill>
+                        <a:srgbClr val="000000"/>
+                      </a:solidFill>
+                      <a:prstDash val="solid"/>
+                      <a:round/>
+                      <a:headEnd type="none" w="med" len="med"/>
+                      <a:tailEnd type="none" w="med" len="med"/>
+                    </a:lnT>
+                    <a:lnB w="6350" cap="flat" cmpd="sng" algn="ctr">
+                      <a:solidFill>
+                        <a:srgbClr val="000000"/>
+                      </a:solidFill>
+                      <a:prstDash val="solid"/>
+                      <a:round/>
+                      <a:headEnd type="none" w="med" len="med"/>
+                      <a:tailEnd type="none" w="med" len="med"/>
+                    </a:lnB>
+                  </a:tcPr>
+                </a:tc>
+                <a:tc>
+                  <a:txBody>
+                    <a:bodyPr/>
+                    <a:lstStyle/>
+                    <a:p>
+                      <a:pPr algn="ctr" fontAlgn="ctr"/>
+                      <a:r>
+                        <a:rPr lang="en-US" sz="1100" b="0" i="0" u="none" strike="noStrike" dirty="0">
+                          <a:solidFill>
+                            <a:srgbClr val="000000"/>
+                          </a:solidFill>
+                          <a:effectLst/>
+                          <a:latin typeface="Calibri" panose="020F0502020204030204" pitchFamily="34" charset="0"/>
+                        </a:rPr>
+                        <a:t>Prakash</a:t>
+                      </a:r>
+                    </a:p>
+                  </a:txBody>
+                  <a:tcPr marL="7620" marR="7620" marT="7620" marB="0" anchor="ctr">
+                    <a:lnL w="6350" cap="flat" cmpd="sng" algn="ctr">
+                      <a:solidFill>
+                        <a:srgbClr val="000000"/>
+                      </a:solidFill>
+                      <a:prstDash val="solid"/>
+                      <a:round/>
+                      <a:headEnd type="none" w="med" len="med"/>
+                      <a:tailEnd type="none" w="med" len="med"/>
+                    </a:lnL>
+                    <a:lnR w="6350" cap="flat" cmpd="sng" algn="ctr">
+                      <a:solidFill>
+                        <a:srgbClr val="000000"/>
+                      </a:solidFill>
+                      <a:prstDash val="solid"/>
+                      <a:round/>
+                      <a:headEnd type="none" w="med" len="med"/>
+                      <a:tailEnd type="none" w="med" len="med"/>
+                    </a:lnR>
+                    <a:lnT w="6350" cap="flat" cmpd="sng" algn="ctr">
+                      <a:solidFill>
+                        <a:srgbClr val="000000"/>
+                      </a:solidFill>
+                      <a:prstDash val="solid"/>
+                      <a:round/>
+                      <a:headEnd type="none" w="med" len="med"/>
+                      <a:tailEnd type="none" w="med" len="med"/>
+                    </a:lnT>
+                    <a:lnB w="6350" cap="flat" cmpd="sng" algn="ctr">
+                      <a:solidFill>
+                        <a:srgbClr val="000000"/>
+                      </a:solidFill>
+                      <a:prstDash val="solid"/>
+                      <a:round/>
+                      <a:headEnd type="none" w="med" len="med"/>
+                      <a:tailEnd type="none" w="med" len="med"/>
+                    </a:lnB>
+                  </a:tcPr>
+                </a:tc>
+                <a:extLst>
+                  <a:ext uri="{0D108BD9-81ED-4DB2-BD59-A6C34878D82A}">
+                    <a16:rowId xmlns:a16="http://schemas.microsoft.com/office/drawing/2014/main" val="1440953786"/>
+                  </a:ext>
+                </a:extLst>
+              </a:tr>
+              <a:tr h="302182">
+                <a:tc>
+                  <a:txBody>
+                    <a:bodyPr/>
+                    <a:lstStyle/>
+                    <a:p>
+                      <a:pPr algn="ctr" fontAlgn="ctr"/>
+                      <a:r>
+                        <a:rPr lang="en-US" sz="1100" b="0" i="0" u="none" strike="noStrike">
+                          <a:solidFill>
+                            <a:srgbClr val="000000"/>
+                          </a:solidFill>
+                          <a:effectLst/>
+                          <a:latin typeface="Calibri" panose="020F0502020204030204" pitchFamily="34" charset="0"/>
+                        </a:rPr>
+                        <a:t>7</a:t>
+                      </a:r>
+                    </a:p>
+                  </a:txBody>
+                  <a:tcPr marL="7620" marR="7620" marT="7620" marB="0" anchor="ctr">
+                    <a:lnL w="6350" cap="flat" cmpd="sng" algn="ctr">
+                      <a:solidFill>
+                        <a:srgbClr val="000000"/>
+                      </a:solidFill>
+                      <a:prstDash val="solid"/>
+                      <a:round/>
+                      <a:headEnd type="none" w="med" len="med"/>
+                      <a:tailEnd type="none" w="med" len="med"/>
+                    </a:lnL>
+                    <a:lnR w="6350" cap="flat" cmpd="sng" algn="ctr">
+                      <a:solidFill>
+                        <a:srgbClr val="000000"/>
+                      </a:solidFill>
+                      <a:prstDash val="solid"/>
+                      <a:round/>
+                      <a:headEnd type="none" w="med" len="med"/>
+                      <a:tailEnd type="none" w="med" len="med"/>
+                    </a:lnR>
+                    <a:lnT w="6350" cap="flat" cmpd="sng" algn="ctr">
+                      <a:solidFill>
+                        <a:srgbClr val="000000"/>
+                      </a:solidFill>
+                      <a:prstDash val="solid"/>
+                      <a:round/>
+                      <a:headEnd type="none" w="med" len="med"/>
+                      <a:tailEnd type="none" w="med" len="med"/>
+                    </a:lnT>
+                    <a:lnB w="6350" cap="flat" cmpd="sng" algn="ctr">
+                      <a:solidFill>
+                        <a:srgbClr val="000000"/>
+                      </a:solidFill>
+                      <a:prstDash val="solid"/>
+                      <a:round/>
+                      <a:headEnd type="none" w="med" len="med"/>
+                      <a:tailEnd type="none" w="med" len="med"/>
+                    </a:lnB>
+                  </a:tcPr>
+                </a:tc>
+                <a:tc>
+                  <a:txBody>
+                    <a:bodyPr/>
+                    <a:lstStyle/>
+                    <a:p>
+                      <a:pPr algn="ctr" fontAlgn="ctr"/>
+                      <a:r>
+                        <a:rPr lang="en-US" sz="1100" b="0" i="0" u="none" strike="noStrike">
+                          <a:solidFill>
+                            <a:srgbClr val="000000"/>
+                          </a:solidFill>
+                          <a:effectLst/>
+                          <a:latin typeface="Calibri" panose="020F0502020204030204" pitchFamily="34" charset="0"/>
+                        </a:rPr>
+                        <a:t>Analyze plots, data</a:t>
+                      </a:r>
+                    </a:p>
+                  </a:txBody>
+                  <a:tcPr marL="7620" marR="7620" marT="7620" marB="0" anchor="ctr">
+                    <a:lnL w="6350" cap="flat" cmpd="sng" algn="ctr">
+                      <a:solidFill>
+                        <a:srgbClr val="000000"/>
+                      </a:solidFill>
+                      <a:prstDash val="solid"/>
+                      <a:round/>
+                      <a:headEnd type="none" w="med" len="med"/>
+                      <a:tailEnd type="none" w="med" len="med"/>
+                    </a:lnL>
+                    <a:lnR w="6350" cap="flat" cmpd="sng" algn="ctr">
+                      <a:solidFill>
+                        <a:srgbClr val="000000"/>
+                      </a:solidFill>
+                      <a:prstDash val="solid"/>
+                      <a:round/>
+                      <a:headEnd type="none" w="med" len="med"/>
+                      <a:tailEnd type="none" w="med" len="med"/>
+                    </a:lnR>
+                    <a:lnT w="6350" cap="flat" cmpd="sng" algn="ctr">
+                      <a:solidFill>
+                        <a:srgbClr val="000000"/>
+                      </a:solidFill>
+                      <a:prstDash val="solid"/>
+                      <a:round/>
+                      <a:headEnd type="none" w="med" len="med"/>
+                      <a:tailEnd type="none" w="med" len="med"/>
+                    </a:lnT>
+                    <a:lnB w="6350" cap="flat" cmpd="sng" algn="ctr">
+                      <a:solidFill>
+                        <a:srgbClr val="000000"/>
+                      </a:solidFill>
+                      <a:prstDash val="solid"/>
+                      <a:round/>
+                      <a:headEnd type="none" w="med" len="med"/>
+                      <a:tailEnd type="none" w="med" len="med"/>
+                    </a:lnB>
+                  </a:tcPr>
+                </a:tc>
+                <a:tc>
+                  <a:txBody>
+                    <a:bodyPr/>
+                    <a:lstStyle/>
+                    <a:p>
+                      <a:pPr algn="ctr" fontAlgn="ctr"/>
+                      <a:r>
+                        <a:rPr lang="en-US" sz="1100" b="0" i="0" u="none" strike="noStrike" dirty="0">
+                          <a:solidFill>
+                            <a:srgbClr val="000000"/>
+                          </a:solidFill>
+                          <a:effectLst/>
+                          <a:latin typeface="Calibri" panose="020F0502020204030204" pitchFamily="34" charset="0"/>
+                        </a:rPr>
+                        <a:t>All</a:t>
+                      </a:r>
+                    </a:p>
+                  </a:txBody>
+                  <a:tcPr marL="7620" marR="7620" marT="7620" marB="0" anchor="ctr">
+                    <a:lnL w="6350" cap="flat" cmpd="sng" algn="ctr">
+                      <a:solidFill>
+                        <a:srgbClr val="000000"/>
+                      </a:solidFill>
+                      <a:prstDash val="solid"/>
+                      <a:round/>
+                      <a:headEnd type="none" w="med" len="med"/>
+                      <a:tailEnd type="none" w="med" len="med"/>
+                    </a:lnL>
+                    <a:lnR w="6350" cap="flat" cmpd="sng" algn="ctr">
+                      <a:solidFill>
+                        <a:srgbClr val="000000"/>
+                      </a:solidFill>
+                      <a:prstDash val="solid"/>
+                      <a:round/>
+                      <a:headEnd type="none" w="med" len="med"/>
+                      <a:tailEnd type="none" w="med" len="med"/>
+                    </a:lnR>
+                    <a:lnT w="6350" cap="flat" cmpd="sng" algn="ctr">
+                      <a:solidFill>
+                        <a:srgbClr val="000000"/>
+                      </a:solidFill>
+                      <a:prstDash val="solid"/>
+                      <a:round/>
+                      <a:headEnd type="none" w="med" len="med"/>
+                      <a:tailEnd type="none" w="med" len="med"/>
+                    </a:lnT>
+                    <a:lnB w="6350" cap="flat" cmpd="sng" algn="ctr">
+                      <a:solidFill>
+                        <a:srgbClr val="000000"/>
+                      </a:solidFill>
+                      <a:prstDash val="solid"/>
+                      <a:round/>
+                      <a:headEnd type="none" w="med" len="med"/>
+                      <a:tailEnd type="none" w="med" len="med"/>
+                    </a:lnB>
+                  </a:tcPr>
+                </a:tc>
+                <a:extLst>
+                  <a:ext uri="{0D108BD9-81ED-4DB2-BD59-A6C34878D82A}">
+                    <a16:rowId xmlns:a16="http://schemas.microsoft.com/office/drawing/2014/main" val="150588915"/>
+                  </a:ext>
+                </a:extLst>
+              </a:tr>
+            </a:tbl>
+          </a:graphicData>
+        </a:graphic>
+      </p:graphicFrame>
+    </p:spTree>
+    <p:extLst>
+      <p:ext uri="{BB962C8B-B14F-4D97-AF65-F5344CB8AC3E}">
+        <p14:creationId xmlns:p14="http://schemas.microsoft.com/office/powerpoint/2010/main" val="950416010"/>
+      </p:ext>
+    </p:extLst>
+  </p:cSld>
+  <p:clrMapOvr>
+    <a:masterClrMapping/>
+  </p:clrMapOvr>
+</p:sld>
+</file>
+
+<file path=ppt/slides/slide5.xml><?xml version="1.0" encoding="utf-8"?>
+<p:sld xmlns:a="http://schemas.openxmlformats.org/drawingml/2006/main" xmlns:r="http://schemas.openxmlformats.org/officeDocument/2006/relationships" xmlns:p="http://schemas.openxmlformats.org/presentationml/2006/main">
+  <p:cSld>
+    <p:spTree>
+      <p:nvGrpSpPr>
+        <p:cNvPr id="1" name=""/>
+        <p:cNvGrpSpPr/>
+        <p:nvPr/>
+      </p:nvGrpSpPr>
+      <p:grpSpPr>
+        <a:xfrm>
+          <a:off x="0" y="0"/>
+          <a:ext cx="0" cy="0"/>
+          <a:chOff x="0" y="0"/>
+          <a:chExt cx="0" cy="0"/>
+        </a:xfrm>
+      </p:grpSpPr>
+      <p:sp>
+        <p:nvSpPr>
+          <p:cNvPr id="2" name="Title 1">
+            <a:extLst>
+              <a:ext uri="{FF2B5EF4-FFF2-40B4-BE49-F238E27FC236}">
+                <a16:creationId xmlns:a16="http://schemas.microsoft.com/office/drawing/2014/main" id="{1917A588-6B43-4326-8CEE-B31FA8CC4FDB}"/>
+              </a:ext>
+            </a:extLst>
+          </p:cNvPr>
+          <p:cNvSpPr>
+            <a:spLocks noGrp="1"/>
+          </p:cNvSpPr>
+          <p:nvPr>
+            <p:ph type="title"/>
+          </p:nvPr>
+        </p:nvSpPr>
         <p:spPr/>
         <p:txBody>
           <a:bodyPr/>
@@ -6532,7 +9133,7 @@
           <a:p>
             <a:r>
               <a:rPr lang="en-US" dirty="0"/>
-              <a:t>Questions</a:t>
+              <a:t>Questions &amp; Criteria</a:t>
             </a:r>
           </a:p>
         </p:txBody>
@@ -6553,39 +9154,209 @@
             <p:ph idx="1"/>
           </p:nvPr>
         </p:nvSpPr>
-        <p:spPr/>
-        <p:txBody>
-          <a:bodyPr/>
-          <a:lstStyle/>
-          <a:p>
-            <a:r>
-              <a:rPr lang="en-US" dirty="0"/>
-              <a:t>1) Does state with higher population have higher salary making it the best state? </a:t>
-            </a:r>
-          </a:p>
-          <a:p>
-            <a:r>
-              <a:rPr lang="en-US" dirty="0"/>
-              <a:t>2) Lower unemployment has lower crime rate therefore making it best state to live in?</a:t>
-            </a:r>
-          </a:p>
-          <a:p>
-            <a:r>
-              <a:rPr lang="en-US" dirty="0"/>
-              <a:t>3) People lives in best state because home is cheaper</a:t>
-            </a:r>
-          </a:p>
-          <a:p>
-            <a:r>
-              <a:rPr lang="en-US" dirty="0"/>
-              <a:t>4) What is criteria to be the best state to live in?</a:t>
-            </a:r>
-          </a:p>
-          <a:p>
-            <a:r>
-              <a:rPr lang="en-US" dirty="0"/>
-              <a:t>5) Southern states are the preferred ones?</a:t>
-            </a:r>
+        <p:spPr>
+          <a:xfrm>
+            <a:off x="1295401" y="2556931"/>
+            <a:ext cx="9601196" cy="3597683"/>
+          </a:xfrm>
+        </p:spPr>
+        <p:txBody>
+          <a:bodyPr>
+            <a:normAutofit fontScale="85000" lnSpcReduction="20000"/>
+          </a:bodyPr>
+          <a:lstStyle/>
+          <a:p>
+            <a:r>
+              <a:rPr lang="en-US" dirty="0"/>
+              <a:t>1) Which state is startup business friendly (low tax)? – </a:t>
+            </a:r>
+            <a:r>
+              <a:rPr lang="en-US" dirty="0">
+                <a:solidFill>
+                  <a:srgbClr val="FF0000"/>
+                </a:solidFill>
+              </a:rPr>
+              <a:t>Tax rate and living cost (housing) </a:t>
+            </a:r>
+            <a:r>
+              <a:rPr lang="en-US" dirty="0"/>
+              <a:t>--  (Extra goal) </a:t>
+            </a:r>
+            <a:r>
+              <a:rPr lang="en-US" dirty="0">
+                <a:sym typeface="Wingdings" panose="05000000000000000000" pitchFamily="2" charset="2"/>
+              </a:rPr>
+              <a:t> </a:t>
+            </a:r>
+            <a:r>
+              <a:rPr lang="en-US" dirty="0" err="1">
+                <a:sym typeface="Wingdings" panose="05000000000000000000" pitchFamily="2" charset="2"/>
+              </a:rPr>
+              <a:t>Bahar</a:t>
+            </a:r>
+            <a:endParaRPr lang="en-US" dirty="0"/>
+          </a:p>
+          <a:p>
+            <a:r>
+              <a:rPr lang="en-US" dirty="0"/>
+              <a:t>2) Which state with low </a:t>
+            </a:r>
+            <a:r>
+              <a:rPr lang="en-US" dirty="0">
+                <a:solidFill>
+                  <a:srgbClr val="FF0000"/>
+                </a:solidFill>
+              </a:rPr>
+              <a:t>tax rate</a:t>
+            </a:r>
+            <a:r>
+              <a:rPr lang="en-US" dirty="0"/>
+              <a:t>, attracts employee? (Main goal) </a:t>
+            </a:r>
+            <a:r>
+              <a:rPr lang="en-US" dirty="0">
+                <a:sym typeface="Wingdings" panose="05000000000000000000" pitchFamily="2" charset="2"/>
+              </a:rPr>
+              <a:t> </a:t>
+            </a:r>
+            <a:r>
+              <a:rPr lang="en-US" dirty="0" err="1">
+                <a:sym typeface="Wingdings" panose="05000000000000000000" pitchFamily="2" charset="2"/>
+              </a:rPr>
+              <a:t>Bahar</a:t>
+            </a:r>
+            <a:endParaRPr lang="en-US" dirty="0"/>
+          </a:p>
+          <a:p>
+            <a:r>
+              <a:rPr lang="en-US" dirty="0"/>
+              <a:t>3) Warmer </a:t>
+            </a:r>
+            <a:r>
+              <a:rPr lang="en-US" dirty="0">
+                <a:solidFill>
+                  <a:srgbClr val="FF0000"/>
+                </a:solidFill>
+              </a:rPr>
+              <a:t>climate</a:t>
+            </a:r>
+            <a:r>
+              <a:rPr lang="en-US" dirty="0"/>
+              <a:t> preferred state to live in, correlate to home price? (Main goal) </a:t>
+            </a:r>
+            <a:r>
+              <a:rPr lang="en-US" dirty="0">
+                <a:sym typeface="Wingdings" panose="05000000000000000000" pitchFamily="2" charset="2"/>
+              </a:rPr>
+              <a:t> Prakash</a:t>
+            </a:r>
+            <a:r>
+              <a:rPr lang="en-US" dirty="0"/>
+              <a:t> </a:t>
+            </a:r>
+          </a:p>
+          <a:p>
+            <a:r>
+              <a:rPr lang="en-US" dirty="0"/>
+              <a:t>4) Lower </a:t>
+            </a:r>
+            <a:r>
+              <a:rPr lang="en-US" dirty="0">
+                <a:solidFill>
+                  <a:srgbClr val="FF0000"/>
+                </a:solidFill>
+              </a:rPr>
+              <a:t>unemployment</a:t>
+            </a:r>
+            <a:r>
+              <a:rPr lang="en-US" dirty="0"/>
+              <a:t> correlated to </a:t>
+            </a:r>
+            <a:r>
+              <a:rPr lang="en-US" dirty="0">
+                <a:solidFill>
+                  <a:srgbClr val="FF0000"/>
+                </a:solidFill>
+              </a:rPr>
+              <a:t>crime rate</a:t>
+            </a:r>
+            <a:r>
+              <a:rPr lang="en-US" dirty="0"/>
+              <a:t>? (Main goal) </a:t>
+            </a:r>
+            <a:r>
+              <a:rPr lang="en-US" dirty="0">
+                <a:sym typeface="Wingdings" panose="05000000000000000000" pitchFamily="2" charset="2"/>
+              </a:rPr>
+              <a:t></a:t>
+            </a:r>
+            <a:r>
+              <a:rPr lang="en-US" dirty="0"/>
+              <a:t> Catherine</a:t>
+            </a:r>
+          </a:p>
+          <a:p>
+            <a:r>
+              <a:rPr lang="en-US" dirty="0"/>
+              <a:t>5) Higher </a:t>
+            </a:r>
+            <a:r>
+              <a:rPr lang="en-US" dirty="0">
+                <a:solidFill>
+                  <a:srgbClr val="FF0000"/>
+                </a:solidFill>
+              </a:rPr>
+              <a:t>salary</a:t>
+            </a:r>
+            <a:r>
+              <a:rPr lang="en-US" dirty="0"/>
+              <a:t> states are the preferred ones? (Main goal) </a:t>
+            </a:r>
+            <a:r>
+              <a:rPr lang="en-US" dirty="0">
+                <a:sym typeface="Wingdings" panose="05000000000000000000" pitchFamily="2" charset="2"/>
+              </a:rPr>
+              <a:t> Molly</a:t>
+            </a:r>
+            <a:endParaRPr lang="en-US" dirty="0"/>
+          </a:p>
+          <a:p>
+            <a:r>
+              <a:rPr lang="en-US" dirty="0"/>
+              <a:t>4) Definition of the best state to live in (our criteria)?</a:t>
+            </a:r>
+          </a:p>
+          <a:p>
+            <a:pPr lvl="1"/>
+            <a:r>
+              <a:rPr lang="en-US" dirty="0"/>
+              <a:t>Modest to high salary range</a:t>
+            </a:r>
+          </a:p>
+          <a:p>
+            <a:pPr lvl="1"/>
+            <a:r>
+              <a:rPr lang="en-US" dirty="0"/>
+              <a:t>Low crime and unemployment rate</a:t>
+            </a:r>
+          </a:p>
+          <a:p>
+            <a:pPr lvl="1"/>
+            <a:r>
+              <a:rPr lang="en-US" dirty="0"/>
+              <a:t>Climate with no hurricane, tornado, snow blizzard, </a:t>
+            </a:r>
+          </a:p>
+          <a:p>
+            <a:pPr lvl="1"/>
+            <a:endParaRPr lang="en-US" dirty="0"/>
+          </a:p>
+          <a:p>
+            <a:pPr lvl="1"/>
+            <a:endParaRPr lang="en-US" dirty="0"/>
+          </a:p>
+          <a:p>
+            <a:endParaRPr lang="en-US" dirty="0"/>
           </a:p>
         </p:txBody>
       </p:sp>
@@ -6602,7 +9373,7 @@
 </p:sld>
 </file>
 
-<file path=ppt/slides/slide5.xml><?xml version="1.0" encoding="utf-8"?>
+<file path=ppt/slides/slide6.xml><?xml version="1.0" encoding="utf-8"?>
 <p:sld xmlns:a="http://schemas.openxmlformats.org/drawingml/2006/main" xmlns:r="http://schemas.openxmlformats.org/officeDocument/2006/relationships" xmlns:p="http://schemas.openxmlformats.org/presentationml/2006/main">
   <p:cSld>
     <p:spTree>
@@ -6694,161 +9465,6 @@
 </p:sld>
 </file>
 
-<file path=ppt/slides/slide6.xml><?xml version="1.0" encoding="utf-8"?>
-<p:sld xmlns:a="http://schemas.openxmlformats.org/drawingml/2006/main" xmlns:r="http://schemas.openxmlformats.org/officeDocument/2006/relationships" xmlns:p="http://schemas.openxmlformats.org/presentationml/2006/main">
-  <p:cSld>
-    <p:spTree>
-      <p:nvGrpSpPr>
-        <p:cNvPr id="1" name=""/>
-        <p:cNvGrpSpPr/>
-        <p:nvPr/>
-      </p:nvGrpSpPr>
-      <p:grpSpPr>
-        <a:xfrm>
-          <a:off x="0" y="0"/>
-          <a:ext cx="0" cy="0"/>
-          <a:chOff x="0" y="0"/>
-          <a:chExt cx="0" cy="0"/>
-        </a:xfrm>
-      </p:grpSpPr>
-      <p:sp>
-        <p:nvSpPr>
-          <p:cNvPr id="2" name="Title 1">
-            <a:extLst>
-              <a:ext uri="{FF2B5EF4-FFF2-40B4-BE49-F238E27FC236}">
-                <a16:creationId xmlns:a16="http://schemas.microsoft.com/office/drawing/2014/main" id="{1917A588-6B43-4326-8CEE-B31FA8CC4FDB}"/>
-              </a:ext>
-            </a:extLst>
-          </p:cNvPr>
-          <p:cNvSpPr>
-            <a:spLocks noGrp="1"/>
-          </p:cNvSpPr>
-          <p:nvPr>
-            <p:ph type="title"/>
-          </p:nvPr>
-        </p:nvSpPr>
-        <p:spPr/>
-        <p:txBody>
-          <a:bodyPr/>
-          <a:lstStyle/>
-          <a:p>
-            <a:r>
-              <a:rPr lang="en-US" dirty="0"/>
-              <a:t>Coding Rules</a:t>
-            </a:r>
-          </a:p>
-        </p:txBody>
-      </p:sp>
-      <p:sp>
-        <p:nvSpPr>
-          <p:cNvPr id="3" name="Content Placeholder 2">
-            <a:extLst>
-              <a:ext uri="{FF2B5EF4-FFF2-40B4-BE49-F238E27FC236}">
-                <a16:creationId xmlns:a16="http://schemas.microsoft.com/office/drawing/2014/main" id="{F5BE9D4D-949C-4037-9F87-16CDE0EE0466}"/>
-              </a:ext>
-            </a:extLst>
-          </p:cNvPr>
-          <p:cNvSpPr>
-            <a:spLocks noGrp="1"/>
-          </p:cNvSpPr>
-          <p:nvPr>
-            <p:ph idx="1"/>
-          </p:nvPr>
-        </p:nvSpPr>
-        <p:spPr/>
-        <p:txBody>
-          <a:bodyPr>
-            <a:normAutofit fontScale="92500" lnSpcReduction="10000"/>
-          </a:bodyPr>
-          <a:lstStyle/>
-          <a:p>
-            <a:r>
-              <a:rPr lang="en-US" dirty="0"/>
-              <a:t>Upload scripts to Script folder</a:t>
-            </a:r>
-          </a:p>
-          <a:p>
-            <a:r>
-              <a:rPr lang="en-US" dirty="0"/>
-              <a:t>Label/ Comment on every code line to help other understand quickly. Explain briefly if needed</a:t>
-            </a:r>
-          </a:p>
-          <a:p>
-            <a:r>
-              <a:rPr lang="en-US" dirty="0"/>
-              <a:t>Label plot(s) well with legend, title and axes</a:t>
-            </a:r>
-          </a:p>
-          <a:p>
-            <a:r>
-              <a:rPr lang="en-US" dirty="0"/>
-              <a:t>Append _</a:t>
-            </a:r>
-            <a:r>
-              <a:rPr lang="en-US" dirty="0" err="1"/>
-              <a:t>lst</a:t>
-            </a:r>
-            <a:r>
-              <a:rPr lang="en-US" dirty="0"/>
-              <a:t>, _df and </a:t>
-            </a:r>
-            <a:r>
-              <a:rPr lang="en-US" dirty="0" err="1"/>
-              <a:t>etc</a:t>
-            </a:r>
-            <a:r>
-              <a:rPr lang="en-US" dirty="0"/>
-              <a:t> when defining lists, dictionaries, data frames. E.g. </a:t>
-            </a:r>
-            <a:r>
-              <a:rPr lang="en-US" dirty="0" err="1"/>
-              <a:t>mylist_lst</a:t>
-            </a:r>
-            <a:r>
-              <a:rPr lang="en-US" dirty="0"/>
-              <a:t>, </a:t>
-            </a:r>
-            <a:r>
-              <a:rPr lang="en-US" dirty="0" err="1"/>
-              <a:t>myplot_plt</a:t>
-            </a:r>
-            <a:endParaRPr lang="en-US" dirty="0"/>
-          </a:p>
-          <a:p>
-            <a:r>
-              <a:rPr lang="en-US" dirty="0"/>
-              <a:t>Backup files locally prior to modification for retrieval</a:t>
-            </a:r>
-          </a:p>
-          <a:p>
-            <a:r>
-              <a:rPr lang="en-US" dirty="0"/>
-              <a:t>Attempt to solve 1</a:t>
-            </a:r>
-            <a:r>
-              <a:rPr lang="en-US" baseline="30000" dirty="0"/>
-              <a:t>st</a:t>
-            </a:r>
-            <a:r>
-              <a:rPr lang="en-US" dirty="0"/>
-              <a:t> by yourself, if help needed, slack out</a:t>
-            </a:r>
-          </a:p>
-        </p:txBody>
-      </p:sp>
-    </p:spTree>
-    <p:extLst>
-      <p:ext uri="{BB962C8B-B14F-4D97-AF65-F5344CB8AC3E}">
-        <p14:creationId xmlns:p14="http://schemas.microsoft.com/office/powerpoint/2010/main" val="2409190503"/>
-      </p:ext>
-    </p:extLst>
-  </p:cSld>
-  <p:clrMapOvr>
-    <a:masterClrMapping/>
-  </p:clrMapOvr>
-</p:sld>
-</file>
-
 <file path=ppt/slides/slide7.xml><?xml version="1.0" encoding="utf-8"?>
 <p:sld xmlns:a="http://schemas.openxmlformats.org/drawingml/2006/main" xmlns:r="http://schemas.openxmlformats.org/officeDocument/2006/relationships" xmlns:p="http://schemas.openxmlformats.org/presentationml/2006/main">
   <p:cSld>
@@ -6889,6 +9505,161 @@
           <a:p>
             <a:r>
               <a:rPr lang="en-US" dirty="0"/>
+              <a:t>Coding Rules</a:t>
+            </a:r>
+          </a:p>
+        </p:txBody>
+      </p:sp>
+      <p:sp>
+        <p:nvSpPr>
+          <p:cNvPr id="3" name="Content Placeholder 2">
+            <a:extLst>
+              <a:ext uri="{FF2B5EF4-FFF2-40B4-BE49-F238E27FC236}">
+                <a16:creationId xmlns:a16="http://schemas.microsoft.com/office/drawing/2014/main" id="{F5BE9D4D-949C-4037-9F87-16CDE0EE0466}"/>
+              </a:ext>
+            </a:extLst>
+          </p:cNvPr>
+          <p:cNvSpPr>
+            <a:spLocks noGrp="1"/>
+          </p:cNvSpPr>
+          <p:nvPr>
+            <p:ph idx="1"/>
+          </p:nvPr>
+        </p:nvSpPr>
+        <p:spPr/>
+        <p:txBody>
+          <a:bodyPr>
+            <a:normAutofit fontScale="92500" lnSpcReduction="10000"/>
+          </a:bodyPr>
+          <a:lstStyle/>
+          <a:p>
+            <a:r>
+              <a:rPr lang="en-US" dirty="0"/>
+              <a:t>Upload scripts to Script folder</a:t>
+            </a:r>
+          </a:p>
+          <a:p>
+            <a:r>
+              <a:rPr lang="en-US" dirty="0"/>
+              <a:t>Label/ Comment on every code line to help other understand quickly. Explain briefly if needed</a:t>
+            </a:r>
+          </a:p>
+          <a:p>
+            <a:r>
+              <a:rPr lang="en-US" dirty="0"/>
+              <a:t>Label plot(s) well with legend, title and axes</a:t>
+            </a:r>
+          </a:p>
+          <a:p>
+            <a:r>
+              <a:rPr lang="en-US" dirty="0"/>
+              <a:t>Append _</a:t>
+            </a:r>
+            <a:r>
+              <a:rPr lang="en-US" dirty="0" err="1"/>
+              <a:t>lst</a:t>
+            </a:r>
+            <a:r>
+              <a:rPr lang="en-US" dirty="0"/>
+              <a:t>, _df and </a:t>
+            </a:r>
+            <a:r>
+              <a:rPr lang="en-US" dirty="0" err="1"/>
+              <a:t>etc</a:t>
+            </a:r>
+            <a:r>
+              <a:rPr lang="en-US" dirty="0"/>
+              <a:t> when defining lists, dictionaries, data frames. E.g. </a:t>
+            </a:r>
+            <a:r>
+              <a:rPr lang="en-US" dirty="0" err="1"/>
+              <a:t>mylist_lst</a:t>
+            </a:r>
+            <a:r>
+              <a:rPr lang="en-US" dirty="0"/>
+              <a:t>, </a:t>
+            </a:r>
+            <a:r>
+              <a:rPr lang="en-US" dirty="0" err="1"/>
+              <a:t>myplot_plt</a:t>
+            </a:r>
+            <a:endParaRPr lang="en-US" dirty="0"/>
+          </a:p>
+          <a:p>
+            <a:r>
+              <a:rPr lang="en-US" dirty="0"/>
+              <a:t>Backup files locally prior to modification for retrieval</a:t>
+            </a:r>
+          </a:p>
+          <a:p>
+            <a:r>
+              <a:rPr lang="en-US" dirty="0"/>
+              <a:t>Attempt to solve 1</a:t>
+            </a:r>
+            <a:r>
+              <a:rPr lang="en-US" baseline="30000" dirty="0"/>
+              <a:t>st</a:t>
+            </a:r>
+            <a:r>
+              <a:rPr lang="en-US" dirty="0"/>
+              <a:t> by yourself, if help needed, slack out</a:t>
+            </a:r>
+          </a:p>
+        </p:txBody>
+      </p:sp>
+    </p:spTree>
+    <p:extLst>
+      <p:ext uri="{BB962C8B-B14F-4D97-AF65-F5344CB8AC3E}">
+        <p14:creationId xmlns:p14="http://schemas.microsoft.com/office/powerpoint/2010/main" val="2409190503"/>
+      </p:ext>
+    </p:extLst>
+  </p:cSld>
+  <p:clrMapOvr>
+    <a:masterClrMapping/>
+  </p:clrMapOvr>
+</p:sld>
+</file>
+
+<file path=ppt/slides/slide8.xml><?xml version="1.0" encoding="utf-8"?>
+<p:sld xmlns:a="http://schemas.openxmlformats.org/drawingml/2006/main" xmlns:r="http://schemas.openxmlformats.org/officeDocument/2006/relationships" xmlns:p="http://schemas.openxmlformats.org/presentationml/2006/main">
+  <p:cSld>
+    <p:spTree>
+      <p:nvGrpSpPr>
+        <p:cNvPr id="1" name=""/>
+        <p:cNvGrpSpPr/>
+        <p:nvPr/>
+      </p:nvGrpSpPr>
+      <p:grpSpPr>
+        <a:xfrm>
+          <a:off x="0" y="0"/>
+          <a:ext cx="0" cy="0"/>
+          <a:chOff x="0" y="0"/>
+          <a:chExt cx="0" cy="0"/>
+        </a:xfrm>
+      </p:grpSpPr>
+      <p:sp>
+        <p:nvSpPr>
+          <p:cNvPr id="2" name="Title 1">
+            <a:extLst>
+              <a:ext uri="{FF2B5EF4-FFF2-40B4-BE49-F238E27FC236}">
+                <a16:creationId xmlns:a16="http://schemas.microsoft.com/office/drawing/2014/main" id="{1917A588-6B43-4326-8CEE-B31FA8CC4FDB}"/>
+              </a:ext>
+            </a:extLst>
+          </p:cNvPr>
+          <p:cNvSpPr>
+            <a:spLocks noGrp="1"/>
+          </p:cNvSpPr>
+          <p:nvPr>
+            <p:ph type="title"/>
+          </p:nvPr>
+        </p:nvSpPr>
+        <p:spPr/>
+        <p:txBody>
+          <a:bodyPr/>
+          <a:lstStyle/>
+          <a:p>
+            <a:r>
+              <a:rPr lang="en-US" dirty="0"/>
               <a:t>Availability</a:t>
             </a:r>
           </a:p>
@@ -6910,14 +9681,14 @@
             <p:ph idx="1"/>
             <p:extLst>
               <p:ext uri="{D42A27DB-BD31-4B8C-83A1-F6EECF244321}">
-                <p14:modId xmlns:p14="http://schemas.microsoft.com/office/powerpoint/2010/main" val="1431381320"/>
+                <p14:modId xmlns:p14="http://schemas.microsoft.com/office/powerpoint/2010/main" val="2806111777"/>
               </p:ext>
             </p:extLst>
           </p:nvPr>
         </p:nvGraphicFramePr>
         <p:xfrm>
-          <a:off x="2734408" y="2583838"/>
-          <a:ext cx="6392007" cy="3597155"/>
+          <a:off x="2734408" y="2583839"/>
+          <a:ext cx="6523892" cy="3016861"/>
         </p:xfrm>
         <a:graphic>
           <a:graphicData uri="http://schemas.openxmlformats.org/drawingml/2006/table">
@@ -6926,35 +9697,35 @@
                 <a:tableStyleId>{5C22544A-7EE6-4342-B048-85BDC9FD1C3A}</a:tableStyleId>
               </a:tblPr>
               <a:tblGrid>
-                <a:gridCol w="1542161">
+                <a:gridCol w="1573980">
                   <a:extLst>
                     <a:ext uri="{9D8B030D-6E8A-4147-A177-3AD203B41FA5}">
                       <a16:colId xmlns:a16="http://schemas.microsoft.com/office/drawing/2014/main" val="2013967057"/>
                     </a:ext>
                   </a:extLst>
                 </a:gridCol>
-                <a:gridCol w="1038280">
+                <a:gridCol w="1059703">
                   <a:extLst>
                     <a:ext uri="{9D8B030D-6E8A-4147-A177-3AD203B41FA5}">
                       <a16:colId xmlns:a16="http://schemas.microsoft.com/office/drawing/2014/main" val="477625931"/>
                     </a:ext>
                   </a:extLst>
                 </a:gridCol>
-                <a:gridCol w="1515602">
+                <a:gridCol w="1546873">
                   <a:extLst>
                     <a:ext uri="{9D8B030D-6E8A-4147-A177-3AD203B41FA5}">
                       <a16:colId xmlns:a16="http://schemas.microsoft.com/office/drawing/2014/main" val="913401616"/>
                     </a:ext>
                   </a:extLst>
                 </a:gridCol>
-                <a:gridCol w="1006962">
+                <a:gridCol w="1027738">
                   <a:extLst>
                     <a:ext uri="{9D8B030D-6E8A-4147-A177-3AD203B41FA5}">
                       <a16:colId xmlns:a16="http://schemas.microsoft.com/office/drawing/2014/main" val="4263324847"/>
                     </a:ext>
                   </a:extLst>
                 </a:gridCol>
-                <a:gridCol w="1289002">
+                <a:gridCol w="1315598">
                   <a:extLst>
                     <a:ext uri="{9D8B030D-6E8A-4147-A177-3AD203B41FA5}">
                       <a16:colId xmlns:a16="http://schemas.microsoft.com/office/drawing/2014/main" val="1813264309"/>
@@ -6962,7 +9733,7 @@
                   </a:extLst>
                 </a:gridCol>
               </a:tblGrid>
-              <a:tr h="559994">
+              <a:tr h="469656">
                 <a:tc>
                   <a:txBody>
                     <a:bodyPr/>
@@ -7040,7 +9811,7 @@
                   </a:ext>
                 </a:extLst>
               </a:tr>
-              <a:tr h="446043">
+              <a:tr h="374087">
                 <a:tc>
                   <a:txBody>
                     <a:bodyPr/>
@@ -7061,7 +9832,10 @@
                     <a:lstStyle/>
                     <a:p>
                       <a:pPr algn="ctr"/>
-                      <a:endParaRPr lang="en-US" dirty="0"/>
+                      <a:r>
+                        <a:rPr lang="en-US" dirty="0"/>
+                        <a:t>Yes</a:t>
+                      </a:r>
                     </a:p>
                   </a:txBody>
                   <a:tcPr anchor="ctr"/>
@@ -7072,7 +9846,10 @@
                     <a:lstStyle/>
                     <a:p>
                       <a:pPr algn="ctr"/>
-                      <a:endParaRPr lang="en-US" dirty="0"/>
+                      <a:r>
+                        <a:rPr lang="en-US" dirty="0"/>
+                        <a:t>Yes</a:t>
+                      </a:r>
                     </a:p>
                   </a:txBody>
                   <a:tcPr anchor="ctr"/>
@@ -7083,7 +9860,10 @@
                     <a:lstStyle/>
                     <a:p>
                       <a:pPr algn="ctr"/>
-                      <a:endParaRPr lang="en-US"/>
+                      <a:r>
+                        <a:rPr lang="en-US" dirty="0"/>
+                        <a:t>Yes</a:t>
+                      </a:r>
                     </a:p>
                   </a:txBody>
                   <a:tcPr anchor="ctr"/>
@@ -7108,7 +9888,7 @@
                   </a:ext>
                 </a:extLst>
               </a:tr>
-              <a:tr h="446043">
+              <a:tr h="374087">
                 <a:tc>
                   <a:txBody>
                     <a:bodyPr/>
@@ -7130,7 +9910,11 @@
                     <a:p>
                       <a:pPr algn="ctr"/>
                       <a:r>
-                        <a:rPr lang="en-US" dirty="0"/>
+                        <a:rPr lang="en-US" dirty="0">
+                          <a:highlight>
+                            <a:srgbClr val="FF0000"/>
+                          </a:highlight>
+                        </a:rPr>
                         <a:t>No</a:t>
                       </a:r>
                     </a:p>
@@ -7143,7 +9927,10 @@
                     <a:lstStyle/>
                     <a:p>
                       <a:pPr algn="ctr"/>
-                      <a:endParaRPr lang="en-US"/>
+                      <a:r>
+                        <a:rPr lang="en-US" dirty="0"/>
+                        <a:t>Yes</a:t>
+                      </a:r>
                     </a:p>
                   </a:txBody>
                   <a:tcPr anchor="ctr"/>
@@ -7154,7 +9941,14 @@
                     <a:lstStyle/>
                     <a:p>
                       <a:pPr algn="ctr"/>
-                      <a:endParaRPr lang="en-US" dirty="0"/>
+                      <a:r>
+                        <a:rPr lang="en-US" dirty="0">
+                          <a:highlight>
+                            <a:srgbClr val="FF0000"/>
+                          </a:highlight>
+                        </a:rPr>
+                        <a:t>No</a:t>
+                      </a:r>
                     </a:p>
                   </a:txBody>
                   <a:tcPr anchor="ctr"/>
@@ -7179,7 +9973,7 @@
                   </a:ext>
                 </a:extLst>
               </a:tr>
-              <a:tr h="446043">
+              <a:tr h="374087">
                 <a:tc>
                   <a:txBody>
                     <a:bodyPr/>
@@ -7200,18 +9994,10 @@
                     <a:lstStyle/>
                     <a:p>
                       <a:pPr algn="ctr"/>
-                      <a:endParaRPr lang="en-US"/>
-                    </a:p>
-                  </a:txBody>
-                  <a:tcPr anchor="ctr"/>
-                </a:tc>
-                <a:tc>
-                  <a:txBody>
-                    <a:bodyPr/>
-                    <a:lstStyle/>
-                    <a:p>
-                      <a:pPr algn="ctr"/>
-                      <a:endParaRPr lang="en-US" dirty="0"/>
+                      <a:r>
+                        <a:rPr lang="en-US" dirty="0"/>
+                        <a:t>Yes</a:t>
+                      </a:r>
                     </a:p>
                   </a:txBody>
                   <a:tcPr anchor="ctr"/>
@@ -7224,6 +10010,24 @@
                       <a:pPr algn="ctr"/>
                       <a:r>
                         <a:rPr lang="en-US" dirty="0"/>
+                        <a:t>Yes</a:t>
+                      </a:r>
+                    </a:p>
+                  </a:txBody>
+                  <a:tcPr anchor="ctr"/>
+                </a:tc>
+                <a:tc>
+                  <a:txBody>
+                    <a:bodyPr/>
+                    <a:lstStyle/>
+                    <a:p>
+                      <a:pPr algn="ctr"/>
+                      <a:r>
+                        <a:rPr lang="en-US" dirty="0">
+                          <a:highlight>
+                            <a:srgbClr val="FF0000"/>
+                          </a:highlight>
+                        </a:rPr>
                         <a:t>No</a:t>
                       </a:r>
                     </a:p>
@@ -7250,7 +10054,7 @@
                   </a:ext>
                 </a:extLst>
               </a:tr>
-              <a:tr h="1252989">
+              <a:tr h="1050857">
                 <a:tc>
                   <a:txBody>
                     <a:bodyPr/>
@@ -7291,18 +10095,10 @@
                     <a:lstStyle/>
                     <a:p>
                       <a:pPr algn="ctr"/>
-                      <a:endParaRPr lang="en-US"/>
-                    </a:p>
-                  </a:txBody>
-                  <a:tcPr anchor="ctr"/>
-                </a:tc>
-                <a:tc>
-                  <a:txBody>
-                    <a:bodyPr/>
-                    <a:lstStyle/>
-                    <a:p>
-                      <a:pPr algn="ctr"/>
-                      <a:endParaRPr lang="en-US"/>
+                      <a:r>
+                        <a:rPr lang="en-US" dirty="0"/>
+                        <a:t>Yes</a:t>
+                      </a:r>
                     </a:p>
                   </a:txBody>
                   <a:tcPr anchor="ctr"/>
@@ -7315,7 +10111,21 @@
                       <a:pPr algn="ctr"/>
                       <a:r>
                         <a:rPr lang="en-US" dirty="0"/>
-                        <a:t>No</a:t>
+                        <a:t>Yes</a:t>
+                      </a:r>
+                    </a:p>
+                  </a:txBody>
+                  <a:tcPr anchor="ctr"/>
+                </a:tc>
+                <a:tc>
+                  <a:txBody>
+                    <a:bodyPr/>
+                    <a:lstStyle/>
+                    <a:p>
+                      <a:pPr algn="ctr"/>
+                      <a:r>
+                        <a:rPr lang="en-US" dirty="0"/>
+                        <a:t>Yes</a:t>
                       </a:r>
                     </a:p>
                   </a:txBody>
@@ -7341,7 +10151,7 @@
                   </a:ext>
                 </a:extLst>
               </a:tr>
-              <a:tr h="446043">
+              <a:tr h="374087">
                 <a:tc>
                   <a:txBody>
                     <a:bodyPr/>
@@ -7426,7 +10236,7 @@
 </p:sld>
 </file>
 
-<file path=ppt/slides/slide8.xml><?xml version="1.0" encoding="utf-8"?>
+<file path=ppt/slides/slide9.xml><?xml version="1.0" encoding="utf-8"?>
 <p:sld xmlns:a="http://schemas.openxmlformats.org/drawingml/2006/main" xmlns:r="http://schemas.openxmlformats.org/officeDocument/2006/relationships" xmlns:p="http://schemas.openxmlformats.org/presentationml/2006/main">
   <p:cSld>
     <p:spTree>
@@ -7464,7 +10274,15 @@
           <a:bodyPr/>
           <a:lstStyle/>
           <a:p>
-            <a:endParaRPr lang="en-US"/>
+            <a:r>
+              <a:rPr lang="en-US" dirty="0"/>
+              <a:t>State Tax &amp; Living Cost - </a:t>
+            </a:r>
+            <a:r>
+              <a:rPr lang="en-US" dirty="0" err="1"/>
+              <a:t>Bahar</a:t>
+            </a:r>
+            <a:endParaRPr lang="en-US" dirty="0"/>
           </a:p>
         </p:txBody>
       </p:sp>
@@ -7489,7 +10307,42 @@
           <a:bodyPr/>
           <a:lstStyle/>
           <a:p>
-            <a:endParaRPr lang="en-US"/>
+            <a:r>
+              <a:rPr lang="en-US" dirty="0"/>
+              <a:t>Which state is startup business friendly (low tax)? – </a:t>
+            </a:r>
+            <a:r>
+              <a:rPr lang="en-US" dirty="0">
+                <a:solidFill>
+                  <a:srgbClr val="FF0000"/>
+                </a:solidFill>
+              </a:rPr>
+              <a:t>Tax rate and living cost (housing).</a:t>
+            </a:r>
+          </a:p>
+          <a:p>
+            <a:r>
+              <a:rPr lang="en-US" dirty="0"/>
+              <a:t>Which state with low </a:t>
+            </a:r>
+            <a:r>
+              <a:rPr lang="en-US" dirty="0">
+                <a:solidFill>
+                  <a:srgbClr val="FF0000"/>
+                </a:solidFill>
+              </a:rPr>
+              <a:t>tax rate</a:t>
+            </a:r>
+            <a:r>
+              <a:rPr lang="en-US" dirty="0"/>
+              <a:t>, attracts employee?</a:t>
+            </a:r>
+          </a:p>
+          <a:p>
+            <a:r>
+              <a:rPr lang="en-US" i="1" dirty="0"/>
+              <a:t>Write description/ observation and supporting plots (minimum 2) here</a:t>
+            </a:r>
           </a:p>
         </p:txBody>
       </p:sp>

</xml_diff>

<commit_message>
Update Working_Presentation with Question breakdown and upload climate dataset
</commit_message>
<xml_diff>
--- a/Working_Presentation.pptx
+++ b/Working_Presentation.pptx
@@ -6,17 +6,19 @@
   </p:sldMasterIdLst>
   <p:sldIdLst>
     <p:sldId id="256" r:id="rId2"/>
-    <p:sldId id="257" r:id="rId3"/>
-    <p:sldId id="262" r:id="rId4"/>
-    <p:sldId id="264" r:id="rId5"/>
-    <p:sldId id="259" r:id="rId6"/>
-    <p:sldId id="261" r:id="rId7"/>
-    <p:sldId id="260" r:id="rId8"/>
-    <p:sldId id="258" r:id="rId9"/>
-    <p:sldId id="263" r:id="rId10"/>
-    <p:sldId id="265" r:id="rId11"/>
-    <p:sldId id="266" r:id="rId12"/>
-    <p:sldId id="267" r:id="rId13"/>
+    <p:sldId id="269" r:id="rId3"/>
+    <p:sldId id="257" r:id="rId4"/>
+    <p:sldId id="268" r:id="rId5"/>
+    <p:sldId id="262" r:id="rId6"/>
+    <p:sldId id="264" r:id="rId7"/>
+    <p:sldId id="259" r:id="rId8"/>
+    <p:sldId id="261" r:id="rId9"/>
+    <p:sldId id="260" r:id="rId10"/>
+    <p:sldId id="258" r:id="rId11"/>
+    <p:sldId id="263" r:id="rId12"/>
+    <p:sldId id="265" r:id="rId13"/>
+    <p:sldId id="266" r:id="rId14"/>
+    <p:sldId id="267" r:id="rId15"/>
   </p:sldIdLst>
   <p:sldSz cx="12192000" cy="6858000"/>
   <p:notesSz cx="6858000" cy="9144000"/>
@@ -455,7 +457,7 @@
             <a:fld id="{B61BEF0D-F0BB-DE4B-95CE-6DB70DBA9567}" type="datetimeFigureOut">
               <a:rPr lang="en-US" dirty="0"/>
               <a:pPr/>
-              <a:t>7/2/2019</a:t>
+              <a:t>7/3/2019</a:t>
             </a:fld>
             <a:endParaRPr lang="en-US" dirty="0"/>
           </a:p>
@@ -776,7 +778,7 @@
             <a:fld id="{B61BEF0D-F0BB-DE4B-95CE-6DB70DBA9567}" type="datetimeFigureOut">
               <a:rPr lang="en-US" dirty="0"/>
               <a:pPr/>
-              <a:t>7/2/2019</a:t>
+              <a:t>7/3/2019</a:t>
             </a:fld>
             <a:endParaRPr lang="en-US" dirty="0"/>
           </a:p>
@@ -1021,7 +1023,7 @@
             <a:fld id="{B61BEF0D-F0BB-DE4B-95CE-6DB70DBA9567}" type="datetimeFigureOut">
               <a:rPr lang="en-US" dirty="0"/>
               <a:pPr/>
-              <a:t>7/2/2019</a:t>
+              <a:t>7/3/2019</a:t>
             </a:fld>
             <a:endParaRPr lang="en-US" dirty="0"/>
           </a:p>
@@ -1357,7 +1359,7 @@
             <a:fld id="{B61BEF0D-F0BB-DE4B-95CE-6DB70DBA9567}" type="datetimeFigureOut">
               <a:rPr lang="en-US" dirty="0"/>
               <a:pPr/>
-              <a:t>7/2/2019</a:t>
+              <a:t>7/3/2019</a:t>
             </a:fld>
             <a:endParaRPr lang="en-US" dirty="0"/>
           </a:p>
@@ -1701,7 +1703,7 @@
             <a:fld id="{B61BEF0D-F0BB-DE4B-95CE-6DB70DBA9567}" type="datetimeFigureOut">
               <a:rPr lang="en-US" dirty="0"/>
               <a:pPr/>
-              <a:t>7/2/2019</a:t>
+              <a:t>7/3/2019</a:t>
             </a:fld>
             <a:endParaRPr lang="en-US" dirty="0"/>
           </a:p>
@@ -2072,7 +2074,7 @@
             <a:fld id="{B61BEF0D-F0BB-DE4B-95CE-6DB70DBA9567}" type="datetimeFigureOut">
               <a:rPr lang="en-US" dirty="0"/>
               <a:pPr/>
-              <a:t>7/2/2019</a:t>
+              <a:t>7/3/2019</a:t>
             </a:fld>
             <a:endParaRPr lang="en-US" dirty="0"/>
           </a:p>
@@ -2539,7 +2541,7 @@
             <a:fld id="{B61BEF0D-F0BB-DE4B-95CE-6DB70DBA9567}" type="datetimeFigureOut">
               <a:rPr lang="en-US" dirty="0"/>
               <a:pPr/>
-              <a:t>7/2/2019</a:t>
+              <a:t>7/3/2019</a:t>
             </a:fld>
             <a:endParaRPr lang="en-US" dirty="0"/>
           </a:p>
@@ -2741,7 +2743,7 @@
             <a:fld id="{B61BEF0D-F0BB-DE4B-95CE-6DB70DBA9567}" type="datetimeFigureOut">
               <a:rPr lang="en-US" dirty="0"/>
               <a:pPr/>
-              <a:t>7/2/2019</a:t>
+              <a:t>7/3/2019</a:t>
             </a:fld>
             <a:endParaRPr lang="en-US" dirty="0"/>
           </a:p>
@@ -2949,7 +2951,7 @@
             <a:fld id="{B61BEF0D-F0BB-DE4B-95CE-6DB70DBA9567}" type="datetimeFigureOut">
               <a:rPr lang="en-US" dirty="0"/>
               <a:pPr/>
-              <a:t>7/2/2019</a:t>
+              <a:t>7/3/2019</a:t>
             </a:fld>
             <a:endParaRPr lang="en-US" dirty="0"/>
           </a:p>
@@ -3177,7 +3179,7 @@
           <a:p>
             <a:fld id="{52647F38-B617-4D2F-AE0A-013F0C4D2C57}" type="datetimeFigureOut">
               <a:rPr lang="en-US" dirty="0"/>
-              <a:t>7/2/2019</a:t>
+              <a:t>7/3/2019</a:t>
             </a:fld>
             <a:endParaRPr lang="en-US" dirty="0"/>
           </a:p>
@@ -3421,7 +3423,7 @@
             <a:fld id="{B61BEF0D-F0BB-DE4B-95CE-6DB70DBA9567}" type="datetimeFigureOut">
               <a:rPr lang="en-US" dirty="0"/>
               <a:pPr/>
-              <a:t>7/2/2019</a:t>
+              <a:t>7/3/2019</a:t>
             </a:fld>
             <a:endParaRPr lang="en-US" dirty="0"/>
           </a:p>
@@ -3715,7 +3717,7 @@
           <a:p>
             <a:fld id="{05BFA754-D5C3-4E66-96A6-867B257F58DC}" type="datetimeFigureOut">
               <a:rPr lang="en-US" dirty="0"/>
-              <a:t>7/2/2019</a:t>
+              <a:t>7/3/2019</a:t>
             </a:fld>
             <a:endParaRPr lang="en-US" dirty="0"/>
           </a:p>
@@ -4105,7 +4107,7 @@
             <a:fld id="{B61BEF0D-F0BB-DE4B-95CE-6DB70DBA9567}" type="datetimeFigureOut">
               <a:rPr lang="en-US" dirty="0"/>
               <a:pPr/>
-              <a:t>7/2/2019</a:t>
+              <a:t>7/3/2019</a:t>
             </a:fld>
             <a:endParaRPr lang="en-US" dirty="0"/>
           </a:p>
@@ -4251,7 +4253,7 @@
             <a:fld id="{B61BEF0D-F0BB-DE4B-95CE-6DB70DBA9567}" type="datetimeFigureOut">
               <a:rPr lang="en-US" dirty="0"/>
               <a:pPr/>
-              <a:t>7/2/2019</a:t>
+              <a:t>7/3/2019</a:t>
             </a:fld>
             <a:endParaRPr lang="en-US" dirty="0"/>
           </a:p>
@@ -4374,7 +4376,7 @@
             <a:fld id="{B61BEF0D-F0BB-DE4B-95CE-6DB70DBA9567}" type="datetimeFigureOut">
               <a:rPr lang="en-US" dirty="0"/>
               <a:pPr/>
-              <a:t>7/2/2019</a:t>
+              <a:t>7/3/2019</a:t>
             </a:fld>
             <a:endParaRPr lang="en-US" dirty="0"/>
           </a:p>
@@ -4626,7 +4628,7 @@
             <a:fld id="{B61BEF0D-F0BB-DE4B-95CE-6DB70DBA9567}" type="datetimeFigureOut">
               <a:rPr lang="en-US" dirty="0"/>
               <a:pPr/>
-              <a:t>7/2/2019</a:t>
+              <a:t>7/3/2019</a:t>
             </a:fld>
             <a:endParaRPr lang="en-US" dirty="0"/>
           </a:p>
@@ -4938,7 +4940,7 @@
             <a:fld id="{B61BEF0D-F0BB-DE4B-95CE-6DB70DBA9567}" type="datetimeFigureOut">
               <a:rPr lang="en-US" dirty="0"/>
               <a:pPr/>
-              <a:t>7/2/2019</a:t>
+              <a:t>7/3/2019</a:t>
             </a:fld>
             <a:endParaRPr lang="en-US" dirty="0"/>
           </a:p>
@@ -5286,7 +5288,7 @@
             <a:fld id="{B61BEF0D-F0BB-DE4B-95CE-6DB70DBA9567}" type="datetimeFigureOut">
               <a:rPr lang="en-US" dirty="0"/>
               <a:pPr/>
-              <a:t>7/2/2019</a:t>
+              <a:t>7/3/2019</a:t>
             </a:fld>
             <a:endParaRPr lang="en-US" dirty="0"/>
           </a:p>
@@ -5847,8 +5849,8 @@
           <a:lstStyle/>
           <a:p>
             <a:r>
-              <a:rPr lang="en-US" dirty="0"/>
-              <a:t>The IQ’s 2018 Best State for Employee</a:t>
+              <a:rPr lang="en-US" sz="4000" dirty="0"/>
+              <a:t>The IQ’s 2018 Best State To Live In For Employee</a:t>
             </a:r>
           </a:p>
         </p:txBody>
@@ -5942,73 +5944,573 @@
           <a:p>
             <a:r>
               <a:rPr lang="en-US" dirty="0"/>
-              <a:t>Unemployment &amp; Crime Rate - Catherine</a:t>
-            </a:r>
-          </a:p>
-        </p:txBody>
-      </p:sp>
-      <p:sp>
-        <p:nvSpPr>
-          <p:cNvPr id="3" name="Content Placeholder 2">
+              <a:t>Availability</a:t>
+            </a:r>
+          </a:p>
+        </p:txBody>
+      </p:sp>
+      <p:graphicFrame>
+        <p:nvGraphicFramePr>
+          <p:cNvPr id="5" name="Content Placeholder 4">
             <a:extLst>
               <a:ext uri="{FF2B5EF4-FFF2-40B4-BE49-F238E27FC236}">
-                <a16:creationId xmlns:a16="http://schemas.microsoft.com/office/drawing/2014/main" id="{F5BE9D4D-949C-4037-9F87-16CDE0EE0466}"/>
+                <a16:creationId xmlns:a16="http://schemas.microsoft.com/office/drawing/2014/main" id="{52BFB9D7-64CC-446E-A2B1-7FEA2F22DFC3}"/>
               </a:ext>
             </a:extLst>
           </p:cNvPr>
-          <p:cNvSpPr>
-            <a:spLocks noGrp="1"/>
-          </p:cNvSpPr>
+          <p:cNvGraphicFramePr>
+            <a:graphicFrameLocks noGrp="1"/>
+          </p:cNvGraphicFramePr>
           <p:nvPr>
             <p:ph idx="1"/>
-          </p:nvPr>
-        </p:nvSpPr>
-        <p:spPr/>
-        <p:txBody>
-          <a:bodyPr/>
-          <a:lstStyle/>
-          <a:p>
-            <a:r>
-              <a:rPr lang="en-US" dirty="0"/>
-              <a:t>Lower </a:t>
-            </a:r>
-            <a:r>
-              <a:rPr lang="en-US" dirty="0">
-                <a:solidFill>
-                  <a:srgbClr val="FF0000"/>
-                </a:solidFill>
-              </a:rPr>
-              <a:t>unemployment</a:t>
-            </a:r>
-            <a:r>
-              <a:rPr lang="en-US" dirty="0"/>
-              <a:t> correlated to </a:t>
-            </a:r>
-            <a:r>
-              <a:rPr lang="en-US" dirty="0">
-                <a:solidFill>
-                  <a:srgbClr val="FF0000"/>
-                </a:solidFill>
-              </a:rPr>
-              <a:t>crime rate</a:t>
-            </a:r>
-            <a:r>
-              <a:rPr lang="en-US" dirty="0"/>
-              <a:t>?</a:t>
-            </a:r>
-          </a:p>
-          <a:p>
-            <a:r>
-              <a:rPr lang="en-US" i="1" dirty="0"/>
-              <a:t>Write description/ observation and supporting plots (minimum 2) here</a:t>
-            </a:r>
-          </a:p>
-        </p:txBody>
-      </p:sp>
+            <p:extLst>
+              <p:ext uri="{D42A27DB-BD31-4B8C-83A1-F6EECF244321}">
+                <p14:modId xmlns:p14="http://schemas.microsoft.com/office/powerpoint/2010/main" val="2806111777"/>
+              </p:ext>
+            </p:extLst>
+          </p:nvPr>
+        </p:nvGraphicFramePr>
+        <p:xfrm>
+          <a:off x="2734408" y="2583839"/>
+          <a:ext cx="6523892" cy="3016861"/>
+        </p:xfrm>
+        <a:graphic>
+          <a:graphicData uri="http://schemas.openxmlformats.org/drawingml/2006/table">
+            <a:tbl>
+              <a:tblPr firstRow="1" bandRow="1">
+                <a:tableStyleId>{5C22544A-7EE6-4342-B048-85BDC9FD1C3A}</a:tableStyleId>
+              </a:tblPr>
+              <a:tblGrid>
+                <a:gridCol w="1573980">
+                  <a:extLst>
+                    <a:ext uri="{9D8B030D-6E8A-4147-A177-3AD203B41FA5}">
+                      <a16:colId xmlns:a16="http://schemas.microsoft.com/office/drawing/2014/main" val="2013967057"/>
+                    </a:ext>
+                  </a:extLst>
+                </a:gridCol>
+                <a:gridCol w="1059703">
+                  <a:extLst>
+                    <a:ext uri="{9D8B030D-6E8A-4147-A177-3AD203B41FA5}">
+                      <a16:colId xmlns:a16="http://schemas.microsoft.com/office/drawing/2014/main" val="477625931"/>
+                    </a:ext>
+                  </a:extLst>
+                </a:gridCol>
+                <a:gridCol w="1546873">
+                  <a:extLst>
+                    <a:ext uri="{9D8B030D-6E8A-4147-A177-3AD203B41FA5}">
+                      <a16:colId xmlns:a16="http://schemas.microsoft.com/office/drawing/2014/main" val="913401616"/>
+                    </a:ext>
+                  </a:extLst>
+                </a:gridCol>
+                <a:gridCol w="1027738">
+                  <a:extLst>
+                    <a:ext uri="{9D8B030D-6E8A-4147-A177-3AD203B41FA5}">
+                      <a16:colId xmlns:a16="http://schemas.microsoft.com/office/drawing/2014/main" val="4263324847"/>
+                    </a:ext>
+                  </a:extLst>
+                </a:gridCol>
+                <a:gridCol w="1315598">
+                  <a:extLst>
+                    <a:ext uri="{9D8B030D-6E8A-4147-A177-3AD203B41FA5}">
+                      <a16:colId xmlns:a16="http://schemas.microsoft.com/office/drawing/2014/main" val="1813264309"/>
+                    </a:ext>
+                  </a:extLst>
+                </a:gridCol>
+              </a:tblGrid>
+              <a:tr h="469656">
+                <a:tc>
+                  <a:txBody>
+                    <a:bodyPr/>
+                    <a:lstStyle/>
+                    <a:p>
+                      <a:pPr algn="ctr"/>
+                      <a:r>
+                        <a:rPr lang="en-US" dirty="0"/>
+                        <a:t>Date/ Ppl</a:t>
+                      </a:r>
+                    </a:p>
+                  </a:txBody>
+                  <a:tcPr anchor="ctr"/>
+                </a:tc>
+                <a:tc>
+                  <a:txBody>
+                    <a:bodyPr/>
+                    <a:lstStyle/>
+                    <a:p>
+                      <a:pPr algn="ctr"/>
+                      <a:r>
+                        <a:rPr lang="en-US" dirty="0" err="1"/>
+                        <a:t>Bahar</a:t>
+                      </a:r>
+                      <a:endParaRPr lang="en-US" dirty="0"/>
+                    </a:p>
+                  </a:txBody>
+                  <a:tcPr anchor="ctr"/>
+                </a:tc>
+                <a:tc>
+                  <a:txBody>
+                    <a:bodyPr/>
+                    <a:lstStyle/>
+                    <a:p>
+                      <a:pPr algn="ctr"/>
+                      <a:r>
+                        <a:rPr lang="en-US" dirty="0"/>
+                        <a:t>Catherine</a:t>
+                      </a:r>
+                    </a:p>
+                  </a:txBody>
+                  <a:tcPr anchor="ctr"/>
+                </a:tc>
+                <a:tc>
+                  <a:txBody>
+                    <a:bodyPr/>
+                    <a:lstStyle/>
+                    <a:p>
+                      <a:pPr algn="ctr"/>
+                      <a:r>
+                        <a:rPr lang="en-US" dirty="0"/>
+                        <a:t>Molly</a:t>
+                      </a:r>
+                    </a:p>
+                  </a:txBody>
+                  <a:tcPr anchor="ctr"/>
+                </a:tc>
+                <a:tc>
+                  <a:txBody>
+                    <a:bodyPr/>
+                    <a:lstStyle/>
+                    <a:p>
+                      <a:pPr algn="ctr"/>
+                      <a:r>
+                        <a:rPr lang="en-US" dirty="0"/>
+                        <a:t>Prakash</a:t>
+                      </a:r>
+                    </a:p>
+                  </a:txBody>
+                  <a:tcPr anchor="ctr"/>
+                </a:tc>
+                <a:extLst>
+                  <a:ext uri="{0D108BD9-81ED-4DB2-BD59-A6C34878D82A}">
+                    <a16:rowId xmlns:a16="http://schemas.microsoft.com/office/drawing/2014/main" val="2459327410"/>
+                  </a:ext>
+                </a:extLst>
+              </a:tr>
+              <a:tr h="374087">
+                <a:tc>
+                  <a:txBody>
+                    <a:bodyPr/>
+                    <a:lstStyle/>
+                    <a:p>
+                      <a:pPr algn="ctr"/>
+                      <a:r>
+                        <a:rPr lang="en-US" dirty="0"/>
+                        <a:t>7/1</a:t>
+                      </a:r>
+                    </a:p>
+                  </a:txBody>
+                  <a:tcPr anchor="ctr"/>
+                </a:tc>
+                <a:tc>
+                  <a:txBody>
+                    <a:bodyPr/>
+                    <a:lstStyle/>
+                    <a:p>
+                      <a:pPr algn="ctr"/>
+                      <a:r>
+                        <a:rPr lang="en-US" dirty="0"/>
+                        <a:t>Yes</a:t>
+                      </a:r>
+                    </a:p>
+                  </a:txBody>
+                  <a:tcPr anchor="ctr"/>
+                </a:tc>
+                <a:tc>
+                  <a:txBody>
+                    <a:bodyPr/>
+                    <a:lstStyle/>
+                    <a:p>
+                      <a:pPr algn="ctr"/>
+                      <a:r>
+                        <a:rPr lang="en-US" dirty="0"/>
+                        <a:t>Yes</a:t>
+                      </a:r>
+                    </a:p>
+                  </a:txBody>
+                  <a:tcPr anchor="ctr"/>
+                </a:tc>
+                <a:tc>
+                  <a:txBody>
+                    <a:bodyPr/>
+                    <a:lstStyle/>
+                    <a:p>
+                      <a:pPr algn="ctr"/>
+                      <a:r>
+                        <a:rPr lang="en-US" dirty="0"/>
+                        <a:t>Yes</a:t>
+                      </a:r>
+                    </a:p>
+                  </a:txBody>
+                  <a:tcPr anchor="ctr"/>
+                </a:tc>
+                <a:tc>
+                  <a:txBody>
+                    <a:bodyPr/>
+                    <a:lstStyle/>
+                    <a:p>
+                      <a:pPr algn="ctr"/>
+                      <a:r>
+                        <a:rPr lang="en-US" dirty="0"/>
+                        <a:t>Yes</a:t>
+                      </a:r>
+                    </a:p>
+                  </a:txBody>
+                  <a:tcPr anchor="ctr"/>
+                </a:tc>
+                <a:extLst>
+                  <a:ext uri="{0D108BD9-81ED-4DB2-BD59-A6C34878D82A}">
+                    <a16:rowId xmlns:a16="http://schemas.microsoft.com/office/drawing/2014/main" val="3970321666"/>
+                  </a:ext>
+                </a:extLst>
+              </a:tr>
+              <a:tr h="374087">
+                <a:tc>
+                  <a:txBody>
+                    <a:bodyPr/>
+                    <a:lstStyle/>
+                    <a:p>
+                      <a:pPr algn="ctr"/>
+                      <a:r>
+                        <a:rPr lang="en-US" dirty="0"/>
+                        <a:t>7/6</a:t>
+                      </a:r>
+                    </a:p>
+                  </a:txBody>
+                  <a:tcPr anchor="ctr"/>
+                </a:tc>
+                <a:tc>
+                  <a:txBody>
+                    <a:bodyPr/>
+                    <a:lstStyle/>
+                    <a:p>
+                      <a:pPr algn="ctr"/>
+                      <a:r>
+                        <a:rPr lang="en-US" dirty="0">
+                          <a:highlight>
+                            <a:srgbClr val="FF0000"/>
+                          </a:highlight>
+                        </a:rPr>
+                        <a:t>No</a:t>
+                      </a:r>
+                    </a:p>
+                  </a:txBody>
+                  <a:tcPr anchor="ctr"/>
+                </a:tc>
+                <a:tc>
+                  <a:txBody>
+                    <a:bodyPr/>
+                    <a:lstStyle/>
+                    <a:p>
+                      <a:pPr algn="ctr"/>
+                      <a:r>
+                        <a:rPr lang="en-US" dirty="0"/>
+                        <a:t>Yes</a:t>
+                      </a:r>
+                    </a:p>
+                  </a:txBody>
+                  <a:tcPr anchor="ctr"/>
+                </a:tc>
+                <a:tc>
+                  <a:txBody>
+                    <a:bodyPr/>
+                    <a:lstStyle/>
+                    <a:p>
+                      <a:pPr algn="ctr"/>
+                      <a:r>
+                        <a:rPr lang="en-US" dirty="0">
+                          <a:highlight>
+                            <a:srgbClr val="FF0000"/>
+                          </a:highlight>
+                        </a:rPr>
+                        <a:t>No</a:t>
+                      </a:r>
+                    </a:p>
+                  </a:txBody>
+                  <a:tcPr anchor="ctr"/>
+                </a:tc>
+                <a:tc>
+                  <a:txBody>
+                    <a:bodyPr/>
+                    <a:lstStyle/>
+                    <a:p>
+                      <a:pPr algn="ctr"/>
+                      <a:r>
+                        <a:rPr lang="en-US" dirty="0"/>
+                        <a:t>Yes</a:t>
+                      </a:r>
+                    </a:p>
+                  </a:txBody>
+                  <a:tcPr anchor="ctr"/>
+                </a:tc>
+                <a:extLst>
+                  <a:ext uri="{0D108BD9-81ED-4DB2-BD59-A6C34878D82A}">
+                    <a16:rowId xmlns:a16="http://schemas.microsoft.com/office/drawing/2014/main" val="2348106690"/>
+                  </a:ext>
+                </a:extLst>
+              </a:tr>
+              <a:tr h="374087">
+                <a:tc>
+                  <a:txBody>
+                    <a:bodyPr/>
+                    <a:lstStyle/>
+                    <a:p>
+                      <a:pPr algn="ctr"/>
+                      <a:r>
+                        <a:rPr lang="en-US" dirty="0"/>
+                        <a:t>7/8</a:t>
+                      </a:r>
+                    </a:p>
+                  </a:txBody>
+                  <a:tcPr anchor="ctr"/>
+                </a:tc>
+                <a:tc>
+                  <a:txBody>
+                    <a:bodyPr/>
+                    <a:lstStyle/>
+                    <a:p>
+                      <a:pPr algn="ctr"/>
+                      <a:r>
+                        <a:rPr lang="en-US" dirty="0"/>
+                        <a:t>Yes</a:t>
+                      </a:r>
+                    </a:p>
+                  </a:txBody>
+                  <a:tcPr anchor="ctr"/>
+                </a:tc>
+                <a:tc>
+                  <a:txBody>
+                    <a:bodyPr/>
+                    <a:lstStyle/>
+                    <a:p>
+                      <a:pPr algn="ctr"/>
+                      <a:r>
+                        <a:rPr lang="en-US" dirty="0"/>
+                        <a:t>Yes</a:t>
+                      </a:r>
+                    </a:p>
+                  </a:txBody>
+                  <a:tcPr anchor="ctr"/>
+                </a:tc>
+                <a:tc>
+                  <a:txBody>
+                    <a:bodyPr/>
+                    <a:lstStyle/>
+                    <a:p>
+                      <a:pPr algn="ctr"/>
+                      <a:r>
+                        <a:rPr lang="en-US" dirty="0">
+                          <a:highlight>
+                            <a:srgbClr val="FF0000"/>
+                          </a:highlight>
+                        </a:rPr>
+                        <a:t>No</a:t>
+                      </a:r>
+                    </a:p>
+                  </a:txBody>
+                  <a:tcPr anchor="ctr"/>
+                </a:tc>
+                <a:tc>
+                  <a:txBody>
+                    <a:bodyPr/>
+                    <a:lstStyle/>
+                    <a:p>
+                      <a:pPr algn="ctr"/>
+                      <a:r>
+                        <a:rPr lang="en-US" dirty="0"/>
+                        <a:t>Yes</a:t>
+                      </a:r>
+                    </a:p>
+                  </a:txBody>
+                  <a:tcPr anchor="ctr"/>
+                </a:tc>
+                <a:extLst>
+                  <a:ext uri="{0D108BD9-81ED-4DB2-BD59-A6C34878D82A}">
+                    <a16:rowId xmlns:a16="http://schemas.microsoft.com/office/drawing/2014/main" val="4946152"/>
+                  </a:ext>
+                </a:extLst>
+              </a:tr>
+              <a:tr h="1050857">
+                <a:tc>
+                  <a:txBody>
+                    <a:bodyPr/>
+                    <a:lstStyle/>
+                    <a:p>
+                      <a:pPr marL="0" marR="0" lvl="0" indent="0" algn="ctr" defTabSz="457200" rtl="0" eaLnBrk="1" fontAlgn="auto" latinLnBrk="0" hangingPunct="1">
+                        <a:lnSpc>
+                          <a:spcPct val="100000"/>
+                        </a:lnSpc>
+                        <a:spcBef>
+                          <a:spcPts val="0"/>
+                        </a:spcBef>
+                        <a:spcAft>
+                          <a:spcPts val="0"/>
+                        </a:spcAft>
+                        <a:buClrTx/>
+                        <a:buSzTx/>
+                        <a:buFontTx/>
+                        <a:buNone/>
+                        <a:tabLst/>
+                        <a:defRPr/>
+                      </a:pPr>
+                      <a:r>
+                        <a:rPr lang="en-US" dirty="0"/>
+                        <a:t>7/10 (slides preparation)</a:t>
+                      </a:r>
+                    </a:p>
+                    <a:p>
+                      <a:pPr algn="ctr"/>
+                      <a:endParaRPr lang="en-US" dirty="0"/>
+                    </a:p>
+                  </a:txBody>
+                  <a:tcPr anchor="ctr"/>
+                </a:tc>
+                <a:tc>
+                  <a:txBody>
+                    <a:bodyPr/>
+                    <a:lstStyle/>
+                    <a:p>
+                      <a:pPr algn="ctr"/>
+                      <a:r>
+                        <a:rPr lang="en-US" dirty="0"/>
+                        <a:t>Yes</a:t>
+                      </a:r>
+                    </a:p>
+                  </a:txBody>
+                  <a:tcPr anchor="ctr"/>
+                </a:tc>
+                <a:tc>
+                  <a:txBody>
+                    <a:bodyPr/>
+                    <a:lstStyle/>
+                    <a:p>
+                      <a:pPr algn="ctr"/>
+                      <a:r>
+                        <a:rPr lang="en-US" dirty="0"/>
+                        <a:t>Yes</a:t>
+                      </a:r>
+                    </a:p>
+                  </a:txBody>
+                  <a:tcPr anchor="ctr"/>
+                </a:tc>
+                <a:tc>
+                  <a:txBody>
+                    <a:bodyPr/>
+                    <a:lstStyle/>
+                    <a:p>
+                      <a:pPr algn="ctr"/>
+                      <a:r>
+                        <a:rPr lang="en-US" dirty="0"/>
+                        <a:t>Yes</a:t>
+                      </a:r>
+                    </a:p>
+                  </a:txBody>
+                  <a:tcPr anchor="ctr"/>
+                </a:tc>
+                <a:tc>
+                  <a:txBody>
+                    <a:bodyPr/>
+                    <a:lstStyle/>
+                    <a:p>
+                      <a:pPr algn="ctr"/>
+                      <a:r>
+                        <a:rPr lang="en-US" dirty="0"/>
+                        <a:t>Yes</a:t>
+                      </a:r>
+                    </a:p>
+                  </a:txBody>
+                  <a:tcPr anchor="ctr"/>
+                </a:tc>
+                <a:extLst>
+                  <a:ext uri="{0D108BD9-81ED-4DB2-BD59-A6C34878D82A}">
+                    <a16:rowId xmlns:a16="http://schemas.microsoft.com/office/drawing/2014/main" val="1302585507"/>
+                  </a:ext>
+                </a:extLst>
+              </a:tr>
+              <a:tr h="374087">
+                <a:tc>
+                  <a:txBody>
+                    <a:bodyPr/>
+                    <a:lstStyle/>
+                    <a:p>
+                      <a:pPr algn="ctr"/>
+                      <a:r>
+                        <a:rPr lang="en-US" dirty="0"/>
+                        <a:t>7/13</a:t>
+                      </a:r>
+                    </a:p>
+                  </a:txBody>
+                  <a:tcPr anchor="ctr"/>
+                </a:tc>
+                <a:tc gridSpan="4">
+                  <a:txBody>
+                    <a:bodyPr/>
+                    <a:lstStyle/>
+                    <a:p>
+                      <a:pPr algn="ctr"/>
+                      <a:r>
+                        <a:rPr lang="en-US" dirty="0"/>
+                        <a:t>Project 1 Presentation &amp; Submission</a:t>
+                      </a:r>
+                    </a:p>
+                  </a:txBody>
+                  <a:tcPr anchor="ctr"/>
+                </a:tc>
+                <a:tc hMerge="1">
+                  <a:txBody>
+                    <a:bodyPr/>
+                    <a:lstStyle/>
+                    <a:p>
+                      <a:pPr algn="ctr"/>
+                      <a:endParaRPr lang="en-US" dirty="0"/>
+                    </a:p>
+                  </a:txBody>
+                  <a:tcPr anchor="ctr"/>
+                </a:tc>
+                <a:tc hMerge="1">
+                  <a:txBody>
+                    <a:bodyPr/>
+                    <a:lstStyle/>
+                    <a:p>
+                      <a:pPr algn="ctr"/>
+                      <a:endParaRPr lang="en-US" dirty="0"/>
+                    </a:p>
+                  </a:txBody>
+                  <a:tcPr anchor="ctr"/>
+                </a:tc>
+                <a:tc hMerge="1">
+                  <a:txBody>
+                    <a:bodyPr/>
+                    <a:lstStyle/>
+                    <a:p>
+                      <a:pPr algn="ctr"/>
+                      <a:endParaRPr lang="en-US" dirty="0"/>
+                    </a:p>
+                  </a:txBody>
+                  <a:tcPr anchor="ctr"/>
+                </a:tc>
+                <a:extLst>
+                  <a:ext uri="{0D108BD9-81ED-4DB2-BD59-A6C34878D82A}">
+                    <a16:rowId xmlns:a16="http://schemas.microsoft.com/office/drawing/2014/main" val="3375028414"/>
+                  </a:ext>
+                </a:extLst>
+              </a:tr>
+            </a:tbl>
+          </a:graphicData>
+        </a:graphic>
+      </p:graphicFrame>
     </p:spTree>
     <p:extLst>
       <p:ext uri="{BB962C8B-B14F-4D97-AF65-F5344CB8AC3E}">
-        <p14:creationId xmlns:p14="http://schemas.microsoft.com/office/powerpoint/2010/main" val="4121259519"/>
+        <p14:creationId xmlns:p14="http://schemas.microsoft.com/office/powerpoint/2010/main" val="2173070810"/>
       </p:ext>
     </p:extLst>
   </p:cSld>
@@ -6058,6 +6560,245 @@
           <a:p>
             <a:r>
               <a:rPr lang="en-US" dirty="0"/>
+              <a:t>State Tax &amp; Living Cost - </a:t>
+            </a:r>
+            <a:r>
+              <a:rPr lang="en-US" dirty="0" err="1"/>
+              <a:t>Bahar</a:t>
+            </a:r>
+            <a:endParaRPr lang="en-US" dirty="0"/>
+          </a:p>
+        </p:txBody>
+      </p:sp>
+      <p:sp>
+        <p:nvSpPr>
+          <p:cNvPr id="3" name="Content Placeholder 2">
+            <a:extLst>
+              <a:ext uri="{FF2B5EF4-FFF2-40B4-BE49-F238E27FC236}">
+                <a16:creationId xmlns:a16="http://schemas.microsoft.com/office/drawing/2014/main" id="{F5BE9D4D-949C-4037-9F87-16CDE0EE0466}"/>
+              </a:ext>
+            </a:extLst>
+          </p:cNvPr>
+          <p:cNvSpPr>
+            <a:spLocks noGrp="1"/>
+          </p:cNvSpPr>
+          <p:nvPr>
+            <p:ph idx="1"/>
+          </p:nvPr>
+        </p:nvSpPr>
+        <p:spPr/>
+        <p:txBody>
+          <a:bodyPr/>
+          <a:lstStyle/>
+          <a:p>
+            <a:r>
+              <a:rPr lang="en-US" dirty="0"/>
+              <a:t>Which state is startup business friendly (low tax)? – </a:t>
+            </a:r>
+            <a:r>
+              <a:rPr lang="en-US" dirty="0">
+                <a:solidFill>
+                  <a:srgbClr val="FF0000"/>
+                </a:solidFill>
+              </a:rPr>
+              <a:t>Tax rate and living cost (housing).</a:t>
+            </a:r>
+          </a:p>
+          <a:p>
+            <a:r>
+              <a:rPr lang="en-US" dirty="0"/>
+              <a:t>Which state with low </a:t>
+            </a:r>
+            <a:r>
+              <a:rPr lang="en-US" dirty="0">
+                <a:solidFill>
+                  <a:srgbClr val="FF0000"/>
+                </a:solidFill>
+              </a:rPr>
+              <a:t>tax rate</a:t>
+            </a:r>
+            <a:r>
+              <a:rPr lang="en-US" dirty="0"/>
+              <a:t>, attracts employee?</a:t>
+            </a:r>
+          </a:p>
+          <a:p>
+            <a:r>
+              <a:rPr lang="en-US" i="1" dirty="0"/>
+              <a:t>Write description/ observation and supporting plots (minimum 2) here</a:t>
+            </a:r>
+          </a:p>
+        </p:txBody>
+      </p:sp>
+    </p:spTree>
+    <p:extLst>
+      <p:ext uri="{BB962C8B-B14F-4D97-AF65-F5344CB8AC3E}">
+        <p14:creationId xmlns:p14="http://schemas.microsoft.com/office/powerpoint/2010/main" val="1207226246"/>
+      </p:ext>
+    </p:extLst>
+  </p:cSld>
+  <p:clrMapOvr>
+    <a:masterClrMapping/>
+  </p:clrMapOvr>
+</p:sld>
+</file>
+
+<file path=ppt/slides/slide12.xml><?xml version="1.0" encoding="utf-8"?>
+<p:sld xmlns:a="http://schemas.openxmlformats.org/drawingml/2006/main" xmlns:r="http://schemas.openxmlformats.org/officeDocument/2006/relationships" xmlns:p="http://schemas.openxmlformats.org/presentationml/2006/main">
+  <p:cSld>
+    <p:spTree>
+      <p:nvGrpSpPr>
+        <p:cNvPr id="1" name=""/>
+        <p:cNvGrpSpPr/>
+        <p:nvPr/>
+      </p:nvGrpSpPr>
+      <p:grpSpPr>
+        <a:xfrm>
+          <a:off x="0" y="0"/>
+          <a:ext cx="0" cy="0"/>
+          <a:chOff x="0" y="0"/>
+          <a:chExt cx="0" cy="0"/>
+        </a:xfrm>
+      </p:grpSpPr>
+      <p:sp>
+        <p:nvSpPr>
+          <p:cNvPr id="2" name="Title 1">
+            <a:extLst>
+              <a:ext uri="{FF2B5EF4-FFF2-40B4-BE49-F238E27FC236}">
+                <a16:creationId xmlns:a16="http://schemas.microsoft.com/office/drawing/2014/main" id="{1917A588-6B43-4326-8CEE-B31FA8CC4FDB}"/>
+              </a:ext>
+            </a:extLst>
+          </p:cNvPr>
+          <p:cNvSpPr>
+            <a:spLocks noGrp="1"/>
+          </p:cNvSpPr>
+          <p:nvPr>
+            <p:ph type="title"/>
+          </p:nvPr>
+        </p:nvSpPr>
+        <p:spPr/>
+        <p:txBody>
+          <a:bodyPr/>
+          <a:lstStyle/>
+          <a:p>
+            <a:r>
+              <a:rPr lang="en-US" dirty="0"/>
+              <a:t>Unemployment &amp; Crime Rate - Catherine</a:t>
+            </a:r>
+          </a:p>
+        </p:txBody>
+      </p:sp>
+      <p:sp>
+        <p:nvSpPr>
+          <p:cNvPr id="3" name="Content Placeholder 2">
+            <a:extLst>
+              <a:ext uri="{FF2B5EF4-FFF2-40B4-BE49-F238E27FC236}">
+                <a16:creationId xmlns:a16="http://schemas.microsoft.com/office/drawing/2014/main" id="{F5BE9D4D-949C-4037-9F87-16CDE0EE0466}"/>
+              </a:ext>
+            </a:extLst>
+          </p:cNvPr>
+          <p:cNvSpPr>
+            <a:spLocks noGrp="1"/>
+          </p:cNvSpPr>
+          <p:nvPr>
+            <p:ph idx="1"/>
+          </p:nvPr>
+        </p:nvSpPr>
+        <p:spPr/>
+        <p:txBody>
+          <a:bodyPr/>
+          <a:lstStyle/>
+          <a:p>
+            <a:r>
+              <a:rPr lang="en-US" dirty="0"/>
+              <a:t>Lower </a:t>
+            </a:r>
+            <a:r>
+              <a:rPr lang="en-US" dirty="0">
+                <a:solidFill>
+                  <a:srgbClr val="FF0000"/>
+                </a:solidFill>
+              </a:rPr>
+              <a:t>unemployment</a:t>
+            </a:r>
+            <a:r>
+              <a:rPr lang="en-US" dirty="0"/>
+              <a:t> correlated to </a:t>
+            </a:r>
+            <a:r>
+              <a:rPr lang="en-US" dirty="0">
+                <a:solidFill>
+                  <a:srgbClr val="FF0000"/>
+                </a:solidFill>
+              </a:rPr>
+              <a:t>crime rate</a:t>
+            </a:r>
+            <a:r>
+              <a:rPr lang="en-US" dirty="0"/>
+              <a:t>?</a:t>
+            </a:r>
+          </a:p>
+          <a:p>
+            <a:r>
+              <a:rPr lang="en-US" i="1" dirty="0"/>
+              <a:t>Write description/ observation and supporting plots (minimum 2) here</a:t>
+            </a:r>
+          </a:p>
+        </p:txBody>
+      </p:sp>
+    </p:spTree>
+    <p:extLst>
+      <p:ext uri="{BB962C8B-B14F-4D97-AF65-F5344CB8AC3E}">
+        <p14:creationId xmlns:p14="http://schemas.microsoft.com/office/powerpoint/2010/main" val="4121259519"/>
+      </p:ext>
+    </p:extLst>
+  </p:cSld>
+  <p:clrMapOvr>
+    <a:masterClrMapping/>
+  </p:clrMapOvr>
+</p:sld>
+</file>
+
+<file path=ppt/slides/slide13.xml><?xml version="1.0" encoding="utf-8"?>
+<p:sld xmlns:a="http://schemas.openxmlformats.org/drawingml/2006/main" xmlns:r="http://schemas.openxmlformats.org/officeDocument/2006/relationships" xmlns:p="http://schemas.openxmlformats.org/presentationml/2006/main">
+  <p:cSld>
+    <p:spTree>
+      <p:nvGrpSpPr>
+        <p:cNvPr id="1" name=""/>
+        <p:cNvGrpSpPr/>
+        <p:nvPr/>
+      </p:nvGrpSpPr>
+      <p:grpSpPr>
+        <a:xfrm>
+          <a:off x="0" y="0"/>
+          <a:ext cx="0" cy="0"/>
+          <a:chOff x="0" y="0"/>
+          <a:chExt cx="0" cy="0"/>
+        </a:xfrm>
+      </p:grpSpPr>
+      <p:sp>
+        <p:nvSpPr>
+          <p:cNvPr id="2" name="Title 1">
+            <a:extLst>
+              <a:ext uri="{FF2B5EF4-FFF2-40B4-BE49-F238E27FC236}">
+                <a16:creationId xmlns:a16="http://schemas.microsoft.com/office/drawing/2014/main" id="{1917A588-6B43-4326-8CEE-B31FA8CC4FDB}"/>
+              </a:ext>
+            </a:extLst>
+          </p:cNvPr>
+          <p:cNvSpPr>
+            <a:spLocks noGrp="1"/>
+          </p:cNvSpPr>
+          <p:nvPr>
+            <p:ph type="title"/>
+          </p:nvPr>
+        </p:nvSpPr>
+        <p:spPr/>
+        <p:txBody>
+          <a:bodyPr/>
+          <a:lstStyle/>
+          <a:p>
+            <a:r>
+              <a:rPr lang="en-US" dirty="0"/>
               <a:t>Salary - Molly</a:t>
             </a:r>
           </a:p>
@@ -6122,7 +6863,7 @@
 </p:sld>
 </file>
 
-<file path=ppt/slides/slide12.xml><?xml version="1.0" encoding="utf-8"?>
+<file path=ppt/slides/slide14.xml><?xml version="1.0" encoding="utf-8"?>
 <p:sld xmlns:a="http://schemas.openxmlformats.org/drawingml/2006/main" xmlns:r="http://schemas.openxmlformats.org/officeDocument/2006/relationships" xmlns:p="http://schemas.openxmlformats.org/presentationml/2006/main">
   <p:cSld>
     <p:spTree>
@@ -6266,7 +7007,7 @@
           <a:p>
             <a:r>
               <a:rPr lang="en-US" dirty="0"/>
-              <a:t>Project Description</a:t>
+              <a:t>Question Breakdown</a:t>
             </a:r>
           </a:p>
         </p:txBody>
@@ -6290,70 +7031,54 @@
         <p:spPr/>
         <p:txBody>
           <a:bodyPr>
-            <a:normAutofit fontScale="92500" lnSpcReduction="10000"/>
+            <a:normAutofit fontScale="92500" lnSpcReduction="20000"/>
           </a:bodyPr>
           <a:lstStyle/>
           <a:p>
             <a:r>
               <a:rPr lang="en-US" dirty="0"/>
-              <a:t>Our opinion on Best State to live in 2018 for </a:t>
-            </a:r>
-            <a:r>
-              <a:rPr lang="en-US" dirty="0">
-                <a:solidFill>
-                  <a:srgbClr val="FF0000"/>
-                </a:solidFill>
-              </a:rPr>
-              <a:t>“employee” </a:t>
-            </a:r>
-            <a:r>
-              <a:rPr lang="en-US" dirty="0">
-                <a:solidFill>
-                  <a:schemeClr val="tx1"/>
-                </a:solidFill>
-              </a:rPr>
-              <a:t>from 5 criteria below, </a:t>
+              <a:t>Best State </a:t>
             </a:r>
           </a:p>
           <a:p>
             <a:pPr lvl="1"/>
             <a:r>
               <a:rPr lang="en-US" dirty="0"/>
-              <a:t>State Tax</a:t>
+              <a:t>Out of 50 states, pick the “best choice” from top 20 in categories of salary, crime rate, unemployment rate, climate and tax rate. Not necessarily the best on all of them.</a:t>
+            </a:r>
+          </a:p>
+          <a:p>
+            <a:r>
+              <a:rPr lang="en-US" dirty="0"/>
+              <a:t>To Live In For Employee </a:t>
             </a:r>
           </a:p>
           <a:p>
             <a:pPr lvl="1"/>
             <a:r>
               <a:rPr lang="en-US" dirty="0"/>
-              <a:t>Climate</a:t>
+              <a:t>Focus is working community and not “retiree” or “retiring soon” community.</a:t>
             </a:r>
           </a:p>
           <a:p>
             <a:pPr lvl="1"/>
             <a:r>
               <a:rPr lang="en-US" dirty="0"/>
-              <a:t>Unemployment rate</a:t>
+              <a:t>Affordable housing and tax rate, salary spent on housing + tax &lt; 65%. Having ability to save money </a:t>
             </a:r>
           </a:p>
           <a:p>
             <a:pPr lvl="1"/>
             <a:r>
               <a:rPr lang="en-US" dirty="0"/>
-              <a:t>Crime rate</a:t>
+              <a:t>low crime rate and unemployment i.e. &lt; 4% for each</a:t>
             </a:r>
           </a:p>
           <a:p>
             <a:pPr lvl="1"/>
             <a:r>
               <a:rPr lang="en-US" dirty="0"/>
-              <a:t>Salary </a:t>
-            </a:r>
-          </a:p>
-          <a:p>
-            <a:r>
-              <a:rPr lang="en-US" dirty="0"/>
-              <a:t>Through observations, plots and correlations, we’re to determine the best state for employee to work in.</a:t>
+              <a:t>acceptable climate i.e. not too hot or cold, less humid. Moderate humidity and temperatures (60 – 80 F)  </a:t>
             </a:r>
           </a:p>
         </p:txBody>
@@ -6361,7 +7086,7 @@
     </p:spTree>
     <p:extLst>
       <p:ext uri="{BB962C8B-B14F-4D97-AF65-F5344CB8AC3E}">
-        <p14:creationId xmlns:p14="http://schemas.microsoft.com/office/powerpoint/2010/main" val="556332744"/>
+        <p14:creationId xmlns:p14="http://schemas.microsoft.com/office/powerpoint/2010/main" val="1234996424"/>
       </p:ext>
     </p:extLst>
   </p:cSld>
@@ -6393,6 +7118,296 @@
           <p:cNvPr id="2" name="Title 1">
             <a:extLst>
               <a:ext uri="{FF2B5EF4-FFF2-40B4-BE49-F238E27FC236}">
+                <a16:creationId xmlns:a16="http://schemas.microsoft.com/office/drawing/2014/main" id="{377C9523-097C-4E43-AC8E-8C68B3057BB1}"/>
+              </a:ext>
+            </a:extLst>
+          </p:cNvPr>
+          <p:cNvSpPr>
+            <a:spLocks noGrp="1"/>
+          </p:cNvSpPr>
+          <p:nvPr>
+            <p:ph type="title"/>
+          </p:nvPr>
+        </p:nvSpPr>
+        <p:spPr/>
+        <p:txBody>
+          <a:bodyPr/>
+          <a:lstStyle/>
+          <a:p>
+            <a:r>
+              <a:rPr lang="en-US" dirty="0"/>
+              <a:t>Project Description</a:t>
+            </a:r>
+          </a:p>
+        </p:txBody>
+      </p:sp>
+      <p:sp>
+        <p:nvSpPr>
+          <p:cNvPr id="3" name="Content Placeholder 2">
+            <a:extLst>
+              <a:ext uri="{FF2B5EF4-FFF2-40B4-BE49-F238E27FC236}">
+                <a16:creationId xmlns:a16="http://schemas.microsoft.com/office/drawing/2014/main" id="{42C92943-A346-4DB7-A073-7ED62D2A2B66}"/>
+              </a:ext>
+            </a:extLst>
+          </p:cNvPr>
+          <p:cNvSpPr>
+            <a:spLocks noGrp="1"/>
+          </p:cNvSpPr>
+          <p:nvPr>
+            <p:ph idx="1"/>
+          </p:nvPr>
+        </p:nvSpPr>
+        <p:spPr/>
+        <p:txBody>
+          <a:bodyPr>
+            <a:normAutofit fontScale="92500" lnSpcReduction="10000"/>
+          </a:bodyPr>
+          <a:lstStyle/>
+          <a:p>
+            <a:r>
+              <a:rPr lang="en-US" dirty="0"/>
+              <a:t>Our opinion on Best State to live in 2018 for </a:t>
+            </a:r>
+            <a:r>
+              <a:rPr lang="en-US" dirty="0">
+                <a:solidFill>
+                  <a:srgbClr val="FF0000"/>
+                </a:solidFill>
+              </a:rPr>
+              <a:t>“employee” </a:t>
+            </a:r>
+            <a:r>
+              <a:rPr lang="en-US" dirty="0">
+                <a:solidFill>
+                  <a:schemeClr val="tx1"/>
+                </a:solidFill>
+              </a:rPr>
+              <a:t>from 5 criteria below, </a:t>
+            </a:r>
+          </a:p>
+          <a:p>
+            <a:pPr lvl="1"/>
+            <a:r>
+              <a:rPr lang="en-US" dirty="0"/>
+              <a:t>State Tax</a:t>
+            </a:r>
+          </a:p>
+          <a:p>
+            <a:pPr lvl="1"/>
+            <a:r>
+              <a:rPr lang="en-US" dirty="0"/>
+              <a:t>Climate</a:t>
+            </a:r>
+          </a:p>
+          <a:p>
+            <a:pPr lvl="1"/>
+            <a:r>
+              <a:rPr lang="en-US" dirty="0"/>
+              <a:t>Unemployment rate</a:t>
+            </a:r>
+          </a:p>
+          <a:p>
+            <a:pPr lvl="1"/>
+            <a:r>
+              <a:rPr lang="en-US" dirty="0"/>
+              <a:t>Crime rate</a:t>
+            </a:r>
+          </a:p>
+          <a:p>
+            <a:pPr lvl="1"/>
+            <a:r>
+              <a:rPr lang="en-US" dirty="0"/>
+              <a:t>Salary </a:t>
+            </a:r>
+          </a:p>
+          <a:p>
+            <a:r>
+              <a:rPr lang="en-US" dirty="0"/>
+              <a:t>Through observations, plots and correlations, we’re to determine the best state for employee to work in.</a:t>
+            </a:r>
+          </a:p>
+        </p:txBody>
+      </p:sp>
+    </p:spTree>
+    <p:extLst>
+      <p:ext uri="{BB962C8B-B14F-4D97-AF65-F5344CB8AC3E}">
+        <p14:creationId xmlns:p14="http://schemas.microsoft.com/office/powerpoint/2010/main" val="556332744"/>
+      </p:ext>
+    </p:extLst>
+  </p:cSld>
+  <p:clrMapOvr>
+    <a:masterClrMapping/>
+  </p:clrMapOvr>
+</p:sld>
+</file>
+
+<file path=ppt/slides/slide4.xml><?xml version="1.0" encoding="utf-8"?>
+<p:sld xmlns:a="http://schemas.openxmlformats.org/drawingml/2006/main" xmlns:r="http://schemas.openxmlformats.org/officeDocument/2006/relationships" xmlns:p="http://schemas.openxmlformats.org/presentationml/2006/main">
+  <p:cSld>
+    <p:spTree>
+      <p:nvGrpSpPr>
+        <p:cNvPr id="1" name=""/>
+        <p:cNvGrpSpPr/>
+        <p:nvPr/>
+      </p:nvGrpSpPr>
+      <p:grpSpPr>
+        <a:xfrm>
+          <a:off x="0" y="0"/>
+          <a:ext cx="0" cy="0"/>
+          <a:chOff x="0" y="0"/>
+          <a:chExt cx="0" cy="0"/>
+        </a:xfrm>
+      </p:grpSpPr>
+      <p:sp>
+        <p:nvSpPr>
+          <p:cNvPr id="2" name="Title 1">
+            <a:extLst>
+              <a:ext uri="{FF2B5EF4-FFF2-40B4-BE49-F238E27FC236}">
+                <a16:creationId xmlns:a16="http://schemas.microsoft.com/office/drawing/2014/main" id="{377C9523-097C-4E43-AC8E-8C68B3057BB1}"/>
+              </a:ext>
+            </a:extLst>
+          </p:cNvPr>
+          <p:cNvSpPr>
+            <a:spLocks noGrp="1"/>
+          </p:cNvSpPr>
+          <p:nvPr>
+            <p:ph type="title"/>
+          </p:nvPr>
+        </p:nvSpPr>
+        <p:spPr/>
+        <p:txBody>
+          <a:bodyPr/>
+          <a:lstStyle/>
+          <a:p>
+            <a:r>
+              <a:rPr lang="en-US" dirty="0"/>
+              <a:t>Project Description</a:t>
+            </a:r>
+          </a:p>
+        </p:txBody>
+      </p:sp>
+      <p:sp>
+        <p:nvSpPr>
+          <p:cNvPr id="3" name="Content Placeholder 2">
+            <a:extLst>
+              <a:ext uri="{FF2B5EF4-FFF2-40B4-BE49-F238E27FC236}">
+                <a16:creationId xmlns:a16="http://schemas.microsoft.com/office/drawing/2014/main" id="{42C92943-A346-4DB7-A073-7ED62D2A2B66}"/>
+              </a:ext>
+            </a:extLst>
+          </p:cNvPr>
+          <p:cNvSpPr>
+            <a:spLocks noGrp="1"/>
+          </p:cNvSpPr>
+          <p:nvPr>
+            <p:ph idx="1"/>
+          </p:nvPr>
+        </p:nvSpPr>
+        <p:spPr/>
+        <p:txBody>
+          <a:bodyPr>
+            <a:normAutofit fontScale="92500" lnSpcReduction="10000"/>
+          </a:bodyPr>
+          <a:lstStyle/>
+          <a:p>
+            <a:r>
+              <a:rPr lang="en-US" dirty="0"/>
+              <a:t>Our opinion on Best State to live in 2018 for </a:t>
+            </a:r>
+            <a:r>
+              <a:rPr lang="en-US" dirty="0">
+                <a:solidFill>
+                  <a:srgbClr val="FF0000"/>
+                </a:solidFill>
+              </a:rPr>
+              <a:t>“employee” </a:t>
+            </a:r>
+            <a:r>
+              <a:rPr lang="en-US" dirty="0">
+                <a:solidFill>
+                  <a:schemeClr val="tx1"/>
+                </a:solidFill>
+              </a:rPr>
+              <a:t>from 5 criteria below, </a:t>
+            </a:r>
+          </a:p>
+          <a:p>
+            <a:pPr lvl="1"/>
+            <a:r>
+              <a:rPr lang="en-US" dirty="0"/>
+              <a:t>State Tax</a:t>
+            </a:r>
+          </a:p>
+          <a:p>
+            <a:pPr lvl="1"/>
+            <a:r>
+              <a:rPr lang="en-US" dirty="0"/>
+              <a:t>Climate</a:t>
+            </a:r>
+          </a:p>
+          <a:p>
+            <a:pPr lvl="1"/>
+            <a:r>
+              <a:rPr lang="en-US" dirty="0"/>
+              <a:t>Unemployment rate</a:t>
+            </a:r>
+          </a:p>
+          <a:p>
+            <a:pPr lvl="1"/>
+            <a:r>
+              <a:rPr lang="en-US" dirty="0"/>
+              <a:t>Crime rate</a:t>
+            </a:r>
+          </a:p>
+          <a:p>
+            <a:pPr lvl="1"/>
+            <a:r>
+              <a:rPr lang="en-US" dirty="0"/>
+              <a:t>Salary </a:t>
+            </a:r>
+          </a:p>
+          <a:p>
+            <a:r>
+              <a:rPr lang="en-US" dirty="0"/>
+              <a:t>Through observations, plots and correlations, we’re to determine the best state for employee to work in.</a:t>
+            </a:r>
+          </a:p>
+        </p:txBody>
+      </p:sp>
+    </p:spTree>
+    <p:extLst>
+      <p:ext uri="{BB962C8B-B14F-4D97-AF65-F5344CB8AC3E}">
+        <p14:creationId xmlns:p14="http://schemas.microsoft.com/office/powerpoint/2010/main" val="2000845695"/>
+      </p:ext>
+    </p:extLst>
+  </p:cSld>
+  <p:clrMapOvr>
+    <a:masterClrMapping/>
+  </p:clrMapOvr>
+</p:sld>
+</file>
+
+<file path=ppt/slides/slide5.xml><?xml version="1.0" encoding="utf-8"?>
+<p:sld xmlns:a="http://schemas.openxmlformats.org/drawingml/2006/main" xmlns:r="http://schemas.openxmlformats.org/officeDocument/2006/relationships" xmlns:p="http://schemas.openxmlformats.org/presentationml/2006/main">
+  <p:cSld>
+    <p:spTree>
+      <p:nvGrpSpPr>
+        <p:cNvPr id="1" name=""/>
+        <p:cNvGrpSpPr/>
+        <p:nvPr/>
+      </p:nvGrpSpPr>
+      <p:grpSpPr>
+        <a:xfrm>
+          <a:off x="0" y="0"/>
+          <a:ext cx="0" cy="0"/>
+          <a:chOff x="0" y="0"/>
+          <a:chExt cx="0" cy="0"/>
+        </a:xfrm>
+      </p:grpSpPr>
+      <p:sp>
+        <p:nvSpPr>
+          <p:cNvPr id="2" name="Title 1">
+            <a:extLst>
+              <a:ext uri="{FF2B5EF4-FFF2-40B4-BE49-F238E27FC236}">
                 <a16:creationId xmlns:a16="http://schemas.microsoft.com/office/drawing/2014/main" id="{1917A588-6B43-4326-8CEE-B31FA8CC4FDB}"/>
               </a:ext>
             </a:extLst>
@@ -6953,7 +7968,7 @@
 </p:sld>
 </file>
 
-<file path=ppt/slides/slide4.xml><?xml version="1.0" encoding="utf-8"?>
+<file path=ppt/slides/slide6.xml><?xml version="1.0" encoding="utf-8"?>
 <p:sld xmlns:a="http://schemas.openxmlformats.org/drawingml/2006/main" xmlns:r="http://schemas.openxmlformats.org/officeDocument/2006/relationships" xmlns:p="http://schemas.openxmlformats.org/presentationml/2006/main">
   <p:cSld>
     <p:spTree>
@@ -9093,7 +10108,7 @@
 </p:sld>
 </file>
 
-<file path=ppt/slides/slide5.xml><?xml version="1.0" encoding="utf-8"?>
+<file path=ppt/slides/slide7.xml><?xml version="1.0" encoding="utf-8"?>
 <p:sld xmlns:a="http://schemas.openxmlformats.org/drawingml/2006/main" xmlns:r="http://schemas.openxmlformats.org/officeDocument/2006/relationships" xmlns:p="http://schemas.openxmlformats.org/presentationml/2006/main">
   <p:cSld>
     <p:spTree>
@@ -9373,7 +10388,7 @@
 </p:sld>
 </file>
 
-<file path=ppt/slides/slide6.xml><?xml version="1.0" encoding="utf-8"?>
+<file path=ppt/slides/slide8.xml><?xml version="1.0" encoding="utf-8"?>
 <p:sld xmlns:a="http://schemas.openxmlformats.org/drawingml/2006/main" xmlns:r="http://schemas.openxmlformats.org/officeDocument/2006/relationships" xmlns:p="http://schemas.openxmlformats.org/presentationml/2006/main">
   <p:cSld>
     <p:spTree>
@@ -9465,777 +10480,6 @@
 </p:sld>
 </file>
 
-<file path=ppt/slides/slide7.xml><?xml version="1.0" encoding="utf-8"?>
-<p:sld xmlns:a="http://schemas.openxmlformats.org/drawingml/2006/main" xmlns:r="http://schemas.openxmlformats.org/officeDocument/2006/relationships" xmlns:p="http://schemas.openxmlformats.org/presentationml/2006/main">
-  <p:cSld>
-    <p:spTree>
-      <p:nvGrpSpPr>
-        <p:cNvPr id="1" name=""/>
-        <p:cNvGrpSpPr/>
-        <p:nvPr/>
-      </p:nvGrpSpPr>
-      <p:grpSpPr>
-        <a:xfrm>
-          <a:off x="0" y="0"/>
-          <a:ext cx="0" cy="0"/>
-          <a:chOff x="0" y="0"/>
-          <a:chExt cx="0" cy="0"/>
-        </a:xfrm>
-      </p:grpSpPr>
-      <p:sp>
-        <p:nvSpPr>
-          <p:cNvPr id="2" name="Title 1">
-            <a:extLst>
-              <a:ext uri="{FF2B5EF4-FFF2-40B4-BE49-F238E27FC236}">
-                <a16:creationId xmlns:a16="http://schemas.microsoft.com/office/drawing/2014/main" id="{1917A588-6B43-4326-8CEE-B31FA8CC4FDB}"/>
-              </a:ext>
-            </a:extLst>
-          </p:cNvPr>
-          <p:cNvSpPr>
-            <a:spLocks noGrp="1"/>
-          </p:cNvSpPr>
-          <p:nvPr>
-            <p:ph type="title"/>
-          </p:nvPr>
-        </p:nvSpPr>
-        <p:spPr/>
-        <p:txBody>
-          <a:bodyPr/>
-          <a:lstStyle/>
-          <a:p>
-            <a:r>
-              <a:rPr lang="en-US" dirty="0"/>
-              <a:t>Coding Rules</a:t>
-            </a:r>
-          </a:p>
-        </p:txBody>
-      </p:sp>
-      <p:sp>
-        <p:nvSpPr>
-          <p:cNvPr id="3" name="Content Placeholder 2">
-            <a:extLst>
-              <a:ext uri="{FF2B5EF4-FFF2-40B4-BE49-F238E27FC236}">
-                <a16:creationId xmlns:a16="http://schemas.microsoft.com/office/drawing/2014/main" id="{F5BE9D4D-949C-4037-9F87-16CDE0EE0466}"/>
-              </a:ext>
-            </a:extLst>
-          </p:cNvPr>
-          <p:cNvSpPr>
-            <a:spLocks noGrp="1"/>
-          </p:cNvSpPr>
-          <p:nvPr>
-            <p:ph idx="1"/>
-          </p:nvPr>
-        </p:nvSpPr>
-        <p:spPr/>
-        <p:txBody>
-          <a:bodyPr>
-            <a:normAutofit fontScale="92500" lnSpcReduction="10000"/>
-          </a:bodyPr>
-          <a:lstStyle/>
-          <a:p>
-            <a:r>
-              <a:rPr lang="en-US" dirty="0"/>
-              <a:t>Upload scripts to Script folder</a:t>
-            </a:r>
-          </a:p>
-          <a:p>
-            <a:r>
-              <a:rPr lang="en-US" dirty="0"/>
-              <a:t>Label/ Comment on every code line to help other understand quickly. Explain briefly if needed</a:t>
-            </a:r>
-          </a:p>
-          <a:p>
-            <a:r>
-              <a:rPr lang="en-US" dirty="0"/>
-              <a:t>Label plot(s) well with legend, title and axes</a:t>
-            </a:r>
-          </a:p>
-          <a:p>
-            <a:r>
-              <a:rPr lang="en-US" dirty="0"/>
-              <a:t>Append _</a:t>
-            </a:r>
-            <a:r>
-              <a:rPr lang="en-US" dirty="0" err="1"/>
-              <a:t>lst</a:t>
-            </a:r>
-            <a:r>
-              <a:rPr lang="en-US" dirty="0"/>
-              <a:t>, _df and </a:t>
-            </a:r>
-            <a:r>
-              <a:rPr lang="en-US" dirty="0" err="1"/>
-              <a:t>etc</a:t>
-            </a:r>
-            <a:r>
-              <a:rPr lang="en-US" dirty="0"/>
-              <a:t> when defining lists, dictionaries, data frames. E.g. </a:t>
-            </a:r>
-            <a:r>
-              <a:rPr lang="en-US" dirty="0" err="1"/>
-              <a:t>mylist_lst</a:t>
-            </a:r>
-            <a:r>
-              <a:rPr lang="en-US" dirty="0"/>
-              <a:t>, </a:t>
-            </a:r>
-            <a:r>
-              <a:rPr lang="en-US" dirty="0" err="1"/>
-              <a:t>myplot_plt</a:t>
-            </a:r>
-            <a:endParaRPr lang="en-US" dirty="0"/>
-          </a:p>
-          <a:p>
-            <a:r>
-              <a:rPr lang="en-US" dirty="0"/>
-              <a:t>Backup files locally prior to modification for retrieval</a:t>
-            </a:r>
-          </a:p>
-          <a:p>
-            <a:r>
-              <a:rPr lang="en-US" dirty="0"/>
-              <a:t>Attempt to solve 1</a:t>
-            </a:r>
-            <a:r>
-              <a:rPr lang="en-US" baseline="30000" dirty="0"/>
-              <a:t>st</a:t>
-            </a:r>
-            <a:r>
-              <a:rPr lang="en-US" dirty="0"/>
-              <a:t> by yourself, if help needed, slack out</a:t>
-            </a:r>
-          </a:p>
-        </p:txBody>
-      </p:sp>
-    </p:spTree>
-    <p:extLst>
-      <p:ext uri="{BB962C8B-B14F-4D97-AF65-F5344CB8AC3E}">
-        <p14:creationId xmlns:p14="http://schemas.microsoft.com/office/powerpoint/2010/main" val="2409190503"/>
-      </p:ext>
-    </p:extLst>
-  </p:cSld>
-  <p:clrMapOvr>
-    <a:masterClrMapping/>
-  </p:clrMapOvr>
-</p:sld>
-</file>
-
-<file path=ppt/slides/slide8.xml><?xml version="1.0" encoding="utf-8"?>
-<p:sld xmlns:a="http://schemas.openxmlformats.org/drawingml/2006/main" xmlns:r="http://schemas.openxmlformats.org/officeDocument/2006/relationships" xmlns:p="http://schemas.openxmlformats.org/presentationml/2006/main">
-  <p:cSld>
-    <p:spTree>
-      <p:nvGrpSpPr>
-        <p:cNvPr id="1" name=""/>
-        <p:cNvGrpSpPr/>
-        <p:nvPr/>
-      </p:nvGrpSpPr>
-      <p:grpSpPr>
-        <a:xfrm>
-          <a:off x="0" y="0"/>
-          <a:ext cx="0" cy="0"/>
-          <a:chOff x="0" y="0"/>
-          <a:chExt cx="0" cy="0"/>
-        </a:xfrm>
-      </p:grpSpPr>
-      <p:sp>
-        <p:nvSpPr>
-          <p:cNvPr id="2" name="Title 1">
-            <a:extLst>
-              <a:ext uri="{FF2B5EF4-FFF2-40B4-BE49-F238E27FC236}">
-                <a16:creationId xmlns:a16="http://schemas.microsoft.com/office/drawing/2014/main" id="{1917A588-6B43-4326-8CEE-B31FA8CC4FDB}"/>
-              </a:ext>
-            </a:extLst>
-          </p:cNvPr>
-          <p:cNvSpPr>
-            <a:spLocks noGrp="1"/>
-          </p:cNvSpPr>
-          <p:nvPr>
-            <p:ph type="title"/>
-          </p:nvPr>
-        </p:nvSpPr>
-        <p:spPr/>
-        <p:txBody>
-          <a:bodyPr/>
-          <a:lstStyle/>
-          <a:p>
-            <a:r>
-              <a:rPr lang="en-US" dirty="0"/>
-              <a:t>Availability</a:t>
-            </a:r>
-          </a:p>
-        </p:txBody>
-      </p:sp>
-      <p:graphicFrame>
-        <p:nvGraphicFramePr>
-          <p:cNvPr id="5" name="Content Placeholder 4">
-            <a:extLst>
-              <a:ext uri="{FF2B5EF4-FFF2-40B4-BE49-F238E27FC236}">
-                <a16:creationId xmlns:a16="http://schemas.microsoft.com/office/drawing/2014/main" id="{52BFB9D7-64CC-446E-A2B1-7FEA2F22DFC3}"/>
-              </a:ext>
-            </a:extLst>
-          </p:cNvPr>
-          <p:cNvGraphicFramePr>
-            <a:graphicFrameLocks noGrp="1"/>
-          </p:cNvGraphicFramePr>
-          <p:nvPr>
-            <p:ph idx="1"/>
-            <p:extLst>
-              <p:ext uri="{D42A27DB-BD31-4B8C-83A1-F6EECF244321}">
-                <p14:modId xmlns:p14="http://schemas.microsoft.com/office/powerpoint/2010/main" val="2806111777"/>
-              </p:ext>
-            </p:extLst>
-          </p:nvPr>
-        </p:nvGraphicFramePr>
-        <p:xfrm>
-          <a:off x="2734408" y="2583839"/>
-          <a:ext cx="6523892" cy="3016861"/>
-        </p:xfrm>
-        <a:graphic>
-          <a:graphicData uri="http://schemas.openxmlformats.org/drawingml/2006/table">
-            <a:tbl>
-              <a:tblPr firstRow="1" bandRow="1">
-                <a:tableStyleId>{5C22544A-7EE6-4342-B048-85BDC9FD1C3A}</a:tableStyleId>
-              </a:tblPr>
-              <a:tblGrid>
-                <a:gridCol w="1573980">
-                  <a:extLst>
-                    <a:ext uri="{9D8B030D-6E8A-4147-A177-3AD203B41FA5}">
-                      <a16:colId xmlns:a16="http://schemas.microsoft.com/office/drawing/2014/main" val="2013967057"/>
-                    </a:ext>
-                  </a:extLst>
-                </a:gridCol>
-                <a:gridCol w="1059703">
-                  <a:extLst>
-                    <a:ext uri="{9D8B030D-6E8A-4147-A177-3AD203B41FA5}">
-                      <a16:colId xmlns:a16="http://schemas.microsoft.com/office/drawing/2014/main" val="477625931"/>
-                    </a:ext>
-                  </a:extLst>
-                </a:gridCol>
-                <a:gridCol w="1546873">
-                  <a:extLst>
-                    <a:ext uri="{9D8B030D-6E8A-4147-A177-3AD203B41FA5}">
-                      <a16:colId xmlns:a16="http://schemas.microsoft.com/office/drawing/2014/main" val="913401616"/>
-                    </a:ext>
-                  </a:extLst>
-                </a:gridCol>
-                <a:gridCol w="1027738">
-                  <a:extLst>
-                    <a:ext uri="{9D8B030D-6E8A-4147-A177-3AD203B41FA5}">
-                      <a16:colId xmlns:a16="http://schemas.microsoft.com/office/drawing/2014/main" val="4263324847"/>
-                    </a:ext>
-                  </a:extLst>
-                </a:gridCol>
-                <a:gridCol w="1315598">
-                  <a:extLst>
-                    <a:ext uri="{9D8B030D-6E8A-4147-A177-3AD203B41FA5}">
-                      <a16:colId xmlns:a16="http://schemas.microsoft.com/office/drawing/2014/main" val="1813264309"/>
-                    </a:ext>
-                  </a:extLst>
-                </a:gridCol>
-              </a:tblGrid>
-              <a:tr h="469656">
-                <a:tc>
-                  <a:txBody>
-                    <a:bodyPr/>
-                    <a:lstStyle/>
-                    <a:p>
-                      <a:pPr algn="ctr"/>
-                      <a:r>
-                        <a:rPr lang="en-US" dirty="0"/>
-                        <a:t>Date/ Ppl</a:t>
-                      </a:r>
-                    </a:p>
-                  </a:txBody>
-                  <a:tcPr anchor="ctr"/>
-                </a:tc>
-                <a:tc>
-                  <a:txBody>
-                    <a:bodyPr/>
-                    <a:lstStyle/>
-                    <a:p>
-                      <a:pPr algn="ctr"/>
-                      <a:r>
-                        <a:rPr lang="en-US" dirty="0" err="1"/>
-                        <a:t>Bahar</a:t>
-                      </a:r>
-                      <a:endParaRPr lang="en-US" dirty="0"/>
-                    </a:p>
-                  </a:txBody>
-                  <a:tcPr anchor="ctr"/>
-                </a:tc>
-                <a:tc>
-                  <a:txBody>
-                    <a:bodyPr/>
-                    <a:lstStyle/>
-                    <a:p>
-                      <a:pPr algn="ctr"/>
-                      <a:r>
-                        <a:rPr lang="en-US" dirty="0"/>
-                        <a:t>Catherine</a:t>
-                      </a:r>
-                    </a:p>
-                  </a:txBody>
-                  <a:tcPr anchor="ctr"/>
-                </a:tc>
-                <a:tc>
-                  <a:txBody>
-                    <a:bodyPr/>
-                    <a:lstStyle/>
-                    <a:p>
-                      <a:pPr algn="ctr"/>
-                      <a:r>
-                        <a:rPr lang="en-US" dirty="0"/>
-                        <a:t>Molly</a:t>
-                      </a:r>
-                    </a:p>
-                  </a:txBody>
-                  <a:tcPr anchor="ctr"/>
-                </a:tc>
-                <a:tc>
-                  <a:txBody>
-                    <a:bodyPr/>
-                    <a:lstStyle/>
-                    <a:p>
-                      <a:pPr algn="ctr"/>
-                      <a:r>
-                        <a:rPr lang="en-US" dirty="0"/>
-                        <a:t>Prakash</a:t>
-                      </a:r>
-                    </a:p>
-                  </a:txBody>
-                  <a:tcPr anchor="ctr"/>
-                </a:tc>
-                <a:extLst>
-                  <a:ext uri="{0D108BD9-81ED-4DB2-BD59-A6C34878D82A}">
-                    <a16:rowId xmlns:a16="http://schemas.microsoft.com/office/drawing/2014/main" val="2459327410"/>
-                  </a:ext>
-                </a:extLst>
-              </a:tr>
-              <a:tr h="374087">
-                <a:tc>
-                  <a:txBody>
-                    <a:bodyPr/>
-                    <a:lstStyle/>
-                    <a:p>
-                      <a:pPr algn="ctr"/>
-                      <a:r>
-                        <a:rPr lang="en-US" dirty="0"/>
-                        <a:t>7/1</a:t>
-                      </a:r>
-                    </a:p>
-                  </a:txBody>
-                  <a:tcPr anchor="ctr"/>
-                </a:tc>
-                <a:tc>
-                  <a:txBody>
-                    <a:bodyPr/>
-                    <a:lstStyle/>
-                    <a:p>
-                      <a:pPr algn="ctr"/>
-                      <a:r>
-                        <a:rPr lang="en-US" dirty="0"/>
-                        <a:t>Yes</a:t>
-                      </a:r>
-                    </a:p>
-                  </a:txBody>
-                  <a:tcPr anchor="ctr"/>
-                </a:tc>
-                <a:tc>
-                  <a:txBody>
-                    <a:bodyPr/>
-                    <a:lstStyle/>
-                    <a:p>
-                      <a:pPr algn="ctr"/>
-                      <a:r>
-                        <a:rPr lang="en-US" dirty="0"/>
-                        <a:t>Yes</a:t>
-                      </a:r>
-                    </a:p>
-                  </a:txBody>
-                  <a:tcPr anchor="ctr"/>
-                </a:tc>
-                <a:tc>
-                  <a:txBody>
-                    <a:bodyPr/>
-                    <a:lstStyle/>
-                    <a:p>
-                      <a:pPr algn="ctr"/>
-                      <a:r>
-                        <a:rPr lang="en-US" dirty="0"/>
-                        <a:t>Yes</a:t>
-                      </a:r>
-                    </a:p>
-                  </a:txBody>
-                  <a:tcPr anchor="ctr"/>
-                </a:tc>
-                <a:tc>
-                  <a:txBody>
-                    <a:bodyPr/>
-                    <a:lstStyle/>
-                    <a:p>
-                      <a:pPr algn="ctr"/>
-                      <a:r>
-                        <a:rPr lang="en-US" dirty="0"/>
-                        <a:t>Yes</a:t>
-                      </a:r>
-                    </a:p>
-                  </a:txBody>
-                  <a:tcPr anchor="ctr"/>
-                </a:tc>
-                <a:extLst>
-                  <a:ext uri="{0D108BD9-81ED-4DB2-BD59-A6C34878D82A}">
-                    <a16:rowId xmlns:a16="http://schemas.microsoft.com/office/drawing/2014/main" val="3970321666"/>
-                  </a:ext>
-                </a:extLst>
-              </a:tr>
-              <a:tr h="374087">
-                <a:tc>
-                  <a:txBody>
-                    <a:bodyPr/>
-                    <a:lstStyle/>
-                    <a:p>
-                      <a:pPr algn="ctr"/>
-                      <a:r>
-                        <a:rPr lang="en-US" dirty="0"/>
-                        <a:t>7/6</a:t>
-                      </a:r>
-                    </a:p>
-                  </a:txBody>
-                  <a:tcPr anchor="ctr"/>
-                </a:tc>
-                <a:tc>
-                  <a:txBody>
-                    <a:bodyPr/>
-                    <a:lstStyle/>
-                    <a:p>
-                      <a:pPr algn="ctr"/>
-                      <a:r>
-                        <a:rPr lang="en-US" dirty="0">
-                          <a:highlight>
-                            <a:srgbClr val="FF0000"/>
-                          </a:highlight>
-                        </a:rPr>
-                        <a:t>No</a:t>
-                      </a:r>
-                    </a:p>
-                  </a:txBody>
-                  <a:tcPr anchor="ctr"/>
-                </a:tc>
-                <a:tc>
-                  <a:txBody>
-                    <a:bodyPr/>
-                    <a:lstStyle/>
-                    <a:p>
-                      <a:pPr algn="ctr"/>
-                      <a:r>
-                        <a:rPr lang="en-US" dirty="0"/>
-                        <a:t>Yes</a:t>
-                      </a:r>
-                    </a:p>
-                  </a:txBody>
-                  <a:tcPr anchor="ctr"/>
-                </a:tc>
-                <a:tc>
-                  <a:txBody>
-                    <a:bodyPr/>
-                    <a:lstStyle/>
-                    <a:p>
-                      <a:pPr algn="ctr"/>
-                      <a:r>
-                        <a:rPr lang="en-US" dirty="0">
-                          <a:highlight>
-                            <a:srgbClr val="FF0000"/>
-                          </a:highlight>
-                        </a:rPr>
-                        <a:t>No</a:t>
-                      </a:r>
-                    </a:p>
-                  </a:txBody>
-                  <a:tcPr anchor="ctr"/>
-                </a:tc>
-                <a:tc>
-                  <a:txBody>
-                    <a:bodyPr/>
-                    <a:lstStyle/>
-                    <a:p>
-                      <a:pPr algn="ctr"/>
-                      <a:r>
-                        <a:rPr lang="en-US" dirty="0"/>
-                        <a:t>Yes</a:t>
-                      </a:r>
-                    </a:p>
-                  </a:txBody>
-                  <a:tcPr anchor="ctr"/>
-                </a:tc>
-                <a:extLst>
-                  <a:ext uri="{0D108BD9-81ED-4DB2-BD59-A6C34878D82A}">
-                    <a16:rowId xmlns:a16="http://schemas.microsoft.com/office/drawing/2014/main" val="2348106690"/>
-                  </a:ext>
-                </a:extLst>
-              </a:tr>
-              <a:tr h="374087">
-                <a:tc>
-                  <a:txBody>
-                    <a:bodyPr/>
-                    <a:lstStyle/>
-                    <a:p>
-                      <a:pPr algn="ctr"/>
-                      <a:r>
-                        <a:rPr lang="en-US" dirty="0"/>
-                        <a:t>7/8</a:t>
-                      </a:r>
-                    </a:p>
-                  </a:txBody>
-                  <a:tcPr anchor="ctr"/>
-                </a:tc>
-                <a:tc>
-                  <a:txBody>
-                    <a:bodyPr/>
-                    <a:lstStyle/>
-                    <a:p>
-                      <a:pPr algn="ctr"/>
-                      <a:r>
-                        <a:rPr lang="en-US" dirty="0"/>
-                        <a:t>Yes</a:t>
-                      </a:r>
-                    </a:p>
-                  </a:txBody>
-                  <a:tcPr anchor="ctr"/>
-                </a:tc>
-                <a:tc>
-                  <a:txBody>
-                    <a:bodyPr/>
-                    <a:lstStyle/>
-                    <a:p>
-                      <a:pPr algn="ctr"/>
-                      <a:r>
-                        <a:rPr lang="en-US" dirty="0"/>
-                        <a:t>Yes</a:t>
-                      </a:r>
-                    </a:p>
-                  </a:txBody>
-                  <a:tcPr anchor="ctr"/>
-                </a:tc>
-                <a:tc>
-                  <a:txBody>
-                    <a:bodyPr/>
-                    <a:lstStyle/>
-                    <a:p>
-                      <a:pPr algn="ctr"/>
-                      <a:r>
-                        <a:rPr lang="en-US" dirty="0">
-                          <a:highlight>
-                            <a:srgbClr val="FF0000"/>
-                          </a:highlight>
-                        </a:rPr>
-                        <a:t>No</a:t>
-                      </a:r>
-                    </a:p>
-                  </a:txBody>
-                  <a:tcPr anchor="ctr"/>
-                </a:tc>
-                <a:tc>
-                  <a:txBody>
-                    <a:bodyPr/>
-                    <a:lstStyle/>
-                    <a:p>
-                      <a:pPr algn="ctr"/>
-                      <a:r>
-                        <a:rPr lang="en-US" dirty="0"/>
-                        <a:t>Yes</a:t>
-                      </a:r>
-                    </a:p>
-                  </a:txBody>
-                  <a:tcPr anchor="ctr"/>
-                </a:tc>
-                <a:extLst>
-                  <a:ext uri="{0D108BD9-81ED-4DB2-BD59-A6C34878D82A}">
-                    <a16:rowId xmlns:a16="http://schemas.microsoft.com/office/drawing/2014/main" val="4946152"/>
-                  </a:ext>
-                </a:extLst>
-              </a:tr>
-              <a:tr h="1050857">
-                <a:tc>
-                  <a:txBody>
-                    <a:bodyPr/>
-                    <a:lstStyle/>
-                    <a:p>
-                      <a:pPr marL="0" marR="0" lvl="0" indent="0" algn="ctr" defTabSz="457200" rtl="0" eaLnBrk="1" fontAlgn="auto" latinLnBrk="0" hangingPunct="1">
-                        <a:lnSpc>
-                          <a:spcPct val="100000"/>
-                        </a:lnSpc>
-                        <a:spcBef>
-                          <a:spcPts val="0"/>
-                        </a:spcBef>
-                        <a:spcAft>
-                          <a:spcPts val="0"/>
-                        </a:spcAft>
-                        <a:buClrTx/>
-                        <a:buSzTx/>
-                        <a:buFontTx/>
-                        <a:buNone/>
-                        <a:tabLst/>
-                        <a:defRPr/>
-                      </a:pPr>
-                      <a:r>
-                        <a:rPr lang="en-US" dirty="0"/>
-                        <a:t>7/10 (slides preparation)</a:t>
-                      </a:r>
-                    </a:p>
-                    <a:p>
-                      <a:pPr algn="ctr"/>
-                      <a:endParaRPr lang="en-US" dirty="0"/>
-                    </a:p>
-                  </a:txBody>
-                  <a:tcPr anchor="ctr"/>
-                </a:tc>
-                <a:tc>
-                  <a:txBody>
-                    <a:bodyPr/>
-                    <a:lstStyle/>
-                    <a:p>
-                      <a:pPr algn="ctr"/>
-                      <a:r>
-                        <a:rPr lang="en-US" dirty="0"/>
-                        <a:t>Yes</a:t>
-                      </a:r>
-                    </a:p>
-                  </a:txBody>
-                  <a:tcPr anchor="ctr"/>
-                </a:tc>
-                <a:tc>
-                  <a:txBody>
-                    <a:bodyPr/>
-                    <a:lstStyle/>
-                    <a:p>
-                      <a:pPr algn="ctr"/>
-                      <a:r>
-                        <a:rPr lang="en-US" dirty="0"/>
-                        <a:t>Yes</a:t>
-                      </a:r>
-                    </a:p>
-                  </a:txBody>
-                  <a:tcPr anchor="ctr"/>
-                </a:tc>
-                <a:tc>
-                  <a:txBody>
-                    <a:bodyPr/>
-                    <a:lstStyle/>
-                    <a:p>
-                      <a:pPr algn="ctr"/>
-                      <a:r>
-                        <a:rPr lang="en-US" dirty="0"/>
-                        <a:t>Yes</a:t>
-                      </a:r>
-                    </a:p>
-                  </a:txBody>
-                  <a:tcPr anchor="ctr"/>
-                </a:tc>
-                <a:tc>
-                  <a:txBody>
-                    <a:bodyPr/>
-                    <a:lstStyle/>
-                    <a:p>
-                      <a:pPr algn="ctr"/>
-                      <a:r>
-                        <a:rPr lang="en-US" dirty="0"/>
-                        <a:t>Yes</a:t>
-                      </a:r>
-                    </a:p>
-                  </a:txBody>
-                  <a:tcPr anchor="ctr"/>
-                </a:tc>
-                <a:extLst>
-                  <a:ext uri="{0D108BD9-81ED-4DB2-BD59-A6C34878D82A}">
-                    <a16:rowId xmlns:a16="http://schemas.microsoft.com/office/drawing/2014/main" val="1302585507"/>
-                  </a:ext>
-                </a:extLst>
-              </a:tr>
-              <a:tr h="374087">
-                <a:tc>
-                  <a:txBody>
-                    <a:bodyPr/>
-                    <a:lstStyle/>
-                    <a:p>
-                      <a:pPr algn="ctr"/>
-                      <a:r>
-                        <a:rPr lang="en-US" dirty="0"/>
-                        <a:t>7/13</a:t>
-                      </a:r>
-                    </a:p>
-                  </a:txBody>
-                  <a:tcPr anchor="ctr"/>
-                </a:tc>
-                <a:tc gridSpan="4">
-                  <a:txBody>
-                    <a:bodyPr/>
-                    <a:lstStyle/>
-                    <a:p>
-                      <a:pPr algn="ctr"/>
-                      <a:r>
-                        <a:rPr lang="en-US" dirty="0"/>
-                        <a:t>Project 1 Presentation &amp; Submission</a:t>
-                      </a:r>
-                    </a:p>
-                  </a:txBody>
-                  <a:tcPr anchor="ctr"/>
-                </a:tc>
-                <a:tc hMerge="1">
-                  <a:txBody>
-                    <a:bodyPr/>
-                    <a:lstStyle/>
-                    <a:p>
-                      <a:pPr algn="ctr"/>
-                      <a:endParaRPr lang="en-US" dirty="0"/>
-                    </a:p>
-                  </a:txBody>
-                  <a:tcPr anchor="ctr"/>
-                </a:tc>
-                <a:tc hMerge="1">
-                  <a:txBody>
-                    <a:bodyPr/>
-                    <a:lstStyle/>
-                    <a:p>
-                      <a:pPr algn="ctr"/>
-                      <a:endParaRPr lang="en-US" dirty="0"/>
-                    </a:p>
-                  </a:txBody>
-                  <a:tcPr anchor="ctr"/>
-                </a:tc>
-                <a:tc hMerge="1">
-                  <a:txBody>
-                    <a:bodyPr/>
-                    <a:lstStyle/>
-                    <a:p>
-                      <a:pPr algn="ctr"/>
-                      <a:endParaRPr lang="en-US" dirty="0"/>
-                    </a:p>
-                  </a:txBody>
-                  <a:tcPr anchor="ctr"/>
-                </a:tc>
-                <a:extLst>
-                  <a:ext uri="{0D108BD9-81ED-4DB2-BD59-A6C34878D82A}">
-                    <a16:rowId xmlns:a16="http://schemas.microsoft.com/office/drawing/2014/main" val="3375028414"/>
-                  </a:ext>
-                </a:extLst>
-              </a:tr>
-            </a:tbl>
-          </a:graphicData>
-        </a:graphic>
-      </p:graphicFrame>
-    </p:spTree>
-    <p:extLst>
-      <p:ext uri="{BB962C8B-B14F-4D97-AF65-F5344CB8AC3E}">
-        <p14:creationId xmlns:p14="http://schemas.microsoft.com/office/powerpoint/2010/main" val="2173070810"/>
-      </p:ext>
-    </p:extLst>
-  </p:cSld>
-  <p:clrMapOvr>
-    <a:masterClrMapping/>
-  </p:clrMapOvr>
-</p:sld>
-</file>
-
 <file path=ppt/slides/slide9.xml><?xml version="1.0" encoding="utf-8"?>
 <p:sld xmlns:a="http://schemas.openxmlformats.org/drawingml/2006/main" xmlns:r="http://schemas.openxmlformats.org/officeDocument/2006/relationships" xmlns:p="http://schemas.openxmlformats.org/presentationml/2006/main">
   <p:cSld>
@@ -10276,13 +10520,8 @@
           <a:p>
             <a:r>
               <a:rPr lang="en-US" dirty="0"/>
-              <a:t>State Tax &amp; Living Cost - </a:t>
-            </a:r>
-            <a:r>
-              <a:rPr lang="en-US" dirty="0" err="1"/>
-              <a:t>Bahar</a:t>
-            </a:r>
-            <a:endParaRPr lang="en-US" dirty="0"/>
+              <a:t>Coding Rules</a:t>
+            </a:r>
           </a:p>
         </p:txBody>
       </p:sp>
@@ -10304,44 +10543,81 @@
         </p:nvSpPr>
         <p:spPr/>
         <p:txBody>
-          <a:bodyPr/>
-          <a:lstStyle/>
-          <a:p>
-            <a:r>
-              <a:rPr lang="en-US" dirty="0"/>
-              <a:t>Which state is startup business friendly (low tax)? – </a:t>
-            </a:r>
-            <a:r>
-              <a:rPr lang="en-US" dirty="0">
-                <a:solidFill>
-                  <a:srgbClr val="FF0000"/>
-                </a:solidFill>
-              </a:rPr>
-              <a:t>Tax rate and living cost (housing).</a:t>
-            </a:r>
-          </a:p>
-          <a:p>
-            <a:r>
-              <a:rPr lang="en-US" dirty="0"/>
-              <a:t>Which state with low </a:t>
-            </a:r>
-            <a:r>
-              <a:rPr lang="en-US" dirty="0">
-                <a:solidFill>
-                  <a:srgbClr val="FF0000"/>
-                </a:solidFill>
-              </a:rPr>
-              <a:t>tax rate</a:t>
-            </a:r>
-            <a:r>
-              <a:rPr lang="en-US" dirty="0"/>
-              <a:t>, attracts employee?</a:t>
-            </a:r>
-          </a:p>
-          <a:p>
-            <a:r>
-              <a:rPr lang="en-US" i="1" dirty="0"/>
-              <a:t>Write description/ observation and supporting plots (minimum 2) here</a:t>
+          <a:bodyPr>
+            <a:normAutofit fontScale="92500" lnSpcReduction="10000"/>
+          </a:bodyPr>
+          <a:lstStyle/>
+          <a:p>
+            <a:r>
+              <a:rPr lang="en-US" dirty="0"/>
+              <a:t>Upload scripts to Script folder</a:t>
+            </a:r>
+          </a:p>
+          <a:p>
+            <a:r>
+              <a:rPr lang="en-US" dirty="0"/>
+              <a:t>Label/ Comment on every code line to help other understand quickly. Explain briefly if needed</a:t>
+            </a:r>
+          </a:p>
+          <a:p>
+            <a:r>
+              <a:rPr lang="en-US" dirty="0"/>
+              <a:t>Label plot(s) well with legend, title and axes</a:t>
+            </a:r>
+          </a:p>
+          <a:p>
+            <a:r>
+              <a:rPr lang="en-US" dirty="0"/>
+              <a:t>Append _</a:t>
+            </a:r>
+            <a:r>
+              <a:rPr lang="en-US" dirty="0" err="1"/>
+              <a:t>lst</a:t>
+            </a:r>
+            <a:r>
+              <a:rPr lang="en-US" dirty="0"/>
+              <a:t>, _df and </a:t>
+            </a:r>
+            <a:r>
+              <a:rPr lang="en-US" dirty="0" err="1"/>
+              <a:t>etc</a:t>
+            </a:r>
+            <a:r>
+              <a:rPr lang="en-US" dirty="0"/>
+              <a:t> when defining lists, dictionaries, data frames. E.g. </a:t>
+            </a:r>
+            <a:r>
+              <a:rPr lang="en-US" dirty="0" err="1"/>
+              <a:t>mylist_lst</a:t>
+            </a:r>
+            <a:r>
+              <a:rPr lang="en-US" dirty="0"/>
+              <a:t>, </a:t>
+            </a:r>
+            <a:r>
+              <a:rPr lang="en-US" dirty="0" err="1"/>
+              <a:t>myplot_plt</a:t>
+            </a:r>
+            <a:endParaRPr lang="en-US" dirty="0"/>
+          </a:p>
+          <a:p>
+            <a:r>
+              <a:rPr lang="en-US" dirty="0"/>
+              <a:t>Backup files locally prior to modification for retrieval</a:t>
+            </a:r>
+          </a:p>
+          <a:p>
+            <a:r>
+              <a:rPr lang="en-US" dirty="0"/>
+              <a:t>Attempt to solve 1</a:t>
+            </a:r>
+            <a:r>
+              <a:rPr lang="en-US" baseline="30000" dirty="0"/>
+              <a:t>st</a:t>
+            </a:r>
+            <a:r>
+              <a:rPr lang="en-US" dirty="0"/>
+              <a:t> by yourself, if help needed, slack out</a:t>
             </a:r>
           </a:p>
         </p:txBody>
@@ -10349,7 +10625,7 @@
     </p:spTree>
     <p:extLst>
       <p:ext uri="{BB962C8B-B14F-4D97-AF65-F5344CB8AC3E}">
-        <p14:creationId xmlns:p14="http://schemas.microsoft.com/office/powerpoint/2010/main" val="1207226246"/>
+        <p14:creationId xmlns:p14="http://schemas.microsoft.com/office/powerpoint/2010/main" val="2409190503"/>
       </p:ext>
     </p:extLst>
   </p:cSld>

</xml_diff>

<commit_message>
Added States Geo Map
</commit_message>
<xml_diff>
--- a/Working_Presentation.pptx
+++ b/Working_Presentation.pptx
@@ -6,19 +6,20 @@
   </p:sldMasterIdLst>
   <p:sldIdLst>
     <p:sldId id="256" r:id="rId2"/>
-    <p:sldId id="269" r:id="rId3"/>
-    <p:sldId id="257" r:id="rId4"/>
-    <p:sldId id="268" r:id="rId5"/>
-    <p:sldId id="262" r:id="rId6"/>
-    <p:sldId id="264" r:id="rId7"/>
-    <p:sldId id="259" r:id="rId8"/>
-    <p:sldId id="261" r:id="rId9"/>
-    <p:sldId id="260" r:id="rId10"/>
-    <p:sldId id="258" r:id="rId11"/>
-    <p:sldId id="263" r:id="rId12"/>
-    <p:sldId id="265" r:id="rId13"/>
-    <p:sldId id="266" r:id="rId14"/>
-    <p:sldId id="267" r:id="rId15"/>
+    <p:sldId id="270" r:id="rId3"/>
+    <p:sldId id="269" r:id="rId4"/>
+    <p:sldId id="257" r:id="rId5"/>
+    <p:sldId id="268" r:id="rId6"/>
+    <p:sldId id="262" r:id="rId7"/>
+    <p:sldId id="264" r:id="rId8"/>
+    <p:sldId id="259" r:id="rId9"/>
+    <p:sldId id="261" r:id="rId10"/>
+    <p:sldId id="260" r:id="rId11"/>
+    <p:sldId id="258" r:id="rId12"/>
+    <p:sldId id="263" r:id="rId13"/>
+    <p:sldId id="265" r:id="rId14"/>
+    <p:sldId id="266" r:id="rId15"/>
+    <p:sldId id="267" r:id="rId16"/>
   </p:sldIdLst>
   <p:sldSz cx="12192000" cy="6858000"/>
   <p:notesSz cx="6858000" cy="9144000"/>
@@ -457,7 +458,7 @@
             <a:fld id="{B61BEF0D-F0BB-DE4B-95CE-6DB70DBA9567}" type="datetimeFigureOut">
               <a:rPr lang="en-US" dirty="0"/>
               <a:pPr/>
-              <a:t>7/3/2019</a:t>
+              <a:t>7/7/2019</a:t>
             </a:fld>
             <a:endParaRPr lang="en-US" dirty="0"/>
           </a:p>
@@ -778,7 +779,7 @@
             <a:fld id="{B61BEF0D-F0BB-DE4B-95CE-6DB70DBA9567}" type="datetimeFigureOut">
               <a:rPr lang="en-US" dirty="0"/>
               <a:pPr/>
-              <a:t>7/3/2019</a:t>
+              <a:t>7/7/2019</a:t>
             </a:fld>
             <a:endParaRPr lang="en-US" dirty="0"/>
           </a:p>
@@ -1023,7 +1024,7 @@
             <a:fld id="{B61BEF0D-F0BB-DE4B-95CE-6DB70DBA9567}" type="datetimeFigureOut">
               <a:rPr lang="en-US" dirty="0"/>
               <a:pPr/>
-              <a:t>7/3/2019</a:t>
+              <a:t>7/7/2019</a:t>
             </a:fld>
             <a:endParaRPr lang="en-US" dirty="0"/>
           </a:p>
@@ -1359,7 +1360,7 @@
             <a:fld id="{B61BEF0D-F0BB-DE4B-95CE-6DB70DBA9567}" type="datetimeFigureOut">
               <a:rPr lang="en-US" dirty="0"/>
               <a:pPr/>
-              <a:t>7/3/2019</a:t>
+              <a:t>7/7/2019</a:t>
             </a:fld>
             <a:endParaRPr lang="en-US" dirty="0"/>
           </a:p>
@@ -1703,7 +1704,7 @@
             <a:fld id="{B61BEF0D-F0BB-DE4B-95CE-6DB70DBA9567}" type="datetimeFigureOut">
               <a:rPr lang="en-US" dirty="0"/>
               <a:pPr/>
-              <a:t>7/3/2019</a:t>
+              <a:t>7/7/2019</a:t>
             </a:fld>
             <a:endParaRPr lang="en-US" dirty="0"/>
           </a:p>
@@ -2074,7 +2075,7 @@
             <a:fld id="{B61BEF0D-F0BB-DE4B-95CE-6DB70DBA9567}" type="datetimeFigureOut">
               <a:rPr lang="en-US" dirty="0"/>
               <a:pPr/>
-              <a:t>7/3/2019</a:t>
+              <a:t>7/7/2019</a:t>
             </a:fld>
             <a:endParaRPr lang="en-US" dirty="0"/>
           </a:p>
@@ -2541,7 +2542,7 @@
             <a:fld id="{B61BEF0D-F0BB-DE4B-95CE-6DB70DBA9567}" type="datetimeFigureOut">
               <a:rPr lang="en-US" dirty="0"/>
               <a:pPr/>
-              <a:t>7/3/2019</a:t>
+              <a:t>7/7/2019</a:t>
             </a:fld>
             <a:endParaRPr lang="en-US" dirty="0"/>
           </a:p>
@@ -2743,7 +2744,7 @@
             <a:fld id="{B61BEF0D-F0BB-DE4B-95CE-6DB70DBA9567}" type="datetimeFigureOut">
               <a:rPr lang="en-US" dirty="0"/>
               <a:pPr/>
-              <a:t>7/3/2019</a:t>
+              <a:t>7/7/2019</a:t>
             </a:fld>
             <a:endParaRPr lang="en-US" dirty="0"/>
           </a:p>
@@ -2951,7 +2952,7 @@
             <a:fld id="{B61BEF0D-F0BB-DE4B-95CE-6DB70DBA9567}" type="datetimeFigureOut">
               <a:rPr lang="en-US" dirty="0"/>
               <a:pPr/>
-              <a:t>7/3/2019</a:t>
+              <a:t>7/7/2019</a:t>
             </a:fld>
             <a:endParaRPr lang="en-US" dirty="0"/>
           </a:p>
@@ -3179,7 +3180,7 @@
           <a:p>
             <a:fld id="{52647F38-B617-4D2F-AE0A-013F0C4D2C57}" type="datetimeFigureOut">
               <a:rPr lang="en-US" dirty="0"/>
-              <a:t>7/3/2019</a:t>
+              <a:t>7/7/2019</a:t>
             </a:fld>
             <a:endParaRPr lang="en-US" dirty="0"/>
           </a:p>
@@ -3423,7 +3424,7 @@
             <a:fld id="{B61BEF0D-F0BB-DE4B-95CE-6DB70DBA9567}" type="datetimeFigureOut">
               <a:rPr lang="en-US" dirty="0"/>
               <a:pPr/>
-              <a:t>7/3/2019</a:t>
+              <a:t>7/7/2019</a:t>
             </a:fld>
             <a:endParaRPr lang="en-US" dirty="0"/>
           </a:p>
@@ -3717,7 +3718,7 @@
           <a:p>
             <a:fld id="{05BFA754-D5C3-4E66-96A6-867B257F58DC}" type="datetimeFigureOut">
               <a:rPr lang="en-US" dirty="0"/>
-              <a:t>7/3/2019</a:t>
+              <a:t>7/7/2019</a:t>
             </a:fld>
             <a:endParaRPr lang="en-US" dirty="0"/>
           </a:p>
@@ -4107,7 +4108,7 @@
             <a:fld id="{B61BEF0D-F0BB-DE4B-95CE-6DB70DBA9567}" type="datetimeFigureOut">
               <a:rPr lang="en-US" dirty="0"/>
               <a:pPr/>
-              <a:t>7/3/2019</a:t>
+              <a:t>7/7/2019</a:t>
             </a:fld>
             <a:endParaRPr lang="en-US" dirty="0"/>
           </a:p>
@@ -4253,7 +4254,7 @@
             <a:fld id="{B61BEF0D-F0BB-DE4B-95CE-6DB70DBA9567}" type="datetimeFigureOut">
               <a:rPr lang="en-US" dirty="0"/>
               <a:pPr/>
-              <a:t>7/3/2019</a:t>
+              <a:t>7/7/2019</a:t>
             </a:fld>
             <a:endParaRPr lang="en-US" dirty="0"/>
           </a:p>
@@ -4376,7 +4377,7 @@
             <a:fld id="{B61BEF0D-F0BB-DE4B-95CE-6DB70DBA9567}" type="datetimeFigureOut">
               <a:rPr lang="en-US" dirty="0"/>
               <a:pPr/>
-              <a:t>7/3/2019</a:t>
+              <a:t>7/7/2019</a:t>
             </a:fld>
             <a:endParaRPr lang="en-US" dirty="0"/>
           </a:p>
@@ -4628,7 +4629,7 @@
             <a:fld id="{B61BEF0D-F0BB-DE4B-95CE-6DB70DBA9567}" type="datetimeFigureOut">
               <a:rPr lang="en-US" dirty="0"/>
               <a:pPr/>
-              <a:t>7/3/2019</a:t>
+              <a:t>7/7/2019</a:t>
             </a:fld>
             <a:endParaRPr lang="en-US" dirty="0"/>
           </a:p>
@@ -4940,7 +4941,7 @@
             <a:fld id="{B61BEF0D-F0BB-DE4B-95CE-6DB70DBA9567}" type="datetimeFigureOut">
               <a:rPr lang="en-US" dirty="0"/>
               <a:pPr/>
-              <a:t>7/3/2019</a:t>
+              <a:t>7/7/2019</a:t>
             </a:fld>
             <a:endParaRPr lang="en-US" dirty="0"/>
           </a:p>
@@ -5288,7 +5289,7 @@
             <a:fld id="{B61BEF0D-F0BB-DE4B-95CE-6DB70DBA9567}" type="datetimeFigureOut">
               <a:rPr lang="en-US" dirty="0"/>
               <a:pPr/>
-              <a:t>7/3/2019</a:t>
+              <a:t>7/7/2019</a:t>
             </a:fld>
             <a:endParaRPr lang="en-US" dirty="0"/>
           </a:p>
@@ -5905,6 +5906,161 @@
 </file>
 
 <file path=ppt/slides/slide10.xml><?xml version="1.0" encoding="utf-8"?>
+<p:sld xmlns:a="http://schemas.openxmlformats.org/drawingml/2006/main" xmlns:r="http://schemas.openxmlformats.org/officeDocument/2006/relationships" xmlns:p="http://schemas.openxmlformats.org/presentationml/2006/main">
+  <p:cSld>
+    <p:spTree>
+      <p:nvGrpSpPr>
+        <p:cNvPr id="1" name=""/>
+        <p:cNvGrpSpPr/>
+        <p:nvPr/>
+      </p:nvGrpSpPr>
+      <p:grpSpPr>
+        <a:xfrm>
+          <a:off x="0" y="0"/>
+          <a:ext cx="0" cy="0"/>
+          <a:chOff x="0" y="0"/>
+          <a:chExt cx="0" cy="0"/>
+        </a:xfrm>
+      </p:grpSpPr>
+      <p:sp>
+        <p:nvSpPr>
+          <p:cNvPr id="2" name="Title 1">
+            <a:extLst>
+              <a:ext uri="{FF2B5EF4-FFF2-40B4-BE49-F238E27FC236}">
+                <a16:creationId xmlns:a16="http://schemas.microsoft.com/office/drawing/2014/main" id="{1917A588-6B43-4326-8CEE-B31FA8CC4FDB}"/>
+              </a:ext>
+            </a:extLst>
+          </p:cNvPr>
+          <p:cNvSpPr>
+            <a:spLocks noGrp="1"/>
+          </p:cNvSpPr>
+          <p:nvPr>
+            <p:ph type="title"/>
+          </p:nvPr>
+        </p:nvSpPr>
+        <p:spPr/>
+        <p:txBody>
+          <a:bodyPr/>
+          <a:lstStyle/>
+          <a:p>
+            <a:r>
+              <a:rPr lang="en-US" dirty="0"/>
+              <a:t>Coding Rules</a:t>
+            </a:r>
+          </a:p>
+        </p:txBody>
+      </p:sp>
+      <p:sp>
+        <p:nvSpPr>
+          <p:cNvPr id="3" name="Content Placeholder 2">
+            <a:extLst>
+              <a:ext uri="{FF2B5EF4-FFF2-40B4-BE49-F238E27FC236}">
+                <a16:creationId xmlns:a16="http://schemas.microsoft.com/office/drawing/2014/main" id="{F5BE9D4D-949C-4037-9F87-16CDE0EE0466}"/>
+              </a:ext>
+            </a:extLst>
+          </p:cNvPr>
+          <p:cNvSpPr>
+            <a:spLocks noGrp="1"/>
+          </p:cNvSpPr>
+          <p:nvPr>
+            <p:ph idx="1"/>
+          </p:nvPr>
+        </p:nvSpPr>
+        <p:spPr/>
+        <p:txBody>
+          <a:bodyPr>
+            <a:normAutofit fontScale="92500" lnSpcReduction="10000"/>
+          </a:bodyPr>
+          <a:lstStyle/>
+          <a:p>
+            <a:r>
+              <a:rPr lang="en-US" dirty="0"/>
+              <a:t>Upload scripts to Script folder</a:t>
+            </a:r>
+          </a:p>
+          <a:p>
+            <a:r>
+              <a:rPr lang="en-US" dirty="0"/>
+              <a:t>Label/ Comment on every code line to help other understand quickly. Explain briefly if needed</a:t>
+            </a:r>
+          </a:p>
+          <a:p>
+            <a:r>
+              <a:rPr lang="en-US" dirty="0"/>
+              <a:t>Label plot(s) well with legend, title and axes</a:t>
+            </a:r>
+          </a:p>
+          <a:p>
+            <a:r>
+              <a:rPr lang="en-US" dirty="0"/>
+              <a:t>Append _</a:t>
+            </a:r>
+            <a:r>
+              <a:rPr lang="en-US" dirty="0" err="1"/>
+              <a:t>lst</a:t>
+            </a:r>
+            <a:r>
+              <a:rPr lang="en-US" dirty="0"/>
+              <a:t>, _df and </a:t>
+            </a:r>
+            <a:r>
+              <a:rPr lang="en-US" dirty="0" err="1"/>
+              <a:t>etc</a:t>
+            </a:r>
+            <a:r>
+              <a:rPr lang="en-US" dirty="0"/>
+              <a:t> when defining lists, dictionaries, data frames. E.g. </a:t>
+            </a:r>
+            <a:r>
+              <a:rPr lang="en-US" dirty="0" err="1"/>
+              <a:t>mylist_lst</a:t>
+            </a:r>
+            <a:r>
+              <a:rPr lang="en-US" dirty="0"/>
+              <a:t>, </a:t>
+            </a:r>
+            <a:r>
+              <a:rPr lang="en-US" dirty="0" err="1"/>
+              <a:t>myplot_plt</a:t>
+            </a:r>
+            <a:endParaRPr lang="en-US" dirty="0"/>
+          </a:p>
+          <a:p>
+            <a:r>
+              <a:rPr lang="en-US" dirty="0"/>
+              <a:t>Backup files locally prior to modification for retrieval</a:t>
+            </a:r>
+          </a:p>
+          <a:p>
+            <a:r>
+              <a:rPr lang="en-US" dirty="0"/>
+              <a:t>Attempt to solve 1</a:t>
+            </a:r>
+            <a:r>
+              <a:rPr lang="en-US" baseline="30000" dirty="0"/>
+              <a:t>st</a:t>
+            </a:r>
+            <a:r>
+              <a:rPr lang="en-US" dirty="0"/>
+              <a:t> by yourself, if help needed, slack out</a:t>
+            </a:r>
+          </a:p>
+        </p:txBody>
+      </p:sp>
+    </p:spTree>
+    <p:extLst>
+      <p:ext uri="{BB962C8B-B14F-4D97-AF65-F5344CB8AC3E}">
+        <p14:creationId xmlns:p14="http://schemas.microsoft.com/office/powerpoint/2010/main" val="2409190503"/>
+      </p:ext>
+    </p:extLst>
+  </p:cSld>
+  <p:clrMapOvr>
+    <a:masterClrMapping/>
+  </p:clrMapOvr>
+</p:sld>
+</file>
+
+<file path=ppt/slides/slide11.xml><?xml version="1.0" encoding="utf-8"?>
 <p:sld xmlns:a="http://schemas.openxmlformats.org/drawingml/2006/main" xmlns:r="http://schemas.openxmlformats.org/officeDocument/2006/relationships" xmlns:p="http://schemas.openxmlformats.org/presentationml/2006/main">
   <p:cSld>
     <p:spTree>
@@ -6520,129 +6676,6 @@
 </p:sld>
 </file>
 
-<file path=ppt/slides/slide11.xml><?xml version="1.0" encoding="utf-8"?>
-<p:sld xmlns:a="http://schemas.openxmlformats.org/drawingml/2006/main" xmlns:r="http://schemas.openxmlformats.org/officeDocument/2006/relationships" xmlns:p="http://schemas.openxmlformats.org/presentationml/2006/main">
-  <p:cSld>
-    <p:spTree>
-      <p:nvGrpSpPr>
-        <p:cNvPr id="1" name=""/>
-        <p:cNvGrpSpPr/>
-        <p:nvPr/>
-      </p:nvGrpSpPr>
-      <p:grpSpPr>
-        <a:xfrm>
-          <a:off x="0" y="0"/>
-          <a:ext cx="0" cy="0"/>
-          <a:chOff x="0" y="0"/>
-          <a:chExt cx="0" cy="0"/>
-        </a:xfrm>
-      </p:grpSpPr>
-      <p:sp>
-        <p:nvSpPr>
-          <p:cNvPr id="2" name="Title 1">
-            <a:extLst>
-              <a:ext uri="{FF2B5EF4-FFF2-40B4-BE49-F238E27FC236}">
-                <a16:creationId xmlns:a16="http://schemas.microsoft.com/office/drawing/2014/main" id="{1917A588-6B43-4326-8CEE-B31FA8CC4FDB}"/>
-              </a:ext>
-            </a:extLst>
-          </p:cNvPr>
-          <p:cNvSpPr>
-            <a:spLocks noGrp="1"/>
-          </p:cNvSpPr>
-          <p:nvPr>
-            <p:ph type="title"/>
-          </p:nvPr>
-        </p:nvSpPr>
-        <p:spPr/>
-        <p:txBody>
-          <a:bodyPr/>
-          <a:lstStyle/>
-          <a:p>
-            <a:r>
-              <a:rPr lang="en-US" dirty="0"/>
-              <a:t>State Tax &amp; Living Cost - </a:t>
-            </a:r>
-            <a:r>
-              <a:rPr lang="en-US" dirty="0" err="1"/>
-              <a:t>Bahar</a:t>
-            </a:r>
-            <a:endParaRPr lang="en-US" dirty="0"/>
-          </a:p>
-        </p:txBody>
-      </p:sp>
-      <p:sp>
-        <p:nvSpPr>
-          <p:cNvPr id="3" name="Content Placeholder 2">
-            <a:extLst>
-              <a:ext uri="{FF2B5EF4-FFF2-40B4-BE49-F238E27FC236}">
-                <a16:creationId xmlns:a16="http://schemas.microsoft.com/office/drawing/2014/main" id="{F5BE9D4D-949C-4037-9F87-16CDE0EE0466}"/>
-              </a:ext>
-            </a:extLst>
-          </p:cNvPr>
-          <p:cNvSpPr>
-            <a:spLocks noGrp="1"/>
-          </p:cNvSpPr>
-          <p:nvPr>
-            <p:ph idx="1"/>
-          </p:nvPr>
-        </p:nvSpPr>
-        <p:spPr/>
-        <p:txBody>
-          <a:bodyPr/>
-          <a:lstStyle/>
-          <a:p>
-            <a:r>
-              <a:rPr lang="en-US" dirty="0"/>
-              <a:t>Which state is startup business friendly (low tax)? – </a:t>
-            </a:r>
-            <a:r>
-              <a:rPr lang="en-US" dirty="0">
-                <a:solidFill>
-                  <a:srgbClr val="FF0000"/>
-                </a:solidFill>
-              </a:rPr>
-              <a:t>Tax rate and living cost (housing).</a:t>
-            </a:r>
-          </a:p>
-          <a:p>
-            <a:r>
-              <a:rPr lang="en-US" dirty="0"/>
-              <a:t>Which state with low </a:t>
-            </a:r>
-            <a:r>
-              <a:rPr lang="en-US" dirty="0">
-                <a:solidFill>
-                  <a:srgbClr val="FF0000"/>
-                </a:solidFill>
-              </a:rPr>
-              <a:t>tax rate</a:t>
-            </a:r>
-            <a:r>
-              <a:rPr lang="en-US" dirty="0"/>
-              <a:t>, attracts employee?</a:t>
-            </a:r>
-          </a:p>
-          <a:p>
-            <a:r>
-              <a:rPr lang="en-US" i="1" dirty="0"/>
-              <a:t>Write description/ observation and supporting plots (minimum 2) here</a:t>
-            </a:r>
-          </a:p>
-        </p:txBody>
-      </p:sp>
-    </p:spTree>
-    <p:extLst>
-      <p:ext uri="{BB962C8B-B14F-4D97-AF65-F5344CB8AC3E}">
-        <p14:creationId xmlns:p14="http://schemas.microsoft.com/office/powerpoint/2010/main" val="1207226246"/>
-      </p:ext>
-    </p:extLst>
-  </p:cSld>
-  <p:clrMapOvr>
-    <a:masterClrMapping/>
-  </p:clrMapOvr>
-</p:sld>
-</file>
-
 <file path=ppt/slides/slide12.xml><?xml version="1.0" encoding="utf-8"?>
 <p:sld xmlns:a="http://schemas.openxmlformats.org/drawingml/2006/main" xmlns:r="http://schemas.openxmlformats.org/officeDocument/2006/relationships" xmlns:p="http://schemas.openxmlformats.org/presentationml/2006/main">
   <p:cSld>
@@ -6683,8 +6716,13 @@
           <a:p>
             <a:r>
               <a:rPr lang="en-US" dirty="0"/>
-              <a:t>Unemployment &amp; Crime Rate - Catherine</a:t>
-            </a:r>
+              <a:t>State Tax &amp; Living Cost - </a:t>
+            </a:r>
+            <a:r>
+              <a:rPr lang="en-US" dirty="0" err="1"/>
+              <a:t>Bahar</a:t>
+            </a:r>
+            <a:endParaRPr lang="en-US" dirty="0"/>
           </a:p>
         </p:txBody>
       </p:sp>
@@ -6711,7 +6749,7 @@
           <a:p>
             <a:r>
               <a:rPr lang="en-US" dirty="0"/>
-              <a:t>Lower </a:t>
+              <a:t>Which state is startup business friendly (low tax)? – </a:t>
             </a:r>
             <a:r>
               <a:rPr lang="en-US" dirty="0">
@@ -6719,11 +6757,13 @@
                   <a:srgbClr val="FF0000"/>
                 </a:solidFill>
               </a:rPr>
-              <a:t>unemployment</a:t>
-            </a:r>
-            <a:r>
-              <a:rPr lang="en-US" dirty="0"/>
-              <a:t> correlated to </a:t>
+              <a:t>Tax rate and living cost (housing).</a:t>
+            </a:r>
+          </a:p>
+          <a:p>
+            <a:r>
+              <a:rPr lang="en-US" dirty="0"/>
+              <a:t>Which state with low </a:t>
             </a:r>
             <a:r>
               <a:rPr lang="en-US" dirty="0">
@@ -6731,11 +6771,11 @@
                   <a:srgbClr val="FF0000"/>
                 </a:solidFill>
               </a:rPr>
-              <a:t>crime rate</a:t>
-            </a:r>
-            <a:r>
-              <a:rPr lang="en-US" dirty="0"/>
-              <a:t>?</a:t>
+              <a:t>tax rate</a:t>
+            </a:r>
+            <a:r>
+              <a:rPr lang="en-US" dirty="0"/>
+              <a:t>, attracts employee?</a:t>
             </a:r>
           </a:p>
           <a:p>
@@ -6749,7 +6789,7 @@
     </p:spTree>
     <p:extLst>
       <p:ext uri="{BB962C8B-B14F-4D97-AF65-F5344CB8AC3E}">
-        <p14:creationId xmlns:p14="http://schemas.microsoft.com/office/powerpoint/2010/main" val="4121259519"/>
+        <p14:creationId xmlns:p14="http://schemas.microsoft.com/office/powerpoint/2010/main" val="1207226246"/>
       </p:ext>
     </p:extLst>
   </p:cSld>
@@ -6799,6 +6839,122 @@
           <a:p>
             <a:r>
               <a:rPr lang="en-US" dirty="0"/>
+              <a:t>Unemployment &amp; Crime Rate - Catherine</a:t>
+            </a:r>
+          </a:p>
+        </p:txBody>
+      </p:sp>
+      <p:sp>
+        <p:nvSpPr>
+          <p:cNvPr id="3" name="Content Placeholder 2">
+            <a:extLst>
+              <a:ext uri="{FF2B5EF4-FFF2-40B4-BE49-F238E27FC236}">
+                <a16:creationId xmlns:a16="http://schemas.microsoft.com/office/drawing/2014/main" id="{F5BE9D4D-949C-4037-9F87-16CDE0EE0466}"/>
+              </a:ext>
+            </a:extLst>
+          </p:cNvPr>
+          <p:cNvSpPr>
+            <a:spLocks noGrp="1"/>
+          </p:cNvSpPr>
+          <p:nvPr>
+            <p:ph idx="1"/>
+          </p:nvPr>
+        </p:nvSpPr>
+        <p:spPr/>
+        <p:txBody>
+          <a:bodyPr/>
+          <a:lstStyle/>
+          <a:p>
+            <a:r>
+              <a:rPr lang="en-US" dirty="0"/>
+              <a:t>Lower </a:t>
+            </a:r>
+            <a:r>
+              <a:rPr lang="en-US" dirty="0">
+                <a:solidFill>
+                  <a:srgbClr val="FF0000"/>
+                </a:solidFill>
+              </a:rPr>
+              <a:t>unemployment</a:t>
+            </a:r>
+            <a:r>
+              <a:rPr lang="en-US" dirty="0"/>
+              <a:t> correlated to </a:t>
+            </a:r>
+            <a:r>
+              <a:rPr lang="en-US" dirty="0">
+                <a:solidFill>
+                  <a:srgbClr val="FF0000"/>
+                </a:solidFill>
+              </a:rPr>
+              <a:t>crime rate</a:t>
+            </a:r>
+            <a:r>
+              <a:rPr lang="en-US" dirty="0"/>
+              <a:t>?</a:t>
+            </a:r>
+          </a:p>
+          <a:p>
+            <a:r>
+              <a:rPr lang="en-US" i="1" dirty="0"/>
+              <a:t>Write description/ observation and supporting plots (minimum 2) here</a:t>
+            </a:r>
+          </a:p>
+        </p:txBody>
+      </p:sp>
+    </p:spTree>
+    <p:extLst>
+      <p:ext uri="{BB962C8B-B14F-4D97-AF65-F5344CB8AC3E}">
+        <p14:creationId xmlns:p14="http://schemas.microsoft.com/office/powerpoint/2010/main" val="4121259519"/>
+      </p:ext>
+    </p:extLst>
+  </p:cSld>
+  <p:clrMapOvr>
+    <a:masterClrMapping/>
+  </p:clrMapOvr>
+</p:sld>
+</file>
+
+<file path=ppt/slides/slide14.xml><?xml version="1.0" encoding="utf-8"?>
+<p:sld xmlns:a="http://schemas.openxmlformats.org/drawingml/2006/main" xmlns:r="http://schemas.openxmlformats.org/officeDocument/2006/relationships" xmlns:p="http://schemas.openxmlformats.org/presentationml/2006/main">
+  <p:cSld>
+    <p:spTree>
+      <p:nvGrpSpPr>
+        <p:cNvPr id="1" name=""/>
+        <p:cNvGrpSpPr/>
+        <p:nvPr/>
+      </p:nvGrpSpPr>
+      <p:grpSpPr>
+        <a:xfrm>
+          <a:off x="0" y="0"/>
+          <a:ext cx="0" cy="0"/>
+          <a:chOff x="0" y="0"/>
+          <a:chExt cx="0" cy="0"/>
+        </a:xfrm>
+      </p:grpSpPr>
+      <p:sp>
+        <p:nvSpPr>
+          <p:cNvPr id="2" name="Title 1">
+            <a:extLst>
+              <a:ext uri="{FF2B5EF4-FFF2-40B4-BE49-F238E27FC236}">
+                <a16:creationId xmlns:a16="http://schemas.microsoft.com/office/drawing/2014/main" id="{1917A588-6B43-4326-8CEE-B31FA8CC4FDB}"/>
+              </a:ext>
+            </a:extLst>
+          </p:cNvPr>
+          <p:cNvSpPr>
+            <a:spLocks noGrp="1"/>
+          </p:cNvSpPr>
+          <p:nvPr>
+            <p:ph type="title"/>
+          </p:nvPr>
+        </p:nvSpPr>
+        <p:spPr/>
+        <p:txBody>
+          <a:bodyPr/>
+          <a:lstStyle/>
+          <a:p>
+            <a:r>
+              <a:rPr lang="en-US" dirty="0"/>
               <a:t>Salary - Molly</a:t>
             </a:r>
           </a:p>
@@ -6863,7 +7019,7 @@
 </p:sld>
 </file>
 
-<file path=ppt/slides/slide14.xml><?xml version="1.0" encoding="utf-8"?>
+<file path=ppt/slides/slide15.xml><?xml version="1.0" encoding="utf-8"?>
 <p:sld xmlns:a="http://schemas.openxmlformats.org/drawingml/2006/main" xmlns:r="http://schemas.openxmlformats.org/officeDocument/2006/relationships" xmlns:p="http://schemas.openxmlformats.org/presentationml/2006/main">
   <p:cSld>
     <p:spTree>
@@ -7007,7 +7163,7 @@
           <a:p>
             <a:r>
               <a:rPr lang="en-US" dirty="0"/>
-              <a:t>Question Breakdown</a:t>
+              <a:t>Project 1 Technical Requirement</a:t>
             </a:r>
           </a:p>
         </p:txBody>
@@ -7031,54 +7187,83 @@
         <p:spPr/>
         <p:txBody>
           <a:bodyPr>
-            <a:normAutofit fontScale="92500" lnSpcReduction="20000"/>
+            <a:normAutofit fontScale="55000" lnSpcReduction="20000"/>
           </a:bodyPr>
           <a:lstStyle/>
           <a:p>
             <a:r>
               <a:rPr lang="en-US" dirty="0"/>
-              <a:t>Best State </a:t>
-            </a:r>
-          </a:p>
-          <a:p>
-            <a:pPr lvl="1"/>
-            <a:r>
-              <a:rPr lang="en-US" dirty="0"/>
-              <a:t>Out of 50 states, pick the “best choice” from top 20 in categories of salary, crime rate, unemployment rate, climate and tax rate. Not necessarily the best on all of them.</a:t>
-            </a:r>
-          </a:p>
-          <a:p>
-            <a:r>
-              <a:rPr lang="en-US" dirty="0"/>
-              <a:t>To Live In For Employee </a:t>
-            </a:r>
-          </a:p>
-          <a:p>
-            <a:pPr lvl="1"/>
-            <a:r>
-              <a:rPr lang="en-US" dirty="0"/>
-              <a:t>Focus is working community and not “retiree” or “retiring soon” community.</a:t>
-            </a:r>
-          </a:p>
-          <a:p>
-            <a:pPr lvl="1"/>
-            <a:r>
-              <a:rPr lang="en-US" dirty="0"/>
-              <a:t>Affordable housing and tax rate, salary spent on housing + tax &lt; 65%. Having ability to save money </a:t>
-            </a:r>
-          </a:p>
-          <a:p>
-            <a:pPr lvl="1"/>
-            <a:r>
-              <a:rPr lang="en-US" dirty="0"/>
-              <a:t>low crime rate and unemployment i.e. &lt; 4% for each</a:t>
-            </a:r>
-          </a:p>
-          <a:p>
-            <a:pPr lvl="1"/>
-            <a:r>
-              <a:rPr lang="en-US" dirty="0"/>
-              <a:t>acceptable climate i.e. not too hot or cold, less humid. Moderate humidity and temperatures (60 – 80 F)  </a:t>
+              <a:t># Technical Requirements</a:t>
+            </a:r>
+          </a:p>
+          <a:p>
+            <a:r>
+              <a:rPr lang="en-US" dirty="0"/>
+              <a:t>The technical requirements for Project 1 are as follows.</a:t>
+            </a:r>
+          </a:p>
+          <a:p>
+            <a:r>
+              <a:rPr lang="en-US" dirty="0"/>
+              <a:t>* [ ] Use Pandas to clean and format your data set(s)</a:t>
+            </a:r>
+          </a:p>
+          <a:p>
+            <a:r>
+              <a:rPr lang="en-US" dirty="0"/>
+              <a:t>* [ ] Create a </a:t>
+            </a:r>
+            <a:r>
+              <a:rPr lang="en-US" dirty="0" err="1"/>
+              <a:t>Jupyter</a:t>
+            </a:r>
+            <a:r>
+              <a:rPr lang="en-US" dirty="0"/>
+              <a:t> Notebook describing the **data exploration and cleanup** process</a:t>
+            </a:r>
+          </a:p>
+          <a:p>
+            <a:r>
+              <a:rPr lang="en-US" dirty="0"/>
+              <a:t>* [ ] Create a </a:t>
+            </a:r>
+            <a:r>
+              <a:rPr lang="en-US" dirty="0" err="1"/>
+              <a:t>Jupyter</a:t>
+            </a:r>
+            <a:r>
+              <a:rPr lang="en-US" dirty="0"/>
+              <a:t> Notebook illustrating the **final data analysis*** [ ] Use Matplotlib to create a total of 6-8 visualizations of your data (ideally, at least 2 per "question" you ask of your data)</a:t>
+            </a:r>
+          </a:p>
+          <a:p>
+            <a:r>
+              <a:rPr lang="en-US" dirty="0"/>
+              <a:t>* [ ] Save PNG images of your visualizations to distribute to the class and instructional team, and for inclusion in your presentation</a:t>
+            </a:r>
+          </a:p>
+          <a:p>
+            <a:r>
+              <a:rPr lang="en-US" dirty="0"/>
+              <a:t>* [ ] Optionally, use at least one API, if you can find an API with data pertinent to your primary research questions</a:t>
+            </a:r>
+          </a:p>
+          <a:p>
+            <a:r>
+              <a:rPr lang="en-US" dirty="0"/>
+              <a:t>* [ ] Create a write-up summarizing your major findings. This should include a heading for each "question" you asked of your data, and under each heading, a short description of what you found and any relevant plots.</a:t>
+            </a:r>
+          </a:p>
+          <a:p>
+            <a:r>
+              <a:rPr lang="en-US" dirty="0"/>
+              <a:t>- - -### Copyright</a:t>
+            </a:r>
+          </a:p>
+          <a:p>
+            <a:r>
+              <a:rPr lang="en-US" dirty="0"/>
+              <a:t>Coding Boot Camp © 2017. All Rights Reserved.</a:t>
             </a:r>
           </a:p>
         </p:txBody>
@@ -7086,7 +7271,7 @@
     </p:spTree>
     <p:extLst>
       <p:ext uri="{BB962C8B-B14F-4D97-AF65-F5344CB8AC3E}">
-        <p14:creationId xmlns:p14="http://schemas.microsoft.com/office/powerpoint/2010/main" val="1234996424"/>
+        <p14:creationId xmlns:p14="http://schemas.microsoft.com/office/powerpoint/2010/main" val="3211359946"/>
       </p:ext>
     </p:extLst>
   </p:cSld>
@@ -7136,7 +7321,7 @@
           <a:p>
             <a:r>
               <a:rPr lang="en-US" dirty="0"/>
-              <a:t>Project Description</a:t>
+              <a:t>Question Breakdown</a:t>
             </a:r>
           </a:p>
         </p:txBody>
@@ -7160,70 +7345,54 @@
         <p:spPr/>
         <p:txBody>
           <a:bodyPr>
-            <a:normAutofit fontScale="92500" lnSpcReduction="10000"/>
+            <a:normAutofit fontScale="92500" lnSpcReduction="20000"/>
           </a:bodyPr>
           <a:lstStyle/>
           <a:p>
             <a:r>
               <a:rPr lang="en-US" dirty="0"/>
-              <a:t>Our opinion on Best State to live in 2018 for </a:t>
-            </a:r>
-            <a:r>
-              <a:rPr lang="en-US" dirty="0">
-                <a:solidFill>
-                  <a:srgbClr val="FF0000"/>
-                </a:solidFill>
-              </a:rPr>
-              <a:t>“employee” </a:t>
-            </a:r>
-            <a:r>
-              <a:rPr lang="en-US" dirty="0">
-                <a:solidFill>
-                  <a:schemeClr val="tx1"/>
-                </a:solidFill>
-              </a:rPr>
-              <a:t>from 5 criteria below, </a:t>
+              <a:t>Best State </a:t>
             </a:r>
           </a:p>
           <a:p>
             <a:pPr lvl="1"/>
             <a:r>
               <a:rPr lang="en-US" dirty="0"/>
-              <a:t>State Tax</a:t>
+              <a:t>Out of 50 states, pick the “best choice” from top 20 in categories of salary, crime rate, unemployment rate, climate and tax rate. Not necessarily the best on all of them.</a:t>
+            </a:r>
+          </a:p>
+          <a:p>
+            <a:r>
+              <a:rPr lang="en-US" dirty="0"/>
+              <a:t>To Live In For Employee </a:t>
             </a:r>
           </a:p>
           <a:p>
             <a:pPr lvl="1"/>
             <a:r>
               <a:rPr lang="en-US" dirty="0"/>
-              <a:t>Climate</a:t>
+              <a:t>Focus is working community and not “retiree” or “retiring soon” community.</a:t>
             </a:r>
           </a:p>
           <a:p>
             <a:pPr lvl="1"/>
             <a:r>
               <a:rPr lang="en-US" dirty="0"/>
-              <a:t>Unemployment rate</a:t>
+              <a:t>Affordable housing and tax rate, salary spent on housing + tax &lt; 65%. Having ability to save money </a:t>
             </a:r>
           </a:p>
           <a:p>
             <a:pPr lvl="1"/>
             <a:r>
               <a:rPr lang="en-US" dirty="0"/>
-              <a:t>Crime rate</a:t>
+              <a:t>low crime rate and unemployment i.e. &lt; 4% for each</a:t>
             </a:r>
           </a:p>
           <a:p>
             <a:pPr lvl="1"/>
             <a:r>
               <a:rPr lang="en-US" dirty="0"/>
-              <a:t>Salary </a:t>
-            </a:r>
-          </a:p>
-          <a:p>
-            <a:r>
-              <a:rPr lang="en-US" dirty="0"/>
-              <a:t>Through observations, plots and correlations, we’re to determine the best state for employee to work in.</a:t>
+              <a:t>acceptable climate i.e. not too hot or cold, less humid. Moderate humidity and temperatures (60 – 80 F)  </a:t>
             </a:r>
           </a:p>
         </p:txBody>
@@ -7231,7 +7400,7 @@
     </p:spTree>
     <p:extLst>
       <p:ext uri="{BB962C8B-B14F-4D97-AF65-F5344CB8AC3E}">
-        <p14:creationId xmlns:p14="http://schemas.microsoft.com/office/powerpoint/2010/main" val="556332744"/>
+        <p14:creationId xmlns:p14="http://schemas.microsoft.com/office/powerpoint/2010/main" val="1234996424"/>
       </p:ext>
     </p:extLst>
   </p:cSld>
@@ -7376,7 +7545,7 @@
     </p:spTree>
     <p:extLst>
       <p:ext uri="{BB962C8B-B14F-4D97-AF65-F5344CB8AC3E}">
-        <p14:creationId xmlns:p14="http://schemas.microsoft.com/office/powerpoint/2010/main" val="2000845695"/>
+        <p14:creationId xmlns:p14="http://schemas.microsoft.com/office/powerpoint/2010/main" val="556332744"/>
       </p:ext>
     </p:extLst>
   </p:cSld>
@@ -7408,6 +7577,151 @@
           <p:cNvPr id="2" name="Title 1">
             <a:extLst>
               <a:ext uri="{FF2B5EF4-FFF2-40B4-BE49-F238E27FC236}">
+                <a16:creationId xmlns:a16="http://schemas.microsoft.com/office/drawing/2014/main" id="{377C9523-097C-4E43-AC8E-8C68B3057BB1}"/>
+              </a:ext>
+            </a:extLst>
+          </p:cNvPr>
+          <p:cNvSpPr>
+            <a:spLocks noGrp="1"/>
+          </p:cNvSpPr>
+          <p:nvPr>
+            <p:ph type="title"/>
+          </p:nvPr>
+        </p:nvSpPr>
+        <p:spPr/>
+        <p:txBody>
+          <a:bodyPr/>
+          <a:lstStyle/>
+          <a:p>
+            <a:r>
+              <a:rPr lang="en-US" dirty="0"/>
+              <a:t>Project Description</a:t>
+            </a:r>
+          </a:p>
+        </p:txBody>
+      </p:sp>
+      <p:sp>
+        <p:nvSpPr>
+          <p:cNvPr id="3" name="Content Placeholder 2">
+            <a:extLst>
+              <a:ext uri="{FF2B5EF4-FFF2-40B4-BE49-F238E27FC236}">
+                <a16:creationId xmlns:a16="http://schemas.microsoft.com/office/drawing/2014/main" id="{42C92943-A346-4DB7-A073-7ED62D2A2B66}"/>
+              </a:ext>
+            </a:extLst>
+          </p:cNvPr>
+          <p:cNvSpPr>
+            <a:spLocks noGrp="1"/>
+          </p:cNvSpPr>
+          <p:nvPr>
+            <p:ph idx="1"/>
+          </p:nvPr>
+        </p:nvSpPr>
+        <p:spPr/>
+        <p:txBody>
+          <a:bodyPr>
+            <a:normAutofit fontScale="92500" lnSpcReduction="10000"/>
+          </a:bodyPr>
+          <a:lstStyle/>
+          <a:p>
+            <a:r>
+              <a:rPr lang="en-US" dirty="0"/>
+              <a:t>Our opinion on Best State to live in 2018 for </a:t>
+            </a:r>
+            <a:r>
+              <a:rPr lang="en-US" dirty="0">
+                <a:solidFill>
+                  <a:srgbClr val="FF0000"/>
+                </a:solidFill>
+              </a:rPr>
+              <a:t>“employee” </a:t>
+            </a:r>
+            <a:r>
+              <a:rPr lang="en-US" dirty="0">
+                <a:solidFill>
+                  <a:schemeClr val="tx1"/>
+                </a:solidFill>
+              </a:rPr>
+              <a:t>from 5 criteria below, </a:t>
+            </a:r>
+          </a:p>
+          <a:p>
+            <a:pPr lvl="1"/>
+            <a:r>
+              <a:rPr lang="en-US" dirty="0"/>
+              <a:t>State Tax</a:t>
+            </a:r>
+          </a:p>
+          <a:p>
+            <a:pPr lvl="1"/>
+            <a:r>
+              <a:rPr lang="en-US" dirty="0"/>
+              <a:t>Climate</a:t>
+            </a:r>
+          </a:p>
+          <a:p>
+            <a:pPr lvl="1"/>
+            <a:r>
+              <a:rPr lang="en-US" dirty="0"/>
+              <a:t>Unemployment rate</a:t>
+            </a:r>
+          </a:p>
+          <a:p>
+            <a:pPr lvl="1"/>
+            <a:r>
+              <a:rPr lang="en-US" dirty="0"/>
+              <a:t>Crime rate</a:t>
+            </a:r>
+          </a:p>
+          <a:p>
+            <a:pPr lvl="1"/>
+            <a:r>
+              <a:rPr lang="en-US" dirty="0"/>
+              <a:t>Salary </a:t>
+            </a:r>
+          </a:p>
+          <a:p>
+            <a:r>
+              <a:rPr lang="en-US" dirty="0"/>
+              <a:t>Through observations, plots and correlations, we’re to determine the best state for employee to work in.</a:t>
+            </a:r>
+          </a:p>
+        </p:txBody>
+      </p:sp>
+    </p:spTree>
+    <p:extLst>
+      <p:ext uri="{BB962C8B-B14F-4D97-AF65-F5344CB8AC3E}">
+        <p14:creationId xmlns:p14="http://schemas.microsoft.com/office/powerpoint/2010/main" val="2000845695"/>
+      </p:ext>
+    </p:extLst>
+  </p:cSld>
+  <p:clrMapOvr>
+    <a:masterClrMapping/>
+  </p:clrMapOvr>
+</p:sld>
+</file>
+
+<file path=ppt/slides/slide6.xml><?xml version="1.0" encoding="utf-8"?>
+<p:sld xmlns:a="http://schemas.openxmlformats.org/drawingml/2006/main" xmlns:r="http://schemas.openxmlformats.org/officeDocument/2006/relationships" xmlns:p="http://schemas.openxmlformats.org/presentationml/2006/main">
+  <p:cSld>
+    <p:spTree>
+      <p:nvGrpSpPr>
+        <p:cNvPr id="1" name=""/>
+        <p:cNvGrpSpPr/>
+        <p:nvPr/>
+      </p:nvGrpSpPr>
+      <p:grpSpPr>
+        <a:xfrm>
+          <a:off x="0" y="0"/>
+          <a:ext cx="0" cy="0"/>
+          <a:chOff x="0" y="0"/>
+          <a:chExt cx="0" cy="0"/>
+        </a:xfrm>
+      </p:grpSpPr>
+      <p:sp>
+        <p:nvSpPr>
+          <p:cNvPr id="2" name="Title 1">
+            <a:extLst>
+              <a:ext uri="{FF2B5EF4-FFF2-40B4-BE49-F238E27FC236}">
                 <a16:creationId xmlns:a16="http://schemas.microsoft.com/office/drawing/2014/main" id="{1917A588-6B43-4326-8CEE-B31FA8CC4FDB}"/>
               </a:ext>
             </a:extLst>
@@ -7968,7 +8282,7 @@
 </p:sld>
 </file>
 
-<file path=ppt/slides/slide6.xml><?xml version="1.0" encoding="utf-8"?>
+<file path=ppt/slides/slide7.xml><?xml version="1.0" encoding="utf-8"?>
 <p:sld xmlns:a="http://schemas.openxmlformats.org/drawingml/2006/main" xmlns:r="http://schemas.openxmlformats.org/officeDocument/2006/relationships" xmlns:p="http://schemas.openxmlformats.org/presentationml/2006/main">
   <p:cSld>
     <p:spTree>
@@ -10108,286 +10422,6 @@
 </p:sld>
 </file>
 
-<file path=ppt/slides/slide7.xml><?xml version="1.0" encoding="utf-8"?>
-<p:sld xmlns:a="http://schemas.openxmlformats.org/drawingml/2006/main" xmlns:r="http://schemas.openxmlformats.org/officeDocument/2006/relationships" xmlns:p="http://schemas.openxmlformats.org/presentationml/2006/main">
-  <p:cSld>
-    <p:spTree>
-      <p:nvGrpSpPr>
-        <p:cNvPr id="1" name=""/>
-        <p:cNvGrpSpPr/>
-        <p:nvPr/>
-      </p:nvGrpSpPr>
-      <p:grpSpPr>
-        <a:xfrm>
-          <a:off x="0" y="0"/>
-          <a:ext cx="0" cy="0"/>
-          <a:chOff x="0" y="0"/>
-          <a:chExt cx="0" cy="0"/>
-        </a:xfrm>
-      </p:grpSpPr>
-      <p:sp>
-        <p:nvSpPr>
-          <p:cNvPr id="2" name="Title 1">
-            <a:extLst>
-              <a:ext uri="{FF2B5EF4-FFF2-40B4-BE49-F238E27FC236}">
-                <a16:creationId xmlns:a16="http://schemas.microsoft.com/office/drawing/2014/main" id="{1917A588-6B43-4326-8CEE-B31FA8CC4FDB}"/>
-              </a:ext>
-            </a:extLst>
-          </p:cNvPr>
-          <p:cNvSpPr>
-            <a:spLocks noGrp="1"/>
-          </p:cNvSpPr>
-          <p:nvPr>
-            <p:ph type="title"/>
-          </p:nvPr>
-        </p:nvSpPr>
-        <p:spPr/>
-        <p:txBody>
-          <a:bodyPr/>
-          <a:lstStyle/>
-          <a:p>
-            <a:r>
-              <a:rPr lang="en-US" dirty="0"/>
-              <a:t>Questions &amp; Criteria</a:t>
-            </a:r>
-          </a:p>
-        </p:txBody>
-      </p:sp>
-      <p:sp>
-        <p:nvSpPr>
-          <p:cNvPr id="3" name="Content Placeholder 2">
-            <a:extLst>
-              <a:ext uri="{FF2B5EF4-FFF2-40B4-BE49-F238E27FC236}">
-                <a16:creationId xmlns:a16="http://schemas.microsoft.com/office/drawing/2014/main" id="{F5BE9D4D-949C-4037-9F87-16CDE0EE0466}"/>
-              </a:ext>
-            </a:extLst>
-          </p:cNvPr>
-          <p:cNvSpPr>
-            <a:spLocks noGrp="1"/>
-          </p:cNvSpPr>
-          <p:nvPr>
-            <p:ph idx="1"/>
-          </p:nvPr>
-        </p:nvSpPr>
-        <p:spPr>
-          <a:xfrm>
-            <a:off x="1295401" y="2556931"/>
-            <a:ext cx="9601196" cy="3597683"/>
-          </a:xfrm>
-        </p:spPr>
-        <p:txBody>
-          <a:bodyPr>
-            <a:normAutofit fontScale="85000" lnSpcReduction="20000"/>
-          </a:bodyPr>
-          <a:lstStyle/>
-          <a:p>
-            <a:r>
-              <a:rPr lang="en-US" dirty="0"/>
-              <a:t>1) Which state is startup business friendly (low tax)? – </a:t>
-            </a:r>
-            <a:r>
-              <a:rPr lang="en-US" dirty="0">
-                <a:solidFill>
-                  <a:srgbClr val="FF0000"/>
-                </a:solidFill>
-              </a:rPr>
-              <a:t>Tax rate and living cost (housing) </a:t>
-            </a:r>
-            <a:r>
-              <a:rPr lang="en-US" dirty="0"/>
-              <a:t>--  (Extra goal) </a:t>
-            </a:r>
-            <a:r>
-              <a:rPr lang="en-US" dirty="0">
-                <a:sym typeface="Wingdings" panose="05000000000000000000" pitchFamily="2" charset="2"/>
-              </a:rPr>
-              <a:t> </a:t>
-            </a:r>
-            <a:r>
-              <a:rPr lang="en-US" dirty="0" err="1">
-                <a:sym typeface="Wingdings" panose="05000000000000000000" pitchFamily="2" charset="2"/>
-              </a:rPr>
-              <a:t>Bahar</a:t>
-            </a:r>
-            <a:endParaRPr lang="en-US" dirty="0"/>
-          </a:p>
-          <a:p>
-            <a:r>
-              <a:rPr lang="en-US" dirty="0"/>
-              <a:t>2) Which state with low </a:t>
-            </a:r>
-            <a:r>
-              <a:rPr lang="en-US" dirty="0">
-                <a:solidFill>
-                  <a:srgbClr val="FF0000"/>
-                </a:solidFill>
-              </a:rPr>
-              <a:t>tax rate</a:t>
-            </a:r>
-            <a:r>
-              <a:rPr lang="en-US" dirty="0"/>
-              <a:t>, attracts employee? (Main goal) </a:t>
-            </a:r>
-            <a:r>
-              <a:rPr lang="en-US" dirty="0">
-                <a:sym typeface="Wingdings" panose="05000000000000000000" pitchFamily="2" charset="2"/>
-              </a:rPr>
-              <a:t> </a:t>
-            </a:r>
-            <a:r>
-              <a:rPr lang="en-US" dirty="0" err="1">
-                <a:sym typeface="Wingdings" panose="05000000000000000000" pitchFamily="2" charset="2"/>
-              </a:rPr>
-              <a:t>Bahar</a:t>
-            </a:r>
-            <a:endParaRPr lang="en-US" dirty="0"/>
-          </a:p>
-          <a:p>
-            <a:r>
-              <a:rPr lang="en-US" dirty="0"/>
-              <a:t>3) Warmer </a:t>
-            </a:r>
-            <a:r>
-              <a:rPr lang="en-US" dirty="0">
-                <a:solidFill>
-                  <a:srgbClr val="FF0000"/>
-                </a:solidFill>
-              </a:rPr>
-              <a:t>climate</a:t>
-            </a:r>
-            <a:r>
-              <a:rPr lang="en-US" dirty="0"/>
-              <a:t> preferred state to live in, correlate to home price? (Main goal) </a:t>
-            </a:r>
-            <a:r>
-              <a:rPr lang="en-US" dirty="0">
-                <a:sym typeface="Wingdings" panose="05000000000000000000" pitchFamily="2" charset="2"/>
-              </a:rPr>
-              <a:t> Prakash</a:t>
-            </a:r>
-            <a:r>
-              <a:rPr lang="en-US" dirty="0"/>
-              <a:t> </a:t>
-            </a:r>
-          </a:p>
-          <a:p>
-            <a:r>
-              <a:rPr lang="en-US" dirty="0"/>
-              <a:t>4) Lower </a:t>
-            </a:r>
-            <a:r>
-              <a:rPr lang="en-US" dirty="0">
-                <a:solidFill>
-                  <a:srgbClr val="FF0000"/>
-                </a:solidFill>
-              </a:rPr>
-              <a:t>unemployment</a:t>
-            </a:r>
-            <a:r>
-              <a:rPr lang="en-US" dirty="0"/>
-              <a:t> correlated to </a:t>
-            </a:r>
-            <a:r>
-              <a:rPr lang="en-US" dirty="0">
-                <a:solidFill>
-                  <a:srgbClr val="FF0000"/>
-                </a:solidFill>
-              </a:rPr>
-              <a:t>crime rate</a:t>
-            </a:r>
-            <a:r>
-              <a:rPr lang="en-US" dirty="0"/>
-              <a:t>? (Main goal) </a:t>
-            </a:r>
-            <a:r>
-              <a:rPr lang="en-US" dirty="0">
-                <a:sym typeface="Wingdings" panose="05000000000000000000" pitchFamily="2" charset="2"/>
-              </a:rPr>
-              <a:t></a:t>
-            </a:r>
-            <a:r>
-              <a:rPr lang="en-US" dirty="0"/>
-              <a:t> Catherine</a:t>
-            </a:r>
-          </a:p>
-          <a:p>
-            <a:r>
-              <a:rPr lang="en-US" dirty="0"/>
-              <a:t>5) Higher </a:t>
-            </a:r>
-            <a:r>
-              <a:rPr lang="en-US" dirty="0">
-                <a:solidFill>
-                  <a:srgbClr val="FF0000"/>
-                </a:solidFill>
-              </a:rPr>
-              <a:t>salary</a:t>
-            </a:r>
-            <a:r>
-              <a:rPr lang="en-US" dirty="0"/>
-              <a:t> states are the preferred ones? (Main goal) </a:t>
-            </a:r>
-            <a:r>
-              <a:rPr lang="en-US" dirty="0">
-                <a:sym typeface="Wingdings" panose="05000000000000000000" pitchFamily="2" charset="2"/>
-              </a:rPr>
-              <a:t> Molly</a:t>
-            </a:r>
-            <a:endParaRPr lang="en-US" dirty="0"/>
-          </a:p>
-          <a:p>
-            <a:r>
-              <a:rPr lang="en-US" dirty="0"/>
-              <a:t>4) Definition of the best state to live in (our criteria)?</a:t>
-            </a:r>
-          </a:p>
-          <a:p>
-            <a:pPr lvl="1"/>
-            <a:r>
-              <a:rPr lang="en-US" dirty="0"/>
-              <a:t>Modest to high salary range</a:t>
-            </a:r>
-          </a:p>
-          <a:p>
-            <a:pPr lvl="1"/>
-            <a:r>
-              <a:rPr lang="en-US" dirty="0"/>
-              <a:t>Low crime and unemployment rate</a:t>
-            </a:r>
-          </a:p>
-          <a:p>
-            <a:pPr lvl="1"/>
-            <a:r>
-              <a:rPr lang="en-US" dirty="0"/>
-              <a:t>Climate with no hurricane, tornado, snow blizzard, </a:t>
-            </a:r>
-          </a:p>
-          <a:p>
-            <a:pPr lvl="1"/>
-            <a:endParaRPr lang="en-US" dirty="0"/>
-          </a:p>
-          <a:p>
-            <a:pPr lvl="1"/>
-            <a:endParaRPr lang="en-US" dirty="0"/>
-          </a:p>
-          <a:p>
-            <a:endParaRPr lang="en-US" dirty="0"/>
-          </a:p>
-        </p:txBody>
-      </p:sp>
-    </p:spTree>
-    <p:extLst>
-      <p:ext uri="{BB962C8B-B14F-4D97-AF65-F5344CB8AC3E}">
-        <p14:creationId xmlns:p14="http://schemas.microsoft.com/office/powerpoint/2010/main" val="635664139"/>
-      </p:ext>
-    </p:extLst>
-  </p:cSld>
-  <p:clrMapOvr>
-    <a:masterClrMapping/>
-  </p:clrMapOvr>
-</p:sld>
-</file>
-
 <file path=ppt/slides/slide8.xml><?xml version="1.0" encoding="utf-8"?>
 <p:sld xmlns:a="http://schemas.openxmlformats.org/drawingml/2006/main" xmlns:r="http://schemas.openxmlformats.org/officeDocument/2006/relationships" xmlns:p="http://schemas.openxmlformats.org/presentationml/2006/main">
   <p:cSld>
@@ -10423,54 +10457,242 @@
         </p:nvSpPr>
         <p:spPr/>
         <p:txBody>
-          <a:bodyPr>
-            <a:normAutofit/>
-          </a:bodyPr>
-          <a:lstStyle/>
-          <a:p>
-            <a:r>
-              <a:rPr lang="en-US" dirty="0"/>
-              <a:t>Raw data files location</a:t>
-            </a:r>
-          </a:p>
-        </p:txBody>
-      </p:sp>
-      <p:pic>
-        <p:nvPicPr>
-          <p:cNvPr id="4" name="Content Placeholder 3">
+          <a:bodyPr/>
+          <a:lstStyle/>
+          <a:p>
+            <a:r>
+              <a:rPr lang="en-US" dirty="0"/>
+              <a:t>Questions &amp; Criteria</a:t>
+            </a:r>
+          </a:p>
+        </p:txBody>
+      </p:sp>
+      <p:sp>
+        <p:nvSpPr>
+          <p:cNvPr id="3" name="Content Placeholder 2">
             <a:extLst>
               <a:ext uri="{FF2B5EF4-FFF2-40B4-BE49-F238E27FC236}">
-                <a16:creationId xmlns:a16="http://schemas.microsoft.com/office/drawing/2014/main" id="{D51BA1BF-2794-4BC3-AB3C-4FCE473C5999}"/>
+                <a16:creationId xmlns:a16="http://schemas.microsoft.com/office/drawing/2014/main" id="{F5BE9D4D-949C-4037-9F87-16CDE0EE0466}"/>
               </a:ext>
             </a:extLst>
           </p:cNvPr>
-          <p:cNvPicPr>
-            <a:picLocks noGrp="1" noChangeAspect="1"/>
-          </p:cNvPicPr>
+          <p:cNvSpPr>
+            <a:spLocks noGrp="1"/>
+          </p:cNvSpPr>
           <p:nvPr>
             <p:ph idx="1"/>
           </p:nvPr>
-        </p:nvPicPr>
-        <p:blipFill>
-          <a:blip r:embed="rId2"/>
-          <a:stretch>
-            <a:fillRect/>
-          </a:stretch>
-        </p:blipFill>
+        </p:nvSpPr>
         <p:spPr>
           <a:xfrm>
-            <a:off x="2038350" y="2878138"/>
-            <a:ext cx="8115300" cy="2676525"/>
+            <a:off x="1295401" y="2556931"/>
+            <a:ext cx="9601196" cy="3597683"/>
           </a:xfrm>
-          <a:prstGeom prst="rect">
-            <a:avLst/>
-          </a:prstGeom>
         </p:spPr>
-      </p:pic>
+        <p:txBody>
+          <a:bodyPr>
+            <a:normAutofit fontScale="85000" lnSpcReduction="20000"/>
+          </a:bodyPr>
+          <a:lstStyle/>
+          <a:p>
+            <a:r>
+              <a:rPr lang="en-US" dirty="0"/>
+              <a:t>1) Which state is startup business friendly (low tax)? – </a:t>
+            </a:r>
+            <a:r>
+              <a:rPr lang="en-US" dirty="0">
+                <a:solidFill>
+                  <a:srgbClr val="FF0000"/>
+                </a:solidFill>
+              </a:rPr>
+              <a:t>Tax rate and living cost (housing) </a:t>
+            </a:r>
+            <a:r>
+              <a:rPr lang="en-US" dirty="0"/>
+              <a:t>--  (Extra goal) </a:t>
+            </a:r>
+            <a:r>
+              <a:rPr lang="en-US" dirty="0">
+                <a:sym typeface="Wingdings" panose="05000000000000000000" pitchFamily="2" charset="2"/>
+              </a:rPr>
+              <a:t> </a:t>
+            </a:r>
+            <a:r>
+              <a:rPr lang="en-US" dirty="0" err="1">
+                <a:sym typeface="Wingdings" panose="05000000000000000000" pitchFamily="2" charset="2"/>
+              </a:rPr>
+              <a:t>Bahar</a:t>
+            </a:r>
+            <a:endParaRPr lang="en-US" dirty="0"/>
+          </a:p>
+          <a:p>
+            <a:r>
+              <a:rPr lang="en-US" dirty="0"/>
+              <a:t>2) Which state with low </a:t>
+            </a:r>
+            <a:r>
+              <a:rPr lang="en-US" dirty="0">
+                <a:solidFill>
+                  <a:srgbClr val="FF0000"/>
+                </a:solidFill>
+              </a:rPr>
+              <a:t>tax rate</a:t>
+            </a:r>
+            <a:r>
+              <a:rPr lang="en-US" dirty="0"/>
+              <a:t>, attracts employee? (Main goal) </a:t>
+            </a:r>
+            <a:r>
+              <a:rPr lang="en-US" dirty="0">
+                <a:sym typeface="Wingdings" panose="05000000000000000000" pitchFamily="2" charset="2"/>
+              </a:rPr>
+              <a:t> </a:t>
+            </a:r>
+            <a:r>
+              <a:rPr lang="en-US" dirty="0" err="1">
+                <a:sym typeface="Wingdings" panose="05000000000000000000" pitchFamily="2" charset="2"/>
+              </a:rPr>
+              <a:t>Bahar</a:t>
+            </a:r>
+            <a:endParaRPr lang="en-US" dirty="0"/>
+          </a:p>
+          <a:p>
+            <a:r>
+              <a:rPr lang="en-US" dirty="0"/>
+              <a:t>3) Warmer </a:t>
+            </a:r>
+            <a:r>
+              <a:rPr lang="en-US" dirty="0">
+                <a:solidFill>
+                  <a:srgbClr val="FF0000"/>
+                </a:solidFill>
+              </a:rPr>
+              <a:t>climate</a:t>
+            </a:r>
+            <a:r>
+              <a:rPr lang="en-US" dirty="0"/>
+              <a:t> preferred state to live in, correlate to home price? (Main goal) </a:t>
+            </a:r>
+            <a:r>
+              <a:rPr lang="en-US" dirty="0">
+                <a:sym typeface="Wingdings" panose="05000000000000000000" pitchFamily="2" charset="2"/>
+              </a:rPr>
+              <a:t> Prakash</a:t>
+            </a:r>
+            <a:r>
+              <a:rPr lang="en-US" dirty="0"/>
+              <a:t> </a:t>
+            </a:r>
+          </a:p>
+          <a:p>
+            <a:r>
+              <a:rPr lang="en-US" dirty="0"/>
+              <a:t>4) Lower </a:t>
+            </a:r>
+            <a:r>
+              <a:rPr lang="en-US" dirty="0">
+                <a:solidFill>
+                  <a:srgbClr val="FF0000"/>
+                </a:solidFill>
+              </a:rPr>
+              <a:t>unemployment</a:t>
+            </a:r>
+            <a:r>
+              <a:rPr lang="en-US" dirty="0"/>
+              <a:t> correlated to </a:t>
+            </a:r>
+            <a:r>
+              <a:rPr lang="en-US" dirty="0">
+                <a:solidFill>
+                  <a:srgbClr val="FF0000"/>
+                </a:solidFill>
+              </a:rPr>
+              <a:t>crime rate</a:t>
+            </a:r>
+            <a:r>
+              <a:rPr lang="en-US" dirty="0"/>
+              <a:t>? (Main goal) </a:t>
+            </a:r>
+            <a:r>
+              <a:rPr lang="en-US" dirty="0">
+                <a:sym typeface="Wingdings" panose="05000000000000000000" pitchFamily="2" charset="2"/>
+              </a:rPr>
+              <a:t></a:t>
+            </a:r>
+            <a:r>
+              <a:rPr lang="en-US" dirty="0"/>
+              <a:t> Catherine</a:t>
+            </a:r>
+          </a:p>
+          <a:p>
+            <a:r>
+              <a:rPr lang="en-US" dirty="0"/>
+              <a:t>5) Higher </a:t>
+            </a:r>
+            <a:r>
+              <a:rPr lang="en-US" dirty="0">
+                <a:solidFill>
+                  <a:srgbClr val="FF0000"/>
+                </a:solidFill>
+              </a:rPr>
+              <a:t>salary</a:t>
+            </a:r>
+            <a:r>
+              <a:rPr lang="en-US" dirty="0"/>
+              <a:t> states are the preferred ones? (Main goal) </a:t>
+            </a:r>
+            <a:r>
+              <a:rPr lang="en-US" dirty="0">
+                <a:sym typeface="Wingdings" panose="05000000000000000000" pitchFamily="2" charset="2"/>
+              </a:rPr>
+              <a:t> Molly</a:t>
+            </a:r>
+            <a:endParaRPr lang="en-US" dirty="0"/>
+          </a:p>
+          <a:p>
+            <a:r>
+              <a:rPr lang="en-US" dirty="0"/>
+              <a:t>4) Definition of the best state to live in (our criteria)?</a:t>
+            </a:r>
+          </a:p>
+          <a:p>
+            <a:pPr lvl="1"/>
+            <a:r>
+              <a:rPr lang="en-US" dirty="0"/>
+              <a:t>Modest to high salary range</a:t>
+            </a:r>
+          </a:p>
+          <a:p>
+            <a:pPr lvl="1"/>
+            <a:r>
+              <a:rPr lang="en-US" dirty="0"/>
+              <a:t>Low crime and unemployment rate</a:t>
+            </a:r>
+          </a:p>
+          <a:p>
+            <a:pPr lvl="1"/>
+            <a:r>
+              <a:rPr lang="en-US" dirty="0"/>
+              <a:t>Climate with no hurricane, tornado, snow blizzard, </a:t>
+            </a:r>
+          </a:p>
+          <a:p>
+            <a:pPr lvl="1"/>
+            <a:endParaRPr lang="en-US" dirty="0"/>
+          </a:p>
+          <a:p>
+            <a:pPr lvl="1"/>
+            <a:endParaRPr lang="en-US" dirty="0"/>
+          </a:p>
+          <a:p>
+            <a:endParaRPr lang="en-US" dirty="0"/>
+          </a:p>
+        </p:txBody>
+      </p:sp>
     </p:spTree>
     <p:extLst>
       <p:ext uri="{BB962C8B-B14F-4D97-AF65-F5344CB8AC3E}">
-        <p14:creationId xmlns:p14="http://schemas.microsoft.com/office/powerpoint/2010/main" val="1660539235"/>
+        <p14:creationId xmlns:p14="http://schemas.microsoft.com/office/powerpoint/2010/main" val="635664139"/>
       </p:ext>
     </p:extLst>
   </p:cSld>
@@ -10515,117 +10737,54 @@
         </p:nvSpPr>
         <p:spPr/>
         <p:txBody>
-          <a:bodyPr/>
-          <a:lstStyle/>
-          <a:p>
-            <a:r>
-              <a:rPr lang="en-US" dirty="0"/>
-              <a:t>Coding Rules</a:t>
-            </a:r>
-          </a:p>
-        </p:txBody>
-      </p:sp>
-      <p:sp>
-        <p:nvSpPr>
-          <p:cNvPr id="3" name="Content Placeholder 2">
+          <a:bodyPr>
+            <a:normAutofit/>
+          </a:bodyPr>
+          <a:lstStyle/>
+          <a:p>
+            <a:r>
+              <a:rPr lang="en-US" dirty="0"/>
+              <a:t>Raw data files location</a:t>
+            </a:r>
+          </a:p>
+        </p:txBody>
+      </p:sp>
+      <p:pic>
+        <p:nvPicPr>
+          <p:cNvPr id="4" name="Content Placeholder 3">
             <a:extLst>
               <a:ext uri="{FF2B5EF4-FFF2-40B4-BE49-F238E27FC236}">
-                <a16:creationId xmlns:a16="http://schemas.microsoft.com/office/drawing/2014/main" id="{F5BE9D4D-949C-4037-9F87-16CDE0EE0466}"/>
+                <a16:creationId xmlns:a16="http://schemas.microsoft.com/office/drawing/2014/main" id="{D51BA1BF-2794-4BC3-AB3C-4FCE473C5999}"/>
               </a:ext>
             </a:extLst>
           </p:cNvPr>
-          <p:cNvSpPr>
-            <a:spLocks noGrp="1"/>
-          </p:cNvSpPr>
+          <p:cNvPicPr>
+            <a:picLocks noGrp="1" noChangeAspect="1"/>
+          </p:cNvPicPr>
           <p:nvPr>
             <p:ph idx="1"/>
           </p:nvPr>
-        </p:nvSpPr>
-        <p:spPr/>
-        <p:txBody>
-          <a:bodyPr>
-            <a:normAutofit fontScale="92500" lnSpcReduction="10000"/>
-          </a:bodyPr>
-          <a:lstStyle/>
-          <a:p>
-            <a:r>
-              <a:rPr lang="en-US" dirty="0"/>
-              <a:t>Upload scripts to Script folder</a:t>
-            </a:r>
-          </a:p>
-          <a:p>
-            <a:r>
-              <a:rPr lang="en-US" dirty="0"/>
-              <a:t>Label/ Comment on every code line to help other understand quickly. Explain briefly if needed</a:t>
-            </a:r>
-          </a:p>
-          <a:p>
-            <a:r>
-              <a:rPr lang="en-US" dirty="0"/>
-              <a:t>Label plot(s) well with legend, title and axes</a:t>
-            </a:r>
-          </a:p>
-          <a:p>
-            <a:r>
-              <a:rPr lang="en-US" dirty="0"/>
-              <a:t>Append _</a:t>
-            </a:r>
-            <a:r>
-              <a:rPr lang="en-US" dirty="0" err="1"/>
-              <a:t>lst</a:t>
-            </a:r>
-            <a:r>
-              <a:rPr lang="en-US" dirty="0"/>
-              <a:t>, _df and </a:t>
-            </a:r>
-            <a:r>
-              <a:rPr lang="en-US" dirty="0" err="1"/>
-              <a:t>etc</a:t>
-            </a:r>
-            <a:r>
-              <a:rPr lang="en-US" dirty="0"/>
-              <a:t> when defining lists, dictionaries, data frames. E.g. </a:t>
-            </a:r>
-            <a:r>
-              <a:rPr lang="en-US" dirty="0" err="1"/>
-              <a:t>mylist_lst</a:t>
-            </a:r>
-            <a:r>
-              <a:rPr lang="en-US" dirty="0"/>
-              <a:t>, </a:t>
-            </a:r>
-            <a:r>
-              <a:rPr lang="en-US" dirty="0" err="1"/>
-              <a:t>myplot_plt</a:t>
-            </a:r>
-            <a:endParaRPr lang="en-US" dirty="0"/>
-          </a:p>
-          <a:p>
-            <a:r>
-              <a:rPr lang="en-US" dirty="0"/>
-              <a:t>Backup files locally prior to modification for retrieval</a:t>
-            </a:r>
-          </a:p>
-          <a:p>
-            <a:r>
-              <a:rPr lang="en-US" dirty="0"/>
-              <a:t>Attempt to solve 1</a:t>
-            </a:r>
-            <a:r>
-              <a:rPr lang="en-US" baseline="30000" dirty="0"/>
-              <a:t>st</a:t>
-            </a:r>
-            <a:r>
-              <a:rPr lang="en-US" dirty="0"/>
-              <a:t> by yourself, if help needed, slack out</a:t>
-            </a:r>
-          </a:p>
-        </p:txBody>
-      </p:sp>
+        </p:nvPicPr>
+        <p:blipFill>
+          <a:blip r:embed="rId2"/>
+          <a:stretch>
+            <a:fillRect/>
+          </a:stretch>
+        </p:blipFill>
+        <p:spPr>
+          <a:xfrm>
+            <a:off x="2038350" y="2878138"/>
+            <a:ext cx="8115300" cy="2676525"/>
+          </a:xfrm>
+          <a:prstGeom prst="rect">
+            <a:avLst/>
+          </a:prstGeom>
+        </p:spPr>
+      </p:pic>
     </p:spTree>
     <p:extLst>
       <p:ext uri="{BB962C8B-B14F-4D97-AF65-F5344CB8AC3E}">
-        <p14:creationId xmlns:p14="http://schemas.microsoft.com/office/powerpoint/2010/main" val="2409190503"/>
+        <p14:creationId xmlns:p14="http://schemas.microsoft.com/office/powerpoint/2010/main" val="1660539235"/>
       </p:ext>
     </p:extLst>
   </p:cSld>

</xml_diff>

<commit_message>
Upload Climate Analysis script and saved plots. Update Working_Presentation Climate question
</commit_message>
<xml_diff>
--- a/Working_Presentation.pptx
+++ b/Working_Presentation.pptx
@@ -458,7 +458,7 @@
             <a:fld id="{B61BEF0D-F0BB-DE4B-95CE-6DB70DBA9567}" type="datetimeFigureOut">
               <a:rPr lang="en-US" dirty="0"/>
               <a:pPr/>
-              <a:t>7/7/2019</a:t>
+              <a:t>7/8/2019</a:t>
             </a:fld>
             <a:endParaRPr lang="en-US" dirty="0"/>
           </a:p>
@@ -779,7 +779,7 @@
             <a:fld id="{B61BEF0D-F0BB-DE4B-95CE-6DB70DBA9567}" type="datetimeFigureOut">
               <a:rPr lang="en-US" dirty="0"/>
               <a:pPr/>
-              <a:t>7/7/2019</a:t>
+              <a:t>7/8/2019</a:t>
             </a:fld>
             <a:endParaRPr lang="en-US" dirty="0"/>
           </a:p>
@@ -1024,7 +1024,7 @@
             <a:fld id="{B61BEF0D-F0BB-DE4B-95CE-6DB70DBA9567}" type="datetimeFigureOut">
               <a:rPr lang="en-US" dirty="0"/>
               <a:pPr/>
-              <a:t>7/7/2019</a:t>
+              <a:t>7/8/2019</a:t>
             </a:fld>
             <a:endParaRPr lang="en-US" dirty="0"/>
           </a:p>
@@ -1360,7 +1360,7 @@
             <a:fld id="{B61BEF0D-F0BB-DE4B-95CE-6DB70DBA9567}" type="datetimeFigureOut">
               <a:rPr lang="en-US" dirty="0"/>
               <a:pPr/>
-              <a:t>7/7/2019</a:t>
+              <a:t>7/8/2019</a:t>
             </a:fld>
             <a:endParaRPr lang="en-US" dirty="0"/>
           </a:p>
@@ -1704,7 +1704,7 @@
             <a:fld id="{B61BEF0D-F0BB-DE4B-95CE-6DB70DBA9567}" type="datetimeFigureOut">
               <a:rPr lang="en-US" dirty="0"/>
               <a:pPr/>
-              <a:t>7/7/2019</a:t>
+              <a:t>7/8/2019</a:t>
             </a:fld>
             <a:endParaRPr lang="en-US" dirty="0"/>
           </a:p>
@@ -2075,7 +2075,7 @@
             <a:fld id="{B61BEF0D-F0BB-DE4B-95CE-6DB70DBA9567}" type="datetimeFigureOut">
               <a:rPr lang="en-US" dirty="0"/>
               <a:pPr/>
-              <a:t>7/7/2019</a:t>
+              <a:t>7/8/2019</a:t>
             </a:fld>
             <a:endParaRPr lang="en-US" dirty="0"/>
           </a:p>
@@ -2542,7 +2542,7 @@
             <a:fld id="{B61BEF0D-F0BB-DE4B-95CE-6DB70DBA9567}" type="datetimeFigureOut">
               <a:rPr lang="en-US" dirty="0"/>
               <a:pPr/>
-              <a:t>7/7/2019</a:t>
+              <a:t>7/8/2019</a:t>
             </a:fld>
             <a:endParaRPr lang="en-US" dirty="0"/>
           </a:p>
@@ -2744,7 +2744,7 @@
             <a:fld id="{B61BEF0D-F0BB-DE4B-95CE-6DB70DBA9567}" type="datetimeFigureOut">
               <a:rPr lang="en-US" dirty="0"/>
               <a:pPr/>
-              <a:t>7/7/2019</a:t>
+              <a:t>7/8/2019</a:t>
             </a:fld>
             <a:endParaRPr lang="en-US" dirty="0"/>
           </a:p>
@@ -2952,7 +2952,7 @@
             <a:fld id="{B61BEF0D-F0BB-DE4B-95CE-6DB70DBA9567}" type="datetimeFigureOut">
               <a:rPr lang="en-US" dirty="0"/>
               <a:pPr/>
-              <a:t>7/7/2019</a:t>
+              <a:t>7/8/2019</a:t>
             </a:fld>
             <a:endParaRPr lang="en-US" dirty="0"/>
           </a:p>
@@ -3180,7 +3180,7 @@
           <a:p>
             <a:fld id="{52647F38-B617-4D2F-AE0A-013F0C4D2C57}" type="datetimeFigureOut">
               <a:rPr lang="en-US" dirty="0"/>
-              <a:t>7/7/2019</a:t>
+              <a:t>7/8/2019</a:t>
             </a:fld>
             <a:endParaRPr lang="en-US" dirty="0"/>
           </a:p>
@@ -3424,7 +3424,7 @@
             <a:fld id="{B61BEF0D-F0BB-DE4B-95CE-6DB70DBA9567}" type="datetimeFigureOut">
               <a:rPr lang="en-US" dirty="0"/>
               <a:pPr/>
-              <a:t>7/7/2019</a:t>
+              <a:t>7/8/2019</a:t>
             </a:fld>
             <a:endParaRPr lang="en-US" dirty="0"/>
           </a:p>
@@ -3718,7 +3718,7 @@
           <a:p>
             <a:fld id="{05BFA754-D5C3-4E66-96A6-867B257F58DC}" type="datetimeFigureOut">
               <a:rPr lang="en-US" dirty="0"/>
-              <a:t>7/7/2019</a:t>
+              <a:t>7/8/2019</a:t>
             </a:fld>
             <a:endParaRPr lang="en-US" dirty="0"/>
           </a:p>
@@ -4108,7 +4108,7 @@
             <a:fld id="{B61BEF0D-F0BB-DE4B-95CE-6DB70DBA9567}" type="datetimeFigureOut">
               <a:rPr lang="en-US" dirty="0"/>
               <a:pPr/>
-              <a:t>7/7/2019</a:t>
+              <a:t>7/8/2019</a:t>
             </a:fld>
             <a:endParaRPr lang="en-US" dirty="0"/>
           </a:p>
@@ -4254,7 +4254,7 @@
             <a:fld id="{B61BEF0D-F0BB-DE4B-95CE-6DB70DBA9567}" type="datetimeFigureOut">
               <a:rPr lang="en-US" dirty="0"/>
               <a:pPr/>
-              <a:t>7/7/2019</a:t>
+              <a:t>7/8/2019</a:t>
             </a:fld>
             <a:endParaRPr lang="en-US" dirty="0"/>
           </a:p>
@@ -4377,7 +4377,7 @@
             <a:fld id="{B61BEF0D-F0BB-DE4B-95CE-6DB70DBA9567}" type="datetimeFigureOut">
               <a:rPr lang="en-US" dirty="0"/>
               <a:pPr/>
-              <a:t>7/7/2019</a:t>
+              <a:t>7/8/2019</a:t>
             </a:fld>
             <a:endParaRPr lang="en-US" dirty="0"/>
           </a:p>
@@ -4629,7 +4629,7 @@
             <a:fld id="{B61BEF0D-F0BB-DE4B-95CE-6DB70DBA9567}" type="datetimeFigureOut">
               <a:rPr lang="en-US" dirty="0"/>
               <a:pPr/>
-              <a:t>7/7/2019</a:t>
+              <a:t>7/8/2019</a:t>
             </a:fld>
             <a:endParaRPr lang="en-US" dirty="0"/>
           </a:p>
@@ -4941,7 +4941,7 @@
             <a:fld id="{B61BEF0D-F0BB-DE4B-95CE-6DB70DBA9567}" type="datetimeFigureOut">
               <a:rPr lang="en-US" dirty="0"/>
               <a:pPr/>
-              <a:t>7/7/2019</a:t>
+              <a:t>7/8/2019</a:t>
             </a:fld>
             <a:endParaRPr lang="en-US" dirty="0"/>
           </a:p>
@@ -5289,7 +5289,7 @@
             <a:fld id="{B61BEF0D-F0BB-DE4B-95CE-6DB70DBA9567}" type="datetimeFigureOut">
               <a:rPr lang="en-US" dirty="0"/>
               <a:pPr/>
-              <a:t>7/7/2019</a:t>
+              <a:t>7/8/2019</a:t>
             </a:fld>
             <a:endParaRPr lang="en-US" dirty="0"/>
           </a:p>
@@ -7099,7 +7099,15 @@
             </a:r>
             <a:r>
               <a:rPr lang="en-US" dirty="0"/>
-              <a:t> preferred state to live in, correlate to home price?</a:t>
+              <a:t> preferred state to live in, correlate </a:t>
+            </a:r>
+            <a:r>
+              <a:rPr lang="en-US"/>
+              <a:t>to higher home </a:t>
+            </a:r>
+            <a:r>
+              <a:rPr lang="en-US" dirty="0"/>
+              <a:t>price?</a:t>
             </a:r>
           </a:p>
           <a:p>

</xml_diff>

<commit_message>
Upload Climate Analysis script and saved plots. Update Working_Presentation with Climate analysis
</commit_message>
<xml_diff>
--- a/Working_Presentation.pptx
+++ b/Working_Presentation.pptx
@@ -20,6 +20,8 @@
     <p:sldId id="265" r:id="rId14"/>
     <p:sldId id="266" r:id="rId15"/>
     <p:sldId id="267" r:id="rId16"/>
+    <p:sldId id="271" r:id="rId17"/>
+    <p:sldId id="272" r:id="rId18"/>
   </p:sldIdLst>
   <p:sldSz cx="12192000" cy="6858000"/>
   <p:notesSz cx="6858000" cy="9144000"/>
@@ -7059,7 +7061,7 @@
           <a:p>
             <a:r>
               <a:rPr lang="en-US" dirty="0"/>
-              <a:t>Climate - Prakash</a:t>
+              <a:t>Climate – Prakash</a:t>
             </a:r>
           </a:p>
         </p:txBody>
@@ -7080,9 +7082,390 @@
             <p:ph idx="1"/>
           </p:nvPr>
         </p:nvSpPr>
+        <p:spPr>
+          <a:xfrm>
+            <a:off x="1295400" y="2556932"/>
+            <a:ext cx="9967545" cy="1258192"/>
+          </a:xfrm>
+        </p:spPr>
+        <p:txBody>
+          <a:bodyPr>
+            <a:normAutofit fontScale="70000" lnSpcReduction="20000"/>
+          </a:bodyPr>
+          <a:lstStyle/>
+          <a:p>
+            <a:r>
+              <a:rPr lang="en-US" dirty="0"/>
+              <a:t>Dataset challenges were,</a:t>
+            </a:r>
+          </a:p>
+          <a:p>
+            <a:pPr lvl="1"/>
+            <a:r>
+              <a:rPr lang="en-US" i="1" dirty="0"/>
+              <a:t>Obtaining the 2018 data, hard to find the latest. Mostly were up to 2010 </a:t>
+            </a:r>
+          </a:p>
+          <a:p>
+            <a:pPr lvl="1"/>
+            <a:r>
+              <a:rPr lang="en-US" i="1" dirty="0"/>
+              <a:t>Limited states with climate data for “2018” – refer to Geo Map figure</a:t>
+            </a:r>
+          </a:p>
+          <a:p>
+            <a:pPr lvl="1"/>
+            <a:r>
+              <a:rPr lang="en-US" i="1" dirty="0"/>
+              <a:t>Some states have wider temperature spread – refer to Temperature boxplot </a:t>
+            </a:r>
+          </a:p>
+          <a:p>
+            <a:pPr lvl="1"/>
+            <a:endParaRPr lang="en-US" i="1" dirty="0"/>
+          </a:p>
+          <a:p>
+            <a:pPr lvl="1"/>
+            <a:endParaRPr lang="en-US" i="1" dirty="0"/>
+          </a:p>
+        </p:txBody>
+      </p:sp>
+      <p:pic>
+        <p:nvPicPr>
+          <p:cNvPr id="5" name="Picture 4" descr="A screenshot of a computer&#10;&#10;Description automatically generated">
+            <a:extLst>
+              <a:ext uri="{FF2B5EF4-FFF2-40B4-BE49-F238E27FC236}">
+                <a16:creationId xmlns:a16="http://schemas.microsoft.com/office/drawing/2014/main" id="{79D8BE27-0A75-404F-B08B-8A2E6976194C}"/>
+              </a:ext>
+            </a:extLst>
+          </p:cNvPr>
+          <p:cNvPicPr>
+            <a:picLocks noChangeAspect="1"/>
+          </p:cNvPicPr>
+          <p:nvPr/>
+        </p:nvPicPr>
+        <p:blipFill>
+          <a:blip r:embed="rId2"/>
+          <a:stretch>
+            <a:fillRect/>
+          </a:stretch>
+        </p:blipFill>
+        <p:spPr>
+          <a:xfrm>
+            <a:off x="764929" y="3815124"/>
+            <a:ext cx="5512558" cy="2362525"/>
+          </a:xfrm>
+          <a:prstGeom prst="rect">
+            <a:avLst/>
+          </a:prstGeom>
+        </p:spPr>
+      </p:pic>
+      <p:pic>
+        <p:nvPicPr>
+          <p:cNvPr id="7" name="Picture 6" descr="A picture containing text, map&#10;&#10;Description automatically generated">
+            <a:extLst>
+              <a:ext uri="{FF2B5EF4-FFF2-40B4-BE49-F238E27FC236}">
+                <a16:creationId xmlns:a16="http://schemas.microsoft.com/office/drawing/2014/main" id="{741B7D40-59D5-4388-9ED2-D7BC2EDC9766}"/>
+              </a:ext>
+            </a:extLst>
+          </p:cNvPr>
+          <p:cNvPicPr>
+            <a:picLocks noChangeAspect="1"/>
+          </p:cNvPicPr>
+          <p:nvPr/>
+        </p:nvPicPr>
+        <p:blipFill>
+          <a:blip r:embed="rId3"/>
+          <a:stretch>
+            <a:fillRect/>
+          </a:stretch>
+        </p:blipFill>
+        <p:spPr>
+          <a:xfrm>
+            <a:off x="6277487" y="3815124"/>
+            <a:ext cx="5275707" cy="2273864"/>
+          </a:xfrm>
+          <a:prstGeom prst="rect">
+            <a:avLst/>
+          </a:prstGeom>
+        </p:spPr>
+      </p:pic>
+      <p:sp>
+        <p:nvSpPr>
+          <p:cNvPr id="8" name="Oval 7">
+            <a:extLst>
+              <a:ext uri="{FF2B5EF4-FFF2-40B4-BE49-F238E27FC236}">
+                <a16:creationId xmlns:a16="http://schemas.microsoft.com/office/drawing/2014/main" id="{02B66A99-1F1F-4C8F-BEA2-44D493D521BF}"/>
+              </a:ext>
+            </a:extLst>
+          </p:cNvPr>
+          <p:cNvSpPr/>
+          <p:nvPr/>
+        </p:nvSpPr>
+        <p:spPr>
+          <a:xfrm>
+            <a:off x="1521229" y="4297680"/>
+            <a:ext cx="282633" cy="1138844"/>
+          </a:xfrm>
+          <a:prstGeom prst="ellipse">
+            <a:avLst/>
+          </a:prstGeom>
+          <a:noFill/>
+          <a:ln>
+            <a:solidFill>
+              <a:srgbClr val="FF0000"/>
+            </a:solidFill>
+          </a:ln>
+        </p:spPr>
+        <p:style>
+          <a:lnRef idx="2">
+            <a:schemeClr val="accent1">
+              <a:shade val="50000"/>
+            </a:schemeClr>
+          </a:lnRef>
+          <a:fillRef idx="1">
+            <a:schemeClr val="accent1"/>
+          </a:fillRef>
+          <a:effectRef idx="0">
+            <a:schemeClr val="accent1"/>
+          </a:effectRef>
+          <a:fontRef idx="minor">
+            <a:schemeClr val="lt1"/>
+          </a:fontRef>
+        </p:style>
+        <p:txBody>
+          <a:bodyPr rtlCol="0" anchor="ctr"/>
+          <a:lstStyle/>
+          <a:p>
+            <a:pPr algn="ctr"/>
+            <a:endParaRPr lang="en-US"/>
+          </a:p>
+        </p:txBody>
+      </p:sp>
+    </p:spTree>
+    <p:extLst>
+      <p:ext uri="{BB962C8B-B14F-4D97-AF65-F5344CB8AC3E}">
+        <p14:creationId xmlns:p14="http://schemas.microsoft.com/office/powerpoint/2010/main" val="4136999629"/>
+      </p:ext>
+    </p:extLst>
+  </p:cSld>
+  <p:clrMapOvr>
+    <a:masterClrMapping/>
+  </p:clrMapOvr>
+</p:sld>
+</file>
+
+<file path=ppt/slides/slide16.xml><?xml version="1.0" encoding="utf-8"?>
+<p:sld xmlns:a="http://schemas.openxmlformats.org/drawingml/2006/main" xmlns:r="http://schemas.openxmlformats.org/officeDocument/2006/relationships" xmlns:p="http://schemas.openxmlformats.org/presentationml/2006/main">
+  <p:cSld>
+    <p:spTree>
+      <p:nvGrpSpPr>
+        <p:cNvPr id="1" name=""/>
+        <p:cNvGrpSpPr/>
+        <p:nvPr/>
+      </p:nvGrpSpPr>
+      <p:grpSpPr>
+        <a:xfrm>
+          <a:off x="0" y="0"/>
+          <a:ext cx="0" cy="0"/>
+          <a:chOff x="0" y="0"/>
+          <a:chExt cx="0" cy="0"/>
+        </a:xfrm>
+      </p:grpSpPr>
+      <p:sp>
+        <p:nvSpPr>
+          <p:cNvPr id="2" name="Title 1">
+            <a:extLst>
+              <a:ext uri="{FF2B5EF4-FFF2-40B4-BE49-F238E27FC236}">
+                <a16:creationId xmlns:a16="http://schemas.microsoft.com/office/drawing/2014/main" id="{1917A588-6B43-4326-8CEE-B31FA8CC4FDB}"/>
+              </a:ext>
+            </a:extLst>
+          </p:cNvPr>
+          <p:cNvSpPr>
+            <a:spLocks noGrp="1"/>
+          </p:cNvSpPr>
+          <p:nvPr>
+            <p:ph type="title"/>
+          </p:nvPr>
+        </p:nvSpPr>
         <p:spPr/>
         <p:txBody>
           <a:bodyPr/>
+          <a:lstStyle/>
+          <a:p>
+            <a:r>
+              <a:rPr lang="en-US" dirty="0"/>
+              <a:t>Climate – Prakash (</a:t>
+            </a:r>
+            <a:r>
+              <a:rPr lang="en-US" dirty="0" err="1"/>
+              <a:t>con’t</a:t>
+            </a:r>
+            <a:r>
+              <a:rPr lang="en-US" dirty="0"/>
+              <a:t>)</a:t>
+            </a:r>
+          </a:p>
+        </p:txBody>
+      </p:sp>
+      <p:sp>
+        <p:nvSpPr>
+          <p:cNvPr id="3" name="Content Placeholder 2">
+            <a:extLst>
+              <a:ext uri="{FF2B5EF4-FFF2-40B4-BE49-F238E27FC236}">
+                <a16:creationId xmlns:a16="http://schemas.microsoft.com/office/drawing/2014/main" id="{F5BE9D4D-949C-4037-9F87-16CDE0EE0466}"/>
+              </a:ext>
+            </a:extLst>
+          </p:cNvPr>
+          <p:cNvSpPr>
+            <a:spLocks noGrp="1"/>
+          </p:cNvSpPr>
+          <p:nvPr>
+            <p:ph idx="1"/>
+          </p:nvPr>
+        </p:nvSpPr>
+        <p:spPr>
+          <a:xfrm>
+            <a:off x="1129147" y="3624501"/>
+            <a:ext cx="2195944" cy="1183795"/>
+          </a:xfrm>
+        </p:spPr>
+        <p:txBody>
+          <a:bodyPr>
+            <a:normAutofit/>
+          </a:bodyPr>
+          <a:lstStyle/>
+          <a:p>
+            <a:r>
+              <a:rPr lang="en-US" sz="1600" dirty="0"/>
+              <a:t>Annual home price by State doesn’t have huge spread like climate’s. </a:t>
+            </a:r>
+            <a:endParaRPr lang="en-US" sz="1600" i="1" dirty="0"/>
+          </a:p>
+        </p:txBody>
+      </p:sp>
+      <p:pic>
+        <p:nvPicPr>
+          <p:cNvPr id="5" name="Picture 4" descr="A close up of a mans face&#10;&#10;Description automatically generated">
+            <a:extLst>
+              <a:ext uri="{FF2B5EF4-FFF2-40B4-BE49-F238E27FC236}">
+                <a16:creationId xmlns:a16="http://schemas.microsoft.com/office/drawing/2014/main" id="{062B4FCC-AECA-4C13-B383-65409235222B}"/>
+              </a:ext>
+            </a:extLst>
+          </p:cNvPr>
+          <p:cNvPicPr>
+            <a:picLocks noChangeAspect="1"/>
+          </p:cNvPicPr>
+          <p:nvPr/>
+        </p:nvPicPr>
+        <p:blipFill>
+          <a:blip r:embed="rId2"/>
+          <a:stretch>
+            <a:fillRect/>
+          </a:stretch>
+        </p:blipFill>
+        <p:spPr>
+          <a:xfrm>
+            <a:off x="3632708" y="2556931"/>
+            <a:ext cx="7744186" cy="3318937"/>
+          </a:xfrm>
+          <a:prstGeom prst="rect">
+            <a:avLst/>
+          </a:prstGeom>
+        </p:spPr>
+      </p:pic>
+    </p:spTree>
+    <p:extLst>
+      <p:ext uri="{BB962C8B-B14F-4D97-AF65-F5344CB8AC3E}">
+        <p14:creationId xmlns:p14="http://schemas.microsoft.com/office/powerpoint/2010/main" val="2698286698"/>
+      </p:ext>
+    </p:extLst>
+  </p:cSld>
+  <p:clrMapOvr>
+    <a:masterClrMapping/>
+  </p:clrMapOvr>
+</p:sld>
+</file>
+
+<file path=ppt/slides/slide17.xml><?xml version="1.0" encoding="utf-8"?>
+<p:sld xmlns:a="http://schemas.openxmlformats.org/drawingml/2006/main" xmlns:r="http://schemas.openxmlformats.org/officeDocument/2006/relationships" xmlns:p="http://schemas.openxmlformats.org/presentationml/2006/main">
+  <p:cSld>
+    <p:spTree>
+      <p:nvGrpSpPr>
+        <p:cNvPr id="1" name=""/>
+        <p:cNvGrpSpPr/>
+        <p:nvPr/>
+      </p:nvGrpSpPr>
+      <p:grpSpPr>
+        <a:xfrm>
+          <a:off x="0" y="0"/>
+          <a:ext cx="0" cy="0"/>
+          <a:chOff x="0" y="0"/>
+          <a:chExt cx="0" cy="0"/>
+        </a:xfrm>
+      </p:grpSpPr>
+      <p:sp>
+        <p:nvSpPr>
+          <p:cNvPr id="2" name="Title 1">
+            <a:extLst>
+              <a:ext uri="{FF2B5EF4-FFF2-40B4-BE49-F238E27FC236}">
+                <a16:creationId xmlns:a16="http://schemas.microsoft.com/office/drawing/2014/main" id="{1917A588-6B43-4326-8CEE-B31FA8CC4FDB}"/>
+              </a:ext>
+            </a:extLst>
+          </p:cNvPr>
+          <p:cNvSpPr>
+            <a:spLocks noGrp="1"/>
+          </p:cNvSpPr>
+          <p:nvPr>
+            <p:ph type="title"/>
+          </p:nvPr>
+        </p:nvSpPr>
+        <p:spPr/>
+        <p:txBody>
+          <a:bodyPr/>
+          <a:lstStyle/>
+          <a:p>
+            <a:r>
+              <a:rPr lang="en-US" dirty="0"/>
+              <a:t>Climate – Prakash (</a:t>
+            </a:r>
+            <a:r>
+              <a:rPr lang="en-US" dirty="0" err="1"/>
+              <a:t>con’t</a:t>
+            </a:r>
+            <a:r>
+              <a:rPr lang="en-US" dirty="0"/>
+              <a:t>)</a:t>
+            </a:r>
+          </a:p>
+        </p:txBody>
+      </p:sp>
+      <p:sp>
+        <p:nvSpPr>
+          <p:cNvPr id="3" name="Content Placeholder 2">
+            <a:extLst>
+              <a:ext uri="{FF2B5EF4-FFF2-40B4-BE49-F238E27FC236}">
+                <a16:creationId xmlns:a16="http://schemas.microsoft.com/office/drawing/2014/main" id="{F5BE9D4D-949C-4037-9F87-16CDE0EE0466}"/>
+              </a:ext>
+            </a:extLst>
+          </p:cNvPr>
+          <p:cNvSpPr>
+            <a:spLocks noGrp="1"/>
+          </p:cNvSpPr>
+          <p:nvPr>
+            <p:ph idx="1"/>
+          </p:nvPr>
+        </p:nvSpPr>
+        <p:spPr>
+          <a:xfrm>
+            <a:off x="1295401" y="2556933"/>
+            <a:ext cx="9601196" cy="1303867"/>
+          </a:xfrm>
+        </p:spPr>
+        <p:txBody>
+          <a:bodyPr>
+            <a:normAutofit fontScale="62500" lnSpcReduction="20000"/>
+          </a:bodyPr>
           <a:lstStyle/>
           <a:p>
             <a:r>
@@ -7099,29 +7482,136 @@
             </a:r>
             <a:r>
               <a:rPr lang="en-US" dirty="0"/>
-              <a:t> preferred state to live in, correlate </a:t>
-            </a:r>
-            <a:r>
-              <a:rPr lang="en-US"/>
-              <a:t>to higher home </a:t>
-            </a:r>
-            <a:r>
-              <a:rPr lang="en-US" dirty="0"/>
-              <a:t>price?</a:t>
-            </a:r>
-          </a:p>
-          <a:p>
+              <a:t> preferred state to live in, correlate to higher home price?</a:t>
+            </a:r>
+            <a:endParaRPr lang="en-US" i="1" dirty="0"/>
+          </a:p>
+          <a:p>
+            <a:pPr lvl="1"/>
             <a:r>
               <a:rPr lang="en-US" i="1" dirty="0"/>
-              <a:t>Write description/ observation and supporting plots (minimum 2) here</a:t>
-            </a:r>
-          </a:p>
-        </p:txBody>
-      </p:sp>
+              <a:t>There’s no obvious correlation for temperature and home price. Thus home prices in higher temperature state isn’t true based on this analysis.</a:t>
+            </a:r>
+          </a:p>
+          <a:p>
+            <a:pPr lvl="1"/>
+            <a:r>
+              <a:rPr lang="en-US" i="1" dirty="0"/>
+              <a:t>Same conclusion for Weighted Sum Analyzed states (see the left plot), the top 20 choice States( in red dots) are almost the same price range as the lower ranked States</a:t>
+            </a:r>
+          </a:p>
+          <a:p>
+            <a:pPr lvl="1"/>
+            <a:r>
+              <a:rPr lang="en-US" i="1" dirty="0"/>
+              <a:t>California came the 1</a:t>
+            </a:r>
+            <a:r>
+              <a:rPr lang="en-US" i="1" baseline="30000" dirty="0"/>
+              <a:t>st</a:t>
+            </a:r>
+            <a:r>
+              <a:rPr lang="en-US" i="1" dirty="0"/>
+              <a:t> in terms of climate (see table)</a:t>
+            </a:r>
+            <a:endParaRPr lang="en-US" dirty="0"/>
+          </a:p>
+        </p:txBody>
+      </p:sp>
+      <p:pic>
+        <p:nvPicPr>
+          <p:cNvPr id="13" name="Picture 12">
+            <a:extLst>
+              <a:ext uri="{FF2B5EF4-FFF2-40B4-BE49-F238E27FC236}">
+                <a16:creationId xmlns:a16="http://schemas.microsoft.com/office/drawing/2014/main" id="{A4045757-FE6B-4FD3-9C1B-E11C2A15257C}"/>
+              </a:ext>
+            </a:extLst>
+          </p:cNvPr>
+          <p:cNvPicPr>
+            <a:picLocks noChangeAspect="1"/>
+          </p:cNvPicPr>
+          <p:nvPr/>
+        </p:nvPicPr>
+        <p:blipFill>
+          <a:blip r:embed="rId2"/>
+          <a:stretch>
+            <a:fillRect/>
+          </a:stretch>
+        </p:blipFill>
+        <p:spPr>
+          <a:xfrm>
+            <a:off x="775852" y="3860800"/>
+            <a:ext cx="5291539" cy="2267803"/>
+          </a:xfrm>
+          <a:prstGeom prst="rect">
+            <a:avLst/>
+          </a:prstGeom>
+        </p:spPr>
+      </p:pic>
+      <p:pic>
+        <p:nvPicPr>
+          <p:cNvPr id="15" name="Picture 14" descr="A picture containing sky&#10;&#10;Description automatically generated">
+            <a:extLst>
+              <a:ext uri="{FF2B5EF4-FFF2-40B4-BE49-F238E27FC236}">
+                <a16:creationId xmlns:a16="http://schemas.microsoft.com/office/drawing/2014/main" id="{81044354-6CB7-4FC8-9A53-29FBAEE31529}"/>
+              </a:ext>
+            </a:extLst>
+          </p:cNvPr>
+          <p:cNvPicPr>
+            <a:picLocks noChangeAspect="1"/>
+          </p:cNvPicPr>
+          <p:nvPr/>
+        </p:nvPicPr>
+        <p:blipFill>
+          <a:blip r:embed="rId3"/>
+          <a:stretch>
+            <a:fillRect/>
+          </a:stretch>
+        </p:blipFill>
+        <p:spPr>
+          <a:xfrm>
+            <a:off x="6124611" y="3860800"/>
+            <a:ext cx="5291543" cy="2267804"/>
+          </a:xfrm>
+          <a:prstGeom prst="rect">
+            <a:avLst/>
+          </a:prstGeom>
+        </p:spPr>
+      </p:pic>
+      <p:pic>
+        <p:nvPicPr>
+          <p:cNvPr id="16" name="Picture 15">
+            <a:extLst>
+              <a:ext uri="{FF2B5EF4-FFF2-40B4-BE49-F238E27FC236}">
+                <a16:creationId xmlns:a16="http://schemas.microsoft.com/office/drawing/2014/main" id="{F7C3ADD3-2F36-4D9D-B803-BCCCA2FB7FBE}"/>
+              </a:ext>
+            </a:extLst>
+          </p:cNvPr>
+          <p:cNvPicPr>
+            <a:picLocks noChangeAspect="1"/>
+          </p:cNvPicPr>
+          <p:nvPr/>
+        </p:nvPicPr>
+        <p:blipFill>
+          <a:blip r:embed="rId4"/>
+          <a:stretch>
+            <a:fillRect/>
+          </a:stretch>
+        </p:blipFill>
+        <p:spPr>
+          <a:xfrm>
+            <a:off x="5648461" y="4131734"/>
+            <a:ext cx="837857" cy="1178040"/>
+          </a:xfrm>
+          <a:prstGeom prst="rect">
+            <a:avLst/>
+          </a:prstGeom>
+        </p:spPr>
+      </p:pic>
     </p:spTree>
     <p:extLst>
       <p:ext uri="{BB962C8B-B14F-4D97-AF65-F5344CB8AC3E}">
-        <p14:creationId xmlns:p14="http://schemas.microsoft.com/office/powerpoint/2010/main" val="4136999629"/>
+        <p14:creationId xmlns:p14="http://schemas.microsoft.com/office/powerpoint/2010/main" val="1615632251"/>
       </p:ext>
     </p:extLst>
   </p:cSld>
@@ -7748,7 +8238,7 @@
           <a:p>
             <a:r>
               <a:rPr lang="en-US" dirty="0"/>
-              <a:t>Supporting Datasets</a:t>
+              <a:t>Supporting 2018 Datasets</a:t>
             </a:r>
           </a:p>
         </p:txBody>
@@ -7767,7 +8257,7 @@
         </p:nvSpPr>
         <p:spPr>
           <a:xfrm>
-            <a:off x="5291503" y="2874670"/>
+            <a:off x="5291503" y="3518101"/>
             <a:ext cx="1608993" cy="1222131"/>
           </a:xfrm>
           <a:prstGeom prst="rect">
@@ -7816,7 +8306,7 @@
         </p:nvSpPr>
         <p:spPr>
           <a:xfrm>
-            <a:off x="7657393" y="2517544"/>
+            <a:off x="7491139" y="2693517"/>
             <a:ext cx="2262549" cy="1222131"/>
           </a:xfrm>
           <a:prstGeom prst="ellipse">
@@ -7865,7 +8355,7 @@
         </p:nvSpPr>
         <p:spPr>
           <a:xfrm>
-            <a:off x="2211253" y="4272246"/>
+            <a:off x="2610514" y="4129166"/>
             <a:ext cx="2262552" cy="1303866"/>
           </a:xfrm>
           <a:prstGeom prst="ellipse">
@@ -7914,7 +8404,7 @@
         </p:nvSpPr>
         <p:spPr>
           <a:xfrm>
-            <a:off x="2211253" y="2522853"/>
+            <a:off x="2473899" y="2693516"/>
             <a:ext cx="2262552" cy="1222131"/>
           </a:xfrm>
           <a:prstGeom prst="ellipse">
@@ -7963,7 +8453,7 @@
         </p:nvSpPr>
         <p:spPr>
           <a:xfrm>
-            <a:off x="7657392" y="4272246"/>
+            <a:off x="7649080" y="4129166"/>
             <a:ext cx="2262549" cy="1222131"/>
           </a:xfrm>
           <a:prstGeom prst="ellipse">
@@ -7995,190 +8485,6 @@
               <a:rPr lang="en-US" dirty="0"/>
               <a:t>Salary</a:t>
             </a:r>
-          </a:p>
-        </p:txBody>
-      </p:sp>
-      <p:sp>
-        <p:nvSpPr>
-          <p:cNvPr id="9" name="Arrow: Right 8">
-            <a:extLst>
-              <a:ext uri="{FF2B5EF4-FFF2-40B4-BE49-F238E27FC236}">
-                <a16:creationId xmlns:a16="http://schemas.microsoft.com/office/drawing/2014/main" id="{B669EA5E-408C-4E0E-8F0B-0E3A3E4AF818}"/>
-              </a:ext>
-            </a:extLst>
-          </p:cNvPr>
-          <p:cNvSpPr/>
-          <p:nvPr/>
-        </p:nvSpPr>
-        <p:spPr>
-          <a:xfrm rot="2105362">
-            <a:off x="4556521" y="3227476"/>
-            <a:ext cx="653560" cy="430822"/>
-          </a:xfrm>
-          <a:prstGeom prst="rightArrow">
-            <a:avLst/>
-          </a:prstGeom>
-        </p:spPr>
-        <p:style>
-          <a:lnRef idx="2">
-            <a:schemeClr val="accent1">
-              <a:shade val="50000"/>
-            </a:schemeClr>
-          </a:lnRef>
-          <a:fillRef idx="1">
-            <a:schemeClr val="accent1"/>
-          </a:fillRef>
-          <a:effectRef idx="0">
-            <a:schemeClr val="accent1"/>
-          </a:effectRef>
-          <a:fontRef idx="minor">
-            <a:schemeClr val="lt1"/>
-          </a:fontRef>
-        </p:style>
-        <p:txBody>
-          <a:bodyPr rtlCol="0" anchor="ctr"/>
-          <a:lstStyle/>
-          <a:p>
-            <a:pPr algn="ctr"/>
-            <a:endParaRPr lang="en-US"/>
-          </a:p>
-        </p:txBody>
-      </p:sp>
-      <p:sp>
-        <p:nvSpPr>
-          <p:cNvPr id="10" name="Arrow: Right 9">
-            <a:extLst>
-              <a:ext uri="{FF2B5EF4-FFF2-40B4-BE49-F238E27FC236}">
-                <a16:creationId xmlns:a16="http://schemas.microsoft.com/office/drawing/2014/main" id="{3268ED5A-38FA-4167-88E1-99E13B3B5A68}"/>
-              </a:ext>
-            </a:extLst>
-          </p:cNvPr>
-          <p:cNvSpPr/>
-          <p:nvPr/>
-        </p:nvSpPr>
-        <p:spPr>
-          <a:xfrm rot="12595974">
-            <a:off x="6979992" y="4171008"/>
-            <a:ext cx="653560" cy="430823"/>
-          </a:xfrm>
-          <a:prstGeom prst="rightArrow">
-            <a:avLst/>
-          </a:prstGeom>
-        </p:spPr>
-        <p:style>
-          <a:lnRef idx="2">
-            <a:schemeClr val="accent1">
-              <a:shade val="50000"/>
-            </a:schemeClr>
-          </a:lnRef>
-          <a:fillRef idx="1">
-            <a:schemeClr val="accent1"/>
-          </a:fillRef>
-          <a:effectRef idx="0">
-            <a:schemeClr val="accent1"/>
-          </a:effectRef>
-          <a:fontRef idx="minor">
-            <a:schemeClr val="lt1"/>
-          </a:fontRef>
-        </p:style>
-        <p:txBody>
-          <a:bodyPr rtlCol="0" anchor="ctr"/>
-          <a:lstStyle/>
-          <a:p>
-            <a:pPr algn="ctr"/>
-            <a:endParaRPr lang="en-US"/>
-          </a:p>
-        </p:txBody>
-      </p:sp>
-      <p:sp>
-        <p:nvSpPr>
-          <p:cNvPr id="11" name="Arrow: Right 10">
-            <a:extLst>
-              <a:ext uri="{FF2B5EF4-FFF2-40B4-BE49-F238E27FC236}">
-                <a16:creationId xmlns:a16="http://schemas.microsoft.com/office/drawing/2014/main" id="{863EC0E5-6E5A-4F45-9B1C-BD342541E908}"/>
-              </a:ext>
-            </a:extLst>
-          </p:cNvPr>
-          <p:cNvSpPr/>
-          <p:nvPr/>
-        </p:nvSpPr>
-        <p:spPr>
-          <a:xfrm rot="18872579">
-            <a:off x="4593516" y="4272601"/>
-            <a:ext cx="653560" cy="430823"/>
-          </a:xfrm>
-          <a:prstGeom prst="rightArrow">
-            <a:avLst/>
-          </a:prstGeom>
-        </p:spPr>
-        <p:style>
-          <a:lnRef idx="2">
-            <a:schemeClr val="accent1">
-              <a:shade val="50000"/>
-            </a:schemeClr>
-          </a:lnRef>
-          <a:fillRef idx="1">
-            <a:schemeClr val="accent1"/>
-          </a:fillRef>
-          <a:effectRef idx="0">
-            <a:schemeClr val="accent1"/>
-          </a:effectRef>
-          <a:fontRef idx="minor">
-            <a:schemeClr val="lt1"/>
-          </a:fontRef>
-        </p:style>
-        <p:txBody>
-          <a:bodyPr rtlCol="0" anchor="ctr"/>
-          <a:lstStyle/>
-          <a:p>
-            <a:pPr algn="ctr"/>
-            <a:endParaRPr lang="en-US"/>
-          </a:p>
-        </p:txBody>
-      </p:sp>
-      <p:sp>
-        <p:nvSpPr>
-          <p:cNvPr id="12" name="Arrow: Right 11">
-            <a:extLst>
-              <a:ext uri="{FF2B5EF4-FFF2-40B4-BE49-F238E27FC236}">
-                <a16:creationId xmlns:a16="http://schemas.microsoft.com/office/drawing/2014/main" id="{E608765A-C816-4FE0-9D92-2BD97FB8C902}"/>
-              </a:ext>
-            </a:extLst>
-          </p:cNvPr>
-          <p:cNvSpPr/>
-          <p:nvPr/>
-        </p:nvSpPr>
-        <p:spPr>
-          <a:xfrm rot="8985750">
-            <a:off x="6945456" y="3173597"/>
-            <a:ext cx="653560" cy="430823"/>
-          </a:xfrm>
-          <a:prstGeom prst="rightArrow">
-            <a:avLst/>
-          </a:prstGeom>
-        </p:spPr>
-        <p:style>
-          <a:lnRef idx="2">
-            <a:schemeClr val="accent1">
-              <a:shade val="50000"/>
-            </a:schemeClr>
-          </a:lnRef>
-          <a:fillRef idx="1">
-            <a:schemeClr val="accent1"/>
-          </a:fillRef>
-          <a:effectRef idx="0">
-            <a:schemeClr val="accent1"/>
-          </a:effectRef>
-          <a:fontRef idx="minor">
-            <a:schemeClr val="lt1"/>
-          </a:fontRef>
-        </p:style>
-        <p:txBody>
-          <a:bodyPr rtlCol="0" anchor="ctr"/>
-          <a:lstStyle/>
-          <a:p>
-            <a:pPr algn="ctr"/>
-            <a:endParaRPr lang="en-US"/>
           </a:p>
         </p:txBody>
       </p:sp>
@@ -8233,10 +8539,10 @@
       </p:sp>
       <p:sp>
         <p:nvSpPr>
-          <p:cNvPr id="14" name="Arrow: Right 13">
+          <p:cNvPr id="15" name="Oval 14">
             <a:extLst>
               <a:ext uri="{FF2B5EF4-FFF2-40B4-BE49-F238E27FC236}">
-                <a16:creationId xmlns:a16="http://schemas.microsoft.com/office/drawing/2014/main" id="{710BA0AC-1A55-4E4B-BAA9-F5E99A8A14DC}"/>
+                <a16:creationId xmlns:a16="http://schemas.microsoft.com/office/drawing/2014/main" id="{76474B55-D896-442F-B02F-1A9226A322EE}"/>
               </a:ext>
             </a:extLst>
           </p:cNvPr>
@@ -8244,11 +8550,290 @@
           <p:nvPr/>
         </p:nvSpPr>
         <p:spPr>
-          <a:xfrm rot="16200000">
-            <a:off x="5832850" y="4343690"/>
-            <a:ext cx="653560" cy="430822"/>
+          <a:xfrm>
+            <a:off x="4934323" y="2028667"/>
+            <a:ext cx="2262552" cy="1222131"/>
           </a:xfrm>
-          <a:prstGeom prst="rightArrow">
+          <a:prstGeom prst="ellipse">
+            <a:avLst/>
+          </a:prstGeom>
+        </p:spPr>
+        <p:style>
+          <a:lnRef idx="2">
+            <a:schemeClr val="accent1">
+              <a:shade val="50000"/>
+            </a:schemeClr>
+          </a:lnRef>
+          <a:fillRef idx="1">
+            <a:schemeClr val="accent1"/>
+          </a:fillRef>
+          <a:effectRef idx="0">
+            <a:schemeClr val="accent1"/>
+          </a:effectRef>
+          <a:fontRef idx="minor">
+            <a:schemeClr val="lt1"/>
+          </a:fontRef>
+        </p:style>
+        <p:txBody>
+          <a:bodyPr rtlCol="0" anchor="ctr"/>
+          <a:lstStyle/>
+          <a:p>
+            <a:pPr algn="ctr"/>
+            <a:r>
+              <a:rPr lang="en-US" dirty="0"/>
+              <a:t>Climate</a:t>
+            </a:r>
+          </a:p>
+        </p:txBody>
+      </p:sp>
+      <p:sp>
+        <p:nvSpPr>
+          <p:cNvPr id="3" name="Arrow: Down 2">
+            <a:extLst>
+              <a:ext uri="{FF2B5EF4-FFF2-40B4-BE49-F238E27FC236}">
+                <a16:creationId xmlns:a16="http://schemas.microsoft.com/office/drawing/2014/main" id="{900C73FB-047C-4A40-AD8B-96ADED6C32D7}"/>
+              </a:ext>
+            </a:extLst>
+          </p:cNvPr>
+          <p:cNvSpPr/>
+          <p:nvPr/>
+        </p:nvSpPr>
+        <p:spPr>
+          <a:xfrm>
+            <a:off x="6004329" y="3246907"/>
+            <a:ext cx="187488" cy="267303"/>
+          </a:xfrm>
+          <a:prstGeom prst="downArrow">
+            <a:avLst/>
+          </a:prstGeom>
+        </p:spPr>
+        <p:style>
+          <a:lnRef idx="2">
+            <a:schemeClr val="accent1">
+              <a:shade val="50000"/>
+            </a:schemeClr>
+          </a:lnRef>
+          <a:fillRef idx="1">
+            <a:schemeClr val="accent1"/>
+          </a:fillRef>
+          <a:effectRef idx="0">
+            <a:schemeClr val="accent1"/>
+          </a:effectRef>
+          <a:fontRef idx="minor">
+            <a:schemeClr val="lt1"/>
+          </a:fontRef>
+        </p:style>
+        <p:txBody>
+          <a:bodyPr rtlCol="0" anchor="ctr"/>
+          <a:lstStyle/>
+          <a:p>
+            <a:pPr algn="ctr"/>
+            <a:endParaRPr lang="en-US"/>
+          </a:p>
+        </p:txBody>
+      </p:sp>
+      <p:sp>
+        <p:nvSpPr>
+          <p:cNvPr id="16" name="Arrow: Down 15">
+            <a:extLst>
+              <a:ext uri="{FF2B5EF4-FFF2-40B4-BE49-F238E27FC236}">
+                <a16:creationId xmlns:a16="http://schemas.microsoft.com/office/drawing/2014/main" id="{D1CF0093-5ECD-469B-A44E-C8939E0EEFCB}"/>
+              </a:ext>
+            </a:extLst>
+          </p:cNvPr>
+          <p:cNvSpPr/>
+          <p:nvPr/>
+        </p:nvSpPr>
+        <p:spPr>
+          <a:xfrm rot="10491732">
+            <a:off x="6005146" y="4740231"/>
+            <a:ext cx="187488" cy="267303"/>
+          </a:xfrm>
+          <a:prstGeom prst="downArrow">
+            <a:avLst/>
+          </a:prstGeom>
+        </p:spPr>
+        <p:style>
+          <a:lnRef idx="2">
+            <a:schemeClr val="accent1">
+              <a:shade val="50000"/>
+            </a:schemeClr>
+          </a:lnRef>
+          <a:fillRef idx="1">
+            <a:schemeClr val="accent1"/>
+          </a:fillRef>
+          <a:effectRef idx="0">
+            <a:schemeClr val="accent1"/>
+          </a:effectRef>
+          <a:fontRef idx="minor">
+            <a:schemeClr val="lt1"/>
+          </a:fontRef>
+        </p:style>
+        <p:txBody>
+          <a:bodyPr rtlCol="0" anchor="ctr"/>
+          <a:lstStyle/>
+          <a:p>
+            <a:pPr algn="ctr"/>
+            <a:endParaRPr lang="en-US"/>
+          </a:p>
+        </p:txBody>
+      </p:sp>
+      <p:sp>
+        <p:nvSpPr>
+          <p:cNvPr id="17" name="Arrow: Down 16">
+            <a:extLst>
+              <a:ext uri="{FF2B5EF4-FFF2-40B4-BE49-F238E27FC236}">
+                <a16:creationId xmlns:a16="http://schemas.microsoft.com/office/drawing/2014/main" id="{FA5A3F07-8233-4F3C-BB58-7449CAF59168}"/>
+              </a:ext>
+            </a:extLst>
+          </p:cNvPr>
+          <p:cNvSpPr/>
+          <p:nvPr/>
+        </p:nvSpPr>
+        <p:spPr>
+          <a:xfrm rot="18038903">
+            <a:off x="4852624" y="3531348"/>
+            <a:ext cx="187488" cy="267303"/>
+          </a:xfrm>
+          <a:prstGeom prst="downArrow">
+            <a:avLst/>
+          </a:prstGeom>
+        </p:spPr>
+        <p:style>
+          <a:lnRef idx="2">
+            <a:schemeClr val="accent1">
+              <a:shade val="50000"/>
+            </a:schemeClr>
+          </a:lnRef>
+          <a:fillRef idx="1">
+            <a:schemeClr val="accent1"/>
+          </a:fillRef>
+          <a:effectRef idx="0">
+            <a:schemeClr val="accent1"/>
+          </a:effectRef>
+          <a:fontRef idx="minor">
+            <a:schemeClr val="lt1"/>
+          </a:fontRef>
+        </p:style>
+        <p:txBody>
+          <a:bodyPr rtlCol="0" anchor="ctr"/>
+          <a:lstStyle/>
+          <a:p>
+            <a:pPr algn="ctr"/>
+            <a:endParaRPr lang="en-US"/>
+          </a:p>
+        </p:txBody>
+      </p:sp>
+      <p:sp>
+        <p:nvSpPr>
+          <p:cNvPr id="18" name="Arrow: Down 17">
+            <a:extLst>
+              <a:ext uri="{FF2B5EF4-FFF2-40B4-BE49-F238E27FC236}">
+                <a16:creationId xmlns:a16="http://schemas.microsoft.com/office/drawing/2014/main" id="{2C53E121-7676-43EB-BCEF-226655D34ECB}"/>
+              </a:ext>
+            </a:extLst>
+          </p:cNvPr>
+          <p:cNvSpPr/>
+          <p:nvPr/>
+        </p:nvSpPr>
+        <p:spPr>
+          <a:xfrm rot="3073007">
+            <a:off x="7168954" y="3531347"/>
+            <a:ext cx="187488" cy="267303"/>
+          </a:xfrm>
+          <a:prstGeom prst="downArrow">
+            <a:avLst/>
+          </a:prstGeom>
+        </p:spPr>
+        <p:style>
+          <a:lnRef idx="2">
+            <a:schemeClr val="accent1">
+              <a:shade val="50000"/>
+            </a:schemeClr>
+          </a:lnRef>
+          <a:fillRef idx="1">
+            <a:schemeClr val="accent1"/>
+          </a:fillRef>
+          <a:effectRef idx="0">
+            <a:schemeClr val="accent1"/>
+          </a:effectRef>
+          <a:fontRef idx="minor">
+            <a:schemeClr val="lt1"/>
+          </a:fontRef>
+        </p:style>
+        <p:txBody>
+          <a:bodyPr rtlCol="0" anchor="ctr"/>
+          <a:lstStyle/>
+          <a:p>
+            <a:pPr algn="ctr"/>
+            <a:endParaRPr lang="en-US"/>
+          </a:p>
+        </p:txBody>
+      </p:sp>
+      <p:sp>
+        <p:nvSpPr>
+          <p:cNvPr id="19" name="Arrow: Down 18">
+            <a:extLst>
+              <a:ext uri="{FF2B5EF4-FFF2-40B4-BE49-F238E27FC236}">
+                <a16:creationId xmlns:a16="http://schemas.microsoft.com/office/drawing/2014/main" id="{3B1A1EF7-00CF-45A1-819E-C401B47DAFDC}"/>
+              </a:ext>
+            </a:extLst>
+          </p:cNvPr>
+          <p:cNvSpPr/>
+          <p:nvPr/>
+        </p:nvSpPr>
+        <p:spPr>
+          <a:xfrm rot="13460410">
+            <a:off x="4934323" y="4465070"/>
+            <a:ext cx="187488" cy="267303"/>
+          </a:xfrm>
+          <a:prstGeom prst="downArrow">
+            <a:avLst/>
+          </a:prstGeom>
+        </p:spPr>
+        <p:style>
+          <a:lnRef idx="2">
+            <a:schemeClr val="accent1">
+              <a:shade val="50000"/>
+            </a:schemeClr>
+          </a:lnRef>
+          <a:fillRef idx="1">
+            <a:schemeClr val="accent1"/>
+          </a:fillRef>
+          <a:effectRef idx="0">
+            <a:schemeClr val="accent1"/>
+          </a:effectRef>
+          <a:fontRef idx="minor">
+            <a:schemeClr val="lt1"/>
+          </a:fontRef>
+        </p:style>
+        <p:txBody>
+          <a:bodyPr rtlCol="0" anchor="ctr"/>
+          <a:lstStyle/>
+          <a:p>
+            <a:pPr algn="ctr"/>
+            <a:endParaRPr lang="en-US"/>
+          </a:p>
+        </p:txBody>
+      </p:sp>
+      <p:sp>
+        <p:nvSpPr>
+          <p:cNvPr id="20" name="Arrow: Down 19">
+            <a:extLst>
+              <a:ext uri="{FF2B5EF4-FFF2-40B4-BE49-F238E27FC236}">
+                <a16:creationId xmlns:a16="http://schemas.microsoft.com/office/drawing/2014/main" id="{99DA2F21-4B74-40D7-B647-6C0A4B1FDF20}"/>
+              </a:ext>
+            </a:extLst>
+          </p:cNvPr>
+          <p:cNvSpPr/>
+          <p:nvPr/>
+        </p:nvSpPr>
+        <p:spPr>
+          <a:xfrm rot="7692649">
+            <a:off x="7230970" y="4491118"/>
+            <a:ext cx="187488" cy="267303"/>
+          </a:xfrm>
+          <a:prstGeom prst="downArrow">
             <a:avLst/>
           </a:prstGeom>
         </p:spPr>

</xml_diff>

<commit_message>
Update Working_Presentation with Climate analysis
</commit_message>
<xml_diff>
--- a/Working_Presentation.pptx
+++ b/Working_Presentation.pptx
@@ -19,9 +19,9 @@
     <p:sldId id="263" r:id="rId13"/>
     <p:sldId id="265" r:id="rId14"/>
     <p:sldId id="266" r:id="rId15"/>
-    <p:sldId id="267" r:id="rId16"/>
-    <p:sldId id="271" r:id="rId17"/>
-    <p:sldId id="272" r:id="rId18"/>
+    <p:sldId id="272" r:id="rId16"/>
+    <p:sldId id="267" r:id="rId17"/>
+    <p:sldId id="271" r:id="rId18"/>
   </p:sldIdLst>
   <p:sldSz cx="12192000" cy="6858000"/>
   <p:notesSz cx="6858000" cy="9144000"/>
@@ -7084,380 +7084,6 @@
         </p:nvSpPr>
         <p:spPr>
           <a:xfrm>
-            <a:off x="1295400" y="2556932"/>
-            <a:ext cx="9967545" cy="1258192"/>
-          </a:xfrm>
-        </p:spPr>
-        <p:txBody>
-          <a:bodyPr>
-            <a:normAutofit fontScale="70000" lnSpcReduction="20000"/>
-          </a:bodyPr>
-          <a:lstStyle/>
-          <a:p>
-            <a:r>
-              <a:rPr lang="en-US" dirty="0"/>
-              <a:t>Dataset challenges were,</a:t>
-            </a:r>
-          </a:p>
-          <a:p>
-            <a:pPr lvl="1"/>
-            <a:r>
-              <a:rPr lang="en-US" i="1" dirty="0"/>
-              <a:t>Obtaining the 2018 data, hard to find the latest. Mostly were up to 2010 </a:t>
-            </a:r>
-          </a:p>
-          <a:p>
-            <a:pPr lvl="1"/>
-            <a:r>
-              <a:rPr lang="en-US" i="1" dirty="0"/>
-              <a:t>Limited states with climate data for “2018” – refer to Geo Map figure</a:t>
-            </a:r>
-          </a:p>
-          <a:p>
-            <a:pPr lvl="1"/>
-            <a:r>
-              <a:rPr lang="en-US" i="1" dirty="0"/>
-              <a:t>Some states have wider temperature spread – refer to Temperature boxplot </a:t>
-            </a:r>
-          </a:p>
-          <a:p>
-            <a:pPr lvl="1"/>
-            <a:endParaRPr lang="en-US" i="1" dirty="0"/>
-          </a:p>
-          <a:p>
-            <a:pPr lvl="1"/>
-            <a:endParaRPr lang="en-US" i="1" dirty="0"/>
-          </a:p>
-        </p:txBody>
-      </p:sp>
-      <p:pic>
-        <p:nvPicPr>
-          <p:cNvPr id="5" name="Picture 4" descr="A screenshot of a computer&#10;&#10;Description automatically generated">
-            <a:extLst>
-              <a:ext uri="{FF2B5EF4-FFF2-40B4-BE49-F238E27FC236}">
-                <a16:creationId xmlns:a16="http://schemas.microsoft.com/office/drawing/2014/main" id="{79D8BE27-0A75-404F-B08B-8A2E6976194C}"/>
-              </a:ext>
-            </a:extLst>
-          </p:cNvPr>
-          <p:cNvPicPr>
-            <a:picLocks noChangeAspect="1"/>
-          </p:cNvPicPr>
-          <p:nvPr/>
-        </p:nvPicPr>
-        <p:blipFill>
-          <a:blip r:embed="rId2"/>
-          <a:stretch>
-            <a:fillRect/>
-          </a:stretch>
-        </p:blipFill>
-        <p:spPr>
-          <a:xfrm>
-            <a:off x="764929" y="3815124"/>
-            <a:ext cx="5512558" cy="2362525"/>
-          </a:xfrm>
-          <a:prstGeom prst="rect">
-            <a:avLst/>
-          </a:prstGeom>
-        </p:spPr>
-      </p:pic>
-      <p:pic>
-        <p:nvPicPr>
-          <p:cNvPr id="7" name="Picture 6" descr="A picture containing text, map&#10;&#10;Description automatically generated">
-            <a:extLst>
-              <a:ext uri="{FF2B5EF4-FFF2-40B4-BE49-F238E27FC236}">
-                <a16:creationId xmlns:a16="http://schemas.microsoft.com/office/drawing/2014/main" id="{741B7D40-59D5-4388-9ED2-D7BC2EDC9766}"/>
-              </a:ext>
-            </a:extLst>
-          </p:cNvPr>
-          <p:cNvPicPr>
-            <a:picLocks noChangeAspect="1"/>
-          </p:cNvPicPr>
-          <p:nvPr/>
-        </p:nvPicPr>
-        <p:blipFill>
-          <a:blip r:embed="rId3"/>
-          <a:stretch>
-            <a:fillRect/>
-          </a:stretch>
-        </p:blipFill>
-        <p:spPr>
-          <a:xfrm>
-            <a:off x="6277487" y="3815124"/>
-            <a:ext cx="5275707" cy="2273864"/>
-          </a:xfrm>
-          <a:prstGeom prst="rect">
-            <a:avLst/>
-          </a:prstGeom>
-        </p:spPr>
-      </p:pic>
-      <p:sp>
-        <p:nvSpPr>
-          <p:cNvPr id="8" name="Oval 7">
-            <a:extLst>
-              <a:ext uri="{FF2B5EF4-FFF2-40B4-BE49-F238E27FC236}">
-                <a16:creationId xmlns:a16="http://schemas.microsoft.com/office/drawing/2014/main" id="{02B66A99-1F1F-4C8F-BEA2-44D493D521BF}"/>
-              </a:ext>
-            </a:extLst>
-          </p:cNvPr>
-          <p:cNvSpPr/>
-          <p:nvPr/>
-        </p:nvSpPr>
-        <p:spPr>
-          <a:xfrm>
-            <a:off x="1521229" y="4297680"/>
-            <a:ext cx="282633" cy="1138844"/>
-          </a:xfrm>
-          <a:prstGeom prst="ellipse">
-            <a:avLst/>
-          </a:prstGeom>
-          <a:noFill/>
-          <a:ln>
-            <a:solidFill>
-              <a:srgbClr val="FF0000"/>
-            </a:solidFill>
-          </a:ln>
-        </p:spPr>
-        <p:style>
-          <a:lnRef idx="2">
-            <a:schemeClr val="accent1">
-              <a:shade val="50000"/>
-            </a:schemeClr>
-          </a:lnRef>
-          <a:fillRef idx="1">
-            <a:schemeClr val="accent1"/>
-          </a:fillRef>
-          <a:effectRef idx="0">
-            <a:schemeClr val="accent1"/>
-          </a:effectRef>
-          <a:fontRef idx="minor">
-            <a:schemeClr val="lt1"/>
-          </a:fontRef>
-        </p:style>
-        <p:txBody>
-          <a:bodyPr rtlCol="0" anchor="ctr"/>
-          <a:lstStyle/>
-          <a:p>
-            <a:pPr algn="ctr"/>
-            <a:endParaRPr lang="en-US"/>
-          </a:p>
-        </p:txBody>
-      </p:sp>
-    </p:spTree>
-    <p:extLst>
-      <p:ext uri="{BB962C8B-B14F-4D97-AF65-F5344CB8AC3E}">
-        <p14:creationId xmlns:p14="http://schemas.microsoft.com/office/powerpoint/2010/main" val="4136999629"/>
-      </p:ext>
-    </p:extLst>
-  </p:cSld>
-  <p:clrMapOvr>
-    <a:masterClrMapping/>
-  </p:clrMapOvr>
-</p:sld>
-</file>
-
-<file path=ppt/slides/slide16.xml><?xml version="1.0" encoding="utf-8"?>
-<p:sld xmlns:a="http://schemas.openxmlformats.org/drawingml/2006/main" xmlns:r="http://schemas.openxmlformats.org/officeDocument/2006/relationships" xmlns:p="http://schemas.openxmlformats.org/presentationml/2006/main">
-  <p:cSld>
-    <p:spTree>
-      <p:nvGrpSpPr>
-        <p:cNvPr id="1" name=""/>
-        <p:cNvGrpSpPr/>
-        <p:nvPr/>
-      </p:nvGrpSpPr>
-      <p:grpSpPr>
-        <a:xfrm>
-          <a:off x="0" y="0"/>
-          <a:ext cx="0" cy="0"/>
-          <a:chOff x="0" y="0"/>
-          <a:chExt cx="0" cy="0"/>
-        </a:xfrm>
-      </p:grpSpPr>
-      <p:sp>
-        <p:nvSpPr>
-          <p:cNvPr id="2" name="Title 1">
-            <a:extLst>
-              <a:ext uri="{FF2B5EF4-FFF2-40B4-BE49-F238E27FC236}">
-                <a16:creationId xmlns:a16="http://schemas.microsoft.com/office/drawing/2014/main" id="{1917A588-6B43-4326-8CEE-B31FA8CC4FDB}"/>
-              </a:ext>
-            </a:extLst>
-          </p:cNvPr>
-          <p:cNvSpPr>
-            <a:spLocks noGrp="1"/>
-          </p:cNvSpPr>
-          <p:nvPr>
-            <p:ph type="title"/>
-          </p:nvPr>
-        </p:nvSpPr>
-        <p:spPr/>
-        <p:txBody>
-          <a:bodyPr/>
-          <a:lstStyle/>
-          <a:p>
-            <a:r>
-              <a:rPr lang="en-US" dirty="0"/>
-              <a:t>Climate – Prakash (</a:t>
-            </a:r>
-            <a:r>
-              <a:rPr lang="en-US" dirty="0" err="1"/>
-              <a:t>con’t</a:t>
-            </a:r>
-            <a:r>
-              <a:rPr lang="en-US" dirty="0"/>
-              <a:t>)</a:t>
-            </a:r>
-          </a:p>
-        </p:txBody>
-      </p:sp>
-      <p:sp>
-        <p:nvSpPr>
-          <p:cNvPr id="3" name="Content Placeholder 2">
-            <a:extLst>
-              <a:ext uri="{FF2B5EF4-FFF2-40B4-BE49-F238E27FC236}">
-                <a16:creationId xmlns:a16="http://schemas.microsoft.com/office/drawing/2014/main" id="{F5BE9D4D-949C-4037-9F87-16CDE0EE0466}"/>
-              </a:ext>
-            </a:extLst>
-          </p:cNvPr>
-          <p:cNvSpPr>
-            <a:spLocks noGrp="1"/>
-          </p:cNvSpPr>
-          <p:nvPr>
-            <p:ph idx="1"/>
-          </p:nvPr>
-        </p:nvSpPr>
-        <p:spPr>
-          <a:xfrm>
-            <a:off x="1129147" y="3624501"/>
-            <a:ext cx="2195944" cy="1183795"/>
-          </a:xfrm>
-        </p:spPr>
-        <p:txBody>
-          <a:bodyPr>
-            <a:normAutofit/>
-          </a:bodyPr>
-          <a:lstStyle/>
-          <a:p>
-            <a:r>
-              <a:rPr lang="en-US" sz="1600" dirty="0"/>
-              <a:t>Annual home price by State doesn’t have huge spread like climate’s. </a:t>
-            </a:r>
-            <a:endParaRPr lang="en-US" sz="1600" i="1" dirty="0"/>
-          </a:p>
-        </p:txBody>
-      </p:sp>
-      <p:pic>
-        <p:nvPicPr>
-          <p:cNvPr id="5" name="Picture 4" descr="A close up of a mans face&#10;&#10;Description automatically generated">
-            <a:extLst>
-              <a:ext uri="{FF2B5EF4-FFF2-40B4-BE49-F238E27FC236}">
-                <a16:creationId xmlns:a16="http://schemas.microsoft.com/office/drawing/2014/main" id="{062B4FCC-AECA-4C13-B383-65409235222B}"/>
-              </a:ext>
-            </a:extLst>
-          </p:cNvPr>
-          <p:cNvPicPr>
-            <a:picLocks noChangeAspect="1"/>
-          </p:cNvPicPr>
-          <p:nvPr/>
-        </p:nvPicPr>
-        <p:blipFill>
-          <a:blip r:embed="rId2"/>
-          <a:stretch>
-            <a:fillRect/>
-          </a:stretch>
-        </p:blipFill>
-        <p:spPr>
-          <a:xfrm>
-            <a:off x="3632708" y="2556931"/>
-            <a:ext cx="7744186" cy="3318937"/>
-          </a:xfrm>
-          <a:prstGeom prst="rect">
-            <a:avLst/>
-          </a:prstGeom>
-        </p:spPr>
-      </p:pic>
-    </p:spTree>
-    <p:extLst>
-      <p:ext uri="{BB962C8B-B14F-4D97-AF65-F5344CB8AC3E}">
-        <p14:creationId xmlns:p14="http://schemas.microsoft.com/office/powerpoint/2010/main" val="2698286698"/>
-      </p:ext>
-    </p:extLst>
-  </p:cSld>
-  <p:clrMapOvr>
-    <a:masterClrMapping/>
-  </p:clrMapOvr>
-</p:sld>
-</file>
-
-<file path=ppt/slides/slide17.xml><?xml version="1.0" encoding="utf-8"?>
-<p:sld xmlns:a="http://schemas.openxmlformats.org/drawingml/2006/main" xmlns:r="http://schemas.openxmlformats.org/officeDocument/2006/relationships" xmlns:p="http://schemas.openxmlformats.org/presentationml/2006/main">
-  <p:cSld>
-    <p:spTree>
-      <p:nvGrpSpPr>
-        <p:cNvPr id="1" name=""/>
-        <p:cNvGrpSpPr/>
-        <p:nvPr/>
-      </p:nvGrpSpPr>
-      <p:grpSpPr>
-        <a:xfrm>
-          <a:off x="0" y="0"/>
-          <a:ext cx="0" cy="0"/>
-          <a:chOff x="0" y="0"/>
-          <a:chExt cx="0" cy="0"/>
-        </a:xfrm>
-      </p:grpSpPr>
-      <p:sp>
-        <p:nvSpPr>
-          <p:cNvPr id="2" name="Title 1">
-            <a:extLst>
-              <a:ext uri="{FF2B5EF4-FFF2-40B4-BE49-F238E27FC236}">
-                <a16:creationId xmlns:a16="http://schemas.microsoft.com/office/drawing/2014/main" id="{1917A588-6B43-4326-8CEE-B31FA8CC4FDB}"/>
-              </a:ext>
-            </a:extLst>
-          </p:cNvPr>
-          <p:cNvSpPr>
-            <a:spLocks noGrp="1"/>
-          </p:cNvSpPr>
-          <p:nvPr>
-            <p:ph type="title"/>
-          </p:nvPr>
-        </p:nvSpPr>
-        <p:spPr/>
-        <p:txBody>
-          <a:bodyPr/>
-          <a:lstStyle/>
-          <a:p>
-            <a:r>
-              <a:rPr lang="en-US" dirty="0"/>
-              <a:t>Climate – Prakash (</a:t>
-            </a:r>
-            <a:r>
-              <a:rPr lang="en-US" dirty="0" err="1"/>
-              <a:t>con’t</a:t>
-            </a:r>
-            <a:r>
-              <a:rPr lang="en-US" dirty="0"/>
-              <a:t>)</a:t>
-            </a:r>
-          </a:p>
-        </p:txBody>
-      </p:sp>
-      <p:sp>
-        <p:nvSpPr>
-          <p:cNvPr id="3" name="Content Placeholder 2">
-            <a:extLst>
-              <a:ext uri="{FF2B5EF4-FFF2-40B4-BE49-F238E27FC236}">
-                <a16:creationId xmlns:a16="http://schemas.microsoft.com/office/drawing/2014/main" id="{F5BE9D4D-949C-4037-9F87-16CDE0EE0466}"/>
-              </a:ext>
-            </a:extLst>
-          </p:cNvPr>
-          <p:cNvSpPr>
-            <a:spLocks noGrp="1"/>
-          </p:cNvSpPr>
-          <p:nvPr>
-            <p:ph idx="1"/>
-          </p:nvPr>
-        </p:nvSpPr>
-        <p:spPr>
-          <a:xfrm>
             <a:off x="1295401" y="2556933"/>
             <a:ext cx="9601196" cy="1303867"/>
           </a:xfrm>
@@ -7490,7 +7116,19 @@
             <a:pPr lvl="1"/>
             <a:r>
               <a:rPr lang="en-US" i="1" dirty="0"/>
-              <a:t>There’s no obvious correlation for temperature and home price. Thus home prices in higher temperature state isn’t true based on this analysis.</a:t>
+              <a:t>There’s </a:t>
+            </a:r>
+            <a:r>
+              <a:rPr lang="en-US" i="1" dirty="0">
+                <a:solidFill>
+                  <a:srgbClr val="FF0000"/>
+                </a:solidFill>
+              </a:rPr>
+              <a:t>no obvious correlation for temperature and home price</a:t>
+            </a:r>
+            <a:r>
+              <a:rPr lang="en-US" i="1" dirty="0"/>
+              <a:t>. Thus home prices in higher temperature state isn’t true based on this analysis.</a:t>
             </a:r>
           </a:p>
           <a:p>
@@ -7503,18 +7141,34 @@
           <a:p>
             <a:pPr lvl="1"/>
             <a:r>
-              <a:rPr lang="en-US" i="1" dirty="0"/>
+              <a:rPr lang="en-US" i="1" dirty="0">
+                <a:solidFill>
+                  <a:srgbClr val="FF0000"/>
+                </a:solidFill>
+              </a:rPr>
               <a:t>California came the 1</a:t>
             </a:r>
             <a:r>
-              <a:rPr lang="en-US" i="1" baseline="30000" dirty="0"/>
+              <a:rPr lang="en-US" i="1" baseline="30000" dirty="0">
+                <a:solidFill>
+                  <a:srgbClr val="FF0000"/>
+                </a:solidFill>
+              </a:rPr>
               <a:t>st</a:t>
             </a:r>
             <a:r>
-              <a:rPr lang="en-US" i="1" dirty="0"/>
-              <a:t> in terms of climate (see table)</a:t>
-            </a:r>
-            <a:endParaRPr lang="en-US" dirty="0"/>
+              <a:rPr lang="en-US" i="1" dirty="0">
+                <a:solidFill>
+                  <a:srgbClr val="FF0000"/>
+                </a:solidFill>
+              </a:rPr>
+              <a:t> in terms of climate (see table, circled in red)</a:t>
+            </a:r>
+            <a:endParaRPr lang="en-US" dirty="0">
+              <a:solidFill>
+                <a:srgbClr val="FF0000"/>
+              </a:solidFill>
+            </a:endParaRPr>
           </a:p>
         </p:txBody>
       </p:sp>
@@ -7612,6 +7266,420 @@
     <p:extLst>
       <p:ext uri="{BB962C8B-B14F-4D97-AF65-F5344CB8AC3E}">
         <p14:creationId xmlns:p14="http://schemas.microsoft.com/office/powerpoint/2010/main" val="1615632251"/>
+      </p:ext>
+    </p:extLst>
+  </p:cSld>
+  <p:clrMapOvr>
+    <a:masterClrMapping/>
+  </p:clrMapOvr>
+</p:sld>
+</file>
+
+<file path=ppt/slides/slide16.xml><?xml version="1.0" encoding="utf-8"?>
+<p:sld xmlns:a="http://schemas.openxmlformats.org/drawingml/2006/main" xmlns:r="http://schemas.openxmlformats.org/officeDocument/2006/relationships" xmlns:p="http://schemas.openxmlformats.org/presentationml/2006/main">
+  <p:cSld>
+    <p:spTree>
+      <p:nvGrpSpPr>
+        <p:cNvPr id="1" name=""/>
+        <p:cNvGrpSpPr/>
+        <p:nvPr/>
+      </p:nvGrpSpPr>
+      <p:grpSpPr>
+        <a:xfrm>
+          <a:off x="0" y="0"/>
+          <a:ext cx="0" cy="0"/>
+          <a:chOff x="0" y="0"/>
+          <a:chExt cx="0" cy="0"/>
+        </a:xfrm>
+      </p:grpSpPr>
+      <p:sp>
+        <p:nvSpPr>
+          <p:cNvPr id="2" name="Title 1">
+            <a:extLst>
+              <a:ext uri="{FF2B5EF4-FFF2-40B4-BE49-F238E27FC236}">
+                <a16:creationId xmlns:a16="http://schemas.microsoft.com/office/drawing/2014/main" id="{1917A588-6B43-4326-8CEE-B31FA8CC4FDB}"/>
+              </a:ext>
+            </a:extLst>
+          </p:cNvPr>
+          <p:cNvSpPr>
+            <a:spLocks noGrp="1"/>
+          </p:cNvSpPr>
+          <p:nvPr>
+            <p:ph type="title"/>
+          </p:nvPr>
+        </p:nvSpPr>
+        <p:spPr/>
+        <p:txBody>
+          <a:bodyPr/>
+          <a:lstStyle/>
+          <a:p>
+            <a:r>
+              <a:rPr lang="en-US" dirty="0"/>
+              <a:t>Climate – Prakash (</a:t>
+            </a:r>
+            <a:r>
+              <a:rPr lang="en-US" dirty="0" err="1"/>
+              <a:t>con’t</a:t>
+            </a:r>
+            <a:r>
+              <a:rPr lang="en-US" dirty="0"/>
+              <a:t>)</a:t>
+            </a:r>
+          </a:p>
+        </p:txBody>
+      </p:sp>
+      <p:sp>
+        <p:nvSpPr>
+          <p:cNvPr id="3" name="Content Placeholder 2">
+            <a:extLst>
+              <a:ext uri="{FF2B5EF4-FFF2-40B4-BE49-F238E27FC236}">
+                <a16:creationId xmlns:a16="http://schemas.microsoft.com/office/drawing/2014/main" id="{F5BE9D4D-949C-4037-9F87-16CDE0EE0466}"/>
+              </a:ext>
+            </a:extLst>
+          </p:cNvPr>
+          <p:cNvSpPr>
+            <a:spLocks noGrp="1"/>
+          </p:cNvSpPr>
+          <p:nvPr>
+            <p:ph idx="1"/>
+          </p:nvPr>
+        </p:nvSpPr>
+        <p:spPr>
+          <a:xfrm>
+            <a:off x="1295400" y="2556932"/>
+            <a:ext cx="9967545" cy="1258192"/>
+          </a:xfrm>
+        </p:spPr>
+        <p:txBody>
+          <a:bodyPr>
+            <a:normAutofit fontScale="70000" lnSpcReduction="20000"/>
+          </a:bodyPr>
+          <a:lstStyle/>
+          <a:p>
+            <a:r>
+              <a:rPr lang="en-US" dirty="0"/>
+              <a:t>Dataset challenges were,</a:t>
+            </a:r>
+          </a:p>
+          <a:p>
+            <a:pPr lvl="1"/>
+            <a:r>
+              <a:rPr lang="en-US" i="1" dirty="0"/>
+              <a:t>Obtaining the 2018 data, </a:t>
+            </a:r>
+            <a:r>
+              <a:rPr lang="en-US" i="1" dirty="0">
+                <a:solidFill>
+                  <a:srgbClr val="FF0000"/>
+                </a:solidFill>
+              </a:rPr>
+              <a:t>hard to find the latest. Mostly were up to 2010 </a:t>
+            </a:r>
+          </a:p>
+          <a:p>
+            <a:pPr lvl="1"/>
+            <a:r>
+              <a:rPr lang="en-US" i="1" dirty="0">
+                <a:solidFill>
+                  <a:srgbClr val="FF0000"/>
+                </a:solidFill>
+              </a:rPr>
+              <a:t>Limited states </a:t>
+            </a:r>
+            <a:r>
+              <a:rPr lang="en-US" i="1" dirty="0"/>
+              <a:t>with climate data for “2018” – refer to Geo Map figure</a:t>
+            </a:r>
+          </a:p>
+          <a:p>
+            <a:pPr lvl="1"/>
+            <a:r>
+              <a:rPr lang="en-US" i="1" dirty="0"/>
+              <a:t>Some states have </a:t>
+            </a:r>
+            <a:r>
+              <a:rPr lang="en-US" i="1" dirty="0">
+                <a:solidFill>
+                  <a:srgbClr val="FF0000"/>
+                </a:solidFill>
+              </a:rPr>
+              <a:t>wider temperature spread </a:t>
+            </a:r>
+            <a:r>
+              <a:rPr lang="en-US" i="1" dirty="0"/>
+              <a:t>– refer to Temperature boxplot </a:t>
+            </a:r>
+          </a:p>
+          <a:p>
+            <a:pPr lvl="1"/>
+            <a:endParaRPr lang="en-US" i="1" dirty="0"/>
+          </a:p>
+          <a:p>
+            <a:pPr lvl="1"/>
+            <a:endParaRPr lang="en-US" i="1" dirty="0"/>
+          </a:p>
+        </p:txBody>
+      </p:sp>
+      <p:pic>
+        <p:nvPicPr>
+          <p:cNvPr id="5" name="Picture 4" descr="A screenshot of a computer&#10;&#10;Description automatically generated">
+            <a:extLst>
+              <a:ext uri="{FF2B5EF4-FFF2-40B4-BE49-F238E27FC236}">
+                <a16:creationId xmlns:a16="http://schemas.microsoft.com/office/drawing/2014/main" id="{79D8BE27-0A75-404F-B08B-8A2E6976194C}"/>
+              </a:ext>
+            </a:extLst>
+          </p:cNvPr>
+          <p:cNvPicPr>
+            <a:picLocks noChangeAspect="1"/>
+          </p:cNvPicPr>
+          <p:nvPr/>
+        </p:nvPicPr>
+        <p:blipFill>
+          <a:blip r:embed="rId2"/>
+          <a:stretch>
+            <a:fillRect/>
+          </a:stretch>
+        </p:blipFill>
+        <p:spPr>
+          <a:xfrm>
+            <a:off x="764929" y="3815124"/>
+            <a:ext cx="5512558" cy="2362525"/>
+          </a:xfrm>
+          <a:prstGeom prst="rect">
+            <a:avLst/>
+          </a:prstGeom>
+        </p:spPr>
+      </p:pic>
+      <p:pic>
+        <p:nvPicPr>
+          <p:cNvPr id="7" name="Picture 6" descr="A picture containing text, map&#10;&#10;Description automatically generated">
+            <a:extLst>
+              <a:ext uri="{FF2B5EF4-FFF2-40B4-BE49-F238E27FC236}">
+                <a16:creationId xmlns:a16="http://schemas.microsoft.com/office/drawing/2014/main" id="{741B7D40-59D5-4388-9ED2-D7BC2EDC9766}"/>
+              </a:ext>
+            </a:extLst>
+          </p:cNvPr>
+          <p:cNvPicPr>
+            <a:picLocks noChangeAspect="1"/>
+          </p:cNvPicPr>
+          <p:nvPr/>
+        </p:nvPicPr>
+        <p:blipFill>
+          <a:blip r:embed="rId3"/>
+          <a:stretch>
+            <a:fillRect/>
+          </a:stretch>
+        </p:blipFill>
+        <p:spPr>
+          <a:xfrm>
+            <a:off x="6277487" y="3815124"/>
+            <a:ext cx="5275707" cy="2273864"/>
+          </a:xfrm>
+          <a:prstGeom prst="rect">
+            <a:avLst/>
+          </a:prstGeom>
+        </p:spPr>
+      </p:pic>
+      <p:sp>
+        <p:nvSpPr>
+          <p:cNvPr id="8" name="Oval 7">
+            <a:extLst>
+              <a:ext uri="{FF2B5EF4-FFF2-40B4-BE49-F238E27FC236}">
+                <a16:creationId xmlns:a16="http://schemas.microsoft.com/office/drawing/2014/main" id="{02B66A99-1F1F-4C8F-BEA2-44D493D521BF}"/>
+              </a:ext>
+            </a:extLst>
+          </p:cNvPr>
+          <p:cNvSpPr/>
+          <p:nvPr/>
+        </p:nvSpPr>
+        <p:spPr>
+          <a:xfrm>
+            <a:off x="1521229" y="4297680"/>
+            <a:ext cx="282633" cy="1138844"/>
+          </a:xfrm>
+          <a:prstGeom prst="ellipse">
+            <a:avLst/>
+          </a:prstGeom>
+          <a:noFill/>
+          <a:ln>
+            <a:solidFill>
+              <a:srgbClr val="FF0000"/>
+            </a:solidFill>
+          </a:ln>
+        </p:spPr>
+        <p:style>
+          <a:lnRef idx="2">
+            <a:schemeClr val="accent1">
+              <a:shade val="50000"/>
+            </a:schemeClr>
+          </a:lnRef>
+          <a:fillRef idx="1">
+            <a:schemeClr val="accent1"/>
+          </a:fillRef>
+          <a:effectRef idx="0">
+            <a:schemeClr val="accent1"/>
+          </a:effectRef>
+          <a:fontRef idx="minor">
+            <a:schemeClr val="lt1"/>
+          </a:fontRef>
+        </p:style>
+        <p:txBody>
+          <a:bodyPr rtlCol="0" anchor="ctr"/>
+          <a:lstStyle/>
+          <a:p>
+            <a:pPr algn="ctr"/>
+            <a:endParaRPr lang="en-US"/>
+          </a:p>
+        </p:txBody>
+      </p:sp>
+    </p:spTree>
+    <p:extLst>
+      <p:ext uri="{BB962C8B-B14F-4D97-AF65-F5344CB8AC3E}">
+        <p14:creationId xmlns:p14="http://schemas.microsoft.com/office/powerpoint/2010/main" val="4136999629"/>
+      </p:ext>
+    </p:extLst>
+  </p:cSld>
+  <p:clrMapOvr>
+    <a:masterClrMapping/>
+  </p:clrMapOvr>
+</p:sld>
+</file>
+
+<file path=ppt/slides/slide17.xml><?xml version="1.0" encoding="utf-8"?>
+<p:sld xmlns:a="http://schemas.openxmlformats.org/drawingml/2006/main" xmlns:r="http://schemas.openxmlformats.org/officeDocument/2006/relationships" xmlns:p="http://schemas.openxmlformats.org/presentationml/2006/main">
+  <p:cSld>
+    <p:spTree>
+      <p:nvGrpSpPr>
+        <p:cNvPr id="1" name=""/>
+        <p:cNvGrpSpPr/>
+        <p:nvPr/>
+      </p:nvGrpSpPr>
+      <p:grpSpPr>
+        <a:xfrm>
+          <a:off x="0" y="0"/>
+          <a:ext cx="0" cy="0"/>
+          <a:chOff x="0" y="0"/>
+          <a:chExt cx="0" cy="0"/>
+        </a:xfrm>
+      </p:grpSpPr>
+      <p:sp>
+        <p:nvSpPr>
+          <p:cNvPr id="2" name="Title 1">
+            <a:extLst>
+              <a:ext uri="{FF2B5EF4-FFF2-40B4-BE49-F238E27FC236}">
+                <a16:creationId xmlns:a16="http://schemas.microsoft.com/office/drawing/2014/main" id="{1917A588-6B43-4326-8CEE-B31FA8CC4FDB}"/>
+              </a:ext>
+            </a:extLst>
+          </p:cNvPr>
+          <p:cNvSpPr>
+            <a:spLocks noGrp="1"/>
+          </p:cNvSpPr>
+          <p:nvPr>
+            <p:ph type="title"/>
+          </p:nvPr>
+        </p:nvSpPr>
+        <p:spPr/>
+        <p:txBody>
+          <a:bodyPr/>
+          <a:lstStyle/>
+          <a:p>
+            <a:r>
+              <a:rPr lang="en-US" dirty="0"/>
+              <a:t>Climate – Prakash (</a:t>
+            </a:r>
+            <a:r>
+              <a:rPr lang="en-US" dirty="0" err="1"/>
+              <a:t>con’t</a:t>
+            </a:r>
+            <a:r>
+              <a:rPr lang="en-US" dirty="0"/>
+              <a:t>)</a:t>
+            </a:r>
+          </a:p>
+        </p:txBody>
+      </p:sp>
+      <p:sp>
+        <p:nvSpPr>
+          <p:cNvPr id="3" name="Content Placeholder 2">
+            <a:extLst>
+              <a:ext uri="{FF2B5EF4-FFF2-40B4-BE49-F238E27FC236}">
+                <a16:creationId xmlns:a16="http://schemas.microsoft.com/office/drawing/2014/main" id="{F5BE9D4D-949C-4037-9F87-16CDE0EE0466}"/>
+              </a:ext>
+            </a:extLst>
+          </p:cNvPr>
+          <p:cNvSpPr>
+            <a:spLocks noGrp="1"/>
+          </p:cNvSpPr>
+          <p:nvPr>
+            <p:ph idx="1"/>
+          </p:nvPr>
+        </p:nvSpPr>
+        <p:spPr>
+          <a:xfrm>
+            <a:off x="1129147" y="3624501"/>
+            <a:ext cx="2195944" cy="1183795"/>
+          </a:xfrm>
+        </p:spPr>
+        <p:txBody>
+          <a:bodyPr>
+            <a:normAutofit/>
+          </a:bodyPr>
+          <a:lstStyle/>
+          <a:p>
+            <a:r>
+              <a:rPr lang="en-US" sz="1600" dirty="0"/>
+              <a:t>Annual home price by State </a:t>
+            </a:r>
+            <a:r>
+              <a:rPr lang="en-US" sz="1600" dirty="0">
+                <a:solidFill>
+                  <a:srgbClr val="FF0000"/>
+                </a:solidFill>
+              </a:rPr>
+              <a:t>doesn’t have huge spread </a:t>
+            </a:r>
+            <a:r>
+              <a:rPr lang="en-US" sz="1600" dirty="0"/>
+              <a:t>like climate’s. </a:t>
+            </a:r>
+            <a:endParaRPr lang="en-US" sz="1600" i="1" dirty="0"/>
+          </a:p>
+        </p:txBody>
+      </p:sp>
+      <p:pic>
+        <p:nvPicPr>
+          <p:cNvPr id="5" name="Picture 4" descr="A close up of a mans face&#10;&#10;Description automatically generated">
+            <a:extLst>
+              <a:ext uri="{FF2B5EF4-FFF2-40B4-BE49-F238E27FC236}">
+                <a16:creationId xmlns:a16="http://schemas.microsoft.com/office/drawing/2014/main" id="{062B4FCC-AECA-4C13-B383-65409235222B}"/>
+              </a:ext>
+            </a:extLst>
+          </p:cNvPr>
+          <p:cNvPicPr>
+            <a:picLocks noChangeAspect="1"/>
+          </p:cNvPicPr>
+          <p:nvPr/>
+        </p:nvPicPr>
+        <p:blipFill>
+          <a:blip r:embed="rId2"/>
+          <a:stretch>
+            <a:fillRect/>
+          </a:stretch>
+        </p:blipFill>
+        <p:spPr>
+          <a:xfrm>
+            <a:off x="3632708" y="2556931"/>
+            <a:ext cx="7744186" cy="3318937"/>
+          </a:xfrm>
+          <a:prstGeom prst="rect">
+            <a:avLst/>
+          </a:prstGeom>
+        </p:spPr>
+      </p:pic>
+    </p:spTree>
+    <p:extLst>
+      <p:ext uri="{BB962C8B-B14F-4D97-AF65-F5344CB8AC3E}">
+        <p14:creationId xmlns:p14="http://schemas.microsoft.com/office/powerpoint/2010/main" val="2698286698"/>
       </p:ext>
     </p:extLst>
   </p:cSld>

</xml_diff>

<commit_message>
Update Working_Presentation and Final Conclusion folder
</commit_message>
<xml_diff>
--- a/Working_Presentation.pptx
+++ b/Working_Presentation.pptx
@@ -6316,8 +6316,8 @@
         </p:blipFill>
         <p:spPr>
           <a:xfrm>
-            <a:off x="3247286" y="2486593"/>
-            <a:ext cx="8042037" cy="3667126"/>
+            <a:off x="667126" y="1310054"/>
+            <a:ext cx="10622197" cy="4843665"/>
           </a:xfrm>
           <a:prstGeom prst="rect">
             <a:avLst/>
@@ -6488,6 +6488,14 @@
 <file path=ppt/slides/slide14.xml><?xml version="1.0" encoding="utf-8"?>
 <p:sld xmlns:a="http://schemas.openxmlformats.org/drawingml/2006/main" xmlns:r="http://schemas.openxmlformats.org/officeDocument/2006/relationships" xmlns:p="http://schemas.openxmlformats.org/presentationml/2006/main">
   <p:cSld>
+    <p:bg>
+      <p:bgPr>
+        <a:solidFill>
+          <a:schemeClr val="bg1"/>
+        </a:solidFill>
+        <a:effectLst/>
+      </p:bgPr>
+    </p:bg>
     <p:spTree>
       <p:nvGrpSpPr>
         <p:cNvPr id="1" name=""/>
@@ -6504,6 +6512,199 @@
       </p:grpSpPr>
       <p:sp>
         <p:nvSpPr>
+          <p:cNvPr id="10" name="Rectangle 9">
+            <a:extLst>
+              <a:ext uri="{FF2B5EF4-FFF2-40B4-BE49-F238E27FC236}">
+                <a16:creationId xmlns:a16="http://schemas.microsoft.com/office/drawing/2014/main" id="{333F0879-3DA0-4CB8-B35E-A0AD42558191}"/>
+              </a:ext>
+              <a:ext uri="{C183D7F6-B498-43B3-948B-1728B52AA6E4}">
+                <adec:decorative xmlns:adec="http://schemas.microsoft.com/office/drawing/2017/decorative" val="1"/>
+              </a:ext>
+            </a:extLst>
+          </p:cNvPr>
+          <p:cNvSpPr>
+            <a:spLocks noGrp="1" noRot="1" noChangeAspect="1" noMove="1" noResize="1" noEditPoints="1" noAdjustHandles="1" noChangeArrowheads="1" noChangeShapeType="1" noTextEdit="1"/>
+          </p:cNvSpPr>
+          <p:nvPr>
+            <p:extLst>
+              <p:ext uri="{386F3935-93C4-4BCD-93E2-E3B085C9AB24}">
+                <p16:designElem xmlns:p16="http://schemas.microsoft.com/office/powerpoint/2015/main" val="1"/>
+              </p:ext>
+            </p:extLst>
+          </p:nvPr>
+        </p:nvSpPr>
+        <p:spPr>
+          <a:xfrm>
+            <a:off x="0" y="2"/>
+            <a:ext cx="12188952" cy="6858000"/>
+          </a:xfrm>
+          <a:prstGeom prst="rect">
+            <a:avLst/>
+          </a:prstGeom>
+          <a:ln>
+            <a:noFill/>
+          </a:ln>
+        </p:spPr>
+        <p:style>
+          <a:lnRef idx="2">
+            <a:schemeClr val="accent1">
+              <a:shade val="50000"/>
+            </a:schemeClr>
+          </a:lnRef>
+          <a:fillRef idx="1003">
+            <a:schemeClr val="lt1"/>
+          </a:fillRef>
+          <a:effectRef idx="0">
+            <a:schemeClr val="accent1"/>
+          </a:effectRef>
+          <a:fontRef idx="minor">
+            <a:schemeClr val="lt1"/>
+          </a:fontRef>
+        </p:style>
+        <p:txBody>
+          <a:bodyPr rtlCol="0" anchor="ctr"/>
+          <a:lstStyle/>
+          <a:p>
+            <a:pPr algn="ctr"/>
+            <a:endParaRPr lang="en-US"/>
+          </a:p>
+        </p:txBody>
+      </p:sp>
+      <p:sp>
+        <p:nvSpPr>
+          <p:cNvPr id="12" name="Rectangle 11">
+            <a:extLst>
+              <a:ext uri="{FF2B5EF4-FFF2-40B4-BE49-F238E27FC236}">
+                <a16:creationId xmlns:a16="http://schemas.microsoft.com/office/drawing/2014/main" id="{324D2183-F388-476E-92A9-D6639D698580}"/>
+              </a:ext>
+              <a:ext uri="{C183D7F6-B498-43B3-948B-1728B52AA6E4}">
+                <adec:decorative xmlns:adec="http://schemas.microsoft.com/office/drawing/2017/decorative" val="1"/>
+              </a:ext>
+            </a:extLst>
+          </p:cNvPr>
+          <p:cNvSpPr>
+            <a:spLocks noGrp="1" noRot="1" noChangeAspect="1" noMove="1" noResize="1" noEditPoints="1" noAdjustHandles="1" noChangeArrowheads="1" noChangeShapeType="1" noTextEdit="1"/>
+          </p:cNvSpPr>
+          <p:nvPr>
+            <p:extLst>
+              <p:ext uri="{386F3935-93C4-4BCD-93E2-E3B085C9AB24}">
+                <p16:designElem xmlns:p16="http://schemas.microsoft.com/office/powerpoint/2015/main" val="1"/>
+              </p:ext>
+            </p:extLst>
+          </p:nvPr>
+        </p:nvSpPr>
+        <p:spPr>
+          <a:xfrm>
+            <a:off x="486138" y="496090"/>
+            <a:ext cx="3823215" cy="5883295"/>
+          </a:xfrm>
+          <a:prstGeom prst="rect">
+            <a:avLst/>
+          </a:prstGeom>
+          <a:blipFill dpi="0" rotWithShape="1">
+            <a:blip r:embed="rId2"/>
+            <a:srcRect/>
+            <a:tile tx="0" ty="0" sx="100000" sy="100000" flip="none" algn="tl"/>
+          </a:blipFill>
+          <a:ln>
+            <a:noFill/>
+          </a:ln>
+          <a:effectLst>
+            <a:outerShdw blurRad="114300" dist="127000" dir="5400000" sx="99000" sy="99000" algn="t" rotWithShape="0">
+              <a:prstClr val="black">
+                <a:alpha val="40000"/>
+              </a:prstClr>
+            </a:outerShdw>
+          </a:effectLst>
+          <a:scene3d>
+            <a:camera prst="orthographicFront"/>
+            <a:lightRig rig="twoPt" dir="t"/>
+          </a:scene3d>
+          <a:sp3d contourW="6350">
+            <a:bevelT w="12700" h="0" prst="coolSlant"/>
+            <a:contourClr>
+              <a:schemeClr val="bg2"/>
+            </a:contourClr>
+          </a:sp3d>
+        </p:spPr>
+        <p:style>
+          <a:lnRef idx="2">
+            <a:schemeClr val="accent1">
+              <a:shade val="50000"/>
+            </a:schemeClr>
+          </a:lnRef>
+          <a:fillRef idx="1">
+            <a:schemeClr val="accent1"/>
+          </a:fillRef>
+          <a:effectRef idx="0">
+            <a:schemeClr val="accent1"/>
+          </a:effectRef>
+          <a:fontRef idx="minor">
+            <a:schemeClr val="lt1"/>
+          </a:fontRef>
+        </p:style>
+        <p:txBody>
+          <a:bodyPr rtlCol="0" anchor="ctr"/>
+          <a:lstStyle/>
+          <a:p>
+            <a:pPr algn="ctr"/>
+            <a:endParaRPr lang="en-US"/>
+          </a:p>
+        </p:txBody>
+      </p:sp>
+      <p:sp>
+        <p:nvSpPr>
+          <p:cNvPr id="14" name="Rectangle 13">
+            <a:extLst>
+              <a:ext uri="{FF2B5EF4-FFF2-40B4-BE49-F238E27FC236}">
+                <a16:creationId xmlns:a16="http://schemas.microsoft.com/office/drawing/2014/main" id="{243462E7-1698-4B21-BE89-AEFAC7C2FEFA}"/>
+              </a:ext>
+              <a:ext uri="{C183D7F6-B498-43B3-948B-1728B52AA6E4}">
+                <adec:decorative xmlns:adec="http://schemas.microsoft.com/office/drawing/2017/decorative" val="1"/>
+              </a:ext>
+            </a:extLst>
+          </p:cNvPr>
+          <p:cNvSpPr>
+            <a:spLocks noGrp="1" noRot="1" noChangeAspect="1" noMove="1" noResize="1" noEditPoints="1" noAdjustHandles="1" noChangeArrowheads="1" noChangeShapeType="1" noTextEdit="1"/>
+          </p:cNvSpPr>
+          <p:nvPr>
+            <p:extLst>
+              <p:ext uri="{386F3935-93C4-4BCD-93E2-E3B085C9AB24}">
+                <p16:designElem xmlns:p16="http://schemas.microsoft.com/office/powerpoint/2015/main" val="1"/>
+              </p:ext>
+            </p:extLst>
+          </p:nvPr>
+        </p:nvSpPr>
+        <p:spPr>
+          <a:xfrm>
+            <a:off x="608012" y="609602"/>
+            <a:ext cx="3552006" cy="5638800"/>
+          </a:xfrm>
+          <a:prstGeom prst="rect">
+            <a:avLst/>
+          </a:prstGeom>
+          <a:noFill/>
+          <a:ln w="15875" cap="flat">
+            <a:miter lim="800000"/>
+          </a:ln>
+        </p:spPr>
+        <p:style>
+          <a:lnRef idx="1">
+            <a:schemeClr val="accent1"/>
+          </a:lnRef>
+          <a:fillRef idx="3">
+            <a:schemeClr val="accent1"/>
+          </a:fillRef>
+          <a:effectRef idx="2">
+            <a:schemeClr val="accent1"/>
+          </a:effectRef>
+          <a:fontRef idx="minor">
+            <a:schemeClr val="lt1"/>
+          </a:fontRef>
+        </p:style>
+      </p:sp>
+      <p:sp>
+        <p:nvSpPr>
           <p:cNvPr id="2" name="Title 1">
             <a:extLst>
               <a:ext uri="{FF2B5EF4-FFF2-40B4-BE49-F238E27FC236}">
@@ -6518,13 +6719,24 @@
             <p:ph type="title"/>
           </p:nvPr>
         </p:nvSpPr>
-        <p:spPr/>
-        <p:txBody>
-          <a:bodyPr/>
-          <a:lstStyle/>
-          <a:p>
-            <a:r>
-              <a:rPr lang="en-US" dirty="0"/>
+        <p:spPr>
+          <a:xfrm>
+            <a:off x="929140" y="972766"/>
+            <a:ext cx="2835464" cy="1254868"/>
+          </a:xfrm>
+        </p:spPr>
+        <p:txBody>
+          <a:bodyPr anchor="b">
+            <a:normAutofit/>
+          </a:bodyPr>
+          <a:lstStyle/>
+          <a:p>
+            <a:r>
+              <a:rPr lang="en-US" sz="2800">
+                <a:solidFill>
+                  <a:srgbClr val="262626"/>
+                </a:solidFill>
+              </a:rPr>
               <a:t>Salary - Molly</a:t>
             </a:r>
           </a:p>
@@ -6546,36 +6758,159 @@
             <p:ph idx="1"/>
           </p:nvPr>
         </p:nvSpPr>
-        <p:spPr/>
-        <p:txBody>
-          <a:bodyPr/>
-          <a:lstStyle/>
-          <a:p>
-            <a:r>
-              <a:rPr lang="en-US" dirty="0"/>
-              <a:t>Higher </a:t>
-            </a:r>
-            <a:r>
-              <a:rPr lang="en-US" dirty="0">
-                <a:solidFill>
-                  <a:srgbClr val="FF0000"/>
+        <p:spPr>
+          <a:xfrm>
+            <a:off x="929141" y="2430471"/>
+            <a:ext cx="2835464" cy="3552039"/>
+          </a:xfrm>
+        </p:spPr>
+        <p:txBody>
+          <a:bodyPr>
+            <a:normAutofit/>
+          </a:bodyPr>
+          <a:lstStyle/>
+          <a:p>
+            <a:r>
+              <a:rPr lang="en-US" sz="1800" dirty="0">
+                <a:solidFill>
+                  <a:srgbClr val="262626"/>
                 </a:solidFill>
               </a:rPr>
-              <a:t>salary</a:t>
-            </a:r>
-            <a:r>
-              <a:rPr lang="en-US" dirty="0"/>
-              <a:t> states are the preferred ones?</a:t>
-            </a:r>
-          </a:p>
-          <a:p>
-            <a:r>
-              <a:rPr lang="en-US" i="1" dirty="0"/>
+              <a:t>Higher salary states are the preferred ones?</a:t>
+            </a:r>
+          </a:p>
+          <a:p>
+            <a:r>
+              <a:rPr lang="en-US" sz="1800" i="1" dirty="0">
+                <a:solidFill>
+                  <a:srgbClr val="262626"/>
+                </a:solidFill>
+              </a:rPr>
               <a:t>Write description/ observation and supporting plots (minimum 2) here</a:t>
             </a:r>
           </a:p>
         </p:txBody>
       </p:sp>
+      <p:sp useBgFill="1">
+        <p:nvSpPr>
+          <p:cNvPr id="16" name="Rectangle 15">
+            <a:extLst>
+              <a:ext uri="{FF2B5EF4-FFF2-40B4-BE49-F238E27FC236}">
+                <a16:creationId xmlns:a16="http://schemas.microsoft.com/office/drawing/2014/main" id="{6C22FCAC-D7EC-4A52-B153-FF761E2235B3}"/>
+              </a:ext>
+              <a:ext uri="{C183D7F6-B498-43B3-948B-1728B52AA6E4}">
+                <adec:decorative xmlns:adec="http://schemas.microsoft.com/office/drawing/2017/decorative" val="1"/>
+              </a:ext>
+            </a:extLst>
+          </p:cNvPr>
+          <p:cNvSpPr>
+            <a:spLocks noGrp="1" noRot="1" noChangeAspect="1" noMove="1" noResize="1" noEditPoints="1" noAdjustHandles="1" noChangeArrowheads="1" noChangeShapeType="1" noTextEdit="1"/>
+          </p:cNvSpPr>
+          <p:nvPr>
+            <p:extLst>
+              <p:ext uri="{386F3935-93C4-4BCD-93E2-E3B085C9AB24}">
+                <p16:designElem xmlns:p16="http://schemas.microsoft.com/office/powerpoint/2015/main" val="1"/>
+              </p:ext>
+            </p:extLst>
+          </p:nvPr>
+        </p:nvSpPr>
+        <p:spPr>
+          <a:xfrm>
+            <a:off x="4795491" y="0"/>
+            <a:ext cx="7396509" cy="6858002"/>
+          </a:xfrm>
+          <a:prstGeom prst="rect">
+            <a:avLst/>
+          </a:prstGeom>
+          <a:ln>
+            <a:noFill/>
+          </a:ln>
+        </p:spPr>
+        <p:style>
+          <a:lnRef idx="2">
+            <a:schemeClr val="accent1">
+              <a:shade val="50000"/>
+            </a:schemeClr>
+          </a:lnRef>
+          <a:fillRef idx="1">
+            <a:schemeClr val="accent1"/>
+          </a:fillRef>
+          <a:effectRef idx="0">
+            <a:schemeClr val="accent1"/>
+          </a:effectRef>
+          <a:fontRef idx="minor">
+            <a:schemeClr val="lt1"/>
+          </a:fontRef>
+        </p:style>
+        <p:txBody>
+          <a:bodyPr rtlCol="0" anchor="ctr"/>
+          <a:lstStyle/>
+          <a:p>
+            <a:pPr algn="ctr"/>
+            <a:endParaRPr lang="en-US"/>
+          </a:p>
+        </p:txBody>
+      </p:sp>
+      <p:pic>
+        <p:nvPicPr>
+          <p:cNvPr id="7" name="Picture 6" descr="A close up of a logo&#10;&#10;Description automatically generated">
+            <a:extLst>
+              <a:ext uri="{FF2B5EF4-FFF2-40B4-BE49-F238E27FC236}">
+                <a16:creationId xmlns:a16="http://schemas.microsoft.com/office/drawing/2014/main" id="{F61791F7-7E1E-44E1-B4B6-2B207FA16B1F}"/>
+              </a:ext>
+            </a:extLst>
+          </p:cNvPr>
+          <p:cNvPicPr>
+            <a:picLocks noChangeAspect="1"/>
+          </p:cNvPicPr>
+          <p:nvPr/>
+        </p:nvPicPr>
+        <p:blipFill>
+          <a:blip r:embed="rId3"/>
+          <a:stretch>
+            <a:fillRect/>
+          </a:stretch>
+        </p:blipFill>
+        <p:spPr>
+          <a:xfrm>
+            <a:off x="4870158" y="307730"/>
+            <a:ext cx="7393461" cy="3646785"/>
+          </a:xfrm>
+          <a:prstGeom prst="rect">
+            <a:avLst/>
+          </a:prstGeom>
+        </p:spPr>
+      </p:pic>
+      <p:pic>
+        <p:nvPicPr>
+          <p:cNvPr id="9" name="Picture 8">
+            <a:extLst>
+              <a:ext uri="{FF2B5EF4-FFF2-40B4-BE49-F238E27FC236}">
+                <a16:creationId xmlns:a16="http://schemas.microsoft.com/office/drawing/2014/main" id="{BC39B7E9-6114-4420-A965-2027D1707F73}"/>
+              </a:ext>
+            </a:extLst>
+          </p:cNvPr>
+          <p:cNvPicPr>
+            <a:picLocks noChangeAspect="1"/>
+          </p:cNvPicPr>
+          <p:nvPr/>
+        </p:nvPicPr>
+        <p:blipFill>
+          <a:blip r:embed="rId4"/>
+          <a:stretch>
+            <a:fillRect/>
+          </a:stretch>
+        </p:blipFill>
+        <p:spPr>
+          <a:xfrm>
+            <a:off x="4957255" y="3557608"/>
+            <a:ext cx="7219265" cy="3168092"/>
+          </a:xfrm>
+          <a:prstGeom prst="rect">
+            <a:avLst/>
+          </a:prstGeom>
+        </p:spPr>
+      </p:pic>
     </p:spTree>
     <p:extLst>
       <p:ext uri="{BB962C8B-B14F-4D97-AF65-F5344CB8AC3E}">

</xml_diff>